<commit_message>
-Fleshed out slides with code snippets, datasets, and graphs -Re-arranged slides to flow better -Added references -Added pictures of cute robots doing exercise - most important part of this whole thing!
P@

Signed-off-by: P@ <patmaynard452@gmail.com>
</commit_message>
<xml_diff>
--- a/Presentation/ALI_Raymond_MAYNARD_Patrick_GENG4500_Final_presentation_2024.pptx
+++ b/Presentation/ALI_Raymond_MAYNARD_Patrick_GENG4500_Final_presentation_2024.pptx
@@ -11,9 +11,9 @@
     <p:sldId id="256" r:id="rId2"/>
     <p:sldId id="268" r:id="rId3"/>
     <p:sldId id="269" r:id="rId4"/>
-    <p:sldId id="271" r:id="rId5"/>
+    <p:sldId id="273" r:id="rId5"/>
     <p:sldId id="272" r:id="rId6"/>
-    <p:sldId id="273" r:id="rId7"/>
+    <p:sldId id="271" r:id="rId7"/>
     <p:sldId id="275" r:id="rId8"/>
     <p:sldId id="274" r:id="rId9"/>
     <p:sldId id="270" r:id="rId10"/>
@@ -206,7 +206,7 @@
           <a:p>
             <a:fld id="{7E5E2DB3-6FEF-4CE5-A6A7-DA370F2E2760}" type="datetimeFigureOut">
               <a:rPr lang="en-CA" smtClean="0"/>
-              <a:t>2024-03-03</a:t>
+              <a:t>2024-03-11</a:t>
             </a:fld>
             <a:endParaRPr lang="en-CA"/>
           </a:p>
@@ -4330,6 +4330,179 @@
           </a:fontRef>
         </p:style>
       </p:cxnSp>
+      <p:pic>
+        <p:nvPicPr>
+          <p:cNvPr id="5" name="Picture 4" descr="A robot sitting on the floor reading a book&#10;&#10;Description automatically generated">
+            <a:extLst>
+              <a:ext uri="{FF2B5EF4-FFF2-40B4-BE49-F238E27FC236}">
+                <a16:creationId xmlns:a16="http://schemas.microsoft.com/office/drawing/2014/main" id="{C1487BB4-D5AD-8F7E-9A10-198C38E5EED9}"/>
+              </a:ext>
+            </a:extLst>
+          </p:cNvPr>
+          <p:cNvPicPr>
+            <a:picLocks noChangeAspect="1"/>
+          </p:cNvPicPr>
+          <p:nvPr/>
+        </p:nvPicPr>
+        <p:blipFill>
+          <a:blip r:embed="rId2">
+            <a:extLst>
+              <a:ext uri="{28A0092B-C50C-407E-A947-70E740481C1C}">
+                <a14:useLocalDpi xmlns:a14="http://schemas.microsoft.com/office/drawing/2010/main" val="0"/>
+              </a:ext>
+            </a:extLst>
+          </a:blip>
+          <a:stretch>
+            <a:fillRect/>
+          </a:stretch>
+        </p:blipFill>
+        <p:spPr>
+          <a:xfrm rot="21260851">
+            <a:off x="2569465" y="3729972"/>
+            <a:ext cx="3048000" cy="2033016"/>
+          </a:xfrm>
+          <a:prstGeom prst="roundRect">
+            <a:avLst>
+              <a:gd name="adj" fmla="val 16667"/>
+            </a:avLst>
+          </a:prstGeom>
+          <a:ln>
+            <a:noFill/>
+          </a:ln>
+          <a:effectLst>
+            <a:outerShdw blurRad="76200" dist="38100" dir="7800000" algn="tl" rotWithShape="0">
+              <a:srgbClr val="000000">
+                <a:alpha val="40000"/>
+              </a:srgbClr>
+            </a:outerShdw>
+          </a:effectLst>
+          <a:scene3d>
+            <a:camera prst="orthographicFront"/>
+            <a:lightRig rig="contrasting" dir="t">
+              <a:rot lat="0" lon="0" rev="4200000"/>
+            </a:lightRig>
+          </a:scene3d>
+          <a:sp3d prstMaterial="plastic">
+            <a:bevelT w="381000" h="114300" prst="relaxedInset"/>
+            <a:contourClr>
+              <a:srgbClr val="969696"/>
+            </a:contourClr>
+          </a:sp3d>
+        </p:spPr>
+      </p:pic>
+      <p:pic>
+        <p:nvPicPr>
+          <p:cNvPr id="7" name="Picture 6" descr="A robot lifting a barbell&#10;&#10;Description automatically generated">
+            <a:extLst>
+              <a:ext uri="{FF2B5EF4-FFF2-40B4-BE49-F238E27FC236}">
+                <a16:creationId xmlns:a16="http://schemas.microsoft.com/office/drawing/2014/main" id="{98F27804-0167-75CE-F09A-8DEAEB6A4E12}"/>
+              </a:ext>
+            </a:extLst>
+          </p:cNvPr>
+          <p:cNvPicPr>
+            <a:picLocks noChangeAspect="1"/>
+          </p:cNvPicPr>
+          <p:nvPr/>
+        </p:nvPicPr>
+        <p:blipFill>
+          <a:blip r:embed="rId3">
+            <a:extLst>
+              <a:ext uri="{28A0092B-C50C-407E-A947-70E740481C1C}">
+                <a14:useLocalDpi xmlns:a14="http://schemas.microsoft.com/office/drawing/2010/main" val="0"/>
+              </a:ext>
+            </a:extLst>
+          </a:blip>
+          <a:stretch>
+            <a:fillRect/>
+          </a:stretch>
+        </p:blipFill>
+        <p:spPr>
+          <a:xfrm>
+            <a:off x="8605520" y="610108"/>
+            <a:ext cx="3048000" cy="1716024"/>
+          </a:xfrm>
+          <a:prstGeom prst="roundRect">
+            <a:avLst>
+              <a:gd name="adj" fmla="val 16667"/>
+            </a:avLst>
+          </a:prstGeom>
+          <a:ln>
+            <a:noFill/>
+          </a:ln>
+          <a:effectLst>
+            <a:outerShdw blurRad="152400" dist="12000" dir="900000" sy="98000" kx="110000" ky="200000" algn="tl" rotWithShape="0">
+              <a:srgbClr val="000000">
+                <a:alpha val="30000"/>
+              </a:srgbClr>
+            </a:outerShdw>
+          </a:effectLst>
+          <a:scene3d>
+            <a:camera prst="perspectiveRelaxed">
+              <a:rot lat="19800000" lon="1200000" rev="20820000"/>
+            </a:camera>
+            <a:lightRig rig="threePt" dir="t"/>
+          </a:scene3d>
+          <a:sp3d contourW="6350" prstMaterial="matte">
+            <a:bevelT w="101600" h="101600"/>
+            <a:contourClr>
+              <a:srgbClr val="969696"/>
+            </a:contourClr>
+          </a:sp3d>
+        </p:spPr>
+      </p:pic>
+      <p:pic>
+        <p:nvPicPr>
+          <p:cNvPr id="9" name="Picture 8" descr="A white robot with arms raised&#10;&#10;Description automatically generated">
+            <a:extLst>
+              <a:ext uri="{FF2B5EF4-FFF2-40B4-BE49-F238E27FC236}">
+                <a16:creationId xmlns:a16="http://schemas.microsoft.com/office/drawing/2014/main" id="{4CFE2206-95D6-303A-E411-872AEB882EED}"/>
+              </a:ext>
+            </a:extLst>
+          </p:cNvPr>
+          <p:cNvPicPr>
+            <a:picLocks noChangeAspect="1"/>
+          </p:cNvPicPr>
+          <p:nvPr/>
+        </p:nvPicPr>
+        <p:blipFill>
+          <a:blip r:embed="rId4">
+            <a:extLst>
+              <a:ext uri="{28A0092B-C50C-407E-A947-70E740481C1C}">
+                <a14:useLocalDpi xmlns:a14="http://schemas.microsoft.com/office/drawing/2010/main" val="0"/>
+              </a:ext>
+            </a:extLst>
+          </a:blip>
+          <a:stretch>
+            <a:fillRect/>
+          </a:stretch>
+        </p:blipFill>
+        <p:spPr>
+          <a:xfrm>
+            <a:off x="796468" y="293581"/>
+            <a:ext cx="2019722" cy="2154370"/>
+          </a:xfrm>
+          <a:prstGeom prst="rect">
+            <a:avLst/>
+          </a:prstGeom>
+          <a:ln>
+            <a:noFill/>
+          </a:ln>
+          <a:effectLst>
+            <a:reflection blurRad="12700" stA="30000" endPos="30000" dist="5000" dir="5400000" sy="-100000" algn="bl" rotWithShape="0"/>
+          </a:effectLst>
+          <a:scene3d>
+            <a:camera prst="perspectiveContrastingLeftFacing">
+              <a:rot lat="300000" lon="19800000" rev="0"/>
+            </a:camera>
+            <a:lightRig rig="threePt" dir="t">
+              <a:rot lat="0" lon="0" rev="2700000"/>
+            </a:lightRig>
+          </a:scene3d>
+          <a:sp3d>
+            <a:bevelT w="63500" h="50800"/>
+          </a:sp3d>
+        </p:spPr>
+      </p:pic>
     </p:spTree>
     <p:extLst>
       <p:ext uri="{BB962C8B-B14F-4D97-AF65-F5344CB8AC3E}">
@@ -4573,7 +4746,51 @@
           </a:bodyPr>
           <a:lstStyle/>
           <a:p>
-            <a:endParaRPr lang="en-CA" sz="2000">
+            <a:r>
+              <a:rPr lang="en-US" sz="2000" dirty="0">
+                <a:solidFill>
+                  <a:schemeClr val="bg1"/>
+                </a:solidFill>
+              </a:rPr>
+              <a:t>Initial Problem - To predict housing prices in Canada</a:t>
+            </a:r>
+          </a:p>
+          <a:p>
+            <a:r>
+              <a:rPr lang="en-US" sz="2000" dirty="0">
+                <a:solidFill>
+                  <a:srgbClr val="FF0000"/>
+                </a:solidFill>
+              </a:rPr>
+              <a:t>New Problem </a:t>
+            </a:r>
+            <a:r>
+              <a:rPr lang="en-US" sz="2000" dirty="0">
+                <a:solidFill>
+                  <a:schemeClr val="bg1"/>
+                </a:solidFill>
+              </a:rPr>
+              <a:t>– Need more features to train our model!</a:t>
+            </a:r>
+          </a:p>
+          <a:p>
+            <a:r>
+              <a:rPr lang="en-US" sz="2000" dirty="0">
+                <a:solidFill>
+                  <a:srgbClr val="FF0000"/>
+                </a:solidFill>
+              </a:rPr>
+              <a:t>New Problem </a:t>
+            </a:r>
+            <a:r>
+              <a:rPr lang="en-US" sz="2000" dirty="0">
+                <a:solidFill>
+                  <a:schemeClr val="bg1"/>
+                </a:solidFill>
+              </a:rPr>
+              <a:t>– Need to Hyper Parameter Tune our model!</a:t>
+            </a:r>
+            <a:endParaRPr lang="en-CA" sz="2000" dirty="0">
               <a:solidFill>
                 <a:schemeClr val="bg1"/>
               </a:solidFill>
@@ -4865,7 +5082,7 @@
         </p:nvSpPr>
         <p:spPr>
           <a:xfrm>
-            <a:off x="908454" y="1360481"/>
+            <a:off x="838200" y="1757334"/>
             <a:ext cx="4605340" cy="2387600"/>
           </a:xfrm>
         </p:spPr>
@@ -4876,7 +5093,7 @@
           <a:lstStyle/>
           <a:p>
             <a:r>
-              <a:rPr lang="en-US" sz="5000" kern="1200">
+              <a:rPr lang="en-US" sz="5000" kern="1200" dirty="0">
                 <a:solidFill>
                   <a:schemeClr val="bg1"/>
                 </a:solidFill>
@@ -5359,7 +5576,7 @@
       </p:grpSpPr>
       <p:sp>
         <p:nvSpPr>
-          <p:cNvPr id="23" name="Rectangle 22">
+          <p:cNvPr id="32" name="Rectangle 31">
             <a:extLst>
               <a:ext uri="{FF2B5EF4-FFF2-40B4-BE49-F238E27FC236}">
                 <a16:creationId xmlns:a16="http://schemas.microsoft.com/office/drawing/2014/main" id="{FB5B0058-AF13-4859-B429-4EDDE2A26F7F}"/>
@@ -5419,103 +5636,6 @@
           <a:lstStyle/>
           <a:p>
             <a:pPr algn="ctr"/>
-            <a:endParaRPr lang="en-US"/>
-          </a:p>
-        </p:txBody>
-      </p:sp>
-      <p:sp>
-        <p:nvSpPr>
-          <p:cNvPr id="2" name="Title 1">
-            <a:extLst>
-              <a:ext uri="{FF2B5EF4-FFF2-40B4-BE49-F238E27FC236}">
-                <a16:creationId xmlns:a16="http://schemas.microsoft.com/office/drawing/2014/main" id="{36D455F1-1E35-A688-9311-D3D136F4A327}"/>
-              </a:ext>
-            </a:extLst>
-          </p:cNvPr>
-          <p:cNvSpPr>
-            <a:spLocks noGrp="1"/>
-          </p:cNvSpPr>
-          <p:nvPr>
-            <p:ph type="title"/>
-          </p:nvPr>
-        </p:nvSpPr>
-        <p:spPr>
-          <a:xfrm>
-            <a:off x="7370571" y="146537"/>
-            <a:ext cx="3003873" cy="607925"/>
-          </a:xfrm>
-        </p:spPr>
-        <p:txBody>
-          <a:bodyPr vert="horz" lIns="91440" tIns="45720" rIns="91440" bIns="45720" rtlCol="0" anchor="b">
-            <a:normAutofit fontScale="90000"/>
-          </a:bodyPr>
-          <a:lstStyle/>
-          <a:p>
-            <a:pPr algn="ctr"/>
-            <a:r>
-              <a:rPr lang="en-US" sz="4200" kern="1200" dirty="0">
-                <a:solidFill>
-                  <a:schemeClr val="bg1"/>
-                </a:solidFill>
-                <a:latin typeface="+mj-lt"/>
-                <a:ea typeface="+mj-ea"/>
-                <a:cs typeface="+mj-cs"/>
-              </a:rPr>
-              <a:t>Code Snippets</a:t>
-            </a:r>
-          </a:p>
-        </p:txBody>
-      </p:sp>
-      <p:sp>
-        <p:nvSpPr>
-          <p:cNvPr id="4" name="Date Placeholder 3">
-            <a:extLst>
-              <a:ext uri="{FF2B5EF4-FFF2-40B4-BE49-F238E27FC236}">
-                <a16:creationId xmlns:a16="http://schemas.microsoft.com/office/drawing/2014/main" id="{2302E614-F52E-86EB-42FD-897361051A04}"/>
-              </a:ext>
-            </a:extLst>
-          </p:cNvPr>
-          <p:cNvSpPr>
-            <a:spLocks noGrp="1"/>
-          </p:cNvSpPr>
-          <p:nvPr>
-            <p:ph type="dt" sz="half" idx="10"/>
-          </p:nvPr>
-        </p:nvSpPr>
-        <p:spPr>
-          <a:xfrm>
-            <a:off x="474033" y="6346337"/>
-            <a:ext cx="751985" cy="365125"/>
-          </a:xfrm>
-        </p:spPr>
-        <p:txBody>
-          <a:bodyPr vert="horz" lIns="91440" tIns="45720" rIns="91440" bIns="45720" rtlCol="0" anchor="ctr">
-            <a:normAutofit/>
-          </a:bodyPr>
-          <a:lstStyle/>
-          <a:p>
-            <a:pPr>
-              <a:spcAft>
-                <a:spcPts val="600"/>
-              </a:spcAft>
-              <a:defRPr/>
-            </a:pPr>
-            <a:fld id="{DD303E3B-074C-440F-86D1-3BB7E04505DE}" type="datetimeyyyy">
-              <a:rPr lang="en-US">
-                <a:solidFill>
-                  <a:schemeClr val="bg1">
-                    <a:lumMod val="50000"/>
-                  </a:schemeClr>
-                </a:solidFill>
-              </a:rPr>
-              <a:pPr>
-                <a:spcAft>
-                  <a:spcPts val="600"/>
-                </a:spcAft>
-                <a:defRPr/>
-              </a:pPr>
-              <a:t>2024</a:t>
-            </a:fld>
             <a:endParaRPr lang="en-US" dirty="0">
               <a:solidFill>
                 <a:schemeClr val="bg1">
@@ -5526,12 +5646,54 @@
           </a:p>
         </p:txBody>
       </p:sp>
+      <p:sp>
+        <p:nvSpPr>
+          <p:cNvPr id="2" name="Title 1">
+            <a:extLst>
+              <a:ext uri="{FF2B5EF4-FFF2-40B4-BE49-F238E27FC236}">
+                <a16:creationId xmlns:a16="http://schemas.microsoft.com/office/drawing/2014/main" id="{F554B7EB-4BB2-0A9F-129C-3895024441E3}"/>
+              </a:ext>
+            </a:extLst>
+          </p:cNvPr>
+          <p:cNvSpPr>
+            <a:spLocks noGrp="1"/>
+          </p:cNvSpPr>
+          <p:nvPr>
+            <p:ph type="title"/>
+          </p:nvPr>
+        </p:nvSpPr>
+        <p:spPr>
+          <a:xfrm>
+            <a:off x="734023" y="136525"/>
+            <a:ext cx="3401097" cy="940434"/>
+          </a:xfrm>
+        </p:spPr>
+        <p:txBody>
+          <a:bodyPr vert="horz" lIns="91440" tIns="45720" rIns="91440" bIns="45720" rtlCol="0" anchor="b">
+            <a:normAutofit fontScale="90000"/>
+          </a:bodyPr>
+          <a:lstStyle/>
+          <a:p>
+            <a:r>
+              <a:rPr lang="en-US" sz="6600" kern="1200" dirty="0">
+                <a:solidFill>
+                  <a:schemeClr val="bg1"/>
+                </a:solidFill>
+                <a:latin typeface="+mj-lt"/>
+                <a:ea typeface="+mj-ea"/>
+                <a:cs typeface="+mj-cs"/>
+              </a:rPr>
+              <a:t>Solutions</a:t>
+            </a:r>
+          </a:p>
+        </p:txBody>
+      </p:sp>
       <p:cxnSp>
         <p:nvCxnSpPr>
-          <p:cNvPr id="25" name="Straight Connector 24">
-            <a:extLst>
-              <a:ext uri="{FF2B5EF4-FFF2-40B4-BE49-F238E27FC236}">
-                <a16:creationId xmlns:a16="http://schemas.microsoft.com/office/drawing/2014/main" id="{FEA8332D-EA74-40A2-8709-00EDB23792E1}"/>
+          <p:cNvPr id="33" name="Straight Connector 32">
+            <a:extLst>
+              <a:ext uri="{FF2B5EF4-FFF2-40B4-BE49-F238E27FC236}">
+                <a16:creationId xmlns:a16="http://schemas.microsoft.com/office/drawing/2014/main" id="{EC4521DE-248E-440D-AAD6-FD9E7D34B3BF}"/>
               </a:ext>
               <a:ext uri="{C183D7F6-B498-43B3-948B-1728B52AA6E4}">
                 <adec:decorative xmlns:adec="http://schemas.microsoft.com/office/drawing/2017/decorative" val="1"/>
@@ -5551,8 +5713,8 @@
         </p:nvCxnSpPr>
         <p:spPr>
           <a:xfrm>
-            <a:off x="317240" y="3429000"/>
-            <a:ext cx="0" cy="3164872"/>
+            <a:off x="585285" y="0"/>
+            <a:ext cx="0" cy="6858000"/>
           </a:xfrm>
           <a:prstGeom prst="line">
             <a:avLst/>
@@ -5578,81 +5740,21 @@
           </a:fontRef>
         </p:style>
       </p:cxnSp>
-      <p:sp>
-        <p:nvSpPr>
-          <p:cNvPr id="6" name="Slide Number Placeholder 5">
-            <a:extLst>
-              <a:ext uri="{FF2B5EF4-FFF2-40B4-BE49-F238E27FC236}">
-                <a16:creationId xmlns:a16="http://schemas.microsoft.com/office/drawing/2014/main" id="{F61D429F-9044-88F6-7609-FFE708B70CF7}"/>
-              </a:ext>
-            </a:extLst>
-          </p:cNvPr>
-          <p:cNvSpPr>
-            <a:spLocks noGrp="1"/>
-          </p:cNvSpPr>
-          <p:nvPr>
-            <p:ph type="sldNum" sz="quarter" idx="12"/>
-          </p:nvPr>
-        </p:nvSpPr>
-        <p:spPr>
-          <a:xfrm>
-            <a:off x="11379614" y="6346339"/>
-            <a:ext cx="677708" cy="365125"/>
-          </a:xfrm>
-        </p:spPr>
-        <p:txBody>
-          <a:bodyPr vert="horz" lIns="91440" tIns="45720" rIns="91440" bIns="45720" rtlCol="0" anchor="ctr">
-            <a:normAutofit/>
-          </a:bodyPr>
-          <a:lstStyle/>
-          <a:p>
-            <a:pPr>
-              <a:spcAft>
-                <a:spcPts val="600"/>
-              </a:spcAft>
-              <a:defRPr/>
-            </a:pPr>
-            <a:fld id="{BC1B8E0F-90D7-4F6F-9CC4-1E156486B9C1}" type="slidenum">
-              <a:rPr lang="en-US">
-                <a:solidFill>
-                  <a:schemeClr val="bg1">
-                    <a:lumMod val="50000"/>
-                  </a:schemeClr>
-                </a:solidFill>
-              </a:rPr>
-              <a:pPr>
-                <a:spcAft>
-                  <a:spcPts val="600"/>
-                </a:spcAft>
-                <a:defRPr/>
-              </a:pPr>
-              <a:t>4</a:t>
-            </a:fld>
-            <a:endParaRPr lang="en-US" dirty="0">
-              <a:solidFill>
-                <a:schemeClr val="bg1">
-                  <a:lumMod val="50000"/>
-                </a:schemeClr>
-              </a:solidFill>
-            </a:endParaRPr>
-          </a:p>
-        </p:txBody>
-      </p:sp>
-      <p:sp>
-        <p:nvSpPr>
-          <p:cNvPr id="27" name="Rectangle 26">
-            <a:extLst>
-              <a:ext uri="{FF2B5EF4-FFF2-40B4-BE49-F238E27FC236}">
-                <a16:creationId xmlns:a16="http://schemas.microsoft.com/office/drawing/2014/main" id="{9358801C-1E89-48FF-B14F-D76A2EA14C8E}"/>
+      <p:cxnSp>
+        <p:nvCxnSpPr>
+          <p:cNvPr id="15" name="Straight Connector 14">
+            <a:extLst>
+              <a:ext uri="{FF2B5EF4-FFF2-40B4-BE49-F238E27FC236}">
+                <a16:creationId xmlns:a16="http://schemas.microsoft.com/office/drawing/2014/main" id="{442C13FA-4C0F-42D0-9626-5BA6040D8C31}"/>
               </a:ext>
               <a:ext uri="{C183D7F6-B498-43B3-948B-1728B52AA6E4}">
                 <adec:decorative xmlns:adec="http://schemas.microsoft.com/office/drawing/2017/decorative" val="1"/>
               </a:ext>
             </a:extLst>
           </p:cNvPr>
-          <p:cNvSpPr>
-            <a:spLocks noGrp="1" noRot="1" noChangeAspect="1" noMove="1" noResize="1" noEditPoints="1" noAdjustHandles="1" noChangeArrowheads="1" noChangeShapeType="1" noTextEdit="1"/>
-          </p:cNvSpPr>
+          <p:cNvCxnSpPr>
+            <a:cxnSpLocks noGrp="1" noRot="1" noChangeAspect="1" noMove="1" noResize="1" noEditPoints="1" noAdjustHandles="1" noChangeArrowheads="1" noChangeShapeType="1"/>
+          </p:cNvCxnSpPr>
           <p:nvPr>
             <p:extLst>
               <p:ext uri="{386F3935-93C4-4BCD-93E2-E3B085C9AB24}">
@@ -5660,74 +5762,11 @@
               </p:ext>
             </p:extLst>
           </p:nvPr>
-        </p:nvSpPr>
-        <p:spPr>
-          <a:xfrm>
-            <a:off x="2134797" y="816429"/>
-            <a:ext cx="8239647" cy="5225143"/>
-          </a:xfrm>
-          <a:prstGeom prst="rect">
-            <a:avLst/>
-          </a:prstGeom>
-          <a:noFill/>
-          <a:ln>
-            <a:solidFill>
-              <a:schemeClr val="accent2"/>
-            </a:solidFill>
-          </a:ln>
-        </p:spPr>
-        <p:style>
-          <a:lnRef idx="2">
-            <a:schemeClr val="accent1">
-              <a:shade val="50000"/>
-            </a:schemeClr>
-          </a:lnRef>
-          <a:fillRef idx="1">
-            <a:schemeClr val="accent1"/>
-          </a:fillRef>
-          <a:effectRef idx="0">
-            <a:schemeClr val="accent1"/>
-          </a:effectRef>
-          <a:fontRef idx="minor">
-            <a:schemeClr val="lt1"/>
-          </a:fontRef>
-        </p:style>
-        <p:txBody>
-          <a:bodyPr rtlCol="0" anchor="ctr"/>
-          <a:lstStyle/>
-          <a:p>
-            <a:pPr algn="ctr"/>
-            <a:endParaRPr lang="en-US"/>
-          </a:p>
-        </p:txBody>
-      </p:sp>
-      <p:cxnSp>
-        <p:nvCxnSpPr>
-          <p:cNvPr id="29" name="Straight Connector 28">
-            <a:extLst>
-              <a:ext uri="{FF2B5EF4-FFF2-40B4-BE49-F238E27FC236}">
-                <a16:creationId xmlns:a16="http://schemas.microsoft.com/office/drawing/2014/main" id="{AB88284F-ED00-40CA-B57D-89C49E8EC6E9}"/>
-              </a:ext>
-              <a:ext uri="{C183D7F6-B498-43B3-948B-1728B52AA6E4}">
-                <adec:decorative xmlns:adec="http://schemas.microsoft.com/office/drawing/2017/decorative" val="1"/>
-              </a:ext>
-            </a:extLst>
-          </p:cNvPr>
-          <p:cNvCxnSpPr>
-            <a:cxnSpLocks noGrp="1" noRot="1" noChangeAspect="1" noMove="1" noResize="1" noEditPoints="1" noAdjustHandles="1" noChangeArrowheads="1" noChangeShapeType="1"/>
-          </p:cNvCxnSpPr>
-          <p:nvPr>
-            <p:extLst>
-              <p:ext uri="{386F3935-93C4-4BCD-93E2-E3B085C9AB24}">
-                <p16:designElem xmlns:p16="http://schemas.microsoft.com/office/powerpoint/2015/main" val="1"/>
-              </p:ext>
-            </p:extLst>
-          </p:nvPr>
         </p:nvCxnSpPr>
         <p:spPr>
-          <a:xfrm>
-            <a:off x="11900357" y="272979"/>
-            <a:ext cx="0" cy="2906211"/>
+          <a:xfrm flipH="1">
+            <a:off x="0" y="6252485"/>
+            <a:ext cx="12192000" cy="0"/>
           </a:xfrm>
           <a:prstGeom prst="line">
             <a:avLst/>
@@ -5755,10 +5794,10 @@
       </p:cxnSp>
       <p:sp>
         <p:nvSpPr>
-          <p:cNvPr id="5" name="Footer Placeholder 4">
-            <a:extLst>
-              <a:ext uri="{FF2B5EF4-FFF2-40B4-BE49-F238E27FC236}">
-                <a16:creationId xmlns:a16="http://schemas.microsoft.com/office/drawing/2014/main" id="{0C7A8648-1807-0813-E6CF-EB4EAB3C8E7F}"/>
+          <p:cNvPr id="4" name="Date Placeholder 3">
+            <a:extLst>
+              <a:ext uri="{FF2B5EF4-FFF2-40B4-BE49-F238E27FC236}">
+                <a16:creationId xmlns:a16="http://schemas.microsoft.com/office/drawing/2014/main" id="{AB7B4B59-A54B-1B2E-A018-28801C948F89}"/>
               </a:ext>
             </a:extLst>
           </p:cNvPr>
@@ -5766,13 +5805,13 @@
             <a:spLocks noGrp="1"/>
           </p:cNvSpPr>
           <p:nvPr>
-            <p:ph type="ftr" sz="quarter" idx="11"/>
+            <p:ph type="dt" sz="half" idx="10"/>
           </p:nvPr>
         </p:nvSpPr>
         <p:spPr>
           <a:xfrm>
-            <a:off x="5742529" y="6346338"/>
-            <a:ext cx="1941900" cy="365125"/>
+            <a:off x="1665533" y="6356350"/>
+            <a:ext cx="2743200" cy="365125"/>
           </a:xfrm>
         </p:spPr>
         <p:txBody>
@@ -5781,19 +5820,76 @@
           </a:bodyPr>
           <a:lstStyle/>
           <a:p>
-            <a:pPr algn="l">
+            <a:pPr>
               <a:spcAft>
                 <a:spcPts val="600"/>
               </a:spcAft>
-              <a:defRPr/>
             </a:pPr>
-            <a:r>
-              <a:rPr lang="en-US" kern="1200" dirty="0">
+            <a:fld id="{DD303E3B-074C-440F-86D1-3BB7E04505DE}" type="datetimeyyyy">
+              <a:rPr lang="en-US">
                 <a:solidFill>
                   <a:schemeClr val="bg1">
                     <a:lumMod val="50000"/>
                   </a:schemeClr>
                 </a:solidFill>
+              </a:rPr>
+              <a:pPr>
+                <a:spcAft>
+                  <a:spcPts val="600"/>
+                </a:spcAft>
+              </a:pPr>
+              <a:t>2024</a:t>
+            </a:fld>
+            <a:endParaRPr lang="en-US">
+              <a:solidFill>
+                <a:schemeClr val="bg1">
+                  <a:lumMod val="50000"/>
+                </a:schemeClr>
+              </a:solidFill>
+            </a:endParaRPr>
+          </a:p>
+        </p:txBody>
+      </p:sp>
+      <p:sp>
+        <p:nvSpPr>
+          <p:cNvPr id="5" name="Footer Placeholder 4">
+            <a:extLst>
+              <a:ext uri="{FF2B5EF4-FFF2-40B4-BE49-F238E27FC236}">
+                <a16:creationId xmlns:a16="http://schemas.microsoft.com/office/drawing/2014/main" id="{1230C12F-2ED5-2D2B-4CDD-90B1C5958274}"/>
+              </a:ext>
+            </a:extLst>
+          </p:cNvPr>
+          <p:cNvSpPr>
+            <a:spLocks noGrp="1"/>
+          </p:cNvSpPr>
+          <p:nvPr>
+            <p:ph type="ftr" sz="quarter" idx="11"/>
+          </p:nvPr>
+        </p:nvSpPr>
+        <p:spPr>
+          <a:xfrm>
+            <a:off x="4730455" y="6356350"/>
+            <a:ext cx="4114800" cy="365125"/>
+          </a:xfrm>
+        </p:spPr>
+        <p:txBody>
+          <a:bodyPr vert="horz" lIns="91440" tIns="45720" rIns="91440" bIns="45720" rtlCol="0" anchor="ctr">
+            <a:normAutofit/>
+          </a:bodyPr>
+          <a:lstStyle/>
+          <a:p>
+            <a:pPr>
+              <a:spcAft>
+                <a:spcPts val="600"/>
+              </a:spcAft>
+            </a:pPr>
+            <a:r>
+              <a:rPr lang="en-US" kern="1200">
+                <a:solidFill>
+                  <a:schemeClr val="bg1">
+                    <a:lumMod val="50000"/>
+                  </a:schemeClr>
+                </a:solidFill>
                 <a:latin typeface="+mn-lt"/>
                 <a:ea typeface="+mn-ea"/>
                 <a:cs typeface="+mn-cs"/>
@@ -5803,10 +5899,209 @@
           </a:p>
         </p:txBody>
       </p:sp>
+      <p:sp>
+        <p:nvSpPr>
+          <p:cNvPr id="6" name="Slide Number Placeholder 5">
+            <a:extLst>
+              <a:ext uri="{FF2B5EF4-FFF2-40B4-BE49-F238E27FC236}">
+                <a16:creationId xmlns:a16="http://schemas.microsoft.com/office/drawing/2014/main" id="{1B66B0D7-11DB-C3B7-7F7F-1ABE1123432D}"/>
+              </a:ext>
+            </a:extLst>
+          </p:cNvPr>
+          <p:cNvSpPr>
+            <a:spLocks noGrp="1"/>
+          </p:cNvSpPr>
+          <p:nvPr>
+            <p:ph type="sldNum" sz="quarter" idx="12"/>
+          </p:nvPr>
+        </p:nvSpPr>
+        <p:spPr>
+          <a:xfrm>
+            <a:off x="9224794" y="6356350"/>
+            <a:ext cx="1779493" cy="365125"/>
+          </a:xfrm>
+        </p:spPr>
+        <p:txBody>
+          <a:bodyPr vert="horz" lIns="91440" tIns="45720" rIns="91440" bIns="45720" rtlCol="0" anchor="ctr">
+            <a:normAutofit/>
+          </a:bodyPr>
+          <a:lstStyle/>
+          <a:p>
+            <a:pPr>
+              <a:spcAft>
+                <a:spcPts val="600"/>
+              </a:spcAft>
+            </a:pPr>
+            <a:fld id="{BC1B8E0F-90D7-4F6F-9CC4-1E156486B9C1}" type="slidenum">
+              <a:rPr lang="en-US">
+                <a:solidFill>
+                  <a:schemeClr val="bg1">
+                    <a:lumMod val="50000"/>
+                  </a:schemeClr>
+                </a:solidFill>
+              </a:rPr>
+              <a:pPr>
+                <a:spcAft>
+                  <a:spcPts val="600"/>
+                </a:spcAft>
+              </a:pPr>
+              <a:t>4</a:t>
+            </a:fld>
+            <a:endParaRPr lang="en-US">
+              <a:solidFill>
+                <a:schemeClr val="bg1">
+                  <a:lumMod val="50000"/>
+                </a:schemeClr>
+              </a:solidFill>
+            </a:endParaRPr>
+          </a:p>
+        </p:txBody>
+      </p:sp>
+      <p:sp>
+        <p:nvSpPr>
+          <p:cNvPr id="3" name="TextBox 2">
+            <a:extLst>
+              <a:ext uri="{FF2B5EF4-FFF2-40B4-BE49-F238E27FC236}">
+                <a16:creationId xmlns:a16="http://schemas.microsoft.com/office/drawing/2014/main" id="{C00B5003-7146-69D1-6BAB-5BB2D86538B6}"/>
+              </a:ext>
+            </a:extLst>
+          </p:cNvPr>
+          <p:cNvSpPr txBox="1"/>
+          <p:nvPr/>
+        </p:nvSpPr>
+        <p:spPr>
+          <a:xfrm>
+            <a:off x="747778" y="1013653"/>
+            <a:ext cx="7415781" cy="1711366"/>
+          </a:xfrm>
+          <a:prstGeom prst="rect">
+            <a:avLst/>
+          </a:prstGeom>
+          <a:noFill/>
+        </p:spPr>
+        <p:txBody>
+          <a:bodyPr wrap="square" rtlCol="0">
+            <a:spAutoFit/>
+          </a:bodyPr>
+          <a:lstStyle/>
+          <a:p>
+            <a:pPr marL="285750" indent="-285750" algn="just">
+              <a:lnSpc>
+                <a:spcPct val="150000"/>
+              </a:lnSpc>
+              <a:buFont typeface="Arial" panose="020B0604020202020204" pitchFamily="34" charset="0"/>
+              <a:buChar char="•"/>
+            </a:pPr>
+            <a:r>
+              <a:rPr lang="en-US" dirty="0">
+                <a:solidFill>
+                  <a:schemeClr val="bg1"/>
+                </a:solidFill>
+              </a:rPr>
+              <a:t>Get more features</a:t>
+            </a:r>
+          </a:p>
+          <a:p>
+            <a:pPr marL="285750" indent="-285750" algn="just">
+              <a:lnSpc>
+                <a:spcPct val="150000"/>
+              </a:lnSpc>
+              <a:buFont typeface="Arial" panose="020B0604020202020204" pitchFamily="34" charset="0"/>
+              <a:buChar char="•"/>
+            </a:pPr>
+            <a:r>
+              <a:rPr lang="en-US" dirty="0">
+                <a:solidFill>
+                  <a:schemeClr val="bg1"/>
+                </a:solidFill>
+              </a:rPr>
+              <a:t>Hyperparameter tune the output and compare the differences</a:t>
+            </a:r>
+          </a:p>
+          <a:p>
+            <a:pPr marL="285750" indent="-285750" algn="just">
+              <a:lnSpc>
+                <a:spcPct val="150000"/>
+              </a:lnSpc>
+              <a:buFont typeface="Arial" panose="020B0604020202020204" pitchFamily="34" charset="0"/>
+              <a:buChar char="•"/>
+            </a:pPr>
+            <a:r>
+              <a:rPr lang="en-US" dirty="0">
+                <a:solidFill>
+                  <a:schemeClr val="bg1"/>
+                </a:solidFill>
+              </a:rPr>
+              <a:t>Get actual dollar values for house costs</a:t>
+            </a:r>
+          </a:p>
+          <a:p>
+            <a:pPr marL="285750" indent="-285750" algn="just">
+              <a:lnSpc>
+                <a:spcPct val="150000"/>
+              </a:lnSpc>
+              <a:buFont typeface="Arial" panose="020B0604020202020204" pitchFamily="34" charset="0"/>
+              <a:buChar char="•"/>
+            </a:pPr>
+            <a:r>
+              <a:rPr lang="en-US" dirty="0">
+                <a:solidFill>
+                  <a:schemeClr val="bg1"/>
+                </a:solidFill>
+              </a:rPr>
+              <a:t>Graph an actual prediction and not just compare prediction vs actual HPI</a:t>
+            </a:r>
+            <a:endParaRPr lang="en-CA" dirty="0">
+              <a:solidFill>
+                <a:schemeClr val="bg1"/>
+              </a:solidFill>
+            </a:endParaRPr>
+          </a:p>
+        </p:txBody>
+      </p:sp>
+      <p:pic>
+        <p:nvPicPr>
+          <p:cNvPr id="8" name="Graphic 7">
+            <a:extLst>
+              <a:ext uri="{FF2B5EF4-FFF2-40B4-BE49-F238E27FC236}">
+                <a16:creationId xmlns:a16="http://schemas.microsoft.com/office/drawing/2014/main" id="{4C9231AE-A590-4540-F1D4-B7F523DAC742}"/>
+              </a:ext>
+            </a:extLst>
+          </p:cNvPr>
+          <p:cNvPicPr>
+            <a:picLocks noChangeAspect="1"/>
+          </p:cNvPicPr>
+          <p:nvPr/>
+        </p:nvPicPr>
+        <p:blipFill>
+          <a:blip r:embed="rId2">
+            <a:extLst>
+              <a:ext uri="{28A0092B-C50C-407E-A947-70E740481C1C}">
+                <a14:useLocalDpi xmlns:a14="http://schemas.microsoft.com/office/drawing/2010/main" val="0"/>
+              </a:ext>
+              <a:ext uri="{96DAC541-7B7A-43D3-8B79-37D633B846F1}">
+                <asvg:svgBlip xmlns:asvg="http://schemas.microsoft.com/office/drawing/2016/SVG/main" r:embed="rId3"/>
+              </a:ext>
+            </a:extLst>
+          </a:blip>
+          <a:stretch>
+            <a:fillRect/>
+          </a:stretch>
+        </p:blipFill>
+        <p:spPr>
+          <a:xfrm>
+            <a:off x="7017731" y="2828883"/>
+            <a:ext cx="4414125" cy="3281361"/>
+          </a:xfrm>
+          <a:prstGeom prst="rect">
+            <a:avLst/>
+          </a:prstGeom>
+        </p:spPr>
+      </p:pic>
     </p:spTree>
     <p:extLst>
       <p:ext uri="{BB962C8B-B14F-4D97-AF65-F5344CB8AC3E}">
-        <p14:creationId xmlns:p14="http://schemas.microsoft.com/office/powerpoint/2010/main" val="2861466632"/>
+        <p14:creationId xmlns:p14="http://schemas.microsoft.com/office/powerpoint/2010/main" val="2907016894"/>
       </p:ext>
     </p:extLst>
   </p:cSld>
@@ -5932,7 +6227,7 @@
         <p:spPr>
           <a:xfrm>
             <a:off x="683223" y="14603"/>
-            <a:ext cx="2232697" cy="989965"/>
+            <a:ext cx="5242089" cy="989965"/>
           </a:xfrm>
         </p:spPr>
         <p:txBody>
@@ -5950,7 +6245,7 @@
                 <a:ea typeface="+mj-ea"/>
                 <a:cs typeface="+mj-cs"/>
               </a:rPr>
-              <a:t>Issues</a:t>
+              <a:t>Dataset Issues</a:t>
             </a:r>
           </a:p>
         </p:txBody>
@@ -6315,13 +6610,13 @@
           <p:nvPr>
             <p:extLst>
               <p:ext uri="{D42A27DB-BD31-4B8C-83A1-F6EECF244321}">
-                <p14:modId xmlns:p14="http://schemas.microsoft.com/office/powerpoint/2010/main" val="3167352250"/>
+                <p14:modId xmlns:p14="http://schemas.microsoft.com/office/powerpoint/2010/main" val="417986935"/>
               </p:ext>
             </p:extLst>
           </p:nvPr>
         </p:nvGraphicFramePr>
         <p:xfrm>
-          <a:off x="808038" y="1593850"/>
+          <a:off x="1170571" y="1444514"/>
           <a:ext cx="10196247" cy="850900"/>
         </p:xfrm>
         <a:graphic>
@@ -6349,8 +6644,155 @@
                     </p:blipFill>
                     <p:spPr>
                       <a:xfrm>
-                        <a:off x="808038" y="1593850"/>
+                        <a:off x="1170571" y="1444514"/>
                         <a:ext cx="10196247" cy="850900"/>
+                      </a:xfrm>
+                      <a:prstGeom prst="rect">
+                        <a:avLst/>
+                      </a:prstGeom>
+                    </p:spPr>
+                  </p:pic>
+                </p:oleObj>
+              </mc:Fallback>
+            </mc:AlternateContent>
+          </a:graphicData>
+        </a:graphic>
+      </p:graphicFrame>
+      <p:sp>
+        <p:nvSpPr>
+          <p:cNvPr id="3" name="TextBox 2">
+            <a:extLst>
+              <a:ext uri="{FF2B5EF4-FFF2-40B4-BE49-F238E27FC236}">
+                <a16:creationId xmlns:a16="http://schemas.microsoft.com/office/drawing/2014/main" id="{48C14A71-534D-0BE5-0D0E-664C345D7C6E}"/>
+              </a:ext>
+            </a:extLst>
+          </p:cNvPr>
+          <p:cNvSpPr txBox="1"/>
+          <p:nvPr/>
+        </p:nvSpPr>
+        <p:spPr>
+          <a:xfrm>
+            <a:off x="1170571" y="1088136"/>
+            <a:ext cx="2066405" cy="369332"/>
+          </a:xfrm>
+          <a:prstGeom prst="rect">
+            <a:avLst/>
+          </a:prstGeom>
+          <a:noFill/>
+        </p:spPr>
+        <p:txBody>
+          <a:bodyPr wrap="square" rtlCol="0">
+            <a:spAutoFit/>
+          </a:bodyPr>
+          <a:lstStyle/>
+          <a:p>
+            <a:r>
+              <a:rPr lang="en-US" dirty="0">
+                <a:solidFill>
+                  <a:schemeClr val="bg1"/>
+                </a:solidFill>
+              </a:rPr>
+              <a:t>Old Data: </a:t>
+            </a:r>
+            <a:endParaRPr lang="en-CA" dirty="0">
+              <a:solidFill>
+                <a:schemeClr val="bg1"/>
+              </a:solidFill>
+            </a:endParaRPr>
+          </a:p>
+        </p:txBody>
+      </p:sp>
+      <p:sp>
+        <p:nvSpPr>
+          <p:cNvPr id="8" name="TextBox 7">
+            <a:extLst>
+              <a:ext uri="{FF2B5EF4-FFF2-40B4-BE49-F238E27FC236}">
+                <a16:creationId xmlns:a16="http://schemas.microsoft.com/office/drawing/2014/main" id="{F47858DA-CF9B-27FB-DCE3-915D4A6D3669}"/>
+              </a:ext>
+            </a:extLst>
+          </p:cNvPr>
+          <p:cNvSpPr txBox="1"/>
+          <p:nvPr/>
+        </p:nvSpPr>
+        <p:spPr>
+          <a:xfrm>
+            <a:off x="1179715" y="2587752"/>
+            <a:ext cx="2285861" cy="369332"/>
+          </a:xfrm>
+          <a:prstGeom prst="rect">
+            <a:avLst/>
+          </a:prstGeom>
+          <a:noFill/>
+        </p:spPr>
+        <p:txBody>
+          <a:bodyPr wrap="square" rtlCol="0">
+            <a:spAutoFit/>
+          </a:bodyPr>
+          <a:lstStyle/>
+          <a:p>
+            <a:r>
+              <a:rPr lang="en-US" dirty="0">
+                <a:solidFill>
+                  <a:schemeClr val="bg1"/>
+                </a:solidFill>
+              </a:rPr>
+              <a:t>New Data:</a:t>
+            </a:r>
+            <a:endParaRPr lang="en-CA" dirty="0"/>
+          </a:p>
+        </p:txBody>
+      </p:sp>
+      <p:graphicFrame>
+        <p:nvGraphicFramePr>
+          <p:cNvPr id="11" name="Object 10">
+            <a:extLst>
+              <a:ext uri="{FF2B5EF4-FFF2-40B4-BE49-F238E27FC236}">
+                <a16:creationId xmlns:a16="http://schemas.microsoft.com/office/drawing/2014/main" id="{8084F757-5FCB-89C5-9C4F-6F2A9D249BE5}"/>
+              </a:ext>
+            </a:extLst>
+          </p:cNvPr>
+          <p:cNvGraphicFramePr>
+            <a:graphicFrameLocks noChangeAspect="1"/>
+          </p:cNvGraphicFramePr>
+          <p:nvPr>
+            <p:extLst>
+              <p:ext uri="{D42A27DB-BD31-4B8C-83A1-F6EECF244321}">
+                <p14:modId xmlns:p14="http://schemas.microsoft.com/office/powerpoint/2010/main" val="3097741284"/>
+              </p:ext>
+            </p:extLst>
+          </p:nvPr>
+        </p:nvGraphicFramePr>
+        <p:xfrm>
+          <a:off x="1290638" y="3005138"/>
+          <a:ext cx="10075862" cy="2611437"/>
+        </p:xfrm>
+        <a:graphic>
+          <a:graphicData uri="http://schemas.openxmlformats.org/presentationml/2006/ole">
+            <mc:AlternateContent xmlns:mc="http://schemas.openxmlformats.org/markup-compatibility/2006">
+              <mc:Choice xmlns:v="urn:schemas-microsoft-com:vml" Requires="v">
+                <p:oleObj name="Worksheet" r:id="rId4" imgW="7934249" imgH="1914525" progId="Excel.Sheet.12">
+                  <p:embed/>
+                </p:oleObj>
+              </mc:Choice>
+              <mc:Fallback>
+                <p:oleObj name="Worksheet" r:id="rId4" imgW="7934249" imgH="1914525" progId="Excel.Sheet.12">
+                  <p:embed/>
+                  <p:pic>
+                    <p:nvPicPr>
+                      <p:cNvPr id="0" name=""/>
+                      <p:cNvPicPr/>
+                      <p:nvPr/>
+                    </p:nvPicPr>
+                    <p:blipFill>
+                      <a:blip r:embed="rId5"/>
+                      <a:stretch>
+                        <a:fillRect/>
+                      </a:stretch>
+                    </p:blipFill>
+                    <p:spPr>
+                      <a:xfrm>
+                        <a:off x="1290638" y="3005138"/>
+                        <a:ext cx="10075862" cy="2611437"/>
                       </a:xfrm>
                       <a:prstGeom prst="rect">
                         <a:avLst/>
@@ -6403,7 +6845,7 @@
       </p:grpSpPr>
       <p:sp>
         <p:nvSpPr>
-          <p:cNvPr id="32" name="Rectangle 31">
+          <p:cNvPr id="23" name="Rectangle 22">
             <a:extLst>
               <a:ext uri="{FF2B5EF4-FFF2-40B4-BE49-F238E27FC236}">
                 <a16:creationId xmlns:a16="http://schemas.microsoft.com/office/drawing/2014/main" id="{FB5B0058-AF13-4859-B429-4EDDE2A26F7F}"/>
@@ -6463,6 +6905,103 @@
           <a:lstStyle/>
           <a:p>
             <a:pPr algn="ctr"/>
+            <a:endParaRPr lang="en-US"/>
+          </a:p>
+        </p:txBody>
+      </p:sp>
+      <p:sp>
+        <p:nvSpPr>
+          <p:cNvPr id="2" name="Title 1">
+            <a:extLst>
+              <a:ext uri="{FF2B5EF4-FFF2-40B4-BE49-F238E27FC236}">
+                <a16:creationId xmlns:a16="http://schemas.microsoft.com/office/drawing/2014/main" id="{36D455F1-1E35-A688-9311-D3D136F4A327}"/>
+              </a:ext>
+            </a:extLst>
+          </p:cNvPr>
+          <p:cNvSpPr>
+            <a:spLocks noGrp="1"/>
+          </p:cNvSpPr>
+          <p:nvPr>
+            <p:ph type="title"/>
+          </p:nvPr>
+        </p:nvSpPr>
+        <p:spPr>
+          <a:xfrm>
+            <a:off x="5212091" y="146537"/>
+            <a:ext cx="5162354" cy="607925"/>
+          </a:xfrm>
+        </p:spPr>
+        <p:txBody>
+          <a:bodyPr vert="horz" lIns="91440" tIns="45720" rIns="91440" bIns="45720" rtlCol="0" anchor="b">
+            <a:normAutofit fontScale="90000"/>
+          </a:bodyPr>
+          <a:lstStyle/>
+          <a:p>
+            <a:pPr algn="ctr"/>
+            <a:r>
+              <a:rPr lang="en-US" sz="4200" kern="1200" dirty="0">
+                <a:solidFill>
+                  <a:schemeClr val="bg1"/>
+                </a:solidFill>
+                <a:latin typeface="+mj-lt"/>
+                <a:ea typeface="+mj-ea"/>
+                <a:cs typeface="+mj-cs"/>
+              </a:rPr>
+              <a:t>Feature Code Snippets</a:t>
+            </a:r>
+          </a:p>
+        </p:txBody>
+      </p:sp>
+      <p:sp>
+        <p:nvSpPr>
+          <p:cNvPr id="4" name="Date Placeholder 3">
+            <a:extLst>
+              <a:ext uri="{FF2B5EF4-FFF2-40B4-BE49-F238E27FC236}">
+                <a16:creationId xmlns:a16="http://schemas.microsoft.com/office/drawing/2014/main" id="{2302E614-F52E-86EB-42FD-897361051A04}"/>
+              </a:ext>
+            </a:extLst>
+          </p:cNvPr>
+          <p:cNvSpPr>
+            <a:spLocks noGrp="1"/>
+          </p:cNvSpPr>
+          <p:nvPr>
+            <p:ph type="dt" sz="half" idx="10"/>
+          </p:nvPr>
+        </p:nvSpPr>
+        <p:spPr>
+          <a:xfrm>
+            <a:off x="474033" y="6346337"/>
+            <a:ext cx="751985" cy="365125"/>
+          </a:xfrm>
+        </p:spPr>
+        <p:txBody>
+          <a:bodyPr vert="horz" lIns="91440" tIns="45720" rIns="91440" bIns="45720" rtlCol="0" anchor="ctr">
+            <a:normAutofit/>
+          </a:bodyPr>
+          <a:lstStyle/>
+          <a:p>
+            <a:pPr>
+              <a:spcAft>
+                <a:spcPts val="600"/>
+              </a:spcAft>
+              <a:defRPr/>
+            </a:pPr>
+            <a:fld id="{DD303E3B-074C-440F-86D1-3BB7E04505DE}" type="datetimeyyyy">
+              <a:rPr lang="en-US">
+                <a:solidFill>
+                  <a:schemeClr val="bg1">
+                    <a:lumMod val="50000"/>
+                  </a:schemeClr>
+                </a:solidFill>
+              </a:rPr>
+              <a:pPr>
+                <a:spcAft>
+                  <a:spcPts val="600"/>
+                </a:spcAft>
+                <a:defRPr/>
+              </a:pPr>
+              <a:t>2024</a:t>
+            </a:fld>
             <a:endParaRPr lang="en-US" dirty="0">
               <a:solidFill>
                 <a:schemeClr val="bg1">
@@ -6473,54 +7012,12 @@
           </a:p>
         </p:txBody>
       </p:sp>
-      <p:sp>
-        <p:nvSpPr>
-          <p:cNvPr id="2" name="Title 1">
-            <a:extLst>
-              <a:ext uri="{FF2B5EF4-FFF2-40B4-BE49-F238E27FC236}">
-                <a16:creationId xmlns:a16="http://schemas.microsoft.com/office/drawing/2014/main" id="{F554B7EB-4BB2-0A9F-129C-3895024441E3}"/>
-              </a:ext>
-            </a:extLst>
-          </p:cNvPr>
-          <p:cNvSpPr>
-            <a:spLocks noGrp="1"/>
-          </p:cNvSpPr>
-          <p:nvPr>
-            <p:ph type="title"/>
-          </p:nvPr>
-        </p:nvSpPr>
-        <p:spPr>
-          <a:xfrm>
-            <a:off x="734023" y="136525"/>
-            <a:ext cx="3401097" cy="940434"/>
-          </a:xfrm>
-        </p:spPr>
-        <p:txBody>
-          <a:bodyPr vert="horz" lIns="91440" tIns="45720" rIns="91440" bIns="45720" rtlCol="0" anchor="b">
-            <a:normAutofit fontScale="90000"/>
-          </a:bodyPr>
-          <a:lstStyle/>
-          <a:p>
-            <a:r>
-              <a:rPr lang="en-US" sz="6600" kern="1200" dirty="0">
-                <a:solidFill>
-                  <a:schemeClr val="bg1"/>
-                </a:solidFill>
-                <a:latin typeface="+mj-lt"/>
-                <a:ea typeface="+mj-ea"/>
-                <a:cs typeface="+mj-cs"/>
-              </a:rPr>
-              <a:t>Solutions</a:t>
-            </a:r>
-          </a:p>
-        </p:txBody>
-      </p:sp>
       <p:cxnSp>
         <p:nvCxnSpPr>
-          <p:cNvPr id="33" name="Straight Connector 32">
-            <a:extLst>
-              <a:ext uri="{FF2B5EF4-FFF2-40B4-BE49-F238E27FC236}">
-                <a16:creationId xmlns:a16="http://schemas.microsoft.com/office/drawing/2014/main" id="{EC4521DE-248E-440D-AAD6-FD9E7D34B3BF}"/>
+          <p:cNvPr id="25" name="Straight Connector 24">
+            <a:extLst>
+              <a:ext uri="{FF2B5EF4-FFF2-40B4-BE49-F238E27FC236}">
+                <a16:creationId xmlns:a16="http://schemas.microsoft.com/office/drawing/2014/main" id="{FEA8332D-EA74-40A2-8709-00EDB23792E1}"/>
               </a:ext>
               <a:ext uri="{C183D7F6-B498-43B3-948B-1728B52AA6E4}">
                 <adec:decorative xmlns:adec="http://schemas.microsoft.com/office/drawing/2017/decorative" val="1"/>
@@ -6540,8 +7037,8 @@
         </p:nvCxnSpPr>
         <p:spPr>
           <a:xfrm>
-            <a:off x="585285" y="0"/>
-            <a:ext cx="0" cy="6858000"/>
+            <a:off x="317240" y="3429000"/>
+            <a:ext cx="0" cy="3164872"/>
           </a:xfrm>
           <a:prstGeom prst="line">
             <a:avLst/>
@@ -6567,21 +7064,81 @@
           </a:fontRef>
         </p:style>
       </p:cxnSp>
-      <p:cxnSp>
-        <p:nvCxnSpPr>
-          <p:cNvPr id="15" name="Straight Connector 14">
-            <a:extLst>
-              <a:ext uri="{FF2B5EF4-FFF2-40B4-BE49-F238E27FC236}">
-                <a16:creationId xmlns:a16="http://schemas.microsoft.com/office/drawing/2014/main" id="{442C13FA-4C0F-42D0-9626-5BA6040D8C31}"/>
+      <p:sp>
+        <p:nvSpPr>
+          <p:cNvPr id="6" name="Slide Number Placeholder 5">
+            <a:extLst>
+              <a:ext uri="{FF2B5EF4-FFF2-40B4-BE49-F238E27FC236}">
+                <a16:creationId xmlns:a16="http://schemas.microsoft.com/office/drawing/2014/main" id="{F61D429F-9044-88F6-7609-FFE708B70CF7}"/>
+              </a:ext>
+            </a:extLst>
+          </p:cNvPr>
+          <p:cNvSpPr>
+            <a:spLocks noGrp="1"/>
+          </p:cNvSpPr>
+          <p:nvPr>
+            <p:ph type="sldNum" sz="quarter" idx="12"/>
+          </p:nvPr>
+        </p:nvSpPr>
+        <p:spPr>
+          <a:xfrm>
+            <a:off x="11379614" y="6346339"/>
+            <a:ext cx="677708" cy="365125"/>
+          </a:xfrm>
+        </p:spPr>
+        <p:txBody>
+          <a:bodyPr vert="horz" lIns="91440" tIns="45720" rIns="91440" bIns="45720" rtlCol="0" anchor="ctr">
+            <a:normAutofit/>
+          </a:bodyPr>
+          <a:lstStyle/>
+          <a:p>
+            <a:pPr>
+              <a:spcAft>
+                <a:spcPts val="600"/>
+              </a:spcAft>
+              <a:defRPr/>
+            </a:pPr>
+            <a:fld id="{BC1B8E0F-90D7-4F6F-9CC4-1E156486B9C1}" type="slidenum">
+              <a:rPr lang="en-US">
+                <a:solidFill>
+                  <a:schemeClr val="bg1">
+                    <a:lumMod val="50000"/>
+                  </a:schemeClr>
+                </a:solidFill>
+              </a:rPr>
+              <a:pPr>
+                <a:spcAft>
+                  <a:spcPts val="600"/>
+                </a:spcAft>
+                <a:defRPr/>
+              </a:pPr>
+              <a:t>6</a:t>
+            </a:fld>
+            <a:endParaRPr lang="en-US" dirty="0">
+              <a:solidFill>
+                <a:schemeClr val="bg1">
+                  <a:lumMod val="50000"/>
+                </a:schemeClr>
+              </a:solidFill>
+            </a:endParaRPr>
+          </a:p>
+        </p:txBody>
+      </p:sp>
+      <p:sp>
+        <p:nvSpPr>
+          <p:cNvPr id="27" name="Rectangle 26">
+            <a:extLst>
+              <a:ext uri="{FF2B5EF4-FFF2-40B4-BE49-F238E27FC236}">
+                <a16:creationId xmlns:a16="http://schemas.microsoft.com/office/drawing/2014/main" id="{9358801C-1E89-48FF-B14F-D76A2EA14C8E}"/>
               </a:ext>
               <a:ext uri="{C183D7F6-B498-43B3-948B-1728B52AA6E4}">
                 <adec:decorative xmlns:adec="http://schemas.microsoft.com/office/drawing/2017/decorative" val="1"/>
               </a:ext>
             </a:extLst>
           </p:cNvPr>
-          <p:cNvCxnSpPr>
-            <a:cxnSpLocks noGrp="1" noRot="1" noChangeAspect="1" noMove="1" noResize="1" noEditPoints="1" noAdjustHandles="1" noChangeArrowheads="1" noChangeShapeType="1"/>
-          </p:cNvCxnSpPr>
+          <p:cNvSpPr>
+            <a:spLocks noGrp="1" noRot="1" noChangeAspect="1" noMove="1" noResize="1" noEditPoints="1" noAdjustHandles="1" noChangeArrowheads="1" noChangeShapeType="1" noTextEdit="1"/>
+          </p:cNvSpPr>
           <p:nvPr>
             <p:extLst>
               <p:ext uri="{386F3935-93C4-4BCD-93E2-E3B085C9AB24}">
@@ -6589,11 +7146,74 @@
               </p:ext>
             </p:extLst>
           </p:nvPr>
+        </p:nvSpPr>
+        <p:spPr>
+          <a:xfrm>
+            <a:off x="2134797" y="816429"/>
+            <a:ext cx="8239647" cy="5225143"/>
+          </a:xfrm>
+          <a:prstGeom prst="rect">
+            <a:avLst/>
+          </a:prstGeom>
+          <a:noFill/>
+          <a:ln>
+            <a:solidFill>
+              <a:schemeClr val="accent2"/>
+            </a:solidFill>
+          </a:ln>
+        </p:spPr>
+        <p:style>
+          <a:lnRef idx="2">
+            <a:schemeClr val="accent1">
+              <a:shade val="50000"/>
+            </a:schemeClr>
+          </a:lnRef>
+          <a:fillRef idx="1">
+            <a:schemeClr val="accent1"/>
+          </a:fillRef>
+          <a:effectRef idx="0">
+            <a:schemeClr val="accent1"/>
+          </a:effectRef>
+          <a:fontRef idx="minor">
+            <a:schemeClr val="lt1"/>
+          </a:fontRef>
+        </p:style>
+        <p:txBody>
+          <a:bodyPr rtlCol="0" anchor="ctr"/>
+          <a:lstStyle/>
+          <a:p>
+            <a:pPr algn="ctr"/>
+            <a:endParaRPr lang="en-US"/>
+          </a:p>
+        </p:txBody>
+      </p:sp>
+      <p:cxnSp>
+        <p:nvCxnSpPr>
+          <p:cNvPr id="29" name="Straight Connector 28">
+            <a:extLst>
+              <a:ext uri="{FF2B5EF4-FFF2-40B4-BE49-F238E27FC236}">
+                <a16:creationId xmlns:a16="http://schemas.microsoft.com/office/drawing/2014/main" id="{AB88284F-ED00-40CA-B57D-89C49E8EC6E9}"/>
+              </a:ext>
+              <a:ext uri="{C183D7F6-B498-43B3-948B-1728B52AA6E4}">
+                <adec:decorative xmlns:adec="http://schemas.microsoft.com/office/drawing/2017/decorative" val="1"/>
+              </a:ext>
+            </a:extLst>
+          </p:cNvPr>
+          <p:cNvCxnSpPr>
+            <a:cxnSpLocks noGrp="1" noRot="1" noChangeAspect="1" noMove="1" noResize="1" noEditPoints="1" noAdjustHandles="1" noChangeArrowheads="1" noChangeShapeType="1"/>
+          </p:cNvCxnSpPr>
+          <p:nvPr>
+            <p:extLst>
+              <p:ext uri="{386F3935-93C4-4BCD-93E2-E3B085C9AB24}">
+                <p16:designElem xmlns:p16="http://schemas.microsoft.com/office/powerpoint/2015/main" val="1"/>
+              </p:ext>
+            </p:extLst>
+          </p:nvPr>
         </p:nvCxnSpPr>
         <p:spPr>
-          <a:xfrm flipH="1">
-            <a:off x="0" y="6252485"/>
-            <a:ext cx="12192000" cy="0"/>
+          <a:xfrm>
+            <a:off x="11900357" y="272979"/>
+            <a:ext cx="0" cy="2906211"/>
           </a:xfrm>
           <a:prstGeom prst="line">
             <a:avLst/>
@@ -6621,10 +7241,10 @@
       </p:cxnSp>
       <p:sp>
         <p:nvSpPr>
-          <p:cNvPr id="4" name="Date Placeholder 3">
-            <a:extLst>
-              <a:ext uri="{FF2B5EF4-FFF2-40B4-BE49-F238E27FC236}">
-                <a16:creationId xmlns:a16="http://schemas.microsoft.com/office/drawing/2014/main" id="{AB7B4B59-A54B-1B2E-A018-28801C948F89}"/>
+          <p:cNvPr id="5" name="Footer Placeholder 4">
+            <a:extLst>
+              <a:ext uri="{FF2B5EF4-FFF2-40B4-BE49-F238E27FC236}">
+                <a16:creationId xmlns:a16="http://schemas.microsoft.com/office/drawing/2014/main" id="{0C7A8648-1807-0813-E6CF-EB4EAB3C8E7F}"/>
               </a:ext>
             </a:extLst>
           </p:cNvPr>
@@ -6632,13 +7252,13 @@
             <a:spLocks noGrp="1"/>
           </p:cNvSpPr>
           <p:nvPr>
-            <p:ph type="dt" sz="half" idx="10"/>
+            <p:ph type="ftr" sz="quarter" idx="11"/>
           </p:nvPr>
         </p:nvSpPr>
         <p:spPr>
           <a:xfrm>
-            <a:off x="1665533" y="6356350"/>
-            <a:ext cx="2743200" cy="365125"/>
+            <a:off x="5742529" y="6346338"/>
+            <a:ext cx="1941900" cy="365125"/>
           </a:xfrm>
         </p:spPr>
         <p:txBody>
@@ -6647,76 +7267,19 @@
           </a:bodyPr>
           <a:lstStyle/>
           <a:p>
-            <a:pPr>
+            <a:pPr algn="l">
               <a:spcAft>
                 <a:spcPts val="600"/>
               </a:spcAft>
+              <a:defRPr/>
             </a:pPr>
-            <a:fld id="{DD303E3B-074C-440F-86D1-3BB7E04505DE}" type="datetimeyyyy">
-              <a:rPr lang="en-US">
+            <a:r>
+              <a:rPr lang="en-US" kern="1200" dirty="0">
                 <a:solidFill>
                   <a:schemeClr val="bg1">
                     <a:lumMod val="50000"/>
                   </a:schemeClr>
                 </a:solidFill>
-              </a:rPr>
-              <a:pPr>
-                <a:spcAft>
-                  <a:spcPts val="600"/>
-                </a:spcAft>
-              </a:pPr>
-              <a:t>2024</a:t>
-            </a:fld>
-            <a:endParaRPr lang="en-US">
-              <a:solidFill>
-                <a:schemeClr val="bg1">
-                  <a:lumMod val="50000"/>
-                </a:schemeClr>
-              </a:solidFill>
-            </a:endParaRPr>
-          </a:p>
-        </p:txBody>
-      </p:sp>
-      <p:sp>
-        <p:nvSpPr>
-          <p:cNvPr id="5" name="Footer Placeholder 4">
-            <a:extLst>
-              <a:ext uri="{FF2B5EF4-FFF2-40B4-BE49-F238E27FC236}">
-                <a16:creationId xmlns:a16="http://schemas.microsoft.com/office/drawing/2014/main" id="{1230C12F-2ED5-2D2B-4CDD-90B1C5958274}"/>
-              </a:ext>
-            </a:extLst>
-          </p:cNvPr>
-          <p:cNvSpPr>
-            <a:spLocks noGrp="1"/>
-          </p:cNvSpPr>
-          <p:nvPr>
-            <p:ph type="ftr" sz="quarter" idx="11"/>
-          </p:nvPr>
-        </p:nvSpPr>
-        <p:spPr>
-          <a:xfrm>
-            <a:off x="4730455" y="6356350"/>
-            <a:ext cx="4114800" cy="365125"/>
-          </a:xfrm>
-        </p:spPr>
-        <p:txBody>
-          <a:bodyPr vert="horz" lIns="91440" tIns="45720" rIns="91440" bIns="45720" rtlCol="0" anchor="ctr">
-            <a:normAutofit/>
-          </a:bodyPr>
-          <a:lstStyle/>
-          <a:p>
-            <a:pPr>
-              <a:spcAft>
-                <a:spcPts val="600"/>
-              </a:spcAft>
-            </a:pPr>
-            <a:r>
-              <a:rPr lang="en-US" kern="1200">
-                <a:solidFill>
-                  <a:schemeClr val="bg1">
-                    <a:lumMod val="50000"/>
-                  </a:schemeClr>
-                </a:solidFill>
                 <a:latin typeface="+mn-lt"/>
                 <a:ea typeface="+mn-ea"/>
                 <a:cs typeface="+mn-cs"/>
@@ -6728,66 +7291,747 @@
       </p:sp>
       <p:sp>
         <p:nvSpPr>
-          <p:cNvPr id="6" name="Slide Number Placeholder 5">
-            <a:extLst>
-              <a:ext uri="{FF2B5EF4-FFF2-40B4-BE49-F238E27FC236}">
-                <a16:creationId xmlns:a16="http://schemas.microsoft.com/office/drawing/2014/main" id="{1B66B0D7-11DB-C3B7-7F7F-1ABE1123432D}"/>
-              </a:ext>
-            </a:extLst>
-          </p:cNvPr>
-          <p:cNvSpPr>
-            <a:spLocks noGrp="1"/>
-          </p:cNvSpPr>
-          <p:nvPr>
-            <p:ph type="sldNum" sz="quarter" idx="12"/>
-          </p:nvPr>
+          <p:cNvPr id="3" name="TextBox 2">
+            <a:extLst>
+              <a:ext uri="{FF2B5EF4-FFF2-40B4-BE49-F238E27FC236}">
+                <a16:creationId xmlns:a16="http://schemas.microsoft.com/office/drawing/2014/main" id="{38967615-A0EC-835E-6E53-2C64B07BD653}"/>
+              </a:ext>
+            </a:extLst>
+          </p:cNvPr>
+          <p:cNvSpPr txBox="1"/>
+          <p:nvPr/>
         </p:nvSpPr>
         <p:spPr>
           <a:xfrm>
-            <a:off x="9224794" y="6356350"/>
-            <a:ext cx="1779493" cy="365125"/>
+            <a:off x="2404872" y="1170432"/>
+            <a:ext cx="7388352" cy="923330"/>
           </a:xfrm>
+          <a:prstGeom prst="rect">
+            <a:avLst/>
+          </a:prstGeom>
+          <a:noFill/>
         </p:spPr>
         <p:txBody>
-          <a:bodyPr vert="horz" lIns="91440" tIns="45720" rIns="91440" bIns="45720" rtlCol="0" anchor="ctr">
-            <a:normAutofit/>
+          <a:bodyPr wrap="square" rtlCol="0">
+            <a:spAutoFit/>
           </a:bodyPr>
           <a:lstStyle/>
           <a:p>
-            <a:pPr>
-              <a:spcAft>
-                <a:spcPts val="600"/>
-              </a:spcAft>
-            </a:pPr>
-            <a:fld id="{BC1B8E0F-90D7-4F6F-9CC4-1E156486B9C1}" type="slidenum">
-              <a:rPr lang="en-US">
-                <a:solidFill>
-                  <a:schemeClr val="bg1">
-                    <a:lumMod val="50000"/>
-                  </a:schemeClr>
-                </a:solidFill>
-              </a:rPr>
-              <a:pPr>
-                <a:spcAft>
-                  <a:spcPts val="600"/>
-                </a:spcAft>
-              </a:pPr>
-              <a:t>6</a:t>
-            </a:fld>
-            <a:endParaRPr lang="en-US">
+            <a:r>
+              <a:rPr lang="en-US" b="0" dirty="0">
+                <a:solidFill>
+                  <a:srgbClr val="6AA94F"/>
+                </a:solidFill>
+                <a:effectLst/>
+                <a:latin typeface="Courier New" panose="02070309020205020404" pitchFamily="49" charset="0"/>
+              </a:rPr>
+              <a:t># Convert the date strings into datetime objects</a:t>
+            </a:r>
+            <a:endParaRPr lang="en-US" b="0" dirty="0">
               <a:solidFill>
-                <a:schemeClr val="bg1">
-                  <a:lumMod val="50000"/>
-                </a:schemeClr>
+                <a:srgbClr val="D4D4D4"/>
               </a:solidFill>
+              <a:effectLst/>
+              <a:latin typeface="Courier New" panose="02070309020205020404" pitchFamily="49" charset="0"/>
             </a:endParaRPr>
+          </a:p>
+          <a:p>
+            <a:r>
+              <a:rPr lang="en-US" b="0" dirty="0">
+                <a:solidFill>
+                  <a:srgbClr val="D4D4D4"/>
+                </a:solidFill>
+                <a:effectLst/>
+                <a:latin typeface="Courier New" panose="02070309020205020404" pitchFamily="49" charset="0"/>
+              </a:rPr>
+              <a:t>dataset</a:t>
+            </a:r>
+            <a:r>
+              <a:rPr lang="en-US" b="0" dirty="0">
+                <a:solidFill>
+                  <a:srgbClr val="DCDCDC"/>
+                </a:solidFill>
+                <a:effectLst/>
+                <a:latin typeface="Courier New" panose="02070309020205020404" pitchFamily="49" charset="0"/>
+              </a:rPr>
+              <a:t>[</a:t>
+            </a:r>
+            <a:r>
+              <a:rPr lang="en-US" b="0" dirty="0">
+                <a:solidFill>
+                  <a:srgbClr val="CE9178"/>
+                </a:solidFill>
+                <a:effectLst/>
+                <a:latin typeface="Courier New" panose="02070309020205020404" pitchFamily="49" charset="0"/>
+              </a:rPr>
+              <a:t>'Date'</a:t>
+            </a:r>
+            <a:r>
+              <a:rPr lang="en-US" b="0" dirty="0">
+                <a:solidFill>
+                  <a:srgbClr val="DCDCDC"/>
+                </a:solidFill>
+                <a:effectLst/>
+                <a:latin typeface="Courier New" panose="02070309020205020404" pitchFamily="49" charset="0"/>
+              </a:rPr>
+              <a:t>]</a:t>
+            </a:r>
+            <a:r>
+              <a:rPr lang="en-US" b="0" dirty="0">
+                <a:solidFill>
+                  <a:srgbClr val="D4D4D4"/>
+                </a:solidFill>
+                <a:effectLst/>
+                <a:latin typeface="Courier New" panose="02070309020205020404" pitchFamily="49" charset="0"/>
+              </a:rPr>
+              <a:t> = </a:t>
+            </a:r>
+            <a:r>
+              <a:rPr lang="en-US" b="0" dirty="0" err="1">
+                <a:solidFill>
+                  <a:srgbClr val="D4D4D4"/>
+                </a:solidFill>
+                <a:effectLst/>
+                <a:latin typeface="Courier New" panose="02070309020205020404" pitchFamily="49" charset="0"/>
+              </a:rPr>
+              <a:t>pd.to_datetime</a:t>
+            </a:r>
+            <a:r>
+              <a:rPr lang="en-US" b="0" dirty="0">
+                <a:solidFill>
+                  <a:srgbClr val="DCDCDC"/>
+                </a:solidFill>
+                <a:effectLst/>
+                <a:latin typeface="Courier New" panose="02070309020205020404" pitchFamily="49" charset="0"/>
+              </a:rPr>
+              <a:t>(</a:t>
+            </a:r>
+            <a:r>
+              <a:rPr lang="en-US" b="0" dirty="0">
+                <a:solidFill>
+                  <a:srgbClr val="D4D4D4"/>
+                </a:solidFill>
+                <a:effectLst/>
+                <a:latin typeface="Courier New" panose="02070309020205020404" pitchFamily="49" charset="0"/>
+              </a:rPr>
+              <a:t>dataset</a:t>
+            </a:r>
+            <a:r>
+              <a:rPr lang="en-US" b="0" dirty="0">
+                <a:solidFill>
+                  <a:srgbClr val="DCDCDC"/>
+                </a:solidFill>
+                <a:effectLst/>
+                <a:latin typeface="Courier New" panose="02070309020205020404" pitchFamily="49" charset="0"/>
+              </a:rPr>
+              <a:t>[</a:t>
+            </a:r>
+            <a:r>
+              <a:rPr lang="en-US" b="0" dirty="0">
+                <a:solidFill>
+                  <a:srgbClr val="CE9178"/>
+                </a:solidFill>
+                <a:effectLst/>
+                <a:latin typeface="Courier New" panose="02070309020205020404" pitchFamily="49" charset="0"/>
+              </a:rPr>
+              <a:t>'Date'</a:t>
+            </a:r>
+            <a:r>
+              <a:rPr lang="en-US" b="0" dirty="0">
+                <a:solidFill>
+                  <a:srgbClr val="DCDCDC"/>
+                </a:solidFill>
+                <a:effectLst/>
+                <a:latin typeface="Courier New" panose="02070309020205020404" pitchFamily="49" charset="0"/>
+              </a:rPr>
+              <a:t>])</a:t>
+            </a:r>
+            <a:endParaRPr lang="en-US" b="0" dirty="0">
+              <a:solidFill>
+                <a:srgbClr val="D4D4D4"/>
+              </a:solidFill>
+              <a:effectLst/>
+              <a:latin typeface="Courier New" panose="02070309020205020404" pitchFamily="49" charset="0"/>
+            </a:endParaRPr>
+          </a:p>
+          <a:p>
+            <a:endParaRPr lang="en-CA" dirty="0"/>
+          </a:p>
+        </p:txBody>
+      </p:sp>
+      <p:sp>
+        <p:nvSpPr>
+          <p:cNvPr id="7" name="TextBox 6">
+            <a:extLst>
+              <a:ext uri="{FF2B5EF4-FFF2-40B4-BE49-F238E27FC236}">
+                <a16:creationId xmlns:a16="http://schemas.microsoft.com/office/drawing/2014/main" id="{ED917204-8559-31CA-8F99-1337C4F10EF9}"/>
+              </a:ext>
+            </a:extLst>
+          </p:cNvPr>
+          <p:cNvSpPr txBox="1"/>
+          <p:nvPr/>
+        </p:nvSpPr>
+        <p:spPr>
+          <a:xfrm>
+            <a:off x="2398776" y="2003393"/>
+            <a:ext cx="7022592" cy="3693319"/>
+          </a:xfrm>
+          <a:prstGeom prst="rect">
+            <a:avLst/>
+          </a:prstGeom>
+          <a:noFill/>
+        </p:spPr>
+        <p:txBody>
+          <a:bodyPr wrap="square" rtlCol="0">
+            <a:spAutoFit/>
+          </a:bodyPr>
+          <a:lstStyle/>
+          <a:p>
+            <a:r>
+              <a:rPr lang="en-CA" b="0" dirty="0">
+                <a:solidFill>
+                  <a:srgbClr val="6AA94F"/>
+                </a:solidFill>
+                <a:effectLst/>
+                <a:latin typeface="Courier New" panose="02070309020205020404" pitchFamily="49" charset="0"/>
+              </a:rPr>
+              <a:t># define X and y variables</a:t>
+            </a:r>
+            <a:endParaRPr lang="en-CA" b="0" dirty="0">
+              <a:solidFill>
+                <a:srgbClr val="D4D4D4"/>
+              </a:solidFill>
+              <a:effectLst/>
+              <a:latin typeface="Courier New" panose="02070309020205020404" pitchFamily="49" charset="0"/>
+            </a:endParaRPr>
+          </a:p>
+          <a:p>
+            <a:r>
+              <a:rPr lang="en-CA" b="0" dirty="0">
+                <a:solidFill>
+                  <a:srgbClr val="D4D4D4"/>
+                </a:solidFill>
+                <a:effectLst/>
+                <a:latin typeface="Courier New" panose="02070309020205020404" pitchFamily="49" charset="0"/>
+              </a:rPr>
+              <a:t>X = dataset</a:t>
+            </a:r>
+            <a:r>
+              <a:rPr lang="en-CA" b="0" dirty="0">
+                <a:solidFill>
+                  <a:srgbClr val="DCDCDC"/>
+                </a:solidFill>
+                <a:effectLst/>
+                <a:latin typeface="Courier New" panose="02070309020205020404" pitchFamily="49" charset="0"/>
+              </a:rPr>
+              <a:t>[[</a:t>
+            </a:r>
+            <a:endParaRPr lang="en-CA" b="0" dirty="0">
+              <a:solidFill>
+                <a:srgbClr val="D4D4D4"/>
+              </a:solidFill>
+              <a:effectLst/>
+              <a:latin typeface="Courier New" panose="02070309020205020404" pitchFamily="49" charset="0"/>
+            </a:endParaRPr>
+          </a:p>
+          <a:p>
+            <a:r>
+              <a:rPr lang="en-CA" b="0" dirty="0">
+                <a:solidFill>
+                  <a:srgbClr val="D4D4D4"/>
+                </a:solidFill>
+                <a:effectLst/>
+                <a:latin typeface="Courier New" panose="02070309020205020404" pitchFamily="49" charset="0"/>
+              </a:rPr>
+              <a:t>    </a:t>
+            </a:r>
+            <a:r>
+              <a:rPr lang="en-CA" b="0" dirty="0">
+                <a:solidFill>
+                  <a:srgbClr val="CE9178"/>
+                </a:solidFill>
+                <a:effectLst/>
+                <a:latin typeface="Courier New" panose="02070309020205020404" pitchFamily="49" charset="0"/>
+              </a:rPr>
+              <a:t>'</a:t>
+            </a:r>
+            <a:r>
+              <a:rPr lang="en-CA" b="0" dirty="0" err="1">
+                <a:solidFill>
+                  <a:srgbClr val="CE9178"/>
+                </a:solidFill>
+                <a:effectLst/>
+                <a:latin typeface="Courier New" panose="02070309020205020404" pitchFamily="49" charset="0"/>
+              </a:rPr>
+              <a:t>Composite_HPI</a:t>
+            </a:r>
+            <a:r>
+              <a:rPr lang="en-CA" b="0" dirty="0">
+                <a:solidFill>
+                  <a:srgbClr val="CE9178"/>
+                </a:solidFill>
+                <a:effectLst/>
+                <a:latin typeface="Courier New" panose="02070309020205020404" pitchFamily="49" charset="0"/>
+              </a:rPr>
+              <a:t>'</a:t>
+            </a:r>
+            <a:r>
+              <a:rPr lang="en-CA" b="0" dirty="0">
+                <a:solidFill>
+                  <a:srgbClr val="DCDCDC"/>
+                </a:solidFill>
+                <a:effectLst/>
+                <a:latin typeface="Courier New" panose="02070309020205020404" pitchFamily="49" charset="0"/>
+              </a:rPr>
+              <a:t>,</a:t>
+            </a:r>
+            <a:r>
+              <a:rPr lang="en-CA" b="0" dirty="0">
+                <a:solidFill>
+                  <a:srgbClr val="D4D4D4"/>
+                </a:solidFill>
+                <a:effectLst/>
+                <a:latin typeface="Courier New" panose="02070309020205020404" pitchFamily="49" charset="0"/>
+              </a:rPr>
+              <a:t> </a:t>
+            </a:r>
+          </a:p>
+          <a:p>
+            <a:r>
+              <a:rPr lang="en-CA" b="0" dirty="0">
+                <a:solidFill>
+                  <a:srgbClr val="D4D4D4"/>
+                </a:solidFill>
+                <a:effectLst/>
+                <a:latin typeface="Courier New" panose="02070309020205020404" pitchFamily="49" charset="0"/>
+              </a:rPr>
+              <a:t>    </a:t>
+            </a:r>
+            <a:r>
+              <a:rPr lang="en-CA" b="0" dirty="0">
+                <a:solidFill>
+                  <a:srgbClr val="CE9178"/>
+                </a:solidFill>
+                <a:effectLst/>
+                <a:latin typeface="Courier New" panose="02070309020205020404" pitchFamily="49" charset="0"/>
+              </a:rPr>
+              <a:t>'</a:t>
+            </a:r>
+            <a:r>
+              <a:rPr lang="en-CA" b="0" dirty="0" err="1">
+                <a:solidFill>
+                  <a:srgbClr val="CE9178"/>
+                </a:solidFill>
+                <a:effectLst/>
+                <a:latin typeface="Courier New" panose="02070309020205020404" pitchFamily="49" charset="0"/>
+              </a:rPr>
+              <a:t>Single_Family_Benchmark</a:t>
+            </a:r>
+            <a:r>
+              <a:rPr lang="en-CA" b="0" dirty="0">
+                <a:solidFill>
+                  <a:srgbClr val="CE9178"/>
+                </a:solidFill>
+                <a:effectLst/>
+                <a:latin typeface="Courier New" panose="02070309020205020404" pitchFamily="49" charset="0"/>
+              </a:rPr>
+              <a:t>'</a:t>
+            </a:r>
+            <a:r>
+              <a:rPr lang="en-CA" b="0" dirty="0">
+                <a:solidFill>
+                  <a:srgbClr val="DCDCDC"/>
+                </a:solidFill>
+                <a:effectLst/>
+                <a:latin typeface="Courier New" panose="02070309020205020404" pitchFamily="49" charset="0"/>
+              </a:rPr>
+              <a:t>,</a:t>
+            </a:r>
+            <a:r>
+              <a:rPr lang="en-CA" b="0" dirty="0">
+                <a:solidFill>
+                  <a:srgbClr val="D4D4D4"/>
+                </a:solidFill>
+                <a:effectLst/>
+                <a:latin typeface="Courier New" panose="02070309020205020404" pitchFamily="49" charset="0"/>
+              </a:rPr>
+              <a:t> </a:t>
+            </a:r>
+          </a:p>
+          <a:p>
+            <a:r>
+              <a:rPr lang="en-CA" b="0" dirty="0">
+                <a:solidFill>
+                  <a:srgbClr val="D4D4D4"/>
+                </a:solidFill>
+                <a:effectLst/>
+                <a:latin typeface="Courier New" panose="02070309020205020404" pitchFamily="49" charset="0"/>
+              </a:rPr>
+              <a:t>    </a:t>
+            </a:r>
+            <a:r>
+              <a:rPr lang="en-CA" b="0" dirty="0">
+                <a:solidFill>
+                  <a:srgbClr val="CE9178"/>
+                </a:solidFill>
+                <a:effectLst/>
+                <a:latin typeface="Courier New" panose="02070309020205020404" pitchFamily="49" charset="0"/>
+              </a:rPr>
+              <a:t>'</a:t>
+            </a:r>
+            <a:r>
+              <a:rPr lang="en-CA" b="0" dirty="0" err="1">
+                <a:solidFill>
+                  <a:srgbClr val="CE9178"/>
+                </a:solidFill>
+                <a:effectLst/>
+                <a:latin typeface="Courier New" panose="02070309020205020404" pitchFamily="49" charset="0"/>
+              </a:rPr>
+              <a:t>One_Storey_Benchmark</a:t>
+            </a:r>
+            <a:r>
+              <a:rPr lang="en-CA" b="0" dirty="0">
+                <a:solidFill>
+                  <a:srgbClr val="CE9178"/>
+                </a:solidFill>
+                <a:effectLst/>
+                <a:latin typeface="Courier New" panose="02070309020205020404" pitchFamily="49" charset="0"/>
+              </a:rPr>
+              <a:t>'</a:t>
+            </a:r>
+            <a:r>
+              <a:rPr lang="en-CA" b="0" dirty="0">
+                <a:solidFill>
+                  <a:srgbClr val="DCDCDC"/>
+                </a:solidFill>
+                <a:effectLst/>
+                <a:latin typeface="Courier New" panose="02070309020205020404" pitchFamily="49" charset="0"/>
+              </a:rPr>
+              <a:t>,</a:t>
+            </a:r>
+            <a:r>
+              <a:rPr lang="en-CA" b="0" dirty="0">
+                <a:solidFill>
+                  <a:srgbClr val="D4D4D4"/>
+                </a:solidFill>
+                <a:effectLst/>
+                <a:latin typeface="Courier New" panose="02070309020205020404" pitchFamily="49" charset="0"/>
+              </a:rPr>
+              <a:t> </a:t>
+            </a:r>
+          </a:p>
+          <a:p>
+            <a:r>
+              <a:rPr lang="en-CA" b="0" dirty="0">
+                <a:solidFill>
+                  <a:srgbClr val="D4D4D4"/>
+                </a:solidFill>
+                <a:effectLst/>
+                <a:latin typeface="Courier New" panose="02070309020205020404" pitchFamily="49" charset="0"/>
+              </a:rPr>
+              <a:t>    </a:t>
+            </a:r>
+            <a:r>
+              <a:rPr lang="en-CA" b="0" dirty="0">
+                <a:solidFill>
+                  <a:srgbClr val="CE9178"/>
+                </a:solidFill>
+                <a:effectLst/>
+                <a:latin typeface="Courier New" panose="02070309020205020404" pitchFamily="49" charset="0"/>
+              </a:rPr>
+              <a:t>'</a:t>
+            </a:r>
+            <a:r>
+              <a:rPr lang="en-CA" b="0" dirty="0" err="1">
+                <a:solidFill>
+                  <a:srgbClr val="CE9178"/>
+                </a:solidFill>
+                <a:effectLst/>
+                <a:latin typeface="Courier New" panose="02070309020205020404" pitchFamily="49" charset="0"/>
+              </a:rPr>
+              <a:t>Two_Storey_Benchmark</a:t>
+            </a:r>
+            <a:r>
+              <a:rPr lang="en-CA" b="0" dirty="0">
+                <a:solidFill>
+                  <a:srgbClr val="CE9178"/>
+                </a:solidFill>
+                <a:effectLst/>
+                <a:latin typeface="Courier New" panose="02070309020205020404" pitchFamily="49" charset="0"/>
+              </a:rPr>
+              <a:t>'</a:t>
+            </a:r>
+            <a:r>
+              <a:rPr lang="en-CA" b="0" dirty="0">
+                <a:solidFill>
+                  <a:srgbClr val="DCDCDC"/>
+                </a:solidFill>
+                <a:effectLst/>
+                <a:latin typeface="Courier New" panose="02070309020205020404" pitchFamily="49" charset="0"/>
+              </a:rPr>
+              <a:t>,</a:t>
+            </a:r>
+            <a:endParaRPr lang="en-CA" b="0" dirty="0">
+              <a:solidFill>
+                <a:srgbClr val="D4D4D4"/>
+              </a:solidFill>
+              <a:effectLst/>
+              <a:latin typeface="Courier New" panose="02070309020205020404" pitchFamily="49" charset="0"/>
+            </a:endParaRPr>
+          </a:p>
+          <a:p>
+            <a:r>
+              <a:rPr lang="en-CA" b="0" dirty="0">
+                <a:solidFill>
+                  <a:srgbClr val="D4D4D4"/>
+                </a:solidFill>
+                <a:effectLst/>
+                <a:latin typeface="Courier New" panose="02070309020205020404" pitchFamily="49" charset="0"/>
+              </a:rPr>
+              <a:t>    </a:t>
+            </a:r>
+            <a:r>
+              <a:rPr lang="en-CA" b="0" dirty="0">
+                <a:solidFill>
+                  <a:srgbClr val="CE9178"/>
+                </a:solidFill>
+                <a:effectLst/>
+                <a:latin typeface="Courier New" panose="02070309020205020404" pitchFamily="49" charset="0"/>
+              </a:rPr>
+              <a:t>'</a:t>
+            </a:r>
+            <a:r>
+              <a:rPr lang="en-CA" b="0" dirty="0" err="1">
+                <a:solidFill>
+                  <a:srgbClr val="CE9178"/>
+                </a:solidFill>
+                <a:effectLst/>
+                <a:latin typeface="Courier New" panose="02070309020205020404" pitchFamily="49" charset="0"/>
+              </a:rPr>
+              <a:t>Townhouse_Benchmark</a:t>
+            </a:r>
+            <a:r>
+              <a:rPr lang="en-CA" b="0" dirty="0">
+                <a:solidFill>
+                  <a:srgbClr val="CE9178"/>
+                </a:solidFill>
+                <a:effectLst/>
+                <a:latin typeface="Courier New" panose="02070309020205020404" pitchFamily="49" charset="0"/>
+              </a:rPr>
+              <a:t>'</a:t>
+            </a:r>
+            <a:r>
+              <a:rPr lang="en-CA" b="0" dirty="0">
+                <a:solidFill>
+                  <a:srgbClr val="DCDCDC"/>
+                </a:solidFill>
+                <a:effectLst/>
+                <a:latin typeface="Courier New" panose="02070309020205020404" pitchFamily="49" charset="0"/>
+              </a:rPr>
+              <a:t>,</a:t>
+            </a:r>
+            <a:endParaRPr lang="en-CA" b="0" dirty="0">
+              <a:solidFill>
+                <a:srgbClr val="D4D4D4"/>
+              </a:solidFill>
+              <a:effectLst/>
+              <a:latin typeface="Courier New" panose="02070309020205020404" pitchFamily="49" charset="0"/>
+            </a:endParaRPr>
+          </a:p>
+          <a:p>
+            <a:r>
+              <a:rPr lang="en-CA" b="0" dirty="0">
+                <a:solidFill>
+                  <a:srgbClr val="D4D4D4"/>
+                </a:solidFill>
+                <a:effectLst/>
+                <a:latin typeface="Courier New" panose="02070309020205020404" pitchFamily="49" charset="0"/>
+              </a:rPr>
+              <a:t>    </a:t>
+            </a:r>
+            <a:r>
+              <a:rPr lang="en-CA" b="0" dirty="0">
+                <a:solidFill>
+                  <a:srgbClr val="CE9178"/>
+                </a:solidFill>
+                <a:effectLst/>
+                <a:latin typeface="Courier New" panose="02070309020205020404" pitchFamily="49" charset="0"/>
+              </a:rPr>
+              <a:t>'</a:t>
+            </a:r>
+            <a:r>
+              <a:rPr lang="en-CA" b="0" dirty="0" err="1">
+                <a:solidFill>
+                  <a:srgbClr val="CE9178"/>
+                </a:solidFill>
+                <a:effectLst/>
+                <a:latin typeface="Courier New" panose="02070309020205020404" pitchFamily="49" charset="0"/>
+              </a:rPr>
+              <a:t>Apartment_Benchmark</a:t>
+            </a:r>
+            <a:r>
+              <a:rPr lang="en-CA" b="0" dirty="0">
+                <a:solidFill>
+                  <a:srgbClr val="CE9178"/>
+                </a:solidFill>
+                <a:effectLst/>
+                <a:latin typeface="Courier New" panose="02070309020205020404" pitchFamily="49" charset="0"/>
+              </a:rPr>
+              <a:t>'</a:t>
+            </a:r>
+            <a:endParaRPr lang="en-CA" b="0" dirty="0">
+              <a:solidFill>
+                <a:srgbClr val="D4D4D4"/>
+              </a:solidFill>
+              <a:effectLst/>
+              <a:latin typeface="Courier New" panose="02070309020205020404" pitchFamily="49" charset="0"/>
+            </a:endParaRPr>
+          </a:p>
+          <a:p>
+            <a:r>
+              <a:rPr lang="en-CA" b="0" dirty="0">
+                <a:solidFill>
+                  <a:srgbClr val="D4D4D4"/>
+                </a:solidFill>
+                <a:effectLst/>
+                <a:latin typeface="Courier New" panose="02070309020205020404" pitchFamily="49" charset="0"/>
+              </a:rPr>
+              <a:t>    </a:t>
+            </a:r>
+            <a:r>
+              <a:rPr lang="en-CA" b="0" dirty="0">
+                <a:solidFill>
+                  <a:srgbClr val="DCDCDC"/>
+                </a:solidFill>
+                <a:effectLst/>
+                <a:latin typeface="Courier New" panose="02070309020205020404" pitchFamily="49" charset="0"/>
+              </a:rPr>
+              <a:t>]]</a:t>
+            </a:r>
+            <a:endParaRPr lang="en-CA" b="0" dirty="0">
+              <a:solidFill>
+                <a:srgbClr val="D4D4D4"/>
+              </a:solidFill>
+              <a:effectLst/>
+              <a:latin typeface="Courier New" panose="02070309020205020404" pitchFamily="49" charset="0"/>
+            </a:endParaRPr>
+          </a:p>
+          <a:p>
+            <a:r>
+              <a:rPr lang="en-CA" b="0" dirty="0">
+                <a:solidFill>
+                  <a:srgbClr val="D4D4D4"/>
+                </a:solidFill>
+                <a:effectLst/>
+                <a:latin typeface="Courier New" panose="02070309020205020404" pitchFamily="49" charset="0"/>
+              </a:rPr>
+              <a:t>y = dataset</a:t>
+            </a:r>
+            <a:r>
+              <a:rPr lang="en-CA" b="0" dirty="0">
+                <a:solidFill>
+                  <a:srgbClr val="DCDCDC"/>
+                </a:solidFill>
+                <a:effectLst/>
+                <a:latin typeface="Courier New" panose="02070309020205020404" pitchFamily="49" charset="0"/>
+              </a:rPr>
+              <a:t>[</a:t>
+            </a:r>
+            <a:endParaRPr lang="en-CA" b="0" dirty="0">
+              <a:solidFill>
+                <a:srgbClr val="D4D4D4"/>
+              </a:solidFill>
+              <a:effectLst/>
+              <a:latin typeface="Courier New" panose="02070309020205020404" pitchFamily="49" charset="0"/>
+            </a:endParaRPr>
+          </a:p>
+          <a:p>
+            <a:r>
+              <a:rPr lang="en-CA" b="0" dirty="0">
+                <a:solidFill>
+                  <a:srgbClr val="D4D4D4"/>
+                </a:solidFill>
+                <a:effectLst/>
+                <a:latin typeface="Courier New" panose="02070309020205020404" pitchFamily="49" charset="0"/>
+              </a:rPr>
+              <a:t>    </a:t>
+            </a:r>
+            <a:r>
+              <a:rPr lang="en-CA" b="0" dirty="0">
+                <a:solidFill>
+                  <a:srgbClr val="CE9178"/>
+                </a:solidFill>
+                <a:effectLst/>
+                <a:latin typeface="Courier New" panose="02070309020205020404" pitchFamily="49" charset="0"/>
+              </a:rPr>
+              <a:t>'</a:t>
+            </a:r>
+            <a:r>
+              <a:rPr lang="en-CA" b="0" dirty="0" err="1">
+                <a:solidFill>
+                  <a:srgbClr val="CE9178"/>
+                </a:solidFill>
+                <a:effectLst/>
+                <a:latin typeface="Courier New" panose="02070309020205020404" pitchFamily="49" charset="0"/>
+              </a:rPr>
+              <a:t>Composite_Benchmark</a:t>
+            </a:r>
+            <a:r>
+              <a:rPr lang="en-CA" b="0" dirty="0">
+                <a:solidFill>
+                  <a:srgbClr val="CE9178"/>
+                </a:solidFill>
+                <a:effectLst/>
+                <a:latin typeface="Courier New" panose="02070309020205020404" pitchFamily="49" charset="0"/>
+              </a:rPr>
+              <a:t>'</a:t>
+            </a:r>
+            <a:endParaRPr lang="en-CA" b="0" dirty="0">
+              <a:solidFill>
+                <a:srgbClr val="D4D4D4"/>
+              </a:solidFill>
+              <a:effectLst/>
+              <a:latin typeface="Courier New" panose="02070309020205020404" pitchFamily="49" charset="0"/>
+            </a:endParaRPr>
+          </a:p>
+          <a:p>
+            <a:r>
+              <a:rPr lang="en-CA" b="0" dirty="0">
+                <a:solidFill>
+                  <a:srgbClr val="D4D4D4"/>
+                </a:solidFill>
+                <a:effectLst/>
+                <a:latin typeface="Courier New" panose="02070309020205020404" pitchFamily="49" charset="0"/>
+              </a:rPr>
+              <a:t>    </a:t>
+            </a:r>
+            <a:r>
+              <a:rPr lang="en-CA" b="0" dirty="0">
+                <a:solidFill>
+                  <a:srgbClr val="DCDCDC"/>
+                </a:solidFill>
+                <a:effectLst/>
+                <a:latin typeface="Courier New" panose="02070309020205020404" pitchFamily="49" charset="0"/>
+              </a:rPr>
+              <a:t>]</a:t>
+            </a:r>
+            <a:endParaRPr lang="en-CA" b="0" dirty="0">
+              <a:solidFill>
+                <a:srgbClr val="D4D4D4"/>
+              </a:solidFill>
+              <a:effectLst/>
+              <a:latin typeface="Courier New" panose="02070309020205020404" pitchFamily="49" charset="0"/>
+            </a:endParaRPr>
+          </a:p>
+          <a:p>
+            <a:endParaRPr lang="en-CA" dirty="0"/>
           </a:p>
         </p:txBody>
       </p:sp>
     </p:spTree>
     <p:extLst>
       <p:ext uri="{BB962C8B-B14F-4D97-AF65-F5344CB8AC3E}">
-        <p14:creationId xmlns:p14="http://schemas.microsoft.com/office/powerpoint/2010/main" val="2907016894"/>
+        <p14:creationId xmlns:p14="http://schemas.microsoft.com/office/powerpoint/2010/main" val="2861466632"/>
       </p:ext>
     </p:extLst>
   </p:cSld>
@@ -7013,8 +8257,8 @@
         </p:nvSpPr>
         <p:spPr>
           <a:xfrm>
-            <a:off x="287341" y="2098438"/>
-            <a:ext cx="4358909" cy="4099623"/>
+            <a:off x="287341" y="2098439"/>
+            <a:ext cx="4358909" cy="1330562"/>
           </a:xfrm>
         </p:spPr>
         <p:txBody>
@@ -7284,6 +8528,1427 @@
           </a:p>
         </p:txBody>
       </p:sp>
+      <p:pic>
+        <p:nvPicPr>
+          <p:cNvPr id="8" name="Graphic 7" descr="Checkbox Checked with solid fill">
+            <a:extLst>
+              <a:ext uri="{FF2B5EF4-FFF2-40B4-BE49-F238E27FC236}">
+                <a16:creationId xmlns:a16="http://schemas.microsoft.com/office/drawing/2014/main" id="{3E1713CC-E780-6C57-83E5-1CC513C8EF4C}"/>
+              </a:ext>
+            </a:extLst>
+          </p:cNvPr>
+          <p:cNvPicPr>
+            <a:picLocks noChangeAspect="1"/>
+          </p:cNvPicPr>
+          <p:nvPr/>
+        </p:nvPicPr>
+        <p:blipFill>
+          <a:blip r:embed="rId2">
+            <a:extLst>
+              <a:ext uri="{28A0092B-C50C-407E-A947-70E740481C1C}">
+                <a14:useLocalDpi xmlns:a14="http://schemas.microsoft.com/office/drawing/2010/main" val="0"/>
+              </a:ext>
+              <a:ext uri="{96DAC541-7B7A-43D3-8B79-37D633B846F1}">
+                <asvg:svgBlip xmlns:asvg="http://schemas.microsoft.com/office/drawing/2016/SVG/main" r:embed="rId3"/>
+              </a:ext>
+            </a:extLst>
+          </a:blip>
+          <a:stretch>
+            <a:fillRect/>
+          </a:stretch>
+        </p:blipFill>
+        <p:spPr>
+          <a:xfrm>
+            <a:off x="2203704" y="2452430"/>
+            <a:ext cx="457200" cy="457200"/>
+          </a:xfrm>
+          <a:prstGeom prst="rect">
+            <a:avLst/>
+          </a:prstGeom>
+        </p:spPr>
+      </p:pic>
+      <p:pic>
+        <p:nvPicPr>
+          <p:cNvPr id="9" name="Graphic 8" descr="Checkbox Checked with solid fill">
+            <a:extLst>
+              <a:ext uri="{FF2B5EF4-FFF2-40B4-BE49-F238E27FC236}">
+                <a16:creationId xmlns:a16="http://schemas.microsoft.com/office/drawing/2014/main" id="{CA19BF06-E97E-D98A-66AC-37B32532535F}"/>
+              </a:ext>
+            </a:extLst>
+          </p:cNvPr>
+          <p:cNvPicPr>
+            <a:picLocks noChangeAspect="1"/>
+          </p:cNvPicPr>
+          <p:nvPr/>
+        </p:nvPicPr>
+        <p:blipFill>
+          <a:blip r:embed="rId2">
+            <a:extLst>
+              <a:ext uri="{28A0092B-C50C-407E-A947-70E740481C1C}">
+                <a14:useLocalDpi xmlns:a14="http://schemas.microsoft.com/office/drawing/2010/main" val="0"/>
+              </a:ext>
+              <a:ext uri="{96DAC541-7B7A-43D3-8B79-37D633B846F1}">
+                <asvg:svgBlip xmlns:asvg="http://schemas.microsoft.com/office/drawing/2016/SVG/main" r:embed="rId3"/>
+              </a:ext>
+            </a:extLst>
+          </a:blip>
+          <a:stretch>
+            <a:fillRect/>
+          </a:stretch>
+        </p:blipFill>
+        <p:spPr>
+          <a:xfrm>
+            <a:off x="3271520" y="2800798"/>
+            <a:ext cx="457200" cy="457200"/>
+          </a:xfrm>
+          <a:prstGeom prst="rect">
+            <a:avLst/>
+          </a:prstGeom>
+        </p:spPr>
+      </p:pic>
+      <p:sp>
+        <p:nvSpPr>
+          <p:cNvPr id="10" name="TextBox 9">
+            <a:extLst>
+              <a:ext uri="{FF2B5EF4-FFF2-40B4-BE49-F238E27FC236}">
+                <a16:creationId xmlns:a16="http://schemas.microsoft.com/office/drawing/2014/main" id="{AFE9FFCF-B8C9-997C-93AF-8B770AB9223A}"/>
+              </a:ext>
+            </a:extLst>
+          </p:cNvPr>
+          <p:cNvSpPr txBox="1"/>
+          <p:nvPr/>
+        </p:nvSpPr>
+        <p:spPr>
+          <a:xfrm>
+            <a:off x="5473352" y="397741"/>
+            <a:ext cx="6514432" cy="5909310"/>
+          </a:xfrm>
+          <a:prstGeom prst="rect">
+            <a:avLst/>
+          </a:prstGeom>
+          <a:noFill/>
+        </p:spPr>
+        <p:txBody>
+          <a:bodyPr wrap="square" rtlCol="0">
+            <a:spAutoFit/>
+          </a:bodyPr>
+          <a:lstStyle/>
+          <a:p>
+            <a:r>
+              <a:rPr lang="en-CA" b="0" dirty="0">
+                <a:solidFill>
+                  <a:srgbClr val="6AA94F"/>
+                </a:solidFill>
+                <a:effectLst/>
+                <a:latin typeface="Courier New" panose="02070309020205020404" pitchFamily="49" charset="0"/>
+              </a:rPr>
+              <a:t># Define the parameter distribution</a:t>
+            </a:r>
+            <a:endParaRPr lang="en-CA" b="0" dirty="0">
+              <a:solidFill>
+                <a:srgbClr val="D4D4D4"/>
+              </a:solidFill>
+              <a:effectLst/>
+              <a:latin typeface="Courier New" panose="02070309020205020404" pitchFamily="49" charset="0"/>
+            </a:endParaRPr>
+          </a:p>
+          <a:p>
+            <a:r>
+              <a:rPr lang="en-CA" b="0" dirty="0" err="1">
+                <a:solidFill>
+                  <a:srgbClr val="D4D4D4"/>
+                </a:solidFill>
+                <a:effectLst/>
+                <a:latin typeface="Courier New" panose="02070309020205020404" pitchFamily="49" charset="0"/>
+              </a:rPr>
+              <a:t>param_dist</a:t>
+            </a:r>
+            <a:r>
+              <a:rPr lang="en-CA" b="0" dirty="0">
+                <a:solidFill>
+                  <a:srgbClr val="D4D4D4"/>
+                </a:solidFill>
+                <a:effectLst/>
+                <a:latin typeface="Courier New" panose="02070309020205020404" pitchFamily="49" charset="0"/>
+              </a:rPr>
+              <a:t> = </a:t>
+            </a:r>
+            <a:r>
+              <a:rPr lang="en-CA" b="0" dirty="0">
+                <a:solidFill>
+                  <a:srgbClr val="DCDCDC"/>
+                </a:solidFill>
+                <a:effectLst/>
+                <a:latin typeface="Courier New" panose="02070309020205020404" pitchFamily="49" charset="0"/>
+              </a:rPr>
+              <a:t>{</a:t>
+            </a:r>
+            <a:endParaRPr lang="en-CA" b="0" dirty="0">
+              <a:solidFill>
+                <a:srgbClr val="D4D4D4"/>
+              </a:solidFill>
+              <a:effectLst/>
+              <a:latin typeface="Courier New" panose="02070309020205020404" pitchFamily="49" charset="0"/>
+            </a:endParaRPr>
+          </a:p>
+          <a:p>
+            <a:r>
+              <a:rPr lang="en-CA" b="0" dirty="0">
+                <a:solidFill>
+                  <a:srgbClr val="D4D4D4"/>
+                </a:solidFill>
+                <a:effectLst/>
+                <a:latin typeface="Courier New" panose="02070309020205020404" pitchFamily="49" charset="0"/>
+              </a:rPr>
+              <a:t>    </a:t>
+            </a:r>
+            <a:r>
+              <a:rPr lang="en-CA" b="0" dirty="0">
+                <a:solidFill>
+                  <a:srgbClr val="CE9178"/>
+                </a:solidFill>
+                <a:effectLst/>
+                <a:latin typeface="Courier New" panose="02070309020205020404" pitchFamily="49" charset="0"/>
+              </a:rPr>
+              <a:t>'</a:t>
+            </a:r>
+            <a:r>
+              <a:rPr lang="en-CA" b="0" dirty="0" err="1">
+                <a:solidFill>
+                  <a:srgbClr val="CE9178"/>
+                </a:solidFill>
+                <a:effectLst/>
+                <a:latin typeface="Courier New" panose="02070309020205020404" pitchFamily="49" charset="0"/>
+              </a:rPr>
+              <a:t>n_estimators</a:t>
+            </a:r>
+            <a:r>
+              <a:rPr lang="en-CA" b="0" dirty="0">
+                <a:solidFill>
+                  <a:srgbClr val="CE9178"/>
+                </a:solidFill>
+                <a:effectLst/>
+                <a:latin typeface="Courier New" panose="02070309020205020404" pitchFamily="49" charset="0"/>
+              </a:rPr>
+              <a:t>'</a:t>
+            </a:r>
+            <a:r>
+              <a:rPr lang="en-CA" b="0" dirty="0">
+                <a:solidFill>
+                  <a:srgbClr val="DCDCDC"/>
+                </a:solidFill>
+                <a:effectLst/>
+                <a:latin typeface="Courier New" panose="02070309020205020404" pitchFamily="49" charset="0"/>
+              </a:rPr>
+              <a:t>:</a:t>
+            </a:r>
+            <a:r>
+              <a:rPr lang="en-CA" b="0" dirty="0">
+                <a:solidFill>
+                  <a:srgbClr val="D4D4D4"/>
+                </a:solidFill>
+                <a:effectLst/>
+                <a:latin typeface="Courier New" panose="02070309020205020404" pitchFamily="49" charset="0"/>
+              </a:rPr>
+              <a:t> </a:t>
+            </a:r>
+            <a:r>
+              <a:rPr lang="en-CA" b="0" dirty="0">
+                <a:solidFill>
+                  <a:srgbClr val="DCDCDC"/>
+                </a:solidFill>
+                <a:effectLst/>
+                <a:latin typeface="Courier New" panose="02070309020205020404" pitchFamily="49" charset="0"/>
+              </a:rPr>
+              <a:t>[</a:t>
+            </a:r>
+            <a:r>
+              <a:rPr lang="en-CA" b="0" dirty="0">
+                <a:solidFill>
+                  <a:srgbClr val="B5CEA8"/>
+                </a:solidFill>
+                <a:effectLst/>
+                <a:latin typeface="Courier New" panose="02070309020205020404" pitchFamily="49" charset="0"/>
+              </a:rPr>
+              <a:t>50</a:t>
+            </a:r>
+            <a:r>
+              <a:rPr lang="en-CA" b="0" dirty="0">
+                <a:solidFill>
+                  <a:srgbClr val="DCDCDC"/>
+                </a:solidFill>
+                <a:effectLst/>
+                <a:latin typeface="Courier New" panose="02070309020205020404" pitchFamily="49" charset="0"/>
+              </a:rPr>
+              <a:t>,</a:t>
+            </a:r>
+            <a:r>
+              <a:rPr lang="en-CA" b="0" dirty="0">
+                <a:solidFill>
+                  <a:srgbClr val="D4D4D4"/>
+                </a:solidFill>
+                <a:effectLst/>
+                <a:latin typeface="Courier New" panose="02070309020205020404" pitchFamily="49" charset="0"/>
+              </a:rPr>
+              <a:t> </a:t>
+            </a:r>
+            <a:r>
+              <a:rPr lang="en-CA" b="0" dirty="0">
+                <a:solidFill>
+                  <a:srgbClr val="B5CEA8"/>
+                </a:solidFill>
+                <a:effectLst/>
+                <a:latin typeface="Courier New" panose="02070309020205020404" pitchFamily="49" charset="0"/>
+              </a:rPr>
+              <a:t>100</a:t>
+            </a:r>
+            <a:r>
+              <a:rPr lang="en-CA" b="0" dirty="0">
+                <a:solidFill>
+                  <a:srgbClr val="DCDCDC"/>
+                </a:solidFill>
+                <a:effectLst/>
+                <a:latin typeface="Courier New" panose="02070309020205020404" pitchFamily="49" charset="0"/>
+              </a:rPr>
+              <a:t>,</a:t>
+            </a:r>
+            <a:r>
+              <a:rPr lang="en-CA" b="0" dirty="0">
+                <a:solidFill>
+                  <a:srgbClr val="D4D4D4"/>
+                </a:solidFill>
+                <a:effectLst/>
+                <a:latin typeface="Courier New" panose="02070309020205020404" pitchFamily="49" charset="0"/>
+              </a:rPr>
+              <a:t> </a:t>
+            </a:r>
+            <a:r>
+              <a:rPr lang="en-CA" b="0" dirty="0">
+                <a:solidFill>
+                  <a:srgbClr val="B5CEA8"/>
+                </a:solidFill>
+                <a:effectLst/>
+                <a:latin typeface="Courier New" panose="02070309020205020404" pitchFamily="49" charset="0"/>
+              </a:rPr>
+              <a:t>150</a:t>
+            </a:r>
+            <a:r>
+              <a:rPr lang="en-CA" b="0" dirty="0">
+                <a:solidFill>
+                  <a:srgbClr val="DCDCDC"/>
+                </a:solidFill>
+                <a:effectLst/>
+                <a:latin typeface="Courier New" panose="02070309020205020404" pitchFamily="49" charset="0"/>
+              </a:rPr>
+              <a:t>,</a:t>
+            </a:r>
+            <a:r>
+              <a:rPr lang="en-CA" b="0" dirty="0">
+                <a:solidFill>
+                  <a:srgbClr val="D4D4D4"/>
+                </a:solidFill>
+                <a:effectLst/>
+                <a:latin typeface="Courier New" panose="02070309020205020404" pitchFamily="49" charset="0"/>
+              </a:rPr>
+              <a:t> </a:t>
+            </a:r>
+            <a:r>
+              <a:rPr lang="en-CA" b="0" dirty="0">
+                <a:solidFill>
+                  <a:srgbClr val="B5CEA8"/>
+                </a:solidFill>
+                <a:effectLst/>
+                <a:latin typeface="Courier New" panose="02070309020205020404" pitchFamily="49" charset="0"/>
+              </a:rPr>
+              <a:t>200</a:t>
+            </a:r>
+            <a:r>
+              <a:rPr lang="en-CA" b="0" dirty="0">
+                <a:solidFill>
+                  <a:srgbClr val="DCDCDC"/>
+                </a:solidFill>
+                <a:effectLst/>
+                <a:latin typeface="Courier New" panose="02070309020205020404" pitchFamily="49" charset="0"/>
+              </a:rPr>
+              <a:t>]</a:t>
+            </a:r>
+            <a:endParaRPr lang="en-CA" b="0" dirty="0">
+              <a:solidFill>
+                <a:srgbClr val="D4D4D4"/>
+              </a:solidFill>
+              <a:effectLst/>
+              <a:latin typeface="Courier New" panose="02070309020205020404" pitchFamily="49" charset="0"/>
+            </a:endParaRPr>
+          </a:p>
+          <a:p>
+            <a:r>
+              <a:rPr lang="en-CA" b="0" dirty="0">
+                <a:solidFill>
+                  <a:srgbClr val="DCDCDC"/>
+                </a:solidFill>
+                <a:effectLst/>
+                <a:latin typeface="Courier New" panose="02070309020205020404" pitchFamily="49" charset="0"/>
+              </a:rPr>
+              <a:t>}</a:t>
+            </a:r>
+            <a:endParaRPr lang="en-CA" b="0" dirty="0">
+              <a:solidFill>
+                <a:srgbClr val="D4D4D4"/>
+              </a:solidFill>
+              <a:effectLst/>
+              <a:latin typeface="Courier New" panose="02070309020205020404" pitchFamily="49" charset="0"/>
+            </a:endParaRPr>
+          </a:p>
+          <a:p>
+            <a:endParaRPr lang="en-US" b="0" dirty="0">
+              <a:solidFill>
+                <a:srgbClr val="D4D4D4"/>
+              </a:solidFill>
+              <a:effectLst/>
+              <a:latin typeface="Courier New" panose="02070309020205020404" pitchFamily="49" charset="0"/>
+            </a:endParaRPr>
+          </a:p>
+          <a:p>
+            <a:r>
+              <a:rPr lang="en-US" b="0" dirty="0">
+                <a:solidFill>
+                  <a:srgbClr val="6AA94F"/>
+                </a:solidFill>
+                <a:effectLst/>
+                <a:latin typeface="Courier New" panose="02070309020205020404" pitchFamily="49" charset="0"/>
+              </a:rPr>
+              <a:t># Plant the seeds to grow a forest</a:t>
+            </a:r>
+            <a:endParaRPr lang="en-US" b="0" dirty="0">
+              <a:solidFill>
+                <a:srgbClr val="D4D4D4"/>
+              </a:solidFill>
+              <a:effectLst/>
+              <a:latin typeface="Courier New" panose="02070309020205020404" pitchFamily="49" charset="0"/>
+            </a:endParaRPr>
+          </a:p>
+          <a:p>
+            <a:r>
+              <a:rPr lang="en-US" b="0" dirty="0" err="1">
+                <a:solidFill>
+                  <a:srgbClr val="D4D4D4"/>
+                </a:solidFill>
+                <a:effectLst/>
+                <a:latin typeface="Courier New" panose="02070309020205020404" pitchFamily="49" charset="0"/>
+              </a:rPr>
+              <a:t>forest_model</a:t>
+            </a:r>
+            <a:r>
+              <a:rPr lang="en-US" b="0" dirty="0">
+                <a:solidFill>
+                  <a:srgbClr val="D4D4D4"/>
+                </a:solidFill>
+                <a:effectLst/>
+                <a:latin typeface="Courier New" panose="02070309020205020404" pitchFamily="49" charset="0"/>
+              </a:rPr>
+              <a:t> = </a:t>
+            </a:r>
+            <a:r>
+              <a:rPr lang="en-US" b="0" dirty="0" err="1">
+                <a:solidFill>
+                  <a:srgbClr val="D4D4D4"/>
+                </a:solidFill>
+                <a:effectLst/>
+                <a:latin typeface="Courier New" panose="02070309020205020404" pitchFamily="49" charset="0"/>
+              </a:rPr>
+              <a:t>RandomForestRegressor</a:t>
+            </a:r>
+            <a:r>
+              <a:rPr lang="en-US" b="0" dirty="0">
+                <a:solidFill>
+                  <a:srgbClr val="DCDCDC"/>
+                </a:solidFill>
+                <a:effectLst/>
+                <a:latin typeface="Courier New" panose="02070309020205020404" pitchFamily="49" charset="0"/>
+              </a:rPr>
+              <a:t>(</a:t>
+            </a:r>
+            <a:r>
+              <a:rPr lang="en-US" b="0" dirty="0" err="1">
+                <a:solidFill>
+                  <a:srgbClr val="D4D4D4"/>
+                </a:solidFill>
+                <a:effectLst/>
+                <a:latin typeface="Courier New" panose="02070309020205020404" pitchFamily="49" charset="0"/>
+              </a:rPr>
+              <a:t>random_state</a:t>
+            </a:r>
+            <a:r>
+              <a:rPr lang="en-US" b="0" dirty="0">
+                <a:solidFill>
+                  <a:srgbClr val="D4D4D4"/>
+                </a:solidFill>
+                <a:effectLst/>
+                <a:latin typeface="Courier New" panose="02070309020205020404" pitchFamily="49" charset="0"/>
+              </a:rPr>
+              <a:t>=</a:t>
+            </a:r>
+            <a:r>
+              <a:rPr lang="en-US" b="0" dirty="0">
+                <a:solidFill>
+                  <a:srgbClr val="B5CEA8"/>
+                </a:solidFill>
+                <a:effectLst/>
+                <a:latin typeface="Courier New" panose="02070309020205020404" pitchFamily="49" charset="0"/>
+              </a:rPr>
+              <a:t>0</a:t>
+            </a:r>
+            <a:r>
+              <a:rPr lang="en-US" b="0" dirty="0">
+                <a:solidFill>
+                  <a:srgbClr val="DCDCDC"/>
+                </a:solidFill>
+                <a:effectLst/>
+                <a:latin typeface="Courier New" panose="02070309020205020404" pitchFamily="49" charset="0"/>
+              </a:rPr>
+              <a:t>)</a:t>
+            </a:r>
+            <a:endParaRPr lang="en-US" b="0" dirty="0">
+              <a:solidFill>
+                <a:srgbClr val="D4D4D4"/>
+              </a:solidFill>
+              <a:effectLst/>
+              <a:latin typeface="Courier New" panose="02070309020205020404" pitchFamily="49" charset="0"/>
+            </a:endParaRPr>
+          </a:p>
+          <a:p>
+            <a:br>
+              <a:rPr lang="en-US" b="0" dirty="0">
+                <a:solidFill>
+                  <a:srgbClr val="D4D4D4"/>
+                </a:solidFill>
+                <a:effectLst/>
+                <a:latin typeface="Courier New" panose="02070309020205020404" pitchFamily="49" charset="0"/>
+              </a:rPr>
+            </a:br>
+            <a:r>
+              <a:rPr lang="en-US" b="0" dirty="0">
+                <a:solidFill>
+                  <a:srgbClr val="6AA94F"/>
+                </a:solidFill>
+                <a:effectLst/>
+                <a:latin typeface="Courier New" panose="02070309020205020404" pitchFamily="49" charset="0"/>
+              </a:rPr>
+              <a:t># Initiate the random search</a:t>
+            </a:r>
+            <a:endParaRPr lang="en-US" b="0" dirty="0">
+              <a:solidFill>
+                <a:srgbClr val="D4D4D4"/>
+              </a:solidFill>
+              <a:effectLst/>
+              <a:latin typeface="Courier New" panose="02070309020205020404" pitchFamily="49" charset="0"/>
+            </a:endParaRPr>
+          </a:p>
+          <a:p>
+            <a:r>
+              <a:rPr lang="en-US" b="0" dirty="0" err="1">
+                <a:solidFill>
+                  <a:srgbClr val="D4D4D4"/>
+                </a:solidFill>
+                <a:effectLst/>
+                <a:latin typeface="Courier New" panose="02070309020205020404" pitchFamily="49" charset="0"/>
+              </a:rPr>
+              <a:t>random_search</a:t>
+            </a:r>
+            <a:r>
+              <a:rPr lang="en-US" b="0" dirty="0">
+                <a:solidFill>
+                  <a:srgbClr val="D4D4D4"/>
+                </a:solidFill>
+                <a:effectLst/>
+                <a:latin typeface="Courier New" panose="02070309020205020404" pitchFamily="49" charset="0"/>
+              </a:rPr>
+              <a:t> = </a:t>
+            </a:r>
+            <a:r>
+              <a:rPr lang="en-US" b="0" dirty="0" err="1">
+                <a:solidFill>
+                  <a:srgbClr val="D4D4D4"/>
+                </a:solidFill>
+                <a:effectLst/>
+                <a:latin typeface="Courier New" panose="02070309020205020404" pitchFamily="49" charset="0"/>
+              </a:rPr>
+              <a:t>RandomizedSearchCV</a:t>
+            </a:r>
+            <a:r>
+              <a:rPr lang="en-US" b="0" dirty="0">
+                <a:solidFill>
+                  <a:srgbClr val="DCDCDC"/>
+                </a:solidFill>
+                <a:effectLst/>
+                <a:latin typeface="Courier New" panose="02070309020205020404" pitchFamily="49" charset="0"/>
+              </a:rPr>
+              <a:t>(</a:t>
+            </a:r>
+            <a:endParaRPr lang="en-US" b="0" dirty="0">
+              <a:solidFill>
+                <a:srgbClr val="D4D4D4"/>
+              </a:solidFill>
+              <a:effectLst/>
+              <a:latin typeface="Courier New" panose="02070309020205020404" pitchFamily="49" charset="0"/>
+            </a:endParaRPr>
+          </a:p>
+          <a:p>
+            <a:r>
+              <a:rPr lang="en-US" b="0" dirty="0">
+                <a:solidFill>
+                  <a:srgbClr val="D4D4D4"/>
+                </a:solidFill>
+                <a:effectLst/>
+                <a:latin typeface="Courier New" panose="02070309020205020404" pitchFamily="49" charset="0"/>
+              </a:rPr>
+              <a:t>    estimator = </a:t>
+            </a:r>
+            <a:r>
+              <a:rPr lang="en-US" b="0" dirty="0" err="1">
+                <a:solidFill>
+                  <a:srgbClr val="D4D4D4"/>
+                </a:solidFill>
+                <a:effectLst/>
+                <a:latin typeface="Courier New" panose="02070309020205020404" pitchFamily="49" charset="0"/>
+              </a:rPr>
+              <a:t>forest_model</a:t>
+            </a:r>
+            <a:r>
+              <a:rPr lang="en-US" b="0" dirty="0">
+                <a:solidFill>
+                  <a:srgbClr val="DCDCDC"/>
+                </a:solidFill>
+                <a:effectLst/>
+                <a:latin typeface="Courier New" panose="02070309020205020404" pitchFamily="49" charset="0"/>
+              </a:rPr>
+              <a:t>,</a:t>
+            </a:r>
+            <a:r>
+              <a:rPr lang="en-US" b="0" dirty="0">
+                <a:solidFill>
+                  <a:srgbClr val="D4D4D4"/>
+                </a:solidFill>
+                <a:effectLst/>
+                <a:latin typeface="Courier New" panose="02070309020205020404" pitchFamily="49" charset="0"/>
+              </a:rPr>
+              <a:t>      </a:t>
+            </a:r>
+          </a:p>
+          <a:p>
+            <a:r>
+              <a:rPr lang="en-US" dirty="0">
+                <a:solidFill>
+                  <a:srgbClr val="D4D4D4"/>
+                </a:solidFill>
+                <a:latin typeface="Courier New" panose="02070309020205020404" pitchFamily="49" charset="0"/>
+              </a:rPr>
+              <a:t>    </a:t>
+            </a:r>
+            <a:r>
+              <a:rPr lang="en-US" b="0" dirty="0" err="1">
+                <a:solidFill>
+                  <a:srgbClr val="D4D4D4"/>
+                </a:solidFill>
+                <a:effectLst/>
+                <a:latin typeface="Courier New" panose="02070309020205020404" pitchFamily="49" charset="0"/>
+              </a:rPr>
+              <a:t>param_distributions</a:t>
+            </a:r>
+            <a:r>
+              <a:rPr lang="en-US" b="0" dirty="0">
+                <a:solidFill>
+                  <a:srgbClr val="D4D4D4"/>
+                </a:solidFill>
+                <a:effectLst/>
+                <a:latin typeface="Courier New" panose="02070309020205020404" pitchFamily="49" charset="0"/>
+              </a:rPr>
+              <a:t> = </a:t>
+            </a:r>
+            <a:r>
+              <a:rPr lang="en-US" b="0" dirty="0" err="1">
+                <a:solidFill>
+                  <a:srgbClr val="D4D4D4"/>
+                </a:solidFill>
+                <a:effectLst/>
+                <a:latin typeface="Courier New" panose="02070309020205020404" pitchFamily="49" charset="0"/>
+              </a:rPr>
+              <a:t>param_dist</a:t>
+            </a:r>
+            <a:r>
+              <a:rPr lang="en-US" b="0" dirty="0">
+                <a:solidFill>
+                  <a:srgbClr val="DCDCDC"/>
+                </a:solidFill>
+                <a:effectLst/>
+                <a:latin typeface="Courier New" panose="02070309020205020404" pitchFamily="49" charset="0"/>
+              </a:rPr>
+              <a:t>,</a:t>
+            </a:r>
+            <a:r>
+              <a:rPr lang="en-US" b="0" dirty="0">
+                <a:solidFill>
+                  <a:srgbClr val="D4D4D4"/>
+                </a:solidFill>
+                <a:effectLst/>
+                <a:latin typeface="Courier New" panose="02070309020205020404" pitchFamily="49" charset="0"/>
+              </a:rPr>
+              <a:t>    </a:t>
+            </a:r>
+          </a:p>
+          <a:p>
+            <a:r>
+              <a:rPr lang="en-US" b="0" dirty="0">
+                <a:solidFill>
+                  <a:srgbClr val="D4D4D4"/>
+                </a:solidFill>
+                <a:effectLst/>
+                <a:latin typeface="Courier New" panose="02070309020205020404" pitchFamily="49" charset="0"/>
+              </a:rPr>
+              <a:t>    </a:t>
+            </a:r>
+            <a:r>
+              <a:rPr lang="en-US" b="0" dirty="0" err="1">
+                <a:solidFill>
+                  <a:srgbClr val="D4D4D4"/>
+                </a:solidFill>
+                <a:effectLst/>
+                <a:latin typeface="Courier New" panose="02070309020205020404" pitchFamily="49" charset="0"/>
+              </a:rPr>
+              <a:t>n_iter</a:t>
+            </a:r>
+            <a:r>
+              <a:rPr lang="en-US" b="0" dirty="0">
+                <a:solidFill>
+                  <a:srgbClr val="D4D4D4"/>
+                </a:solidFill>
+                <a:effectLst/>
+                <a:latin typeface="Courier New" panose="02070309020205020404" pitchFamily="49" charset="0"/>
+              </a:rPr>
+              <a:t> = </a:t>
+            </a:r>
+            <a:r>
+              <a:rPr lang="en-US" b="0" dirty="0">
+                <a:solidFill>
+                  <a:srgbClr val="B5CEA8"/>
+                </a:solidFill>
+                <a:effectLst/>
+                <a:latin typeface="Courier New" panose="02070309020205020404" pitchFamily="49" charset="0"/>
+              </a:rPr>
+              <a:t>15</a:t>
+            </a:r>
+            <a:r>
+              <a:rPr lang="en-US" b="0" dirty="0">
+                <a:solidFill>
+                  <a:srgbClr val="DCDCDC"/>
+                </a:solidFill>
+                <a:effectLst/>
+                <a:latin typeface="Courier New" panose="02070309020205020404" pitchFamily="49" charset="0"/>
+              </a:rPr>
+              <a:t>,</a:t>
+            </a:r>
+            <a:endParaRPr lang="en-US" b="0" dirty="0">
+              <a:solidFill>
+                <a:srgbClr val="D4D4D4"/>
+              </a:solidFill>
+              <a:effectLst/>
+              <a:latin typeface="Courier New" panose="02070309020205020404" pitchFamily="49" charset="0"/>
+            </a:endParaRPr>
+          </a:p>
+          <a:p>
+            <a:r>
+              <a:rPr lang="en-US" b="0" dirty="0">
+                <a:solidFill>
+                  <a:srgbClr val="D4D4D4"/>
+                </a:solidFill>
+                <a:effectLst/>
+                <a:latin typeface="Courier New" panose="02070309020205020404" pitchFamily="49" charset="0"/>
+              </a:rPr>
+              <a:t>    cv = </a:t>
+            </a:r>
+            <a:r>
+              <a:rPr lang="en-US" b="0" dirty="0">
+                <a:solidFill>
+                  <a:srgbClr val="B5CEA8"/>
+                </a:solidFill>
+                <a:effectLst/>
+                <a:latin typeface="Courier New" panose="02070309020205020404" pitchFamily="49" charset="0"/>
+              </a:rPr>
+              <a:t>5</a:t>
+            </a:r>
+            <a:r>
+              <a:rPr lang="en-US" b="0" dirty="0">
+                <a:solidFill>
+                  <a:srgbClr val="DCDCDC"/>
+                </a:solidFill>
+                <a:effectLst/>
+                <a:latin typeface="Courier New" panose="02070309020205020404" pitchFamily="49" charset="0"/>
+              </a:rPr>
+              <a:t>,</a:t>
+            </a:r>
+            <a:r>
+              <a:rPr lang="en-US" b="0" dirty="0">
+                <a:solidFill>
+                  <a:srgbClr val="D4D4D4"/>
+                </a:solidFill>
+                <a:effectLst/>
+                <a:latin typeface="Courier New" panose="02070309020205020404" pitchFamily="49" charset="0"/>
+              </a:rPr>
+              <a:t>  </a:t>
+            </a:r>
+            <a:r>
+              <a:rPr lang="en-US" b="0" dirty="0">
+                <a:solidFill>
+                  <a:srgbClr val="6AA94F"/>
+                </a:solidFill>
+                <a:effectLst/>
+                <a:latin typeface="Courier New" panose="02070309020205020404" pitchFamily="49" charset="0"/>
+              </a:rPr>
+              <a:t># Cross validation</a:t>
+            </a:r>
+            <a:endParaRPr lang="en-US" b="0" dirty="0">
+              <a:solidFill>
+                <a:srgbClr val="D4D4D4"/>
+              </a:solidFill>
+              <a:effectLst/>
+              <a:latin typeface="Courier New" panose="02070309020205020404" pitchFamily="49" charset="0"/>
+            </a:endParaRPr>
+          </a:p>
+          <a:p>
+            <a:r>
+              <a:rPr lang="en-US" b="0" dirty="0">
+                <a:solidFill>
+                  <a:srgbClr val="D4D4D4"/>
+                </a:solidFill>
+                <a:effectLst/>
+                <a:latin typeface="Courier New" panose="02070309020205020404" pitchFamily="49" charset="0"/>
+              </a:rPr>
+              <a:t>    scoring = </a:t>
+            </a:r>
+            <a:r>
+              <a:rPr lang="en-US" b="0" dirty="0">
+                <a:solidFill>
+                  <a:srgbClr val="CE9178"/>
+                </a:solidFill>
+                <a:effectLst/>
+                <a:latin typeface="Courier New" panose="02070309020205020404" pitchFamily="49" charset="0"/>
+              </a:rPr>
+              <a:t>'</a:t>
+            </a:r>
+            <a:r>
+              <a:rPr lang="en-US" b="0" dirty="0" err="1">
+                <a:solidFill>
+                  <a:srgbClr val="CE9178"/>
+                </a:solidFill>
+                <a:effectLst/>
+                <a:latin typeface="Courier New" panose="02070309020205020404" pitchFamily="49" charset="0"/>
+              </a:rPr>
+              <a:t>neg_mean_squared_error</a:t>
+            </a:r>
+            <a:r>
+              <a:rPr lang="en-US" b="0" dirty="0">
+                <a:solidFill>
+                  <a:srgbClr val="CE9178"/>
+                </a:solidFill>
+                <a:effectLst/>
+                <a:latin typeface="Courier New" panose="02070309020205020404" pitchFamily="49" charset="0"/>
+              </a:rPr>
+              <a:t>’</a:t>
+            </a:r>
+            <a:r>
+              <a:rPr lang="en-US" b="0" dirty="0">
+                <a:solidFill>
+                  <a:srgbClr val="DCDCDC"/>
+                </a:solidFill>
+                <a:effectLst/>
+                <a:latin typeface="Courier New" panose="02070309020205020404" pitchFamily="49" charset="0"/>
+              </a:rPr>
+              <a:t>,</a:t>
+            </a:r>
+            <a:r>
+              <a:rPr lang="en-US" b="0" dirty="0">
+                <a:solidFill>
+                  <a:srgbClr val="D4D4D4"/>
+                </a:solidFill>
+                <a:effectLst/>
+                <a:latin typeface="Courier New" panose="02070309020205020404" pitchFamily="49" charset="0"/>
+              </a:rPr>
+              <a:t>  </a:t>
+            </a:r>
+          </a:p>
+          <a:p>
+            <a:r>
+              <a:rPr lang="en-US" dirty="0">
+                <a:solidFill>
+                  <a:srgbClr val="D4D4D4"/>
+                </a:solidFill>
+                <a:latin typeface="Courier New" panose="02070309020205020404" pitchFamily="49" charset="0"/>
+              </a:rPr>
+              <a:t>    </a:t>
+            </a:r>
+            <a:r>
+              <a:rPr lang="en-US" b="0" dirty="0">
+                <a:solidFill>
+                  <a:srgbClr val="6AA94F"/>
+                </a:solidFill>
+                <a:effectLst/>
+                <a:latin typeface="Courier New" panose="02070309020205020404" pitchFamily="49" charset="0"/>
+              </a:rPr>
+              <a:t># score output for performance</a:t>
+            </a:r>
+            <a:endParaRPr lang="en-US" b="0" dirty="0">
+              <a:solidFill>
+                <a:srgbClr val="D4D4D4"/>
+              </a:solidFill>
+              <a:effectLst/>
+              <a:latin typeface="Courier New" panose="02070309020205020404" pitchFamily="49" charset="0"/>
+            </a:endParaRPr>
+          </a:p>
+          <a:p>
+            <a:r>
+              <a:rPr lang="en-US" b="0" dirty="0">
+                <a:solidFill>
+                  <a:srgbClr val="D4D4D4"/>
+                </a:solidFill>
+                <a:effectLst/>
+                <a:latin typeface="Courier New" panose="02070309020205020404" pitchFamily="49" charset="0"/>
+              </a:rPr>
+              <a:t>    </a:t>
+            </a:r>
+            <a:r>
+              <a:rPr lang="en-US" b="0" dirty="0" err="1">
+                <a:solidFill>
+                  <a:srgbClr val="D4D4D4"/>
+                </a:solidFill>
+                <a:effectLst/>
+                <a:latin typeface="Courier New" panose="02070309020205020404" pitchFamily="49" charset="0"/>
+              </a:rPr>
+              <a:t>random_state</a:t>
+            </a:r>
+            <a:r>
+              <a:rPr lang="en-US" b="0" dirty="0">
+                <a:solidFill>
+                  <a:srgbClr val="D4D4D4"/>
+                </a:solidFill>
+                <a:effectLst/>
+                <a:latin typeface="Courier New" panose="02070309020205020404" pitchFamily="49" charset="0"/>
+              </a:rPr>
+              <a:t> = </a:t>
+            </a:r>
+            <a:r>
+              <a:rPr lang="en-US" b="0" dirty="0">
+                <a:solidFill>
+                  <a:srgbClr val="B5CEA8"/>
+                </a:solidFill>
+                <a:effectLst/>
+                <a:latin typeface="Courier New" panose="02070309020205020404" pitchFamily="49" charset="0"/>
+              </a:rPr>
+              <a:t>0</a:t>
+            </a:r>
+            <a:endParaRPr lang="en-US" b="0" dirty="0">
+              <a:solidFill>
+                <a:srgbClr val="D4D4D4"/>
+              </a:solidFill>
+              <a:effectLst/>
+              <a:latin typeface="Courier New" panose="02070309020205020404" pitchFamily="49" charset="0"/>
+            </a:endParaRPr>
+          </a:p>
+          <a:p>
+            <a:r>
+              <a:rPr lang="en-US" b="0" dirty="0">
+                <a:solidFill>
+                  <a:srgbClr val="D4D4D4"/>
+                </a:solidFill>
+                <a:effectLst/>
+                <a:latin typeface="Courier New" panose="02070309020205020404" pitchFamily="49" charset="0"/>
+              </a:rPr>
+              <a:t>    </a:t>
+            </a:r>
+            <a:r>
+              <a:rPr lang="en-US" b="0" dirty="0">
+                <a:solidFill>
+                  <a:srgbClr val="DCDCDC"/>
+                </a:solidFill>
+                <a:effectLst/>
+                <a:latin typeface="Courier New" panose="02070309020205020404" pitchFamily="49" charset="0"/>
+              </a:rPr>
+              <a:t>)</a:t>
+            </a:r>
+            <a:endParaRPr lang="en-US" b="0" dirty="0">
+              <a:solidFill>
+                <a:srgbClr val="D4D4D4"/>
+              </a:solidFill>
+              <a:effectLst/>
+              <a:latin typeface="Courier New" panose="02070309020205020404" pitchFamily="49" charset="0"/>
+            </a:endParaRPr>
+          </a:p>
+          <a:p>
+            <a:endParaRPr lang="en-US" b="0" dirty="0">
+              <a:solidFill>
+                <a:srgbClr val="D4D4D4"/>
+              </a:solidFill>
+              <a:effectLst/>
+              <a:latin typeface="Courier New" panose="02070309020205020404" pitchFamily="49" charset="0"/>
+            </a:endParaRPr>
+          </a:p>
+          <a:p>
+            <a:endParaRPr lang="en-CA" dirty="0"/>
+          </a:p>
+        </p:txBody>
+      </p:sp>
+      <p:cxnSp>
+        <p:nvCxnSpPr>
+          <p:cNvPr id="14" name="Straight Arrow Connector 13">
+            <a:extLst>
+              <a:ext uri="{FF2B5EF4-FFF2-40B4-BE49-F238E27FC236}">
+                <a16:creationId xmlns:a16="http://schemas.microsoft.com/office/drawing/2014/main" id="{92242458-C69F-6C8A-F8D4-613E0885DCE6}"/>
+              </a:ext>
+            </a:extLst>
+          </p:cNvPr>
+          <p:cNvCxnSpPr>
+            <a:cxnSpLocks/>
+          </p:cNvCxnSpPr>
+          <p:nvPr/>
+        </p:nvCxnSpPr>
+        <p:spPr>
+          <a:xfrm>
+            <a:off x="2734056" y="2697480"/>
+            <a:ext cx="2661286" cy="162306"/>
+          </a:xfrm>
+          <a:prstGeom prst="straightConnector1">
+            <a:avLst/>
+          </a:prstGeom>
+          <a:ln>
+            <a:solidFill>
+              <a:schemeClr val="bg1"/>
+            </a:solidFill>
+            <a:tailEnd type="triangle"/>
+          </a:ln>
+        </p:spPr>
+        <p:style>
+          <a:lnRef idx="1">
+            <a:schemeClr val="accent1"/>
+          </a:lnRef>
+          <a:fillRef idx="0">
+            <a:schemeClr val="accent1"/>
+          </a:fillRef>
+          <a:effectRef idx="0">
+            <a:schemeClr val="accent1"/>
+          </a:effectRef>
+          <a:fontRef idx="minor">
+            <a:schemeClr val="tx1"/>
+          </a:fontRef>
+        </p:style>
+      </p:cxnSp>
+      <p:sp>
+        <p:nvSpPr>
+          <p:cNvPr id="17" name="Rectangle 1">
+            <a:extLst>
+              <a:ext uri="{FF2B5EF4-FFF2-40B4-BE49-F238E27FC236}">
+                <a16:creationId xmlns:a16="http://schemas.microsoft.com/office/drawing/2014/main" id="{BCAC0F39-98F3-A4D5-9AA4-0C0D2AD2B89C}"/>
+              </a:ext>
+            </a:extLst>
+          </p:cNvPr>
+          <p:cNvSpPr>
+            <a:spLocks noChangeArrowheads="1"/>
+          </p:cNvSpPr>
+          <p:nvPr/>
+        </p:nvSpPr>
+        <p:spPr bwMode="auto">
+          <a:xfrm>
+            <a:off x="431544" y="4400132"/>
+            <a:ext cx="4745210" cy="984885"/>
+          </a:xfrm>
+          <a:prstGeom prst="rect">
+            <a:avLst/>
+          </a:prstGeom>
+          <a:noFill/>
+          <a:ln>
+            <a:noFill/>
+          </a:ln>
+          <a:effectLst/>
+          <a:extLst>
+            <a:ext uri="{909E8E84-426E-40DD-AFC4-6F175D3DCCD1}">
+              <a14:hiddenFill xmlns:a14="http://schemas.microsoft.com/office/drawing/2010/main">
+                <a:solidFill>
+                  <a:schemeClr val="accent1"/>
+                </a:solidFill>
+              </a14:hiddenFill>
+            </a:ext>
+            <a:ext uri="{91240B29-F687-4F45-9708-019B960494DF}">
+              <a14:hiddenLine xmlns:a14="http://schemas.microsoft.com/office/drawing/2010/main" w="9525">
+                <a:solidFill>
+                  <a:schemeClr val="tx1"/>
+                </a:solidFill>
+                <a:miter lim="800000"/>
+                <a:headEnd/>
+                <a:tailEnd/>
+              </a14:hiddenLine>
+            </a:ext>
+            <a:ext uri="{AF507438-7753-43E0-B8FC-AC1667EBCBE1}">
+              <a14:hiddenEffects xmlns:a14="http://schemas.microsoft.com/office/drawing/2010/main">
+                <a:effectLst>
+                  <a:outerShdw dist="35921" dir="2700000" algn="ctr" rotWithShape="0">
+                    <a:schemeClr val="bg2"/>
+                  </a:outerShdw>
+                </a:effectLst>
+              </a14:hiddenEffects>
+            </a:ext>
+          </a:extLst>
+        </p:spPr>
+        <p:txBody>
+          <a:bodyPr vert="horz" wrap="none" lIns="91440" tIns="45720" rIns="91440" bIns="45720" numCol="1" anchor="ctr" anchorCtr="0" compatLnSpc="1">
+            <a:prstTxWarp prst="textNoShape">
+              <a:avLst/>
+            </a:prstTxWarp>
+            <a:spAutoFit/>
+          </a:bodyPr>
+          <a:lstStyle/>
+          <a:p>
+            <a:pPr marL="0" marR="0" lvl="0" indent="0" algn="l" defTabSz="914400" rtl="0" eaLnBrk="0" fontAlgn="base" latinLnBrk="0" hangingPunct="0">
+              <a:lnSpc>
+                <a:spcPct val="100000"/>
+              </a:lnSpc>
+              <a:spcBef>
+                <a:spcPct val="0"/>
+              </a:spcBef>
+              <a:spcAft>
+                <a:spcPct val="0"/>
+              </a:spcAft>
+              <a:buClrTx/>
+              <a:buSzTx/>
+              <a:buFontTx/>
+              <a:buNone/>
+              <a:tabLst/>
+            </a:pPr>
+            <a:r>
+              <a:rPr kumimoji="0" lang="en-US" altLang="en-US" sz="1600" b="0" i="0" u="none" strike="noStrike" cap="none" normalizeH="0" baseline="0" dirty="0">
+                <a:ln>
+                  <a:noFill/>
+                </a:ln>
+                <a:solidFill>
+                  <a:schemeClr val="bg1"/>
+                </a:solidFill>
+                <a:effectLst/>
+                <a:latin typeface="Arial Unicode MS"/>
+              </a:rPr>
+              <a:t>Initial Mean Squared Error: 15446690.869565217 </a:t>
+            </a:r>
+          </a:p>
+          <a:p>
+            <a:pPr marL="0" marR="0" lvl="0" indent="0" algn="l" defTabSz="914400" rtl="0" eaLnBrk="0" fontAlgn="base" latinLnBrk="0" hangingPunct="0">
+              <a:lnSpc>
+                <a:spcPct val="100000"/>
+              </a:lnSpc>
+              <a:spcBef>
+                <a:spcPct val="0"/>
+              </a:spcBef>
+              <a:spcAft>
+                <a:spcPct val="0"/>
+              </a:spcAft>
+              <a:buClrTx/>
+              <a:buSzTx/>
+              <a:buFontTx/>
+              <a:buNone/>
+              <a:tabLst/>
+            </a:pPr>
+            <a:r>
+              <a:rPr kumimoji="0" lang="en-US" altLang="en-US" sz="1600" b="0" i="0" u="none" strike="noStrike" cap="none" normalizeH="0" baseline="0" dirty="0">
+                <a:ln>
+                  <a:noFill/>
+                </a:ln>
+                <a:solidFill>
+                  <a:schemeClr val="bg1"/>
+                </a:solidFill>
+                <a:effectLst/>
+                <a:latin typeface="Arial Unicode MS"/>
+              </a:rPr>
+              <a:t>Best Parameters to use: {'</a:t>
+            </a:r>
+            <a:r>
+              <a:rPr kumimoji="0" lang="en-US" altLang="en-US" sz="1600" b="0" i="0" u="none" strike="noStrike" cap="none" normalizeH="0" baseline="0" dirty="0" err="1">
+                <a:ln>
+                  <a:noFill/>
+                </a:ln>
+                <a:solidFill>
+                  <a:schemeClr val="bg1"/>
+                </a:solidFill>
+                <a:effectLst/>
+                <a:latin typeface="Arial Unicode MS"/>
+              </a:rPr>
+              <a:t>n_estimators</a:t>
+            </a:r>
+            <a:r>
+              <a:rPr kumimoji="0" lang="en-US" altLang="en-US" sz="1600" b="0" i="0" u="none" strike="noStrike" cap="none" normalizeH="0" baseline="0" dirty="0">
+                <a:ln>
+                  <a:noFill/>
+                </a:ln>
+                <a:solidFill>
+                  <a:schemeClr val="bg1"/>
+                </a:solidFill>
+                <a:effectLst/>
+                <a:latin typeface="Arial Unicode MS"/>
+              </a:rPr>
+              <a:t>': 200}</a:t>
+            </a:r>
+            <a:r>
+              <a:rPr kumimoji="0" lang="en-US" altLang="en-US" sz="1600" b="0" i="0" u="none" strike="noStrike" cap="none" normalizeH="0" baseline="0" dirty="0">
+                <a:ln>
+                  <a:noFill/>
+                </a:ln>
+                <a:solidFill>
+                  <a:schemeClr val="bg1"/>
+                </a:solidFill>
+                <a:effectLst/>
+              </a:rPr>
+              <a:t> </a:t>
+            </a:r>
+          </a:p>
+          <a:p>
+            <a:pPr marL="0" marR="0" lvl="0" indent="0" algn="l" defTabSz="914400" rtl="0" eaLnBrk="0" fontAlgn="base" latinLnBrk="0" hangingPunct="0">
+              <a:lnSpc>
+                <a:spcPct val="100000"/>
+              </a:lnSpc>
+              <a:spcBef>
+                <a:spcPct val="0"/>
+              </a:spcBef>
+              <a:spcAft>
+                <a:spcPct val="0"/>
+              </a:spcAft>
+              <a:buClrTx/>
+              <a:buSzTx/>
+              <a:buFontTx/>
+              <a:buNone/>
+              <a:tabLst/>
+            </a:pPr>
+            <a:endParaRPr lang="en-US" altLang="en-US" sz="400" dirty="0">
+              <a:solidFill>
+                <a:schemeClr val="bg1"/>
+              </a:solidFill>
+              <a:latin typeface="Arial" panose="020B0604020202020204" pitchFamily="34" charset="0"/>
+            </a:endParaRPr>
+          </a:p>
+          <a:p>
+            <a:pPr marL="0" marR="0" lvl="0" indent="0" algn="l" defTabSz="914400" rtl="0" eaLnBrk="0" fontAlgn="base" latinLnBrk="0" hangingPunct="0">
+              <a:lnSpc>
+                <a:spcPct val="100000"/>
+              </a:lnSpc>
+              <a:spcBef>
+                <a:spcPct val="0"/>
+              </a:spcBef>
+              <a:spcAft>
+                <a:spcPct val="0"/>
+              </a:spcAft>
+              <a:buClrTx/>
+              <a:buSzTx/>
+              <a:buFontTx/>
+              <a:buNone/>
+              <a:tabLst/>
+            </a:pPr>
+            <a:endParaRPr kumimoji="0" lang="en-US" altLang="en-US" sz="400" b="0" i="0" u="none" strike="noStrike" cap="none" normalizeH="0" baseline="0" dirty="0">
+              <a:ln>
+                <a:noFill/>
+              </a:ln>
+              <a:solidFill>
+                <a:schemeClr val="bg1"/>
+              </a:solidFill>
+              <a:effectLst/>
+              <a:latin typeface="Arial" panose="020B0604020202020204" pitchFamily="34" charset="0"/>
+            </a:endParaRPr>
+          </a:p>
+          <a:p>
+            <a:pPr marL="0" marR="0" lvl="0" indent="0" algn="l" defTabSz="914400" rtl="0" eaLnBrk="0" fontAlgn="base" latinLnBrk="0" hangingPunct="0">
+              <a:lnSpc>
+                <a:spcPct val="100000"/>
+              </a:lnSpc>
+              <a:spcBef>
+                <a:spcPct val="0"/>
+              </a:spcBef>
+              <a:spcAft>
+                <a:spcPct val="0"/>
+              </a:spcAft>
+              <a:buClrTx/>
+              <a:buSzTx/>
+              <a:buFontTx/>
+              <a:buNone/>
+              <a:tabLst/>
+            </a:pPr>
+            <a:endParaRPr kumimoji="0" lang="en-US" altLang="en-US" sz="1800" b="0" i="0" u="none" strike="noStrike" cap="none" normalizeH="0" baseline="0" dirty="0">
+              <a:ln>
+                <a:noFill/>
+              </a:ln>
+              <a:solidFill>
+                <a:schemeClr val="bg1"/>
+              </a:solidFill>
+              <a:effectLst/>
+              <a:latin typeface="Arial" panose="020B0604020202020204" pitchFamily="34" charset="0"/>
+            </a:endParaRPr>
+          </a:p>
+        </p:txBody>
+      </p:sp>
+      <p:sp>
+        <p:nvSpPr>
+          <p:cNvPr id="19" name="Rectangle 3">
+            <a:extLst>
+              <a:ext uri="{FF2B5EF4-FFF2-40B4-BE49-F238E27FC236}">
+                <a16:creationId xmlns:a16="http://schemas.microsoft.com/office/drawing/2014/main" id="{83FC4C8D-C435-F76E-991E-6B7763C3B8EB}"/>
+              </a:ext>
+            </a:extLst>
+          </p:cNvPr>
+          <p:cNvSpPr>
+            <a:spLocks noChangeArrowheads="1"/>
+          </p:cNvSpPr>
+          <p:nvPr/>
+        </p:nvSpPr>
+        <p:spPr bwMode="auto">
+          <a:xfrm>
+            <a:off x="431544" y="5539089"/>
+            <a:ext cx="5429563" cy="338554"/>
+          </a:xfrm>
+          <a:prstGeom prst="rect">
+            <a:avLst/>
+          </a:prstGeom>
+          <a:noFill/>
+          <a:ln>
+            <a:noFill/>
+          </a:ln>
+          <a:effectLst/>
+          <a:extLst>
+            <a:ext uri="{909E8E84-426E-40DD-AFC4-6F175D3DCCD1}">
+              <a14:hiddenFill xmlns:a14="http://schemas.microsoft.com/office/drawing/2010/main">
+                <a:solidFill>
+                  <a:schemeClr val="accent1"/>
+                </a:solidFill>
+              </a14:hiddenFill>
+            </a:ext>
+            <a:ext uri="{91240B29-F687-4F45-9708-019B960494DF}">
+              <a14:hiddenLine xmlns:a14="http://schemas.microsoft.com/office/drawing/2010/main" w="9525">
+                <a:solidFill>
+                  <a:schemeClr val="tx1"/>
+                </a:solidFill>
+                <a:miter lim="800000"/>
+                <a:headEnd/>
+                <a:tailEnd/>
+              </a14:hiddenLine>
+            </a:ext>
+            <a:ext uri="{AF507438-7753-43E0-B8FC-AC1667EBCBE1}">
+              <a14:hiddenEffects xmlns:a14="http://schemas.microsoft.com/office/drawing/2010/main">
+                <a:effectLst>
+                  <a:outerShdw dist="35921" dir="2700000" algn="ctr" rotWithShape="0">
+                    <a:schemeClr val="bg2"/>
+                  </a:outerShdw>
+                </a:effectLst>
+              </a14:hiddenEffects>
+            </a:ext>
+          </a:extLst>
+        </p:spPr>
+        <p:txBody>
+          <a:bodyPr vert="horz" wrap="none" lIns="91440" tIns="45720" rIns="91440" bIns="45720" numCol="1" anchor="ctr" anchorCtr="0" compatLnSpc="1">
+            <a:prstTxWarp prst="textNoShape">
+              <a:avLst/>
+            </a:prstTxWarp>
+            <a:spAutoFit/>
+          </a:bodyPr>
+          <a:lstStyle/>
+          <a:p>
+            <a:pPr marL="0" marR="0" lvl="0" indent="0" algn="l" defTabSz="914400" rtl="0" eaLnBrk="0" fontAlgn="base" latinLnBrk="0" hangingPunct="0">
+              <a:lnSpc>
+                <a:spcPct val="100000"/>
+              </a:lnSpc>
+              <a:spcBef>
+                <a:spcPct val="0"/>
+              </a:spcBef>
+              <a:spcAft>
+                <a:spcPct val="0"/>
+              </a:spcAft>
+              <a:buClrTx/>
+              <a:buSzTx/>
+              <a:buFontTx/>
+              <a:buNone/>
+              <a:tabLst/>
+            </a:pPr>
+            <a:r>
+              <a:rPr kumimoji="0" lang="en-US" altLang="en-US" sz="1600" b="0" i="0" u="none" strike="noStrike" cap="none" normalizeH="0" baseline="0" dirty="0">
+                <a:ln>
+                  <a:noFill/>
+                </a:ln>
+                <a:solidFill>
+                  <a:schemeClr val="bg1"/>
+                </a:solidFill>
+                <a:effectLst/>
+                <a:latin typeface="Arial Unicode MS"/>
+              </a:rPr>
+              <a:t>Hyper Tuned Mean Squared Error: 16103867.163043479</a:t>
+            </a:r>
+            <a:r>
+              <a:rPr kumimoji="0" lang="en-US" altLang="en-US" sz="1600" b="0" i="0" u="none" strike="noStrike" cap="none" normalizeH="0" baseline="0" dirty="0">
+                <a:ln>
+                  <a:noFill/>
+                </a:ln>
+                <a:solidFill>
+                  <a:schemeClr val="bg1"/>
+                </a:solidFill>
+                <a:effectLst/>
+              </a:rPr>
+              <a:t> </a:t>
+            </a:r>
+            <a:endParaRPr kumimoji="0" lang="en-US" altLang="en-US" sz="1600" b="0" i="0" u="none" strike="noStrike" cap="none" normalizeH="0" baseline="0" dirty="0">
+              <a:ln>
+                <a:noFill/>
+              </a:ln>
+              <a:solidFill>
+                <a:schemeClr val="bg1"/>
+              </a:solidFill>
+              <a:effectLst/>
+              <a:latin typeface="Arial" panose="020B0604020202020204" pitchFamily="34" charset="0"/>
+            </a:endParaRPr>
+          </a:p>
+        </p:txBody>
+      </p:sp>
+      <p:cxnSp>
+        <p:nvCxnSpPr>
+          <p:cNvPr id="23" name="Straight Arrow Connector 22">
+            <a:extLst>
+              <a:ext uri="{FF2B5EF4-FFF2-40B4-BE49-F238E27FC236}">
+                <a16:creationId xmlns:a16="http://schemas.microsoft.com/office/drawing/2014/main" id="{45938FA3-04D7-A5DC-C1CB-4BA324D2A5C2}"/>
+              </a:ext>
+            </a:extLst>
+          </p:cNvPr>
+          <p:cNvCxnSpPr>
+            <a:cxnSpLocks/>
+          </p:cNvCxnSpPr>
+          <p:nvPr/>
+        </p:nvCxnSpPr>
+        <p:spPr>
+          <a:xfrm flipH="1">
+            <a:off x="2359152" y="3257998"/>
+            <a:ext cx="987552" cy="1167698"/>
+          </a:xfrm>
+          <a:prstGeom prst="straightConnector1">
+            <a:avLst/>
+          </a:prstGeom>
+          <a:ln>
+            <a:solidFill>
+              <a:schemeClr val="bg1"/>
+            </a:solidFill>
+            <a:tailEnd type="triangle"/>
+          </a:ln>
+        </p:spPr>
+        <p:style>
+          <a:lnRef idx="1">
+            <a:schemeClr val="accent1"/>
+          </a:lnRef>
+          <a:fillRef idx="0">
+            <a:schemeClr val="accent1"/>
+          </a:fillRef>
+          <a:effectRef idx="0">
+            <a:schemeClr val="accent1"/>
+          </a:effectRef>
+          <a:fontRef idx="minor">
+            <a:schemeClr val="tx1"/>
+          </a:fontRef>
+        </p:style>
+      </p:cxnSp>
     </p:spTree>
     <p:extLst>
       <p:ext uri="{BB962C8B-B14F-4D97-AF65-F5344CB8AC3E}">
@@ -7829,8 +10494,8 @@
         </p:nvSpPr>
         <p:spPr>
           <a:xfrm>
-            <a:off x="8226552" y="1759006"/>
-            <a:ext cx="3809735" cy="923330"/>
+            <a:off x="6976872" y="1759006"/>
+            <a:ext cx="5059415" cy="2308324"/>
           </a:xfrm>
           <a:prstGeom prst="rect">
             <a:avLst/>
@@ -7844,8 +10509,122 @@
           <a:lstStyle/>
           <a:p>
             <a:pPr marL="285750" indent="-285750">
-              <a:buFont typeface="Arial" panose="020B0604020202020204" pitchFamily="34" charset="0"/>
-              <a:buChar char="•"/>
+              <a:buFont typeface="Wingdings" panose="05000000000000000000" pitchFamily="2" charset="2"/>
+              <a:buChar char="v"/>
+            </a:pPr>
+            <a:r>
+              <a:rPr lang="en-US" dirty="0">
+                <a:solidFill>
+                  <a:schemeClr val="bg1"/>
+                </a:solidFill>
+              </a:rPr>
+              <a:t>Scale of the output price ranges is possibly off, but hard to verify.</a:t>
+            </a:r>
+          </a:p>
+          <a:p>
+            <a:pPr marL="285750" indent="-285750">
+              <a:buFont typeface="Wingdings" panose="05000000000000000000" pitchFamily="2" charset="2"/>
+              <a:buChar char="v"/>
+            </a:pPr>
+            <a:r>
+              <a:rPr lang="en-US" dirty="0">
+                <a:solidFill>
+                  <a:schemeClr val="bg1"/>
+                </a:solidFill>
+              </a:rPr>
+              <a:t>Scale issue </a:t>
+            </a:r>
+            <a:r>
+              <a:rPr lang="en-US" dirty="0">
+                <a:solidFill>
+                  <a:srgbClr val="FFFF00"/>
+                </a:solidFill>
+              </a:rPr>
+              <a:t>could</a:t>
+            </a:r>
+            <a:r>
+              <a:rPr lang="en-US" dirty="0">
+                <a:solidFill>
+                  <a:schemeClr val="bg1"/>
+                </a:solidFill>
+              </a:rPr>
+              <a:t> be due to a lower starting point in historical data.</a:t>
+            </a:r>
+          </a:p>
+          <a:p>
+            <a:pPr marL="285750" indent="-285750">
+              <a:buFont typeface="Wingdings" panose="05000000000000000000" pitchFamily="2" charset="2"/>
+              <a:buChar char="v"/>
+            </a:pPr>
+            <a:r>
+              <a:rPr lang="en-US" dirty="0">
+                <a:solidFill>
+                  <a:srgbClr val="FF0000"/>
+                </a:solidFill>
+              </a:rPr>
+              <a:t>Sell</a:t>
+            </a:r>
+            <a:r>
+              <a:rPr lang="en-US" dirty="0">
+                <a:solidFill>
+                  <a:schemeClr val="bg1"/>
+                </a:solidFill>
+              </a:rPr>
+              <a:t> Spring of </a:t>
+            </a:r>
+            <a:r>
+              <a:rPr lang="en-US" dirty="0">
+                <a:solidFill>
+                  <a:srgbClr val="FF0000"/>
+                </a:solidFill>
+              </a:rPr>
+              <a:t>2027</a:t>
+            </a:r>
+            <a:r>
+              <a:rPr lang="en-US" dirty="0">
+                <a:solidFill>
+                  <a:schemeClr val="bg1"/>
+                </a:solidFill>
+              </a:rPr>
+              <a:t>, </a:t>
+            </a:r>
+            <a:r>
+              <a:rPr lang="en-US" dirty="0">
+                <a:solidFill>
+                  <a:srgbClr val="FFFF00"/>
+                </a:solidFill>
+              </a:rPr>
+              <a:t>Buy</a:t>
+            </a:r>
+            <a:r>
+              <a:rPr lang="en-US" dirty="0">
+                <a:solidFill>
+                  <a:schemeClr val="bg1"/>
+                </a:solidFill>
+              </a:rPr>
+              <a:t> Winter of </a:t>
+            </a:r>
+            <a:r>
+              <a:rPr lang="en-US" dirty="0">
+                <a:solidFill>
+                  <a:srgbClr val="FFFF00"/>
+                </a:solidFill>
+              </a:rPr>
+              <a:t>2028</a:t>
+            </a:r>
+            <a:r>
+              <a:rPr lang="en-US" dirty="0">
+                <a:solidFill>
+                  <a:schemeClr val="bg1"/>
+                </a:solidFill>
+              </a:rPr>
+              <a:t>!</a:t>
+            </a:r>
+          </a:p>
+          <a:p>
+            <a:pPr marL="285750" indent="-285750">
+              <a:buFont typeface="Wingdings" panose="05000000000000000000" pitchFamily="2" charset="2"/>
+              <a:buChar char="v"/>
             </a:pPr>
             <a:r>
               <a:rPr lang="en-US" dirty="0">
@@ -7863,6 +10642,45 @@
           </a:p>
         </p:txBody>
       </p:sp>
+      <p:pic>
+        <p:nvPicPr>
+          <p:cNvPr id="10" name="Graphic 9">
+            <a:extLst>
+              <a:ext uri="{FF2B5EF4-FFF2-40B4-BE49-F238E27FC236}">
+                <a16:creationId xmlns:a16="http://schemas.microsoft.com/office/drawing/2014/main" id="{747E059B-53EE-437F-9B0A-CF6AC4D74308}"/>
+              </a:ext>
+            </a:extLst>
+          </p:cNvPr>
+          <p:cNvPicPr>
+            <a:picLocks noChangeAspect="1"/>
+          </p:cNvPicPr>
+          <p:nvPr/>
+        </p:nvPicPr>
+        <p:blipFill>
+          <a:blip r:embed="rId2">
+            <a:extLst>
+              <a:ext uri="{28A0092B-C50C-407E-A947-70E740481C1C}">
+                <a14:useLocalDpi xmlns:a14="http://schemas.microsoft.com/office/drawing/2010/main" val="0"/>
+              </a:ext>
+              <a:ext uri="{96DAC541-7B7A-43D3-8B79-37D633B846F1}">
+                <asvg:svgBlip xmlns:asvg="http://schemas.microsoft.com/office/drawing/2016/SVG/main" r:embed="rId3"/>
+              </a:ext>
+            </a:extLst>
+          </a:blip>
+          <a:stretch>
+            <a:fillRect/>
+          </a:stretch>
+        </p:blipFill>
+        <p:spPr>
+          <a:xfrm>
+            <a:off x="387069" y="1656417"/>
+            <a:ext cx="4630891" cy="3436810"/>
+          </a:xfrm>
+          <a:prstGeom prst="rect">
+            <a:avLst/>
+          </a:prstGeom>
+        </p:spPr>
+      </p:pic>
     </p:spTree>
     <p:extLst>
       <p:ext uri="{BB962C8B-B14F-4D97-AF65-F5344CB8AC3E}">
@@ -8144,7 +10962,123 @@
               </a:rPr>
               <a:t>https://www.youtube.com/watch?v=cIbj0WuK41w&amp;ab_channel=Econoscent</a:t>
             </a:r>
+            <a:endParaRPr lang="en-CA" sz="1600" dirty="0">
+              <a:solidFill>
+                <a:schemeClr val="bg1"/>
+              </a:solidFill>
+            </a:endParaRPr>
+          </a:p>
+          <a:p>
+            <a:pPr marL="342900" indent="-342900">
+              <a:buFont typeface="+mj-lt"/>
+              <a:buAutoNum type="arabicPeriod"/>
+            </a:pPr>
+            <a:r>
+              <a:rPr lang="en-US" sz="1400" dirty="0">
+                <a:solidFill>
+                  <a:schemeClr val="bg1"/>
+                </a:solidFill>
+                <a:effectLst/>
+              </a:rPr>
+              <a:t>Canadian Real Estate Association. (2024) </a:t>
+            </a:r>
+            <a:r>
+              <a:rPr lang="en-US" sz="1400" i="1" dirty="0">
+                <a:solidFill>
+                  <a:schemeClr val="bg1"/>
+                </a:solidFill>
+                <a:effectLst/>
+              </a:rPr>
+              <a:t>National statistics</a:t>
+            </a:r>
+            <a:r>
+              <a:rPr lang="en-US" sz="1400" dirty="0">
+                <a:solidFill>
+                  <a:schemeClr val="bg1"/>
+                </a:solidFill>
+                <a:effectLst/>
+              </a:rPr>
+              <a:t>, </a:t>
+            </a:r>
+            <a:r>
+              <a:rPr lang="en-US" sz="1400" i="1" dirty="0">
+                <a:solidFill>
+                  <a:schemeClr val="bg1"/>
+                </a:solidFill>
+                <a:effectLst/>
+              </a:rPr>
+              <a:t>February 14 2024 News Release | CREA Statistics</a:t>
+            </a:r>
+            <a:r>
+              <a:rPr lang="en-US" sz="1400" dirty="0">
+                <a:solidFill>
+                  <a:schemeClr val="bg1"/>
+                </a:solidFill>
+                <a:effectLst/>
+              </a:rPr>
+              <a:t>. Available at: https://creastats.crea.ca/en-CA/ (Accessed: 11 March 2024). </a:t>
+            </a:r>
+          </a:p>
+          <a:p>
+            <a:pPr lvl="1"/>
+            <a:r>
+              <a:rPr lang="en-US" sz="1600" dirty="0">
+                <a:solidFill>
+                  <a:schemeClr val="bg1"/>
+                </a:solidFill>
+                <a:effectLst/>
+                <a:hlinkClick r:id="rId3"/>
+              </a:rPr>
+              <a:t>https://creastats.crea.ca/en-CA/</a:t>
+            </a:r>
             <a:endParaRPr lang="en-US" sz="1600" dirty="0">
+              <a:solidFill>
+                <a:schemeClr val="bg1"/>
+              </a:solidFill>
+              <a:effectLst/>
+            </a:endParaRPr>
+          </a:p>
+          <a:p>
+            <a:pPr marL="457200" indent="-457200">
+              <a:buFont typeface="+mj-lt"/>
+              <a:buAutoNum type="arabicPeriod"/>
+            </a:pPr>
+            <a:r>
+              <a:rPr lang="en-US" sz="2000" dirty="0">
+                <a:solidFill>
+                  <a:schemeClr val="bg1"/>
+                </a:solidFill>
+                <a:hlinkClick r:id="rId4"/>
+              </a:rPr>
+              <a:t>https://stackoverflow.com/</a:t>
+            </a:r>
+            <a:r>
+              <a:rPr lang="en-US" sz="2000" dirty="0">
+                <a:solidFill>
+                  <a:schemeClr val="bg1"/>
+                </a:solidFill>
+              </a:rPr>
+              <a:t> - Non-stop Forum Searching.</a:t>
+            </a:r>
+          </a:p>
+          <a:p>
+            <a:endParaRPr lang="en-US" sz="2000" dirty="0">
+              <a:solidFill>
+                <a:schemeClr val="bg1"/>
+              </a:solidFill>
+            </a:endParaRPr>
+          </a:p>
+          <a:p>
+            <a:pPr lvl="1"/>
+            <a:endParaRPr lang="en-US" sz="1000" dirty="0">
+              <a:solidFill>
+                <a:schemeClr val="bg1"/>
+              </a:solidFill>
+              <a:effectLst/>
+            </a:endParaRPr>
+          </a:p>
+          <a:p>
+            <a:endParaRPr lang="en-US" sz="2000" dirty="0">
               <a:solidFill>
                 <a:schemeClr val="bg1"/>
               </a:solidFill>

</xml_diff>

<commit_message>
-Updated the conclusions slide to show the actual pattern we found
P@

Signed-off-by: P@ <patmaynard452@gmail.com>
</commit_message>
<xml_diff>
--- a/Presentation/ALI_Raymond_MAYNARD_Patrick_GENG4500_Final_presentation_2024.pptx
+++ b/Presentation/ALI_Raymond_MAYNARD_Patrick_GENG4500_Final_presentation_2024.pptx
@@ -206,7 +206,7 @@
           <a:p>
             <a:fld id="{7E5E2DB3-6FEF-4CE5-A6A7-DA370F2E2760}" type="datetimeFigureOut">
               <a:rPr lang="en-CA" smtClean="0"/>
-              <a:t>2024-03-11</a:t>
+              <a:t>2024-03-14</a:t>
             </a:fld>
             <a:endParaRPr lang="en-CA"/>
           </a:p>
@@ -10495,7 +10495,7 @@
         <p:spPr>
           <a:xfrm>
             <a:off x="6976872" y="1759006"/>
-            <a:ext cx="5059415" cy="2308324"/>
+            <a:ext cx="5059415" cy="2862322"/>
           </a:xfrm>
           <a:prstGeom prst="rect">
             <a:avLst/>
@@ -10518,7 +10518,7 @@
                   <a:schemeClr val="bg1"/>
                 </a:solidFill>
               </a:rPr>
-              <a:t>Scale of the output price ranges is possibly off, but hard to verify.</a:t>
+              <a:t> The scale of the output price ranges is possibly off, but hard to verify.</a:t>
             </a:r>
           </a:p>
           <a:p>
@@ -10619,6 +10619,20 @@
                 </a:solidFill>
               </a:rPr>
               <a:t>!</a:t>
+            </a:r>
+          </a:p>
+          <a:p>
+            <a:pPr marL="285750" indent="-285750">
+              <a:buFont typeface="Wingdings" panose="05000000000000000000" pitchFamily="2" charset="2"/>
+              <a:buChar char="v"/>
+            </a:pPr>
+            <a:r>
+              <a:rPr lang="en-US" dirty="0">
+                <a:solidFill>
+                  <a:schemeClr val="bg1"/>
+                </a:solidFill>
+              </a:rPr>
+              <a:t>The same trends of Spring/Winter are shown again in a few places.</a:t>
             </a:r>
           </a:p>
           <a:p>

</xml_diff>

<commit_message>
-Updated scoring on tuned model
P@

Signed-off-by: P@ <patmaynard452@gmail.com>
</commit_message>
<xml_diff>
--- a/Presentation/ALI_Raymond_MAYNARD_Patrick_GENG4500_Final_presentation_2024.pptx
+++ b/Presentation/ALI_Raymond_MAYNARD_Patrick_GENG4500_Final_presentation_2024.pptx
@@ -206,7 +206,7 @@
           <a:p>
             <a:fld id="{7E5E2DB3-6FEF-4CE5-A6A7-DA370F2E2760}" type="datetimeFigureOut">
               <a:rPr lang="en-CA" smtClean="0"/>
-              <a:t>2024-03-14</a:t>
+              <a:t>2024-03-17</a:t>
             </a:fld>
             <a:endParaRPr lang="en-CA"/>
           </a:p>
@@ -9343,7 +9343,7 @@
                 <a:effectLst/>
                 <a:latin typeface="Courier New" panose="02070309020205020404" pitchFamily="49" charset="0"/>
               </a:rPr>
-              <a:t>neg_mean_squared_error</a:t>
+              <a:t>mean_squared_error</a:t>
             </a:r>
             <a:r>
               <a:rPr lang="en-US" b="0" dirty="0">

</xml_diff>

<commit_message>
-Added circles to the graph to show our statements
P@

Signed-off-by: P@ <patmaynard452@gmail.com>
</commit_message>
<xml_diff>
--- a/Presentation/ALI_Raymond_MAYNARD_Patrick_GENG4500_Final_presentation_2024.pptx
+++ b/Presentation/ALI_Raymond_MAYNARD_Patrick_GENG4500_Final_presentation_2024.pptx
@@ -10695,6 +10695,141 @@
           </a:prstGeom>
         </p:spPr>
       </p:pic>
+      <p:sp>
+        <p:nvSpPr>
+          <p:cNvPr id="3" name="Oval 2">
+            <a:extLst>
+              <a:ext uri="{FF2B5EF4-FFF2-40B4-BE49-F238E27FC236}">
+                <a16:creationId xmlns:a16="http://schemas.microsoft.com/office/drawing/2014/main" id="{7E41FF53-FA93-B8AC-E4D7-264F7ACF5CB6}"/>
+              </a:ext>
+            </a:extLst>
+          </p:cNvPr>
+          <p:cNvSpPr/>
+          <p:nvPr/>
+        </p:nvSpPr>
+        <p:spPr>
+          <a:xfrm>
+            <a:off x="2304288" y="3063240"/>
+            <a:ext cx="557784" cy="731520"/>
+          </a:xfrm>
+          <a:prstGeom prst="ellipse">
+            <a:avLst/>
+          </a:prstGeom>
+          <a:noFill/>
+        </p:spPr>
+        <p:style>
+          <a:lnRef idx="2">
+            <a:schemeClr val="accent2"/>
+          </a:lnRef>
+          <a:fillRef idx="1">
+            <a:schemeClr val="lt1"/>
+          </a:fillRef>
+          <a:effectRef idx="0">
+            <a:schemeClr val="accent2"/>
+          </a:effectRef>
+          <a:fontRef idx="minor">
+            <a:schemeClr val="dk1"/>
+          </a:fontRef>
+        </p:style>
+        <p:txBody>
+          <a:bodyPr rtlCol="0" anchor="ctr"/>
+          <a:lstStyle/>
+          <a:p>
+            <a:pPr algn="ctr"/>
+            <a:endParaRPr lang="en-CA"/>
+          </a:p>
+        </p:txBody>
+      </p:sp>
+      <p:sp>
+        <p:nvSpPr>
+          <p:cNvPr id="9" name="Oval 8">
+            <a:extLst>
+              <a:ext uri="{FF2B5EF4-FFF2-40B4-BE49-F238E27FC236}">
+                <a16:creationId xmlns:a16="http://schemas.microsoft.com/office/drawing/2014/main" id="{1D28FCD0-F751-5CE1-43A6-9EB0384A629A}"/>
+              </a:ext>
+            </a:extLst>
+          </p:cNvPr>
+          <p:cNvSpPr/>
+          <p:nvPr/>
+        </p:nvSpPr>
+        <p:spPr>
+          <a:xfrm>
+            <a:off x="2970249" y="2778416"/>
+            <a:ext cx="467895" cy="531712"/>
+          </a:xfrm>
+          <a:prstGeom prst="ellipse">
+            <a:avLst/>
+          </a:prstGeom>
+          <a:noFill/>
+        </p:spPr>
+        <p:style>
+          <a:lnRef idx="2">
+            <a:schemeClr val="accent2"/>
+          </a:lnRef>
+          <a:fillRef idx="1">
+            <a:schemeClr val="lt1"/>
+          </a:fillRef>
+          <a:effectRef idx="0">
+            <a:schemeClr val="accent2"/>
+          </a:effectRef>
+          <a:fontRef idx="minor">
+            <a:schemeClr val="dk1"/>
+          </a:fontRef>
+        </p:style>
+        <p:txBody>
+          <a:bodyPr rtlCol="0" anchor="ctr"/>
+          <a:lstStyle/>
+          <a:p>
+            <a:pPr algn="ctr"/>
+            <a:endParaRPr lang="en-CA"/>
+          </a:p>
+        </p:txBody>
+      </p:sp>
+      <p:sp>
+        <p:nvSpPr>
+          <p:cNvPr id="11" name="Oval 10">
+            <a:extLst>
+              <a:ext uri="{FF2B5EF4-FFF2-40B4-BE49-F238E27FC236}">
+                <a16:creationId xmlns:a16="http://schemas.microsoft.com/office/drawing/2014/main" id="{A46F3365-A092-80FF-4DBE-3DA2F9EE1814}"/>
+              </a:ext>
+            </a:extLst>
+          </p:cNvPr>
+          <p:cNvSpPr/>
+          <p:nvPr/>
+        </p:nvSpPr>
+        <p:spPr>
+          <a:xfrm>
+            <a:off x="3705062" y="2292015"/>
+            <a:ext cx="467895" cy="531712"/>
+          </a:xfrm>
+          <a:prstGeom prst="ellipse">
+            <a:avLst/>
+          </a:prstGeom>
+          <a:noFill/>
+        </p:spPr>
+        <p:style>
+          <a:lnRef idx="2">
+            <a:schemeClr val="accent2"/>
+          </a:lnRef>
+          <a:fillRef idx="1">
+            <a:schemeClr val="lt1"/>
+          </a:fillRef>
+          <a:effectRef idx="0">
+            <a:schemeClr val="accent2"/>
+          </a:effectRef>
+          <a:fontRef idx="minor">
+            <a:schemeClr val="dk1"/>
+          </a:fontRef>
+        </p:style>
+        <p:txBody>
+          <a:bodyPr rtlCol="0" anchor="ctr"/>
+          <a:lstStyle/>
+          <a:p>
+            <a:pPr algn="ctr"/>
+            <a:endParaRPr lang="en-CA"/>
+          </a:p>
+        </p:txBody>
+      </p:sp>
     </p:spTree>
     <p:extLst>
       <p:ext uri="{BB962C8B-B14F-4D97-AF65-F5344CB8AC3E}">

</xml_diff>

<commit_message>
-Updated the code snippets after the refactor
P@

Signed-off-by: P@ <patmaynard452@gmail.com>
</commit_message>
<xml_diff>
--- a/Presentation/ALI_Raymond_MAYNARD_Patrick_GENG4500_Final_presentation_2024.pptx
+++ b/Presentation/ALI_Raymond_MAYNARD_Patrick_GENG4500_Final_presentation_2024.pptx
@@ -7303,8 +7303,8 @@
         </p:nvSpPr>
         <p:spPr>
           <a:xfrm>
-            <a:off x="2404872" y="1170432"/>
-            <a:ext cx="7388352" cy="923330"/>
+            <a:off x="2337131" y="816428"/>
+            <a:ext cx="7388352" cy="1754326"/>
           </a:xfrm>
           <a:prstGeom prst="rect">
             <a:avLst/>
@@ -7318,7 +7318,7 @@
           <a:lstStyle/>
           <a:p>
             <a:r>
-              <a:rPr lang="en-US" b="0" dirty="0">
+              <a:rPr lang="en-CA" b="0" dirty="0">
                 <a:solidFill>
                   <a:srgbClr val="6AA94F"/>
                 </a:solidFill>
@@ -7327,7 +7327,7 @@
               </a:rPr>
               <a:t># Convert the date strings into datetime objects</a:t>
             </a:r>
-            <a:endParaRPr lang="en-US" b="0" dirty="0">
+            <a:endParaRPr lang="en-CA" b="0" dirty="0">
               <a:solidFill>
                 <a:srgbClr val="D4D4D4"/>
               </a:solidFill>
@@ -7337,7 +7337,7 @@
           </a:p>
           <a:p>
             <a:r>
-              <a:rPr lang="en-US" b="0" dirty="0">
+              <a:rPr lang="en-CA" b="0" dirty="0">
                 <a:solidFill>
                   <a:srgbClr val="D4D4D4"/>
                 </a:solidFill>
@@ -7347,7 +7347,7 @@
               <a:t>dataset</a:t>
             </a:r>
             <a:r>
-              <a:rPr lang="en-US" b="0" dirty="0">
+              <a:rPr lang="en-CA" b="0" dirty="0">
                 <a:solidFill>
                   <a:srgbClr val="DCDCDC"/>
                 </a:solidFill>
@@ -7357,7 +7357,7 @@
               <a:t>[</a:t>
             </a:r>
             <a:r>
-              <a:rPr lang="en-US" b="0" dirty="0">
+              <a:rPr lang="en-CA" b="0" dirty="0">
                 <a:solidFill>
                   <a:srgbClr val="CE9178"/>
                 </a:solidFill>
@@ -7367,7 +7367,7 @@
               <a:t>'Date'</a:t>
             </a:r>
             <a:r>
-              <a:rPr lang="en-US" b="0" dirty="0">
+              <a:rPr lang="en-CA" b="0" dirty="0">
                 <a:solidFill>
                   <a:srgbClr val="DCDCDC"/>
                 </a:solidFill>
@@ -7377,7 +7377,7 @@
               <a:t>]</a:t>
             </a:r>
             <a:r>
-              <a:rPr lang="en-US" b="0" dirty="0">
+              <a:rPr lang="en-CA" b="0" dirty="0">
                 <a:solidFill>
                   <a:srgbClr val="D4D4D4"/>
                 </a:solidFill>
@@ -7387,7 +7387,7 @@
               <a:t> = </a:t>
             </a:r>
             <a:r>
-              <a:rPr lang="en-US" b="0" dirty="0" err="1">
+              <a:rPr lang="en-CA" b="0" dirty="0" err="1">
                 <a:solidFill>
                   <a:srgbClr val="D4D4D4"/>
                 </a:solidFill>
@@ -7397,7 +7397,7 @@
               <a:t>pd.to_datetime</a:t>
             </a:r>
             <a:r>
-              <a:rPr lang="en-US" b="0" dirty="0">
+              <a:rPr lang="en-CA" b="0" dirty="0">
                 <a:solidFill>
                   <a:srgbClr val="DCDCDC"/>
                 </a:solidFill>
@@ -7407,7 +7407,7 @@
               <a:t>(</a:t>
             </a:r>
             <a:r>
-              <a:rPr lang="en-US" b="0" dirty="0">
+              <a:rPr lang="en-CA" b="0" dirty="0">
                 <a:solidFill>
                   <a:srgbClr val="D4D4D4"/>
                 </a:solidFill>
@@ -7417,7 +7417,7 @@
               <a:t>dataset</a:t>
             </a:r>
             <a:r>
-              <a:rPr lang="en-US" b="0" dirty="0">
+              <a:rPr lang="en-CA" b="0" dirty="0">
                 <a:solidFill>
                   <a:srgbClr val="DCDCDC"/>
                 </a:solidFill>
@@ -7427,7 +7427,7 @@
               <a:t>[</a:t>
             </a:r>
             <a:r>
-              <a:rPr lang="en-US" b="0" dirty="0">
+              <a:rPr lang="en-CA" b="0" dirty="0">
                 <a:solidFill>
                   <a:srgbClr val="CE9178"/>
                 </a:solidFill>
@@ -7437,7 +7437,7 @@
               <a:t>'Date'</a:t>
             </a:r>
             <a:r>
-              <a:rPr lang="en-US" b="0" dirty="0">
+              <a:rPr lang="en-CA" b="0" dirty="0">
                 <a:solidFill>
                   <a:srgbClr val="DCDCDC"/>
                 </a:solidFill>
@@ -7446,7 +7446,26 @@
               </a:rPr>
               <a:t>])</a:t>
             </a:r>
-            <a:endParaRPr lang="en-US" b="0" dirty="0">
+            <a:br>
+              <a:rPr lang="en-CA" b="0" dirty="0">
+                <a:solidFill>
+                  <a:srgbClr val="D4D4D4"/>
+                </a:solidFill>
+                <a:effectLst/>
+                <a:latin typeface="Courier New" panose="02070309020205020404" pitchFamily="49" charset="0"/>
+              </a:rPr>
+            </a:br>
+            <a:r>
+              <a:rPr lang="en-CA" b="0" dirty="0">
+                <a:solidFill>
+                  <a:srgbClr val="6AA94F"/>
+                </a:solidFill>
+                <a:effectLst/>
+                <a:latin typeface="Courier New" panose="02070309020205020404" pitchFamily="49" charset="0"/>
+              </a:rPr>
+              <a:t># Convert Date Features to a number format</a:t>
+            </a:r>
+            <a:endParaRPr lang="en-CA" b="0" dirty="0">
               <a:solidFill>
                 <a:srgbClr val="D4D4D4"/>
               </a:solidFill>
@@ -7455,6 +7474,224 @@
             </a:endParaRPr>
           </a:p>
           <a:p>
+            <a:r>
+              <a:rPr lang="en-CA" b="0" dirty="0">
+                <a:solidFill>
+                  <a:srgbClr val="D4D4D4"/>
+                </a:solidFill>
+                <a:effectLst/>
+                <a:latin typeface="Courier New" panose="02070309020205020404" pitchFamily="49" charset="0"/>
+              </a:rPr>
+              <a:t>dataset</a:t>
+            </a:r>
+            <a:r>
+              <a:rPr lang="en-CA" b="0" dirty="0">
+                <a:solidFill>
+                  <a:srgbClr val="DCDCDC"/>
+                </a:solidFill>
+                <a:effectLst/>
+                <a:latin typeface="Courier New" panose="02070309020205020404" pitchFamily="49" charset="0"/>
+              </a:rPr>
+              <a:t>[</a:t>
+            </a:r>
+            <a:r>
+              <a:rPr lang="en-CA" b="0" dirty="0">
+                <a:solidFill>
+                  <a:srgbClr val="CE9178"/>
+                </a:solidFill>
+                <a:effectLst/>
+                <a:latin typeface="Courier New" panose="02070309020205020404" pitchFamily="49" charset="0"/>
+              </a:rPr>
+              <a:t>'Year'</a:t>
+            </a:r>
+            <a:r>
+              <a:rPr lang="en-CA" b="0" dirty="0">
+                <a:solidFill>
+                  <a:srgbClr val="DCDCDC"/>
+                </a:solidFill>
+                <a:effectLst/>
+                <a:latin typeface="Courier New" panose="02070309020205020404" pitchFamily="49" charset="0"/>
+              </a:rPr>
+              <a:t>]</a:t>
+            </a:r>
+            <a:r>
+              <a:rPr lang="en-CA" b="0" dirty="0">
+                <a:solidFill>
+                  <a:srgbClr val="D4D4D4"/>
+                </a:solidFill>
+                <a:effectLst/>
+                <a:latin typeface="Courier New" panose="02070309020205020404" pitchFamily="49" charset="0"/>
+              </a:rPr>
+              <a:t> = dataset</a:t>
+            </a:r>
+            <a:r>
+              <a:rPr lang="en-CA" b="0" dirty="0">
+                <a:solidFill>
+                  <a:srgbClr val="DCDCDC"/>
+                </a:solidFill>
+                <a:effectLst/>
+                <a:latin typeface="Courier New" panose="02070309020205020404" pitchFamily="49" charset="0"/>
+              </a:rPr>
+              <a:t>[</a:t>
+            </a:r>
+            <a:r>
+              <a:rPr lang="en-CA" b="0" dirty="0">
+                <a:solidFill>
+                  <a:srgbClr val="CE9178"/>
+                </a:solidFill>
+                <a:effectLst/>
+                <a:latin typeface="Courier New" panose="02070309020205020404" pitchFamily="49" charset="0"/>
+              </a:rPr>
+              <a:t>'Date'</a:t>
+            </a:r>
+            <a:r>
+              <a:rPr lang="en-CA" b="0" dirty="0">
+                <a:solidFill>
+                  <a:srgbClr val="DCDCDC"/>
+                </a:solidFill>
+                <a:effectLst/>
+                <a:latin typeface="Courier New" panose="02070309020205020404" pitchFamily="49" charset="0"/>
+              </a:rPr>
+              <a:t>]</a:t>
+            </a:r>
+            <a:r>
+              <a:rPr lang="en-CA" b="0" dirty="0">
+                <a:solidFill>
+                  <a:srgbClr val="D4D4D4"/>
+                </a:solidFill>
+                <a:effectLst/>
+                <a:latin typeface="Courier New" panose="02070309020205020404" pitchFamily="49" charset="0"/>
+              </a:rPr>
+              <a:t>.</a:t>
+            </a:r>
+            <a:r>
+              <a:rPr lang="en-CA" b="0" dirty="0" err="1">
+                <a:solidFill>
+                  <a:srgbClr val="D4D4D4"/>
+                </a:solidFill>
+                <a:effectLst/>
+                <a:latin typeface="Courier New" panose="02070309020205020404" pitchFamily="49" charset="0"/>
+              </a:rPr>
+              <a:t>dt.year</a:t>
+            </a:r>
+            <a:endParaRPr lang="en-CA" b="0" dirty="0">
+              <a:solidFill>
+                <a:srgbClr val="D4D4D4"/>
+              </a:solidFill>
+              <a:effectLst/>
+              <a:latin typeface="Courier New" panose="02070309020205020404" pitchFamily="49" charset="0"/>
+            </a:endParaRPr>
+          </a:p>
+          <a:p>
+            <a:r>
+              <a:rPr lang="en-CA" b="0" dirty="0">
+                <a:solidFill>
+                  <a:srgbClr val="D4D4D4"/>
+                </a:solidFill>
+                <a:effectLst/>
+                <a:latin typeface="Courier New" panose="02070309020205020404" pitchFamily="49" charset="0"/>
+              </a:rPr>
+              <a:t>dataset</a:t>
+            </a:r>
+            <a:r>
+              <a:rPr lang="en-CA" b="0" dirty="0">
+                <a:solidFill>
+                  <a:srgbClr val="DCDCDC"/>
+                </a:solidFill>
+                <a:effectLst/>
+                <a:latin typeface="Courier New" panose="02070309020205020404" pitchFamily="49" charset="0"/>
+              </a:rPr>
+              <a:t>[</a:t>
+            </a:r>
+            <a:r>
+              <a:rPr lang="en-CA" b="0" dirty="0">
+                <a:solidFill>
+                  <a:srgbClr val="CE9178"/>
+                </a:solidFill>
+                <a:effectLst/>
+                <a:latin typeface="Courier New" panose="02070309020205020404" pitchFamily="49" charset="0"/>
+              </a:rPr>
+              <a:t>'Month'</a:t>
+            </a:r>
+            <a:r>
+              <a:rPr lang="en-CA" b="0" dirty="0">
+                <a:solidFill>
+                  <a:srgbClr val="DCDCDC"/>
+                </a:solidFill>
+                <a:effectLst/>
+                <a:latin typeface="Courier New" panose="02070309020205020404" pitchFamily="49" charset="0"/>
+              </a:rPr>
+              <a:t>]</a:t>
+            </a:r>
+            <a:r>
+              <a:rPr lang="en-CA" b="0" dirty="0">
+                <a:solidFill>
+                  <a:srgbClr val="D4D4D4"/>
+                </a:solidFill>
+                <a:effectLst/>
+                <a:latin typeface="Courier New" panose="02070309020205020404" pitchFamily="49" charset="0"/>
+              </a:rPr>
+              <a:t> = dataset</a:t>
+            </a:r>
+            <a:r>
+              <a:rPr lang="en-CA" b="0" dirty="0">
+                <a:solidFill>
+                  <a:srgbClr val="DCDCDC"/>
+                </a:solidFill>
+                <a:effectLst/>
+                <a:latin typeface="Courier New" panose="02070309020205020404" pitchFamily="49" charset="0"/>
+              </a:rPr>
+              <a:t>[</a:t>
+            </a:r>
+            <a:r>
+              <a:rPr lang="en-CA" b="0" dirty="0">
+                <a:solidFill>
+                  <a:srgbClr val="CE9178"/>
+                </a:solidFill>
+                <a:effectLst/>
+                <a:latin typeface="Courier New" panose="02070309020205020404" pitchFamily="49" charset="0"/>
+              </a:rPr>
+              <a:t>'Date'</a:t>
+            </a:r>
+            <a:r>
+              <a:rPr lang="en-CA" b="0" dirty="0">
+                <a:solidFill>
+                  <a:srgbClr val="DCDCDC"/>
+                </a:solidFill>
+                <a:effectLst/>
+                <a:latin typeface="Courier New" panose="02070309020205020404" pitchFamily="49" charset="0"/>
+              </a:rPr>
+              <a:t>]</a:t>
+            </a:r>
+            <a:r>
+              <a:rPr lang="en-CA" b="0" dirty="0">
+                <a:solidFill>
+                  <a:srgbClr val="D4D4D4"/>
+                </a:solidFill>
+                <a:effectLst/>
+                <a:latin typeface="Courier New" panose="02070309020205020404" pitchFamily="49" charset="0"/>
+              </a:rPr>
+              <a:t>.</a:t>
+            </a:r>
+            <a:r>
+              <a:rPr lang="en-CA" b="0" dirty="0" err="1">
+                <a:solidFill>
+                  <a:srgbClr val="D4D4D4"/>
+                </a:solidFill>
+                <a:effectLst/>
+                <a:latin typeface="Courier New" panose="02070309020205020404" pitchFamily="49" charset="0"/>
+              </a:rPr>
+              <a:t>dt.month</a:t>
+            </a:r>
+            <a:endParaRPr lang="en-CA" b="0" dirty="0">
+              <a:solidFill>
+                <a:srgbClr val="D4D4D4"/>
+              </a:solidFill>
+              <a:effectLst/>
+              <a:latin typeface="Courier New" panose="02070309020205020404" pitchFamily="49" charset="0"/>
+            </a:endParaRPr>
+          </a:p>
+          <a:p>
             <a:endParaRPr lang="en-CA" dirty="0"/>
           </a:p>
         </p:txBody>
@@ -7473,7 +7710,7 @@
         </p:nvSpPr>
         <p:spPr>
           <a:xfrm>
-            <a:off x="2398776" y="2003393"/>
+            <a:off x="2337131" y="2395262"/>
             <a:ext cx="7022592" cy="3693319"/>
           </a:xfrm>
           <a:prstGeom prst="rect">
@@ -7495,7 +7732,7 @@
                 <a:effectLst/>
                 <a:latin typeface="Courier New" panose="02070309020205020404" pitchFamily="49" charset="0"/>
               </a:rPr>
-              <a:t># define X and y variables</a:t>
+              <a:t># Split data into X and y sets</a:t>
             </a:r>
             <a:endParaRPr lang="en-CA" b="0" dirty="0">
               <a:solidFill>
@@ -7553,6 +7790,90 @@
                 <a:effectLst/>
                 <a:latin typeface="Courier New" panose="02070309020205020404" pitchFamily="49" charset="0"/>
               </a:rPr>
+              <a:t>'Year'</a:t>
+            </a:r>
+            <a:r>
+              <a:rPr lang="en-CA" b="0" dirty="0">
+                <a:solidFill>
+                  <a:srgbClr val="DCDCDC"/>
+                </a:solidFill>
+                <a:effectLst/>
+                <a:latin typeface="Courier New" panose="02070309020205020404" pitchFamily="49" charset="0"/>
+              </a:rPr>
+              <a:t>,</a:t>
+            </a:r>
+            <a:r>
+              <a:rPr lang="en-CA" b="0" dirty="0">
+                <a:solidFill>
+                  <a:srgbClr val="D4D4D4"/>
+                </a:solidFill>
+                <a:effectLst/>
+                <a:latin typeface="Courier New" panose="02070309020205020404" pitchFamily="49" charset="0"/>
+              </a:rPr>
+              <a:t> </a:t>
+            </a:r>
+          </a:p>
+          <a:p>
+            <a:r>
+              <a:rPr lang="en-CA" b="0" dirty="0">
+                <a:solidFill>
+                  <a:srgbClr val="D4D4D4"/>
+                </a:solidFill>
+                <a:effectLst/>
+                <a:latin typeface="Courier New" panose="02070309020205020404" pitchFamily="49" charset="0"/>
+              </a:rPr>
+              <a:t>    </a:t>
+            </a:r>
+            <a:r>
+              <a:rPr lang="en-CA" b="0" dirty="0">
+                <a:solidFill>
+                  <a:srgbClr val="CE9178"/>
+                </a:solidFill>
+                <a:effectLst/>
+                <a:latin typeface="Courier New" panose="02070309020205020404" pitchFamily="49" charset="0"/>
+              </a:rPr>
+              <a:t>'Month'</a:t>
+            </a:r>
+            <a:r>
+              <a:rPr lang="en-CA" b="0" dirty="0">
+                <a:solidFill>
+                  <a:srgbClr val="DCDCDC"/>
+                </a:solidFill>
+                <a:effectLst/>
+                <a:latin typeface="Courier New" panose="02070309020205020404" pitchFamily="49" charset="0"/>
+              </a:rPr>
+              <a:t>,</a:t>
+            </a:r>
+            <a:r>
+              <a:rPr lang="en-CA" b="0" dirty="0">
+                <a:solidFill>
+                  <a:srgbClr val="D4D4D4"/>
+                </a:solidFill>
+                <a:effectLst/>
+                <a:latin typeface="Courier New" panose="02070309020205020404" pitchFamily="49" charset="0"/>
+              </a:rPr>
+              <a:t>  </a:t>
+            </a:r>
+          </a:p>
+          <a:p>
+            <a:r>
+              <a:rPr lang="en-CA" b="0" dirty="0">
+                <a:solidFill>
+                  <a:srgbClr val="D4D4D4"/>
+                </a:solidFill>
+                <a:effectLst/>
+                <a:latin typeface="Courier New" panose="02070309020205020404" pitchFamily="49" charset="0"/>
+              </a:rPr>
+              <a:t>    </a:t>
+            </a:r>
+            <a:r>
+              <a:rPr lang="en-CA" b="0" dirty="0">
+                <a:solidFill>
+                  <a:srgbClr val="CE9178"/>
+                </a:solidFill>
+                <a:effectLst/>
+                <a:latin typeface="Courier New" panose="02070309020205020404" pitchFamily="49" charset="0"/>
+              </a:rPr>
               <a:t>'</a:t>
             </a:r>
             <a:r>
@@ -7770,6 +8091,120 @@
                 <a:latin typeface="Courier New" panose="02070309020205020404" pitchFamily="49" charset="0"/>
               </a:rPr>
               <a:t>,</a:t>
+            </a:r>
+            <a:r>
+              <a:rPr lang="en-CA" b="0" dirty="0">
+                <a:solidFill>
+                  <a:srgbClr val="D4D4D4"/>
+                </a:solidFill>
+                <a:effectLst/>
+                <a:latin typeface="Courier New" panose="02070309020205020404" pitchFamily="49" charset="0"/>
+              </a:rPr>
+              <a:t> </a:t>
+            </a:r>
+          </a:p>
+          <a:p>
+            <a:r>
+              <a:rPr lang="en-CA" b="0" dirty="0">
+                <a:solidFill>
+                  <a:srgbClr val="D4D4D4"/>
+                </a:solidFill>
+                <a:effectLst/>
+                <a:latin typeface="Courier New" panose="02070309020205020404" pitchFamily="49" charset="0"/>
+              </a:rPr>
+              <a:t>    </a:t>
+            </a:r>
+            <a:r>
+              <a:rPr lang="en-CA" b="0" dirty="0">
+                <a:solidFill>
+                  <a:srgbClr val="CE9178"/>
+                </a:solidFill>
+                <a:effectLst/>
+                <a:latin typeface="Courier New" panose="02070309020205020404" pitchFamily="49" charset="0"/>
+              </a:rPr>
+              <a:t>'</a:t>
+            </a:r>
+            <a:r>
+              <a:rPr lang="en-CA" b="0" dirty="0" err="1">
+                <a:solidFill>
+                  <a:srgbClr val="CE9178"/>
+                </a:solidFill>
+                <a:effectLst/>
+                <a:latin typeface="Courier New" panose="02070309020205020404" pitchFamily="49" charset="0"/>
+              </a:rPr>
+              <a:t>Townhouse_Benchmark</a:t>
+            </a:r>
+            <a:r>
+              <a:rPr lang="en-CA" b="0" dirty="0">
+                <a:solidFill>
+                  <a:srgbClr val="CE9178"/>
+                </a:solidFill>
+                <a:effectLst/>
+                <a:latin typeface="Courier New" panose="02070309020205020404" pitchFamily="49" charset="0"/>
+              </a:rPr>
+              <a:t>'</a:t>
+            </a:r>
+            <a:r>
+              <a:rPr lang="en-CA" b="0" dirty="0">
+                <a:solidFill>
+                  <a:srgbClr val="DCDCDC"/>
+                </a:solidFill>
+                <a:effectLst/>
+                <a:latin typeface="Courier New" panose="02070309020205020404" pitchFamily="49" charset="0"/>
+              </a:rPr>
+              <a:t>,</a:t>
+            </a:r>
+            <a:r>
+              <a:rPr lang="en-CA" b="0" dirty="0">
+                <a:solidFill>
+                  <a:srgbClr val="D4D4D4"/>
+                </a:solidFill>
+                <a:effectLst/>
+                <a:latin typeface="Courier New" panose="02070309020205020404" pitchFamily="49" charset="0"/>
+              </a:rPr>
+              <a:t> </a:t>
+            </a:r>
+          </a:p>
+          <a:p>
+            <a:r>
+              <a:rPr lang="en-CA" b="0" dirty="0">
+                <a:solidFill>
+                  <a:srgbClr val="D4D4D4"/>
+                </a:solidFill>
+                <a:effectLst/>
+                <a:latin typeface="Courier New" panose="02070309020205020404" pitchFamily="49" charset="0"/>
+              </a:rPr>
+              <a:t>    </a:t>
+            </a:r>
+            <a:r>
+              <a:rPr lang="en-CA" b="0" dirty="0">
+                <a:solidFill>
+                  <a:srgbClr val="CE9178"/>
+                </a:solidFill>
+                <a:effectLst/>
+                <a:latin typeface="Courier New" panose="02070309020205020404" pitchFamily="49" charset="0"/>
+              </a:rPr>
+              <a:t>'</a:t>
+            </a:r>
+            <a:r>
+              <a:rPr lang="en-CA" b="0" dirty="0" err="1">
+                <a:solidFill>
+                  <a:srgbClr val="CE9178"/>
+                </a:solidFill>
+                <a:effectLst/>
+                <a:latin typeface="Courier New" panose="02070309020205020404" pitchFamily="49" charset="0"/>
+              </a:rPr>
+              <a:t>Apartment_Benchmark</a:t>
+            </a:r>
+            <a:r>
+              <a:rPr lang="en-CA" b="0" dirty="0">
+                <a:solidFill>
+                  <a:srgbClr val="CE9178"/>
+                </a:solidFill>
+                <a:effectLst/>
+                <a:latin typeface="Courier New" panose="02070309020205020404" pitchFamily="49" charset="0"/>
+              </a:rPr>
+              <a:t>'</a:t>
             </a:r>
             <a:endParaRPr lang="en-CA" b="0" dirty="0">
               <a:solidFill>
@@ -7793,6 +8228,45 @@
             <a:r>
               <a:rPr lang="en-CA" b="0" dirty="0">
                 <a:solidFill>
+                  <a:srgbClr val="DCDCDC"/>
+                </a:solidFill>
+                <a:effectLst/>
+                <a:latin typeface="Courier New" panose="02070309020205020404" pitchFamily="49" charset="0"/>
+              </a:rPr>
+              <a:t>]]</a:t>
+            </a:r>
+            <a:br>
+              <a:rPr lang="en-CA" b="0" dirty="0">
+                <a:solidFill>
+                  <a:srgbClr val="D4D4D4"/>
+                </a:solidFill>
+                <a:effectLst/>
+                <a:latin typeface="Courier New" panose="02070309020205020404" pitchFamily="49" charset="0"/>
+              </a:rPr>
+            </a:br>
+            <a:r>
+              <a:rPr lang="en-CA" b="0" dirty="0">
+                <a:solidFill>
+                  <a:srgbClr val="D4D4D4"/>
+                </a:solidFill>
+                <a:effectLst/>
+                <a:latin typeface="Courier New" panose="02070309020205020404" pitchFamily="49" charset="0"/>
+              </a:rPr>
+              <a:t>y = dataset</a:t>
+            </a:r>
+            <a:r>
+              <a:rPr lang="en-CA" b="0" dirty="0">
+                <a:solidFill>
+                  <a:srgbClr val="DCDCDC"/>
+                </a:solidFill>
+                <a:effectLst/>
+                <a:latin typeface="Courier New" panose="02070309020205020404" pitchFamily="49" charset="0"/>
+              </a:rPr>
+              <a:t>[</a:t>
+            </a:r>
+            <a:r>
+              <a:rPr lang="en-CA" b="0" dirty="0">
+                <a:solidFill>
                   <a:srgbClr val="CE9178"/>
                 </a:solidFill>
                 <a:effectLst/>
@@ -7808,7 +8282,7 @@
                 <a:effectLst/>
                 <a:latin typeface="Courier New" panose="02070309020205020404" pitchFamily="49" charset="0"/>
               </a:rPr>
-              <a:t>Townhouse_Benchmark</a:t>
+              <a:t>Composite_Benchmark</a:t>
             </a:r>
             <a:r>
               <a:rPr lang="en-CA" b="0" dirty="0">
@@ -7819,191 +8293,6 @@
                 <a:latin typeface="Courier New" panose="02070309020205020404" pitchFamily="49" charset="0"/>
               </a:rPr>
               <a:t>'</a:t>
-            </a:r>
-            <a:r>
-              <a:rPr lang="en-CA" b="0" dirty="0">
-                <a:solidFill>
-                  <a:srgbClr val="DCDCDC"/>
-                </a:solidFill>
-                <a:effectLst/>
-                <a:latin typeface="Courier New" panose="02070309020205020404" pitchFamily="49" charset="0"/>
-              </a:rPr>
-              <a:t>,</a:t>
-            </a:r>
-            <a:endParaRPr lang="en-CA" b="0" dirty="0">
-              <a:solidFill>
-                <a:srgbClr val="D4D4D4"/>
-              </a:solidFill>
-              <a:effectLst/>
-              <a:latin typeface="Courier New" panose="02070309020205020404" pitchFamily="49" charset="0"/>
-            </a:endParaRPr>
-          </a:p>
-          <a:p>
-            <a:r>
-              <a:rPr lang="en-CA" b="0" dirty="0">
-                <a:solidFill>
-                  <a:srgbClr val="D4D4D4"/>
-                </a:solidFill>
-                <a:effectLst/>
-                <a:latin typeface="Courier New" panose="02070309020205020404" pitchFamily="49" charset="0"/>
-              </a:rPr>
-              <a:t>    </a:t>
-            </a:r>
-            <a:r>
-              <a:rPr lang="en-CA" b="0" dirty="0">
-                <a:solidFill>
-                  <a:srgbClr val="CE9178"/>
-                </a:solidFill>
-                <a:effectLst/>
-                <a:latin typeface="Courier New" panose="02070309020205020404" pitchFamily="49" charset="0"/>
-              </a:rPr>
-              <a:t>'</a:t>
-            </a:r>
-            <a:r>
-              <a:rPr lang="en-CA" b="0" dirty="0" err="1">
-                <a:solidFill>
-                  <a:srgbClr val="CE9178"/>
-                </a:solidFill>
-                <a:effectLst/>
-                <a:latin typeface="Courier New" panose="02070309020205020404" pitchFamily="49" charset="0"/>
-              </a:rPr>
-              <a:t>Apartment_Benchmark</a:t>
-            </a:r>
-            <a:r>
-              <a:rPr lang="en-CA" b="0" dirty="0">
-                <a:solidFill>
-                  <a:srgbClr val="CE9178"/>
-                </a:solidFill>
-                <a:effectLst/>
-                <a:latin typeface="Courier New" panose="02070309020205020404" pitchFamily="49" charset="0"/>
-              </a:rPr>
-              <a:t>'</a:t>
-            </a:r>
-            <a:endParaRPr lang="en-CA" b="0" dirty="0">
-              <a:solidFill>
-                <a:srgbClr val="D4D4D4"/>
-              </a:solidFill>
-              <a:effectLst/>
-              <a:latin typeface="Courier New" panose="02070309020205020404" pitchFamily="49" charset="0"/>
-            </a:endParaRPr>
-          </a:p>
-          <a:p>
-            <a:r>
-              <a:rPr lang="en-CA" b="0" dirty="0">
-                <a:solidFill>
-                  <a:srgbClr val="D4D4D4"/>
-                </a:solidFill>
-                <a:effectLst/>
-                <a:latin typeface="Courier New" panose="02070309020205020404" pitchFamily="49" charset="0"/>
-              </a:rPr>
-              <a:t>    </a:t>
-            </a:r>
-            <a:r>
-              <a:rPr lang="en-CA" b="0" dirty="0">
-                <a:solidFill>
-                  <a:srgbClr val="DCDCDC"/>
-                </a:solidFill>
-                <a:effectLst/>
-                <a:latin typeface="Courier New" panose="02070309020205020404" pitchFamily="49" charset="0"/>
-              </a:rPr>
-              <a:t>]]</a:t>
-            </a:r>
-            <a:endParaRPr lang="en-CA" b="0" dirty="0">
-              <a:solidFill>
-                <a:srgbClr val="D4D4D4"/>
-              </a:solidFill>
-              <a:effectLst/>
-              <a:latin typeface="Courier New" panose="02070309020205020404" pitchFamily="49" charset="0"/>
-            </a:endParaRPr>
-          </a:p>
-          <a:p>
-            <a:r>
-              <a:rPr lang="en-CA" b="0" dirty="0">
-                <a:solidFill>
-                  <a:srgbClr val="D4D4D4"/>
-                </a:solidFill>
-                <a:effectLst/>
-                <a:latin typeface="Courier New" panose="02070309020205020404" pitchFamily="49" charset="0"/>
-              </a:rPr>
-              <a:t>y = dataset</a:t>
-            </a:r>
-            <a:r>
-              <a:rPr lang="en-CA" b="0" dirty="0">
-                <a:solidFill>
-                  <a:srgbClr val="DCDCDC"/>
-                </a:solidFill>
-                <a:effectLst/>
-                <a:latin typeface="Courier New" panose="02070309020205020404" pitchFamily="49" charset="0"/>
-              </a:rPr>
-              <a:t>[</a:t>
-            </a:r>
-            <a:endParaRPr lang="en-CA" b="0" dirty="0">
-              <a:solidFill>
-                <a:srgbClr val="D4D4D4"/>
-              </a:solidFill>
-              <a:effectLst/>
-              <a:latin typeface="Courier New" panose="02070309020205020404" pitchFamily="49" charset="0"/>
-            </a:endParaRPr>
-          </a:p>
-          <a:p>
-            <a:r>
-              <a:rPr lang="en-CA" b="0" dirty="0">
-                <a:solidFill>
-                  <a:srgbClr val="D4D4D4"/>
-                </a:solidFill>
-                <a:effectLst/>
-                <a:latin typeface="Courier New" panose="02070309020205020404" pitchFamily="49" charset="0"/>
-              </a:rPr>
-              <a:t>    </a:t>
-            </a:r>
-            <a:r>
-              <a:rPr lang="en-CA" b="0" dirty="0">
-                <a:solidFill>
-                  <a:srgbClr val="CE9178"/>
-                </a:solidFill>
-                <a:effectLst/>
-                <a:latin typeface="Courier New" panose="02070309020205020404" pitchFamily="49" charset="0"/>
-              </a:rPr>
-              <a:t>'</a:t>
-            </a:r>
-            <a:r>
-              <a:rPr lang="en-CA" b="0" dirty="0" err="1">
-                <a:solidFill>
-                  <a:srgbClr val="CE9178"/>
-                </a:solidFill>
-                <a:effectLst/>
-                <a:latin typeface="Courier New" panose="02070309020205020404" pitchFamily="49" charset="0"/>
-              </a:rPr>
-              <a:t>Composite_Benchmark</a:t>
-            </a:r>
-            <a:r>
-              <a:rPr lang="en-CA" b="0" dirty="0">
-                <a:solidFill>
-                  <a:srgbClr val="CE9178"/>
-                </a:solidFill>
-                <a:effectLst/>
-                <a:latin typeface="Courier New" panose="02070309020205020404" pitchFamily="49" charset="0"/>
-              </a:rPr>
-              <a:t>'</a:t>
-            </a:r>
-            <a:endParaRPr lang="en-CA" b="0" dirty="0">
-              <a:solidFill>
-                <a:srgbClr val="D4D4D4"/>
-              </a:solidFill>
-              <a:effectLst/>
-              <a:latin typeface="Courier New" panose="02070309020205020404" pitchFamily="49" charset="0"/>
-            </a:endParaRPr>
-          </a:p>
-          <a:p>
-            <a:r>
-              <a:rPr lang="en-CA" b="0" dirty="0">
-                <a:solidFill>
-                  <a:srgbClr val="D4D4D4"/>
-                </a:solidFill>
-                <a:effectLst/>
-                <a:latin typeface="Courier New" panose="02070309020205020404" pitchFamily="49" charset="0"/>
-              </a:rPr>
-              <a:t>    </a:t>
             </a:r>
             <a:r>
               <a:rPr lang="en-CA" b="0" dirty="0">
@@ -8414,7 +8703,7 @@
               </a:pPr>
               <a:t>2024</a:t>
             </a:fld>
-            <a:endParaRPr lang="en-CA">
+            <a:endParaRPr lang="en-CA" dirty="0">
               <a:solidFill>
                 <a:schemeClr val="bg1">
                   <a:lumMod val="50000"/>
@@ -8458,7 +8747,7 @@
               </a:spcAft>
             </a:pPr>
             <a:r>
-              <a:rPr lang="en-CA">
+              <a:rPr lang="en-CA" dirty="0">
                 <a:solidFill>
                   <a:schemeClr val="bg1">
                     <a:lumMod val="50000"/>
@@ -8621,7 +8910,7 @@
         <p:spPr>
           <a:xfrm>
             <a:off x="5473352" y="397741"/>
-            <a:ext cx="6514432" cy="5909310"/>
+            <a:ext cx="6514432" cy="6740307"/>
           </a:xfrm>
           <a:prstGeom prst="rect">
             <a:avLst/>
@@ -8785,16 +9074,6 @@
             <a:r>
               <a:rPr lang="en-CA" b="0" dirty="0">
                 <a:solidFill>
-                  <a:srgbClr val="D4D4D4"/>
-                </a:solidFill>
-                <a:effectLst/>
-                <a:latin typeface="Courier New" panose="02070309020205020404" pitchFamily="49" charset="0"/>
-              </a:rPr>
-              <a:t> </a:t>
-            </a:r>
-            <a:r>
-              <a:rPr lang="en-CA" b="0" dirty="0">
-                <a:solidFill>
                   <a:srgbClr val="B5CEA8"/>
                 </a:solidFill>
                 <a:effectLst/>
@@ -8815,16 +9094,6 @@
             <a:r>
               <a:rPr lang="en-CA" b="0" dirty="0">
                 <a:solidFill>
-                  <a:srgbClr val="D4D4D4"/>
-                </a:solidFill>
-                <a:effectLst/>
-                <a:latin typeface="Courier New" panose="02070309020205020404" pitchFamily="49" charset="0"/>
-              </a:rPr>
-              <a:t> </a:t>
-            </a:r>
-            <a:r>
-              <a:rPr lang="en-CA" b="0" dirty="0">
-                <a:solidFill>
                   <a:srgbClr val="B5CEA8"/>
                 </a:solidFill>
                 <a:effectLst/>
@@ -8845,16 +9114,6 @@
             <a:r>
               <a:rPr lang="en-CA" b="0" dirty="0">
                 <a:solidFill>
-                  <a:srgbClr val="D4D4D4"/>
-                </a:solidFill>
-                <a:effectLst/>
-                <a:latin typeface="Courier New" panose="02070309020205020404" pitchFamily="49" charset="0"/>
-              </a:rPr>
-              <a:t> </a:t>
-            </a:r>
-            <a:r>
-              <a:rPr lang="en-CA" b="0" dirty="0">
-                <a:solidFill>
                   <a:srgbClr val="B5CEA8"/>
                 </a:solidFill>
                 <a:effectLst/>
@@ -8870,7 +9129,47 @@
                 <a:effectLst/>
                 <a:latin typeface="Courier New" panose="02070309020205020404" pitchFamily="49" charset="0"/>
               </a:rPr>
-              <a:t>]</a:t>
+              <a:t>,</a:t>
+            </a:r>
+            <a:r>
+              <a:rPr lang="en-CA" b="0" dirty="0">
+                <a:solidFill>
+                  <a:srgbClr val="B5CEA8"/>
+                </a:solidFill>
+                <a:effectLst/>
+                <a:latin typeface="Courier New" panose="02070309020205020404" pitchFamily="49" charset="0"/>
+              </a:rPr>
+              <a:t>250</a:t>
+            </a:r>
+            <a:r>
+              <a:rPr lang="en-CA" b="0" dirty="0">
+                <a:solidFill>
+                  <a:srgbClr val="DCDCDC"/>
+                </a:solidFill>
+                <a:effectLst/>
+                <a:latin typeface="Courier New" panose="02070309020205020404" pitchFamily="49" charset="0"/>
+              </a:rPr>
+              <a:t>,</a:t>
+            </a:r>
+            <a:r>
+              <a:rPr lang="en-CA" b="0" dirty="0">
+                <a:solidFill>
+                  <a:srgbClr val="B5CEA8"/>
+                </a:solidFill>
+                <a:effectLst/>
+                <a:latin typeface="Courier New" panose="02070309020205020404" pitchFamily="49" charset="0"/>
+              </a:rPr>
+              <a:t>300</a:t>
+            </a:r>
+            <a:r>
+              <a:rPr lang="en-CA" b="0" dirty="0">
+                <a:solidFill>
+                  <a:srgbClr val="DCDCDC"/>
+                </a:solidFill>
+                <a:effectLst/>
+                <a:latin typeface="Courier New" panose="02070309020205020404" pitchFamily="49" charset="0"/>
+              </a:rPr>
+              <a:t>,</a:t>
             </a:r>
             <a:endParaRPr lang="en-CA" b="0" dirty="0">
               <a:solidFill>
@@ -8884,12 +9183,192 @@
             <a:r>
               <a:rPr lang="en-CA" b="0" dirty="0">
                 <a:solidFill>
+                  <a:srgbClr val="D4D4D4"/>
+                </a:solidFill>
+                <a:effectLst/>
+                <a:latin typeface="Courier New" panose="02070309020205020404" pitchFamily="49" charset="0"/>
+              </a:rPr>
+              <a:t>    </a:t>
+            </a:r>
+            <a:r>
+              <a:rPr lang="en-CA" b="0" dirty="0">
+                <a:solidFill>
+                  <a:srgbClr val="B5CEA8"/>
+                </a:solidFill>
+                <a:effectLst/>
+                <a:latin typeface="Courier New" panose="02070309020205020404" pitchFamily="49" charset="0"/>
+              </a:rPr>
+              <a:t>350</a:t>
+            </a:r>
+            <a:r>
+              <a:rPr lang="en-CA" b="0" dirty="0">
+                <a:solidFill>
                   <a:srgbClr val="DCDCDC"/>
                 </a:solidFill>
                 <a:effectLst/>
                 <a:latin typeface="Courier New" panose="02070309020205020404" pitchFamily="49" charset="0"/>
               </a:rPr>
-              <a:t>}</a:t>
+              <a:t>,</a:t>
+            </a:r>
+            <a:r>
+              <a:rPr lang="en-CA" b="0" dirty="0">
+                <a:solidFill>
+                  <a:srgbClr val="B5CEA8"/>
+                </a:solidFill>
+                <a:effectLst/>
+                <a:latin typeface="Courier New" panose="02070309020205020404" pitchFamily="49" charset="0"/>
+              </a:rPr>
+              <a:t>400</a:t>
+            </a:r>
+            <a:r>
+              <a:rPr lang="en-CA" b="0" dirty="0">
+                <a:solidFill>
+                  <a:srgbClr val="DCDCDC"/>
+                </a:solidFill>
+                <a:effectLst/>
+                <a:latin typeface="Courier New" panose="02070309020205020404" pitchFamily="49" charset="0"/>
+              </a:rPr>
+              <a:t>,</a:t>
+            </a:r>
+            <a:r>
+              <a:rPr lang="en-CA" b="0" dirty="0">
+                <a:solidFill>
+                  <a:srgbClr val="B5CEA8"/>
+                </a:solidFill>
+                <a:effectLst/>
+                <a:latin typeface="Courier New" panose="02070309020205020404" pitchFamily="49" charset="0"/>
+              </a:rPr>
+              <a:t>450</a:t>
+            </a:r>
+            <a:r>
+              <a:rPr lang="en-CA" b="0" dirty="0">
+                <a:solidFill>
+                  <a:srgbClr val="DCDCDC"/>
+                </a:solidFill>
+                <a:effectLst/>
+                <a:latin typeface="Courier New" panose="02070309020205020404" pitchFamily="49" charset="0"/>
+              </a:rPr>
+              <a:t>,</a:t>
+            </a:r>
+            <a:r>
+              <a:rPr lang="en-CA" b="0" dirty="0">
+                <a:solidFill>
+                  <a:srgbClr val="B5CEA8"/>
+                </a:solidFill>
+                <a:effectLst/>
+                <a:latin typeface="Courier New" panose="02070309020205020404" pitchFamily="49" charset="0"/>
+              </a:rPr>
+              <a:t>500</a:t>
+            </a:r>
+            <a:r>
+              <a:rPr lang="en-CA" b="0" dirty="0">
+                <a:solidFill>
+                  <a:srgbClr val="DCDCDC"/>
+                </a:solidFill>
+                <a:effectLst/>
+                <a:latin typeface="Courier New" panose="02070309020205020404" pitchFamily="49" charset="0"/>
+              </a:rPr>
+              <a:t>,</a:t>
+            </a:r>
+            <a:r>
+              <a:rPr lang="en-CA" b="0" dirty="0">
+                <a:solidFill>
+                  <a:srgbClr val="B5CEA8"/>
+                </a:solidFill>
+                <a:effectLst/>
+                <a:latin typeface="Courier New" panose="02070309020205020404" pitchFamily="49" charset="0"/>
+              </a:rPr>
+              <a:t>550</a:t>
+            </a:r>
+            <a:r>
+              <a:rPr lang="en-CA" b="0" dirty="0">
+                <a:solidFill>
+                  <a:srgbClr val="DCDCDC"/>
+                </a:solidFill>
+                <a:effectLst/>
+                <a:latin typeface="Courier New" panose="02070309020205020404" pitchFamily="49" charset="0"/>
+              </a:rPr>
+              <a:t>,</a:t>
+            </a:r>
+            <a:r>
+              <a:rPr lang="en-CA" b="0" dirty="0">
+                <a:solidFill>
+                  <a:srgbClr val="B5CEA8"/>
+                </a:solidFill>
+                <a:effectLst/>
+                <a:latin typeface="Courier New" panose="02070309020205020404" pitchFamily="49" charset="0"/>
+              </a:rPr>
+              <a:t>600</a:t>
+            </a:r>
+            <a:r>
+              <a:rPr lang="en-CA" b="0" dirty="0">
+                <a:solidFill>
+                  <a:srgbClr val="DCDCDC"/>
+                </a:solidFill>
+                <a:effectLst/>
+                <a:latin typeface="Courier New" panose="02070309020205020404" pitchFamily="49" charset="0"/>
+              </a:rPr>
+              <a:t>,</a:t>
+            </a:r>
+            <a:r>
+              <a:rPr lang="en-CA" b="0" dirty="0">
+                <a:solidFill>
+                  <a:srgbClr val="B5CEA8"/>
+                </a:solidFill>
+                <a:effectLst/>
+                <a:latin typeface="Courier New" panose="02070309020205020404" pitchFamily="49" charset="0"/>
+              </a:rPr>
+              <a:t>650</a:t>
+            </a:r>
+            <a:r>
+              <a:rPr lang="en-CA" b="0" dirty="0">
+                <a:solidFill>
+                  <a:srgbClr val="DCDCDC"/>
+                </a:solidFill>
+                <a:effectLst/>
+                <a:latin typeface="Courier New" panose="02070309020205020404" pitchFamily="49" charset="0"/>
+              </a:rPr>
+              <a:t>,</a:t>
+            </a:r>
+            <a:r>
+              <a:rPr lang="en-CA" b="0" dirty="0">
+                <a:solidFill>
+                  <a:srgbClr val="B5CEA8"/>
+                </a:solidFill>
+                <a:effectLst/>
+                <a:latin typeface="Courier New" panose="02070309020205020404" pitchFamily="49" charset="0"/>
+              </a:rPr>
+              <a:t>700</a:t>
+            </a:r>
+            <a:r>
+              <a:rPr lang="en-CA" b="0" dirty="0">
+                <a:solidFill>
+                  <a:srgbClr val="DCDCDC"/>
+                </a:solidFill>
+                <a:effectLst/>
+                <a:latin typeface="Courier New" panose="02070309020205020404" pitchFamily="49" charset="0"/>
+              </a:rPr>
+              <a:t>,</a:t>
+            </a:r>
+            <a:r>
+              <a:rPr lang="en-CA" b="0" dirty="0">
+                <a:solidFill>
+                  <a:srgbClr val="B5CEA8"/>
+                </a:solidFill>
+                <a:effectLst/>
+                <a:latin typeface="Courier New" panose="02070309020205020404" pitchFamily="49" charset="0"/>
+              </a:rPr>
+              <a:t>750</a:t>
+            </a:r>
+            <a:r>
+              <a:rPr lang="en-CA" b="0" dirty="0">
+                <a:solidFill>
+                  <a:srgbClr val="DCDCDC"/>
+                </a:solidFill>
+                <a:effectLst/>
+                <a:latin typeface="Courier New" panose="02070309020205020404" pitchFamily="49" charset="0"/>
+              </a:rPr>
+              <a:t>]}</a:t>
             </a:r>
             <a:endParaRPr lang="en-CA" b="0" dirty="0">
               <a:solidFill>
@@ -9027,14 +9506,407 @@
               </a:rPr>
             </a:br>
             <a:r>
+              <a:rPr lang="en-CA" b="0" dirty="0">
+                <a:solidFill>
+                  <a:srgbClr val="6AA94F"/>
+                </a:solidFill>
+                <a:effectLst/>
+                <a:latin typeface="Courier New" panose="02070309020205020404" pitchFamily="49" charset="0"/>
+              </a:rPr>
+              <a:t># Initialize the random search</a:t>
+            </a:r>
+            <a:endParaRPr lang="en-CA" b="0" dirty="0">
+              <a:solidFill>
+                <a:srgbClr val="D4D4D4"/>
+              </a:solidFill>
+              <a:effectLst/>
+              <a:latin typeface="Courier New" panose="02070309020205020404" pitchFamily="49" charset="0"/>
+            </a:endParaRPr>
+          </a:p>
+          <a:p>
+            <a:r>
+              <a:rPr lang="en-CA" b="0" dirty="0" err="1">
+                <a:solidFill>
+                  <a:srgbClr val="D4D4D4"/>
+                </a:solidFill>
+                <a:effectLst/>
+                <a:latin typeface="Courier New" panose="02070309020205020404" pitchFamily="49" charset="0"/>
+              </a:rPr>
+              <a:t>random_search</a:t>
+            </a:r>
+            <a:r>
+              <a:rPr lang="en-CA" b="0" dirty="0">
+                <a:solidFill>
+                  <a:srgbClr val="D4D4D4"/>
+                </a:solidFill>
+                <a:effectLst/>
+                <a:latin typeface="Courier New" panose="02070309020205020404" pitchFamily="49" charset="0"/>
+              </a:rPr>
+              <a:t> = </a:t>
+            </a:r>
+            <a:r>
+              <a:rPr lang="en-CA" b="0" dirty="0" err="1">
+                <a:solidFill>
+                  <a:srgbClr val="D4D4D4"/>
+                </a:solidFill>
+                <a:effectLst/>
+                <a:latin typeface="Courier New" panose="02070309020205020404" pitchFamily="49" charset="0"/>
+              </a:rPr>
+              <a:t>RandomizedSearchCV</a:t>
+            </a:r>
+            <a:r>
+              <a:rPr lang="en-CA" b="0" dirty="0">
+                <a:solidFill>
+                  <a:srgbClr val="DCDCDC"/>
+                </a:solidFill>
+                <a:effectLst/>
+                <a:latin typeface="Courier New" panose="02070309020205020404" pitchFamily="49" charset="0"/>
+              </a:rPr>
+              <a:t>(</a:t>
+            </a:r>
+            <a:endParaRPr lang="en-CA" b="0" dirty="0">
+              <a:solidFill>
+                <a:srgbClr val="D4D4D4"/>
+              </a:solidFill>
+              <a:effectLst/>
+              <a:latin typeface="Courier New" panose="02070309020205020404" pitchFamily="49" charset="0"/>
+            </a:endParaRPr>
+          </a:p>
+          <a:p>
+            <a:r>
+              <a:rPr lang="en-CA" b="0" dirty="0">
+                <a:solidFill>
+                  <a:srgbClr val="D4D4D4"/>
+                </a:solidFill>
+                <a:effectLst/>
+                <a:latin typeface="Courier New" panose="02070309020205020404" pitchFamily="49" charset="0"/>
+              </a:rPr>
+              <a:t>    estimator = </a:t>
+            </a:r>
+            <a:r>
+              <a:rPr lang="en-CA" b="0" dirty="0" err="1">
+                <a:solidFill>
+                  <a:srgbClr val="D4D4D4"/>
+                </a:solidFill>
+                <a:effectLst/>
+                <a:latin typeface="Courier New" panose="02070309020205020404" pitchFamily="49" charset="0"/>
+              </a:rPr>
+              <a:t>forest_model</a:t>
+            </a:r>
+            <a:r>
+              <a:rPr lang="en-CA" b="0" dirty="0">
+                <a:solidFill>
+                  <a:srgbClr val="DCDCDC"/>
+                </a:solidFill>
+                <a:effectLst/>
+                <a:latin typeface="Courier New" panose="02070309020205020404" pitchFamily="49" charset="0"/>
+              </a:rPr>
+              <a:t>,</a:t>
+            </a:r>
+            <a:endParaRPr lang="en-CA" b="0" dirty="0">
+              <a:solidFill>
+                <a:srgbClr val="D4D4D4"/>
+              </a:solidFill>
+              <a:effectLst/>
+              <a:latin typeface="Courier New" panose="02070309020205020404" pitchFamily="49" charset="0"/>
+            </a:endParaRPr>
+          </a:p>
+          <a:p>
+            <a:r>
+              <a:rPr lang="en-CA" b="0" dirty="0">
+                <a:solidFill>
+                  <a:srgbClr val="D4D4D4"/>
+                </a:solidFill>
+                <a:effectLst/>
+                <a:latin typeface="Courier New" panose="02070309020205020404" pitchFamily="49" charset="0"/>
+              </a:rPr>
+              <a:t>    </a:t>
+            </a:r>
+            <a:r>
+              <a:rPr lang="en-CA" b="0" dirty="0" err="1">
+                <a:solidFill>
+                  <a:srgbClr val="D4D4D4"/>
+                </a:solidFill>
+                <a:effectLst/>
+                <a:latin typeface="Courier New" panose="02070309020205020404" pitchFamily="49" charset="0"/>
+              </a:rPr>
+              <a:t>param_distributions</a:t>
+            </a:r>
+            <a:r>
+              <a:rPr lang="en-CA" b="0" dirty="0">
+                <a:solidFill>
+                  <a:srgbClr val="D4D4D4"/>
+                </a:solidFill>
+                <a:effectLst/>
+                <a:latin typeface="Courier New" panose="02070309020205020404" pitchFamily="49" charset="0"/>
+              </a:rPr>
+              <a:t> = </a:t>
+            </a:r>
+            <a:r>
+              <a:rPr lang="en-CA" b="0" dirty="0" err="1">
+                <a:solidFill>
+                  <a:srgbClr val="D4D4D4"/>
+                </a:solidFill>
+                <a:effectLst/>
+                <a:latin typeface="Courier New" panose="02070309020205020404" pitchFamily="49" charset="0"/>
+              </a:rPr>
+              <a:t>param_dist</a:t>
+            </a:r>
+            <a:r>
+              <a:rPr lang="en-CA" b="0" dirty="0">
+                <a:solidFill>
+                  <a:srgbClr val="DCDCDC"/>
+                </a:solidFill>
+                <a:effectLst/>
+                <a:latin typeface="Courier New" panose="02070309020205020404" pitchFamily="49" charset="0"/>
+              </a:rPr>
+              <a:t>,</a:t>
+            </a:r>
+            <a:endParaRPr lang="en-CA" b="0" dirty="0">
+              <a:solidFill>
+                <a:srgbClr val="D4D4D4"/>
+              </a:solidFill>
+              <a:effectLst/>
+              <a:latin typeface="Courier New" panose="02070309020205020404" pitchFamily="49" charset="0"/>
+            </a:endParaRPr>
+          </a:p>
+          <a:p>
+            <a:r>
+              <a:rPr lang="en-CA" b="0" dirty="0">
+                <a:solidFill>
+                  <a:srgbClr val="D4D4D4"/>
+                </a:solidFill>
+                <a:effectLst/>
+                <a:latin typeface="Courier New" panose="02070309020205020404" pitchFamily="49" charset="0"/>
+              </a:rPr>
+              <a:t>    </a:t>
+            </a:r>
+            <a:r>
+              <a:rPr lang="en-CA" b="0" dirty="0" err="1">
+                <a:solidFill>
+                  <a:srgbClr val="D4D4D4"/>
+                </a:solidFill>
+                <a:effectLst/>
+                <a:latin typeface="Courier New" panose="02070309020205020404" pitchFamily="49" charset="0"/>
+              </a:rPr>
+              <a:t>n_iter</a:t>
+            </a:r>
+            <a:r>
+              <a:rPr lang="en-CA" b="0" dirty="0">
+                <a:solidFill>
+                  <a:srgbClr val="D4D4D4"/>
+                </a:solidFill>
+                <a:effectLst/>
+                <a:latin typeface="Courier New" panose="02070309020205020404" pitchFamily="49" charset="0"/>
+              </a:rPr>
+              <a:t> = </a:t>
+            </a:r>
+            <a:r>
+              <a:rPr lang="en-CA" b="0" dirty="0">
+                <a:solidFill>
+                  <a:srgbClr val="B5CEA8"/>
+                </a:solidFill>
+                <a:effectLst/>
+                <a:latin typeface="Courier New" panose="02070309020205020404" pitchFamily="49" charset="0"/>
+              </a:rPr>
+              <a:t>15</a:t>
+            </a:r>
+            <a:r>
+              <a:rPr lang="en-CA" b="0" dirty="0">
+                <a:solidFill>
+                  <a:srgbClr val="DCDCDC"/>
+                </a:solidFill>
+                <a:effectLst/>
+                <a:latin typeface="Courier New" panose="02070309020205020404" pitchFamily="49" charset="0"/>
+              </a:rPr>
+              <a:t>,</a:t>
+            </a:r>
+            <a:endParaRPr lang="en-CA" b="0" dirty="0">
+              <a:solidFill>
+                <a:srgbClr val="D4D4D4"/>
+              </a:solidFill>
+              <a:effectLst/>
+              <a:latin typeface="Courier New" panose="02070309020205020404" pitchFamily="49" charset="0"/>
+            </a:endParaRPr>
+          </a:p>
+          <a:p>
+            <a:r>
+              <a:rPr lang="en-CA" b="0" dirty="0">
+                <a:solidFill>
+                  <a:srgbClr val="D4D4D4"/>
+                </a:solidFill>
+                <a:effectLst/>
+                <a:latin typeface="Courier New" panose="02070309020205020404" pitchFamily="49" charset="0"/>
+              </a:rPr>
+              <a:t>    cv = </a:t>
+            </a:r>
+            <a:r>
+              <a:rPr lang="en-CA" b="0" dirty="0">
+                <a:solidFill>
+                  <a:srgbClr val="B5CEA8"/>
+                </a:solidFill>
+                <a:effectLst/>
+                <a:latin typeface="Courier New" panose="02070309020205020404" pitchFamily="49" charset="0"/>
+              </a:rPr>
+              <a:t>5</a:t>
+            </a:r>
+            <a:r>
+              <a:rPr lang="en-CA" b="0" dirty="0">
+                <a:solidFill>
+                  <a:srgbClr val="DCDCDC"/>
+                </a:solidFill>
+                <a:effectLst/>
+                <a:latin typeface="Courier New" panose="02070309020205020404" pitchFamily="49" charset="0"/>
+              </a:rPr>
+              <a:t>,</a:t>
+            </a:r>
+            <a:endParaRPr lang="en-CA" b="0" dirty="0">
+              <a:solidFill>
+                <a:srgbClr val="D4D4D4"/>
+              </a:solidFill>
+              <a:effectLst/>
+              <a:latin typeface="Courier New" panose="02070309020205020404" pitchFamily="49" charset="0"/>
+            </a:endParaRPr>
+          </a:p>
+          <a:p>
+            <a:r>
+              <a:rPr lang="en-CA" b="0" dirty="0">
+                <a:solidFill>
+                  <a:srgbClr val="D4D4D4"/>
+                </a:solidFill>
+                <a:effectLst/>
+                <a:latin typeface="Courier New" panose="02070309020205020404" pitchFamily="49" charset="0"/>
+              </a:rPr>
+              <a:t>    scoring = </a:t>
+            </a:r>
+            <a:r>
+              <a:rPr lang="en-CA" b="0" dirty="0">
+                <a:solidFill>
+                  <a:srgbClr val="CE9178"/>
+                </a:solidFill>
+                <a:effectLst/>
+                <a:latin typeface="Courier New" panose="02070309020205020404" pitchFamily="49" charset="0"/>
+              </a:rPr>
+              <a:t>'</a:t>
+            </a:r>
+            <a:r>
+              <a:rPr lang="en-CA" b="0" dirty="0" err="1">
+                <a:solidFill>
+                  <a:srgbClr val="CE9178"/>
+                </a:solidFill>
+                <a:effectLst/>
+                <a:latin typeface="Courier New" panose="02070309020205020404" pitchFamily="49" charset="0"/>
+              </a:rPr>
+              <a:t>neg_mean_squared_error</a:t>
+            </a:r>
+            <a:r>
+              <a:rPr lang="en-CA" b="0" dirty="0">
+                <a:solidFill>
+                  <a:srgbClr val="CE9178"/>
+                </a:solidFill>
+                <a:effectLst/>
+                <a:latin typeface="Courier New" panose="02070309020205020404" pitchFamily="49" charset="0"/>
+              </a:rPr>
+              <a:t>'</a:t>
+            </a:r>
+            <a:r>
+              <a:rPr lang="en-CA" b="0" dirty="0">
+                <a:solidFill>
+                  <a:srgbClr val="DCDCDC"/>
+                </a:solidFill>
+                <a:effectLst/>
+                <a:latin typeface="Courier New" panose="02070309020205020404" pitchFamily="49" charset="0"/>
+              </a:rPr>
+              <a:t>,</a:t>
+            </a:r>
+            <a:endParaRPr lang="en-CA" b="0" dirty="0">
+              <a:solidFill>
+                <a:srgbClr val="D4D4D4"/>
+              </a:solidFill>
+              <a:effectLst/>
+              <a:latin typeface="Courier New" panose="02070309020205020404" pitchFamily="49" charset="0"/>
+            </a:endParaRPr>
+          </a:p>
+          <a:p>
+            <a:r>
+              <a:rPr lang="en-CA" b="0" dirty="0">
+                <a:solidFill>
+                  <a:srgbClr val="D4D4D4"/>
+                </a:solidFill>
+                <a:effectLst/>
+                <a:latin typeface="Courier New" panose="02070309020205020404" pitchFamily="49" charset="0"/>
+              </a:rPr>
+              <a:t>    </a:t>
+            </a:r>
+            <a:r>
+              <a:rPr lang="en-CA" b="0" dirty="0" err="1">
+                <a:solidFill>
+                  <a:srgbClr val="D4D4D4"/>
+                </a:solidFill>
+                <a:effectLst/>
+                <a:latin typeface="Courier New" panose="02070309020205020404" pitchFamily="49" charset="0"/>
+              </a:rPr>
+              <a:t>random_state</a:t>
+            </a:r>
+            <a:r>
+              <a:rPr lang="en-CA" b="0" dirty="0">
+                <a:solidFill>
+                  <a:srgbClr val="D4D4D4"/>
+                </a:solidFill>
+                <a:effectLst/>
+                <a:latin typeface="Courier New" panose="02070309020205020404" pitchFamily="49" charset="0"/>
+              </a:rPr>
+              <a:t> = </a:t>
+            </a:r>
+            <a:r>
+              <a:rPr lang="en-CA" b="0" dirty="0">
+                <a:solidFill>
+                  <a:srgbClr val="B5CEA8"/>
+                </a:solidFill>
+                <a:effectLst/>
+                <a:latin typeface="Courier New" panose="02070309020205020404" pitchFamily="49" charset="0"/>
+              </a:rPr>
+              <a:t>0</a:t>
+            </a:r>
+            <a:endParaRPr lang="en-CA" b="0" dirty="0">
+              <a:solidFill>
+                <a:srgbClr val="D4D4D4"/>
+              </a:solidFill>
+              <a:effectLst/>
+              <a:latin typeface="Courier New" panose="02070309020205020404" pitchFamily="49" charset="0"/>
+            </a:endParaRPr>
+          </a:p>
+          <a:p>
+            <a:r>
+              <a:rPr lang="en-CA" b="0" dirty="0">
+                <a:solidFill>
+                  <a:srgbClr val="DCDCDC"/>
+                </a:solidFill>
+                <a:effectLst/>
+                <a:latin typeface="Courier New" panose="02070309020205020404" pitchFamily="49" charset="0"/>
+              </a:rPr>
+              <a:t>)</a:t>
+            </a:r>
+          </a:p>
+          <a:p>
+            <a:br>
               <a:rPr lang="en-US" b="0" dirty="0">
                 <a:solidFill>
+                  <a:srgbClr val="D4D4D4"/>
+                </a:solidFill>
+                <a:effectLst/>
+                <a:latin typeface="Courier New" panose="02070309020205020404" pitchFamily="49" charset="0"/>
+              </a:rPr>
+            </a:br>
+            <a:r>
+              <a:rPr lang="en-US" b="0" dirty="0">
+                <a:solidFill>
                   <a:srgbClr val="6AA94F"/>
                 </a:solidFill>
                 <a:effectLst/>
                 <a:latin typeface="Courier New" panose="02070309020205020404" pitchFamily="49" charset="0"/>
               </a:rPr>
-              <a:t># Initiate the random search</a:t>
+              <a:t># Store the best selection for later</a:t>
             </a:r>
             <a:endParaRPr lang="en-US" b="0" dirty="0">
               <a:solidFill>
@@ -9053,7 +9925,7 @@
                 <a:effectLst/>
                 <a:latin typeface="Courier New" panose="02070309020205020404" pitchFamily="49" charset="0"/>
               </a:rPr>
-              <a:t>random_search</a:t>
+              <a:t>selected_params</a:t>
             </a:r>
             <a:r>
               <a:rPr lang="en-US" b="0" dirty="0">
@@ -9073,408 +9945,21 @@
                 <a:effectLst/>
                 <a:latin typeface="Courier New" panose="02070309020205020404" pitchFamily="49" charset="0"/>
               </a:rPr>
-              <a:t>RandomizedSearchCV</a:t>
+              <a:t>random_search.best_params</a:t>
             </a:r>
             <a:r>
               <a:rPr lang="en-US" b="0" dirty="0">
                 <a:solidFill>
-                  <a:srgbClr val="DCDCDC"/>
-                </a:solidFill>
-                <a:effectLst/>
-                <a:latin typeface="Courier New" panose="02070309020205020404" pitchFamily="49" charset="0"/>
-              </a:rPr>
-              <a:t>(</a:t>
-            </a:r>
-            <a:endParaRPr lang="en-US" b="0" dirty="0">
-              <a:solidFill>
-                <a:srgbClr val="D4D4D4"/>
-              </a:solidFill>
-              <a:effectLst/>
-              <a:latin typeface="Courier New" panose="02070309020205020404" pitchFamily="49" charset="0"/>
-            </a:endParaRPr>
-          </a:p>
-          <a:p>
-            <a:r>
-              <a:rPr lang="en-US" b="0" dirty="0">
-                <a:solidFill>
                   <a:srgbClr val="D4D4D4"/>
                 </a:solidFill>
                 <a:effectLst/>
                 <a:latin typeface="Courier New" panose="02070309020205020404" pitchFamily="49" charset="0"/>
               </a:rPr>
-              <a:t>    estimator = </a:t>
-            </a:r>
-            <a:r>
-              <a:rPr lang="en-US" b="0" dirty="0" err="1">
-                <a:solidFill>
-                  <a:srgbClr val="D4D4D4"/>
-                </a:solidFill>
-                <a:effectLst/>
-                <a:latin typeface="Courier New" panose="02070309020205020404" pitchFamily="49" charset="0"/>
-              </a:rPr>
-              <a:t>forest_model</a:t>
-            </a:r>
-            <a:r>
-              <a:rPr lang="en-US" b="0" dirty="0">
-                <a:solidFill>
-                  <a:srgbClr val="DCDCDC"/>
-                </a:solidFill>
-                <a:effectLst/>
-                <a:latin typeface="Courier New" panose="02070309020205020404" pitchFamily="49" charset="0"/>
-              </a:rPr>
-              <a:t>,</a:t>
-            </a:r>
-            <a:r>
-              <a:rPr lang="en-US" b="0" dirty="0">
-                <a:solidFill>
-                  <a:srgbClr val="D4D4D4"/>
-                </a:solidFill>
-                <a:effectLst/>
-                <a:latin typeface="Courier New" panose="02070309020205020404" pitchFamily="49" charset="0"/>
-              </a:rPr>
-              <a:t>      </a:t>
-            </a:r>
-          </a:p>
-          <a:p>
-            <a:r>
-              <a:rPr lang="en-US" dirty="0">
-                <a:solidFill>
-                  <a:srgbClr val="D4D4D4"/>
-                </a:solidFill>
-                <a:latin typeface="Courier New" panose="02070309020205020404" pitchFamily="49" charset="0"/>
-              </a:rPr>
-              <a:t>    </a:t>
-            </a:r>
-            <a:r>
-              <a:rPr lang="en-US" b="0" dirty="0" err="1">
-                <a:solidFill>
-                  <a:srgbClr val="D4D4D4"/>
-                </a:solidFill>
-                <a:effectLst/>
-                <a:latin typeface="Courier New" panose="02070309020205020404" pitchFamily="49" charset="0"/>
-              </a:rPr>
-              <a:t>param_distributions</a:t>
-            </a:r>
-            <a:r>
-              <a:rPr lang="en-US" b="0" dirty="0">
-                <a:solidFill>
-                  <a:srgbClr val="D4D4D4"/>
-                </a:solidFill>
-                <a:effectLst/>
-                <a:latin typeface="Courier New" panose="02070309020205020404" pitchFamily="49" charset="0"/>
-              </a:rPr>
-              <a:t> = </a:t>
-            </a:r>
-            <a:r>
-              <a:rPr lang="en-US" b="0" dirty="0" err="1">
-                <a:solidFill>
-                  <a:srgbClr val="D4D4D4"/>
-                </a:solidFill>
-                <a:effectLst/>
-                <a:latin typeface="Courier New" panose="02070309020205020404" pitchFamily="49" charset="0"/>
-              </a:rPr>
-              <a:t>param_dist</a:t>
-            </a:r>
-            <a:r>
-              <a:rPr lang="en-US" b="0" dirty="0">
-                <a:solidFill>
-                  <a:srgbClr val="DCDCDC"/>
-                </a:solidFill>
-                <a:effectLst/>
-                <a:latin typeface="Courier New" panose="02070309020205020404" pitchFamily="49" charset="0"/>
-              </a:rPr>
-              <a:t>,</a:t>
-            </a:r>
-            <a:r>
-              <a:rPr lang="en-US" b="0" dirty="0">
-                <a:solidFill>
-                  <a:srgbClr val="D4D4D4"/>
-                </a:solidFill>
-                <a:effectLst/>
-                <a:latin typeface="Courier New" panose="02070309020205020404" pitchFamily="49" charset="0"/>
-              </a:rPr>
-              <a:t>    </a:t>
-            </a:r>
-          </a:p>
-          <a:p>
-            <a:r>
-              <a:rPr lang="en-US" b="0" dirty="0">
-                <a:solidFill>
-                  <a:srgbClr val="D4D4D4"/>
-                </a:solidFill>
-                <a:effectLst/>
-                <a:latin typeface="Courier New" panose="02070309020205020404" pitchFamily="49" charset="0"/>
-              </a:rPr>
-              <a:t>    </a:t>
-            </a:r>
-            <a:r>
-              <a:rPr lang="en-US" b="0" dirty="0" err="1">
-                <a:solidFill>
-                  <a:srgbClr val="D4D4D4"/>
-                </a:solidFill>
-                <a:effectLst/>
-                <a:latin typeface="Courier New" panose="02070309020205020404" pitchFamily="49" charset="0"/>
-              </a:rPr>
-              <a:t>n_iter</a:t>
-            </a:r>
-            <a:r>
-              <a:rPr lang="en-US" b="0" dirty="0">
-                <a:solidFill>
-                  <a:srgbClr val="D4D4D4"/>
-                </a:solidFill>
-                <a:effectLst/>
-                <a:latin typeface="Courier New" panose="02070309020205020404" pitchFamily="49" charset="0"/>
-              </a:rPr>
-              <a:t> = </a:t>
-            </a:r>
-            <a:r>
-              <a:rPr lang="en-US" b="0" dirty="0">
-                <a:solidFill>
-                  <a:srgbClr val="B5CEA8"/>
-                </a:solidFill>
-                <a:effectLst/>
-                <a:latin typeface="Courier New" panose="02070309020205020404" pitchFamily="49" charset="0"/>
-              </a:rPr>
-              <a:t>15</a:t>
-            </a:r>
-            <a:r>
-              <a:rPr lang="en-US" b="0" dirty="0">
-                <a:solidFill>
-                  <a:srgbClr val="DCDCDC"/>
-                </a:solidFill>
-                <a:effectLst/>
-                <a:latin typeface="Courier New" panose="02070309020205020404" pitchFamily="49" charset="0"/>
-              </a:rPr>
-              <a:t>,</a:t>
-            </a:r>
-            <a:endParaRPr lang="en-US" b="0" dirty="0">
-              <a:solidFill>
-                <a:srgbClr val="D4D4D4"/>
-              </a:solidFill>
-              <a:effectLst/>
-              <a:latin typeface="Courier New" panose="02070309020205020404" pitchFamily="49" charset="0"/>
-            </a:endParaRPr>
-          </a:p>
-          <a:p>
-            <a:r>
-              <a:rPr lang="en-US" b="0" dirty="0">
-                <a:solidFill>
-                  <a:srgbClr val="D4D4D4"/>
-                </a:solidFill>
-                <a:effectLst/>
-                <a:latin typeface="Courier New" panose="02070309020205020404" pitchFamily="49" charset="0"/>
-              </a:rPr>
-              <a:t>    cv = </a:t>
-            </a:r>
-            <a:r>
-              <a:rPr lang="en-US" b="0" dirty="0">
-                <a:solidFill>
-                  <a:srgbClr val="B5CEA8"/>
-                </a:solidFill>
-                <a:effectLst/>
-                <a:latin typeface="Courier New" panose="02070309020205020404" pitchFamily="49" charset="0"/>
-              </a:rPr>
-              <a:t>5</a:t>
-            </a:r>
-            <a:r>
-              <a:rPr lang="en-US" b="0" dirty="0">
-                <a:solidFill>
-                  <a:srgbClr val="DCDCDC"/>
-                </a:solidFill>
-                <a:effectLst/>
-                <a:latin typeface="Courier New" panose="02070309020205020404" pitchFamily="49" charset="0"/>
-              </a:rPr>
-              <a:t>,</a:t>
-            </a:r>
-            <a:r>
-              <a:rPr lang="en-US" b="0" dirty="0">
-                <a:solidFill>
-                  <a:srgbClr val="D4D4D4"/>
-                </a:solidFill>
-                <a:effectLst/>
-                <a:latin typeface="Courier New" panose="02070309020205020404" pitchFamily="49" charset="0"/>
-              </a:rPr>
-              <a:t>  </a:t>
-            </a:r>
-            <a:r>
-              <a:rPr lang="en-US" b="0" dirty="0">
-                <a:solidFill>
-                  <a:srgbClr val="6AA94F"/>
-                </a:solidFill>
-                <a:effectLst/>
-                <a:latin typeface="Courier New" panose="02070309020205020404" pitchFamily="49" charset="0"/>
-              </a:rPr>
-              <a:t># Cross validation</a:t>
-            </a:r>
-            <a:endParaRPr lang="en-US" b="0" dirty="0">
-              <a:solidFill>
-                <a:srgbClr val="D4D4D4"/>
-              </a:solidFill>
-              <a:effectLst/>
-              <a:latin typeface="Courier New" panose="02070309020205020404" pitchFamily="49" charset="0"/>
-            </a:endParaRPr>
-          </a:p>
-          <a:p>
-            <a:r>
-              <a:rPr lang="en-US" b="0" dirty="0">
-                <a:solidFill>
-                  <a:srgbClr val="D4D4D4"/>
-                </a:solidFill>
-                <a:effectLst/>
-                <a:latin typeface="Courier New" panose="02070309020205020404" pitchFamily="49" charset="0"/>
-              </a:rPr>
-              <a:t>    scoring = </a:t>
-            </a:r>
-            <a:r>
-              <a:rPr lang="en-US" b="0" dirty="0">
-                <a:solidFill>
-                  <a:srgbClr val="CE9178"/>
-                </a:solidFill>
-                <a:effectLst/>
-                <a:latin typeface="Courier New" panose="02070309020205020404" pitchFamily="49" charset="0"/>
-              </a:rPr>
-              <a:t>'</a:t>
-            </a:r>
-            <a:r>
-              <a:rPr lang="en-US" b="0" dirty="0" err="1">
-                <a:solidFill>
-                  <a:srgbClr val="CE9178"/>
-                </a:solidFill>
-                <a:effectLst/>
-                <a:latin typeface="Courier New" panose="02070309020205020404" pitchFamily="49" charset="0"/>
-              </a:rPr>
-              <a:t>mean_squared_error</a:t>
-            </a:r>
-            <a:r>
-              <a:rPr lang="en-US" b="0" dirty="0">
-                <a:solidFill>
-                  <a:srgbClr val="CE9178"/>
-                </a:solidFill>
-                <a:effectLst/>
-                <a:latin typeface="Courier New" panose="02070309020205020404" pitchFamily="49" charset="0"/>
-              </a:rPr>
-              <a:t>’</a:t>
-            </a:r>
-            <a:r>
-              <a:rPr lang="en-US" b="0" dirty="0">
-                <a:solidFill>
-                  <a:srgbClr val="DCDCDC"/>
-                </a:solidFill>
-                <a:effectLst/>
-                <a:latin typeface="Courier New" panose="02070309020205020404" pitchFamily="49" charset="0"/>
-              </a:rPr>
-              <a:t>,</a:t>
-            </a:r>
-            <a:r>
-              <a:rPr lang="en-US" b="0" dirty="0">
-                <a:solidFill>
-                  <a:srgbClr val="D4D4D4"/>
-                </a:solidFill>
-                <a:effectLst/>
-                <a:latin typeface="Courier New" panose="02070309020205020404" pitchFamily="49" charset="0"/>
-              </a:rPr>
-              <a:t>  </a:t>
-            </a:r>
-          </a:p>
-          <a:p>
-            <a:r>
-              <a:rPr lang="en-US" dirty="0">
-                <a:solidFill>
-                  <a:srgbClr val="D4D4D4"/>
-                </a:solidFill>
-                <a:latin typeface="Courier New" panose="02070309020205020404" pitchFamily="49" charset="0"/>
-              </a:rPr>
-              <a:t>    </a:t>
-            </a:r>
-            <a:r>
-              <a:rPr lang="en-US" b="0" dirty="0">
-                <a:solidFill>
-                  <a:srgbClr val="6AA94F"/>
-                </a:solidFill>
-                <a:effectLst/>
-                <a:latin typeface="Courier New" panose="02070309020205020404" pitchFamily="49" charset="0"/>
-              </a:rPr>
-              <a:t># score output for performance</a:t>
-            </a:r>
-            <a:endParaRPr lang="en-US" b="0" dirty="0">
-              <a:solidFill>
-                <a:srgbClr val="D4D4D4"/>
-              </a:solidFill>
-              <a:effectLst/>
-              <a:latin typeface="Courier New" panose="02070309020205020404" pitchFamily="49" charset="0"/>
-            </a:endParaRPr>
-          </a:p>
-          <a:p>
-            <a:r>
-              <a:rPr lang="en-US" b="0" dirty="0">
-                <a:solidFill>
-                  <a:srgbClr val="D4D4D4"/>
-                </a:solidFill>
-                <a:effectLst/>
-                <a:latin typeface="Courier New" panose="02070309020205020404" pitchFamily="49" charset="0"/>
-              </a:rPr>
-              <a:t>    </a:t>
-            </a:r>
-            <a:r>
-              <a:rPr lang="en-US" b="0" dirty="0" err="1">
-                <a:solidFill>
-                  <a:srgbClr val="D4D4D4"/>
-                </a:solidFill>
-                <a:effectLst/>
-                <a:latin typeface="Courier New" panose="02070309020205020404" pitchFamily="49" charset="0"/>
-              </a:rPr>
-              <a:t>random_state</a:t>
-            </a:r>
-            <a:r>
-              <a:rPr lang="en-US" b="0" dirty="0">
-                <a:solidFill>
-                  <a:srgbClr val="D4D4D4"/>
-                </a:solidFill>
-                <a:effectLst/>
-                <a:latin typeface="Courier New" panose="02070309020205020404" pitchFamily="49" charset="0"/>
-              </a:rPr>
-              <a:t> = </a:t>
-            </a:r>
-            <a:r>
-              <a:rPr lang="en-US" b="0" dirty="0">
-                <a:solidFill>
-                  <a:srgbClr val="B5CEA8"/>
-                </a:solidFill>
-                <a:effectLst/>
-                <a:latin typeface="Courier New" panose="02070309020205020404" pitchFamily="49" charset="0"/>
-              </a:rPr>
-              <a:t>0</a:t>
-            </a:r>
-            <a:endParaRPr lang="en-US" b="0" dirty="0">
-              <a:solidFill>
-                <a:srgbClr val="D4D4D4"/>
-              </a:solidFill>
-              <a:effectLst/>
-              <a:latin typeface="Courier New" panose="02070309020205020404" pitchFamily="49" charset="0"/>
-            </a:endParaRPr>
-          </a:p>
-          <a:p>
-            <a:r>
-              <a:rPr lang="en-US" b="0" dirty="0">
-                <a:solidFill>
-                  <a:srgbClr val="D4D4D4"/>
-                </a:solidFill>
-                <a:effectLst/>
-                <a:latin typeface="Courier New" panose="02070309020205020404" pitchFamily="49" charset="0"/>
-              </a:rPr>
-              <a:t>    </a:t>
-            </a:r>
-            <a:r>
-              <a:rPr lang="en-US" b="0" dirty="0">
-                <a:solidFill>
-                  <a:srgbClr val="DCDCDC"/>
-                </a:solidFill>
-                <a:effectLst/>
-                <a:latin typeface="Courier New" panose="02070309020205020404" pitchFamily="49" charset="0"/>
-              </a:rPr>
-              <a:t>)</a:t>
-            </a:r>
-            <a:endParaRPr lang="en-US" b="0" dirty="0">
+              <a:t>_</a:t>
+            </a:r>
+          </a:p>
+          <a:p>
+            <a:endParaRPr lang="en-CA" b="0" dirty="0">
               <a:solidFill>
                 <a:srgbClr val="D4D4D4"/>
               </a:solidFill>
@@ -9556,7 +10041,7 @@
         </p:nvSpPr>
         <p:spPr bwMode="auto">
           <a:xfrm>
-            <a:off x="431544" y="4400132"/>
+            <a:off x="204216" y="4400193"/>
             <a:ext cx="4745210" cy="984885"/>
           </a:xfrm>
           <a:prstGeom prst="rect">
@@ -9689,7 +10174,29 @@
                 <a:effectLst/>
                 <a:latin typeface="Arial Unicode MS"/>
               </a:rPr>
-              <a:t>': 200}</a:t>
+              <a:t>’: </a:t>
+            </a:r>
+            <a:r>
+              <a:rPr lang="en-US" altLang="en-US" sz="1600" dirty="0">
+                <a:solidFill>
+                  <a:schemeClr val="bg1"/>
+                </a:solidFill>
+                <a:latin typeface="Arial Unicode MS"/>
+              </a:rPr>
+              <a:t>350</a:t>
+            </a:r>
+            <a:r>
+              <a:rPr kumimoji="0" lang="en-US" altLang="en-US" sz="1600" b="0" i="0" u="none" strike="noStrike" cap="none" normalizeH="0" baseline="0" dirty="0">
+                <a:ln>
+                  <a:noFill/>
+                </a:ln>
+                <a:solidFill>
+                  <a:schemeClr val="bg1"/>
+                </a:solidFill>
+                <a:effectLst/>
+                <a:latin typeface="Arial Unicode MS"/>
+              </a:rPr>
+              <a:t>}</a:t>
             </a:r>
             <a:r>
               <a:rPr kumimoji="0" lang="en-US" altLang="en-US" sz="1600" b="0" i="0" u="none" strike="noStrike" cap="none" normalizeH="0" baseline="0" dirty="0">
@@ -9802,7 +10309,7 @@
         </p:nvSpPr>
         <p:spPr bwMode="auto">
           <a:xfrm>
-            <a:off x="431544" y="5539089"/>
+            <a:off x="155448" y="5329072"/>
             <a:ext cx="5429563" cy="338554"/>
           </a:xfrm>
           <a:prstGeom prst="rect">

</xml_diff>

<commit_message>
-Added a reference to sk.learn documentation
P@

Signed-off-by: P@ <patmaynard452@gmail.com>
</commit_message>
<xml_diff>
--- a/Presentation/ALI_Raymond_MAYNARD_Patrick_GENG4500_Final_presentation_2024.pptx
+++ b/Presentation/ALI_Raymond_MAYNARD_Patrick_GENG4500_Final_presentation_2024.pptx
@@ -206,7 +206,7 @@
           <a:p>
             <a:fld id="{7E5E2DB3-6FEF-4CE5-A6A7-DA370F2E2760}" type="datetimeFigureOut">
               <a:rPr lang="en-CA" smtClean="0"/>
-              <a:t>2024-03-17</a:t>
+              <a:t>2024-03-21</a:t>
             </a:fld>
             <a:endParaRPr lang="en-CA"/>
           </a:p>
@@ -11715,6 +11715,45 @@
                 </a:solidFill>
               </a:rPr>
               <a:t> - Non-stop Forum Searching.</a:t>
+            </a:r>
+          </a:p>
+          <a:p>
+            <a:pPr marL="457200" indent="-457200">
+              <a:buFont typeface="+mj-lt"/>
+              <a:buAutoNum type="arabicPeriod"/>
+            </a:pPr>
+            <a:r>
+              <a:rPr lang="en-US" sz="2000" dirty="0">
+                <a:solidFill>
+                  <a:schemeClr val="bg1"/>
+                </a:solidFill>
+                <a:hlinkClick r:id="rId5"/>
+              </a:rPr>
+              <a:t>https://scikit-learn.org/stable/user_guide.html</a:t>
+            </a:r>
+            <a:r>
+              <a:rPr lang="en-US" sz="2000" dirty="0">
+                <a:solidFill>
+                  <a:schemeClr val="bg1"/>
+                </a:solidFill>
+              </a:rPr>
+              <a:t> - </a:t>
+            </a:r>
+            <a:r>
+              <a:rPr lang="en-US" sz="2000" dirty="0" err="1">
+                <a:solidFill>
+                  <a:schemeClr val="bg1"/>
+                </a:solidFill>
+              </a:rPr>
+              <a:t>Sk.Learn</a:t>
+            </a:r>
+            <a:r>
+              <a:rPr lang="en-US" sz="2000" dirty="0">
+                <a:solidFill>
+                  <a:schemeClr val="bg1"/>
+                </a:solidFill>
+              </a:rPr>
+              <a:t> Documentation.</a:t>
             </a:r>
           </a:p>
           <a:p>

</xml_diff>

<commit_message>
-Updated presentation after failed attempt to predict future feature data
P@

Signed-off-by: P@ <patmaynard452@gmail.com>
</commit_message>
<xml_diff>
--- a/Presentation/ALI_Raymond_MAYNARD_Patrick_GENG4500_Final_presentation_2024.pptx
+++ b/Presentation/ALI_Raymond_MAYNARD_Patrick_GENG4500_Final_presentation_2024.pptx
@@ -5,7 +5,7 @@
     <p:sldMasterId id="2147483648" r:id="rId1"/>
   </p:sldMasterIdLst>
   <p:notesMasterIdLst>
-    <p:notesMasterId r:id="rId12"/>
+    <p:notesMasterId r:id="rId13"/>
   </p:notesMasterIdLst>
   <p:sldIdLst>
     <p:sldId id="256" r:id="rId2"/>
@@ -16,8 +16,9 @@
     <p:sldId id="271" r:id="rId7"/>
     <p:sldId id="275" r:id="rId8"/>
     <p:sldId id="274" r:id="rId9"/>
-    <p:sldId id="270" r:id="rId10"/>
-    <p:sldId id="267" r:id="rId11"/>
+    <p:sldId id="276" r:id="rId10"/>
+    <p:sldId id="270" r:id="rId11"/>
+    <p:sldId id="267" r:id="rId12"/>
   </p:sldIdLst>
   <p:sldSz cx="12192000" cy="6858000"/>
   <p:notesSz cx="6858000" cy="9144000"/>
@@ -206,7 +207,7 @@
           <a:p>
             <a:fld id="{7E5E2DB3-6FEF-4CE5-A6A7-DA370F2E2760}" type="datetimeFigureOut">
               <a:rPr lang="en-CA" smtClean="0"/>
-              <a:t>2024-03-21</a:t>
+              <a:t>2024-03-22</a:t>
             </a:fld>
             <a:endParaRPr lang="en-CA"/>
           </a:p>
@@ -4072,6 +4073,721 @@
       </p:grpSpPr>
       <p:sp>
         <p:nvSpPr>
+          <p:cNvPr id="11" name="Rectangle 10">
+            <a:extLst>
+              <a:ext uri="{FF2B5EF4-FFF2-40B4-BE49-F238E27FC236}">
+                <a16:creationId xmlns:a16="http://schemas.microsoft.com/office/drawing/2014/main" id="{A7AE9375-4664-4DB2-922D-2782A6E439AC}"/>
+              </a:ext>
+              <a:ext uri="{C183D7F6-B498-43B3-948B-1728B52AA6E4}">
+                <adec:decorative xmlns:adec="http://schemas.microsoft.com/office/drawing/2017/decorative" val="1"/>
+              </a:ext>
+            </a:extLst>
+          </p:cNvPr>
+          <p:cNvSpPr>
+            <a:spLocks noGrp="1" noRot="1" noChangeAspect="1" noMove="1" noResize="1" noEditPoints="1" noAdjustHandles="1" noChangeArrowheads="1" noChangeShapeType="1" noTextEdit="1"/>
+          </p:cNvSpPr>
+          <p:nvPr>
+            <p:extLst>
+              <p:ext uri="{386F3935-93C4-4BCD-93E2-E3B085C9AB24}">
+                <p16:designElem xmlns:p16="http://schemas.microsoft.com/office/powerpoint/2015/main" val="1"/>
+              </p:ext>
+            </p:extLst>
+          </p:nvPr>
+        </p:nvSpPr>
+        <p:spPr>
+          <a:xfrm>
+            <a:off x="0" y="0"/>
+            <a:ext cx="12192000" cy="6858000"/>
+          </a:xfrm>
+          <a:prstGeom prst="rect">
+            <a:avLst/>
+          </a:prstGeom>
+          <a:solidFill>
+            <a:schemeClr val="tx1">
+              <a:lumMod val="95000"/>
+              <a:lumOff val="5000"/>
+            </a:schemeClr>
+          </a:solidFill>
+          <a:ln>
+            <a:noFill/>
+          </a:ln>
+        </p:spPr>
+        <p:style>
+          <a:lnRef idx="2">
+            <a:schemeClr val="accent1">
+              <a:shade val="50000"/>
+            </a:schemeClr>
+          </a:lnRef>
+          <a:fillRef idx="1">
+            <a:schemeClr val="accent1"/>
+          </a:fillRef>
+          <a:effectRef idx="0">
+            <a:schemeClr val="accent1"/>
+          </a:effectRef>
+          <a:fontRef idx="minor">
+            <a:schemeClr val="lt1"/>
+          </a:fontRef>
+        </p:style>
+        <p:txBody>
+          <a:bodyPr rtlCol="0" anchor="ctr"/>
+          <a:lstStyle/>
+          <a:p>
+            <a:pPr algn="ctr"/>
+            <a:endParaRPr lang="en-US" dirty="0">
+              <a:solidFill>
+                <a:schemeClr val="tx1"/>
+              </a:solidFill>
+            </a:endParaRPr>
+          </a:p>
+        </p:txBody>
+      </p:sp>
+      <p:sp>
+        <p:nvSpPr>
+          <p:cNvPr id="2" name="Title 1">
+            <a:extLst>
+              <a:ext uri="{FF2B5EF4-FFF2-40B4-BE49-F238E27FC236}">
+                <a16:creationId xmlns:a16="http://schemas.microsoft.com/office/drawing/2014/main" id="{1BDDE9E2-35D5-82E3-D67C-48B1694FE836}"/>
+              </a:ext>
+            </a:extLst>
+          </p:cNvPr>
+          <p:cNvSpPr>
+            <a:spLocks noGrp="1"/>
+          </p:cNvSpPr>
+          <p:nvPr>
+            <p:ph type="title"/>
+          </p:nvPr>
+        </p:nvSpPr>
+        <p:spPr>
+          <a:xfrm>
+            <a:off x="838200" y="669925"/>
+            <a:ext cx="4508946" cy="1325563"/>
+          </a:xfrm>
+        </p:spPr>
+        <p:txBody>
+          <a:bodyPr anchor="b">
+            <a:normAutofit/>
+          </a:bodyPr>
+          <a:lstStyle/>
+          <a:p>
+            <a:pPr algn="r"/>
+            <a:r>
+              <a:rPr lang="en-US">
+                <a:solidFill>
+                  <a:schemeClr val="bg1"/>
+                </a:solidFill>
+              </a:rPr>
+              <a:t>References</a:t>
+            </a:r>
+            <a:endParaRPr lang="en-CA">
+              <a:solidFill>
+                <a:schemeClr val="bg1"/>
+              </a:solidFill>
+            </a:endParaRPr>
+          </a:p>
+        </p:txBody>
+      </p:sp>
+      <p:cxnSp>
+        <p:nvCxnSpPr>
+          <p:cNvPr id="13" name="Straight Connector 12">
+            <a:extLst>
+              <a:ext uri="{FF2B5EF4-FFF2-40B4-BE49-F238E27FC236}">
+                <a16:creationId xmlns:a16="http://schemas.microsoft.com/office/drawing/2014/main" id="{EE504C98-6397-41C1-A8D8-2D9C4ED307E0}"/>
+              </a:ext>
+              <a:ext uri="{C183D7F6-B498-43B3-948B-1728B52AA6E4}">
+                <adec:decorative xmlns:adec="http://schemas.microsoft.com/office/drawing/2017/decorative" val="1"/>
+              </a:ext>
+            </a:extLst>
+          </p:cNvPr>
+          <p:cNvCxnSpPr>
+            <a:cxnSpLocks noGrp="1" noRot="1" noChangeAspect="1" noMove="1" noResize="1" noEditPoints="1" noAdjustHandles="1" noChangeArrowheads="1" noChangeShapeType="1"/>
+          </p:cNvCxnSpPr>
+          <p:nvPr>
+            <p:extLst>
+              <p:ext uri="{386F3935-93C4-4BCD-93E2-E3B085C9AB24}">
+                <p16:designElem xmlns:p16="http://schemas.microsoft.com/office/powerpoint/2015/main" val="1"/>
+              </p:ext>
+            </p:extLst>
+          </p:nvPr>
+        </p:nvCxnSpPr>
+        <p:spPr>
+          <a:xfrm flipH="1">
+            <a:off x="126210" y="2026340"/>
+            <a:ext cx="5220936" cy="0"/>
+          </a:xfrm>
+          <a:prstGeom prst="line">
+            <a:avLst/>
+          </a:prstGeom>
+          <a:ln w="12700">
+            <a:solidFill>
+              <a:schemeClr val="accent2"/>
+            </a:solidFill>
+          </a:ln>
+        </p:spPr>
+        <p:style>
+          <a:lnRef idx="1">
+            <a:schemeClr val="accent1"/>
+          </a:lnRef>
+          <a:fillRef idx="0">
+            <a:schemeClr val="accent1"/>
+          </a:fillRef>
+          <a:effectRef idx="0">
+            <a:schemeClr val="accent1"/>
+          </a:effectRef>
+          <a:fontRef idx="minor">
+            <a:schemeClr val="tx1"/>
+          </a:fontRef>
+        </p:style>
+      </p:cxnSp>
+      <p:sp>
+        <p:nvSpPr>
+          <p:cNvPr id="3" name="Content Placeholder 2">
+            <a:extLst>
+              <a:ext uri="{FF2B5EF4-FFF2-40B4-BE49-F238E27FC236}">
+                <a16:creationId xmlns:a16="http://schemas.microsoft.com/office/drawing/2014/main" id="{299635AB-7FEE-F05E-C2FC-12AC1BEB369E}"/>
+              </a:ext>
+            </a:extLst>
+          </p:cNvPr>
+          <p:cNvSpPr>
+            <a:spLocks noGrp="1"/>
+          </p:cNvSpPr>
+          <p:nvPr>
+            <p:ph idx="1"/>
+          </p:nvPr>
+        </p:nvSpPr>
+        <p:spPr>
+          <a:xfrm>
+            <a:off x="4038600" y="2199130"/>
+            <a:ext cx="7862451" cy="4099623"/>
+          </a:xfrm>
+        </p:spPr>
+        <p:txBody>
+          <a:bodyPr>
+            <a:normAutofit/>
+          </a:bodyPr>
+          <a:lstStyle/>
+          <a:p>
+            <a:pPr marL="457200" indent="-457200">
+              <a:buFont typeface="+mj-lt"/>
+              <a:buAutoNum type="arabicPeriod"/>
+            </a:pPr>
+            <a:r>
+              <a:rPr lang="en-US" sz="2000" dirty="0" err="1">
+                <a:solidFill>
+                  <a:schemeClr val="bg1"/>
+                </a:solidFill>
+              </a:rPr>
+              <a:t>Econoscent</a:t>
+            </a:r>
+            <a:r>
+              <a:rPr lang="en-US" sz="2000" dirty="0">
+                <a:solidFill>
+                  <a:schemeClr val="bg1"/>
+                </a:solidFill>
+              </a:rPr>
+              <a:t> – Aug 30, 2020 – </a:t>
+            </a:r>
+            <a:r>
+              <a:rPr lang="en-US" sz="2000" i="1" dirty="0">
+                <a:solidFill>
+                  <a:schemeClr val="bg1"/>
+                </a:solidFill>
+              </a:rPr>
+              <a:t>YouTube</a:t>
+            </a:r>
+            <a:r>
+              <a:rPr lang="en-US" sz="2000" dirty="0">
+                <a:solidFill>
+                  <a:schemeClr val="bg1"/>
+                </a:solidFill>
+              </a:rPr>
+              <a:t> – Visual Guide to Random Forest</a:t>
+            </a:r>
+          </a:p>
+          <a:p>
+            <a:pPr lvl="1"/>
+            <a:r>
+              <a:rPr lang="en-CA" sz="1600" dirty="0">
+                <a:solidFill>
+                  <a:schemeClr val="bg1"/>
+                </a:solidFill>
+                <a:hlinkClick r:id="rId2"/>
+              </a:rPr>
+              <a:t>https://www.youtube.com/watch?v=cIbj0WuK41w&amp;ab_channel=Econoscent</a:t>
+            </a:r>
+            <a:endParaRPr lang="en-CA" sz="1600" dirty="0">
+              <a:solidFill>
+                <a:schemeClr val="bg1"/>
+              </a:solidFill>
+            </a:endParaRPr>
+          </a:p>
+          <a:p>
+            <a:pPr marL="342900" indent="-342900">
+              <a:buFont typeface="+mj-lt"/>
+              <a:buAutoNum type="arabicPeriod"/>
+            </a:pPr>
+            <a:r>
+              <a:rPr lang="en-US" sz="1400" dirty="0">
+                <a:solidFill>
+                  <a:schemeClr val="bg1"/>
+                </a:solidFill>
+                <a:effectLst/>
+              </a:rPr>
+              <a:t>Canadian Real Estate Association. (2024) </a:t>
+            </a:r>
+            <a:r>
+              <a:rPr lang="en-US" sz="1400" i="1" dirty="0">
+                <a:solidFill>
+                  <a:schemeClr val="bg1"/>
+                </a:solidFill>
+                <a:effectLst/>
+              </a:rPr>
+              <a:t>National statistics</a:t>
+            </a:r>
+            <a:r>
+              <a:rPr lang="en-US" sz="1400" dirty="0">
+                <a:solidFill>
+                  <a:schemeClr val="bg1"/>
+                </a:solidFill>
+                <a:effectLst/>
+              </a:rPr>
+              <a:t>, </a:t>
+            </a:r>
+            <a:r>
+              <a:rPr lang="en-US" sz="1400" i="1" dirty="0">
+                <a:solidFill>
+                  <a:schemeClr val="bg1"/>
+                </a:solidFill>
+                <a:effectLst/>
+              </a:rPr>
+              <a:t>February 14 2024 News Release | CREA Statistics</a:t>
+            </a:r>
+            <a:r>
+              <a:rPr lang="en-US" sz="1400" dirty="0">
+                <a:solidFill>
+                  <a:schemeClr val="bg1"/>
+                </a:solidFill>
+                <a:effectLst/>
+              </a:rPr>
+              <a:t>. Available at: https://creastats.crea.ca/en-CA/ (Accessed: 11 March 2024). </a:t>
+            </a:r>
+          </a:p>
+          <a:p>
+            <a:pPr lvl="1"/>
+            <a:r>
+              <a:rPr lang="en-US" sz="1600" dirty="0">
+                <a:solidFill>
+                  <a:schemeClr val="bg1"/>
+                </a:solidFill>
+                <a:effectLst/>
+                <a:hlinkClick r:id="rId3"/>
+              </a:rPr>
+              <a:t>https://creastats.crea.ca/en-CA/</a:t>
+            </a:r>
+            <a:endParaRPr lang="en-US" sz="1600" dirty="0">
+              <a:solidFill>
+                <a:schemeClr val="bg1"/>
+              </a:solidFill>
+              <a:effectLst/>
+            </a:endParaRPr>
+          </a:p>
+          <a:p>
+            <a:pPr marL="457200" indent="-457200">
+              <a:buFont typeface="+mj-lt"/>
+              <a:buAutoNum type="arabicPeriod"/>
+            </a:pPr>
+            <a:r>
+              <a:rPr lang="en-US" sz="2000" dirty="0">
+                <a:solidFill>
+                  <a:schemeClr val="bg1"/>
+                </a:solidFill>
+                <a:hlinkClick r:id="rId4"/>
+              </a:rPr>
+              <a:t>https://stackoverflow.com/</a:t>
+            </a:r>
+            <a:r>
+              <a:rPr lang="en-US" sz="2000" dirty="0">
+                <a:solidFill>
+                  <a:schemeClr val="bg1"/>
+                </a:solidFill>
+              </a:rPr>
+              <a:t> - Non-stop Forum Searching.</a:t>
+            </a:r>
+          </a:p>
+          <a:p>
+            <a:pPr marL="457200" indent="-457200">
+              <a:buFont typeface="+mj-lt"/>
+              <a:buAutoNum type="arabicPeriod"/>
+            </a:pPr>
+            <a:r>
+              <a:rPr lang="en-US" sz="2000" dirty="0">
+                <a:solidFill>
+                  <a:schemeClr val="bg1"/>
+                </a:solidFill>
+                <a:hlinkClick r:id="rId5"/>
+              </a:rPr>
+              <a:t>https://scikit-learn.org/stable/user_guide.html</a:t>
+            </a:r>
+            <a:r>
+              <a:rPr lang="en-US" sz="2000" dirty="0">
+                <a:solidFill>
+                  <a:schemeClr val="bg1"/>
+                </a:solidFill>
+              </a:rPr>
+              <a:t> - </a:t>
+            </a:r>
+            <a:r>
+              <a:rPr lang="en-US" sz="2000" dirty="0" err="1">
+                <a:solidFill>
+                  <a:schemeClr val="bg1"/>
+                </a:solidFill>
+              </a:rPr>
+              <a:t>SkLearn</a:t>
+            </a:r>
+            <a:r>
+              <a:rPr lang="en-US" sz="2000" dirty="0">
+                <a:solidFill>
+                  <a:schemeClr val="bg1"/>
+                </a:solidFill>
+              </a:rPr>
+              <a:t> Documentation.</a:t>
+            </a:r>
+          </a:p>
+          <a:p>
+            <a:pPr marL="457200" indent="-457200">
+              <a:buFont typeface="+mj-lt"/>
+              <a:buAutoNum type="arabicPeriod"/>
+            </a:pPr>
+            <a:r>
+              <a:rPr lang="en-US" sz="2000" dirty="0">
+                <a:solidFill>
+                  <a:schemeClr val="bg1"/>
+                </a:solidFill>
+                <a:hlinkClick r:id="rId6"/>
+              </a:rPr>
+              <a:t>https://www.sktime.net/en/stable/</a:t>
+            </a:r>
+            <a:r>
+              <a:rPr lang="en-US" sz="2000" dirty="0">
+                <a:solidFill>
+                  <a:schemeClr val="bg1"/>
+                </a:solidFill>
+              </a:rPr>
+              <a:t> - </a:t>
+            </a:r>
+            <a:r>
+              <a:rPr lang="en-US" sz="2000" dirty="0" err="1">
+                <a:solidFill>
+                  <a:schemeClr val="bg1"/>
+                </a:solidFill>
+              </a:rPr>
+              <a:t>SkTime</a:t>
+            </a:r>
+            <a:r>
+              <a:rPr lang="en-US" sz="2000" dirty="0">
+                <a:solidFill>
+                  <a:schemeClr val="bg1"/>
+                </a:solidFill>
+              </a:rPr>
+              <a:t> Documentation.</a:t>
+            </a:r>
+          </a:p>
+          <a:p>
+            <a:endParaRPr lang="en-US" sz="2000" dirty="0">
+              <a:solidFill>
+                <a:schemeClr val="bg1"/>
+              </a:solidFill>
+            </a:endParaRPr>
+          </a:p>
+          <a:p>
+            <a:pPr lvl="1"/>
+            <a:endParaRPr lang="en-US" sz="1000" dirty="0">
+              <a:solidFill>
+                <a:schemeClr val="bg1"/>
+              </a:solidFill>
+              <a:effectLst/>
+            </a:endParaRPr>
+          </a:p>
+          <a:p>
+            <a:endParaRPr lang="en-US" sz="2000" dirty="0">
+              <a:solidFill>
+                <a:schemeClr val="bg1"/>
+              </a:solidFill>
+            </a:endParaRPr>
+          </a:p>
+          <a:p>
+            <a:endParaRPr lang="en-CA" sz="2000" dirty="0">
+              <a:solidFill>
+                <a:schemeClr val="bg1"/>
+              </a:solidFill>
+            </a:endParaRPr>
+          </a:p>
+        </p:txBody>
+      </p:sp>
+      <p:sp>
+        <p:nvSpPr>
+          <p:cNvPr id="15" name="Rectangle 14">
+            <a:extLst>
+              <a:ext uri="{FF2B5EF4-FFF2-40B4-BE49-F238E27FC236}">
+                <a16:creationId xmlns:a16="http://schemas.microsoft.com/office/drawing/2014/main" id="{9DD005C1-8C51-42D6-9BEE-B9B83849743D}"/>
+              </a:ext>
+              <a:ext uri="{C183D7F6-B498-43B3-948B-1728B52AA6E4}">
+                <adec:decorative xmlns:adec="http://schemas.microsoft.com/office/drawing/2017/decorative" val="1"/>
+              </a:ext>
+            </a:extLst>
+          </p:cNvPr>
+          <p:cNvSpPr>
+            <a:spLocks noGrp="1" noRot="1" noChangeAspect="1" noMove="1" noResize="1" noEditPoints="1" noAdjustHandles="1" noChangeArrowheads="1" noChangeShapeType="1" noTextEdit="1"/>
+          </p:cNvSpPr>
+          <p:nvPr>
+            <p:extLst>
+              <p:ext uri="{386F3935-93C4-4BCD-93E2-E3B085C9AB24}">
+                <p16:designElem xmlns:p16="http://schemas.microsoft.com/office/powerpoint/2015/main" val="1"/>
+              </p:ext>
+            </p:extLst>
+          </p:nvPr>
+        </p:nvSpPr>
+        <p:spPr>
+          <a:xfrm>
+            <a:off x="126206" y="115193"/>
+            <a:ext cx="11939588" cy="6627614"/>
+          </a:xfrm>
+          <a:prstGeom prst="rect">
+            <a:avLst/>
+          </a:prstGeom>
+          <a:noFill/>
+          <a:ln w="12700">
+            <a:solidFill>
+              <a:schemeClr val="accent2"/>
+            </a:solidFill>
+          </a:ln>
+        </p:spPr>
+        <p:style>
+          <a:lnRef idx="2">
+            <a:schemeClr val="accent1">
+              <a:shade val="50000"/>
+            </a:schemeClr>
+          </a:lnRef>
+          <a:fillRef idx="1">
+            <a:schemeClr val="accent1"/>
+          </a:fillRef>
+          <a:effectRef idx="0">
+            <a:schemeClr val="accent1"/>
+          </a:effectRef>
+          <a:fontRef idx="minor">
+            <a:schemeClr val="lt1"/>
+          </a:fontRef>
+        </p:style>
+        <p:txBody>
+          <a:bodyPr rtlCol="0" anchor="ctr"/>
+          <a:lstStyle/>
+          <a:p>
+            <a:pPr algn="ctr"/>
+            <a:endParaRPr lang="en-US"/>
+          </a:p>
+        </p:txBody>
+      </p:sp>
+      <p:sp>
+        <p:nvSpPr>
+          <p:cNvPr id="4" name="Date Placeholder 3">
+            <a:extLst>
+              <a:ext uri="{FF2B5EF4-FFF2-40B4-BE49-F238E27FC236}">
+                <a16:creationId xmlns:a16="http://schemas.microsoft.com/office/drawing/2014/main" id="{E262571C-DFA6-7E05-20AD-B233CF1FC388}"/>
+              </a:ext>
+            </a:extLst>
+          </p:cNvPr>
+          <p:cNvSpPr>
+            <a:spLocks noGrp="1"/>
+          </p:cNvSpPr>
+          <p:nvPr>
+            <p:ph type="dt" sz="half" idx="10"/>
+          </p:nvPr>
+        </p:nvSpPr>
+        <p:spPr>
+          <a:xfrm>
+            <a:off x="838200" y="6356350"/>
+            <a:ext cx="2743200" cy="365125"/>
+          </a:xfrm>
+        </p:spPr>
+        <p:txBody>
+          <a:bodyPr>
+            <a:normAutofit/>
+          </a:bodyPr>
+          <a:lstStyle/>
+          <a:p>
+            <a:pPr>
+              <a:spcAft>
+                <a:spcPts val="600"/>
+              </a:spcAft>
+            </a:pPr>
+            <a:fld id="{DD303E3B-074C-440F-86D1-3BB7E04505DE}" type="datetimeyyyy">
+              <a:rPr lang="en-CA">
+                <a:solidFill>
+                  <a:schemeClr val="bg1">
+                    <a:lumMod val="50000"/>
+                  </a:schemeClr>
+                </a:solidFill>
+              </a:rPr>
+              <a:pPr>
+                <a:spcAft>
+                  <a:spcPts val="600"/>
+                </a:spcAft>
+              </a:pPr>
+              <a:t>2024</a:t>
+            </a:fld>
+            <a:endParaRPr lang="en-CA">
+              <a:solidFill>
+                <a:schemeClr val="bg1">
+                  <a:lumMod val="50000"/>
+                </a:schemeClr>
+              </a:solidFill>
+            </a:endParaRPr>
+          </a:p>
+        </p:txBody>
+      </p:sp>
+      <p:sp>
+        <p:nvSpPr>
+          <p:cNvPr id="5" name="Footer Placeholder 4">
+            <a:extLst>
+              <a:ext uri="{FF2B5EF4-FFF2-40B4-BE49-F238E27FC236}">
+                <a16:creationId xmlns:a16="http://schemas.microsoft.com/office/drawing/2014/main" id="{42349A59-061C-C214-BB5B-8E570A359C17}"/>
+              </a:ext>
+            </a:extLst>
+          </p:cNvPr>
+          <p:cNvSpPr>
+            <a:spLocks noGrp="1"/>
+          </p:cNvSpPr>
+          <p:nvPr>
+            <p:ph type="ftr" sz="quarter" idx="11"/>
+          </p:nvPr>
+        </p:nvSpPr>
+        <p:spPr>
+          <a:xfrm>
+            <a:off x="4038600" y="6356350"/>
+            <a:ext cx="4114800" cy="365125"/>
+          </a:xfrm>
+        </p:spPr>
+        <p:txBody>
+          <a:bodyPr>
+            <a:normAutofit/>
+          </a:bodyPr>
+          <a:lstStyle/>
+          <a:p>
+            <a:pPr>
+              <a:spcAft>
+                <a:spcPts val="600"/>
+              </a:spcAft>
+            </a:pPr>
+            <a:r>
+              <a:rPr lang="en-CA">
+                <a:solidFill>
+                  <a:schemeClr val="bg1">
+                    <a:lumMod val="50000"/>
+                  </a:schemeClr>
+                </a:solidFill>
+              </a:rPr>
+              <a:t>GENG4500-60</a:t>
+            </a:r>
+          </a:p>
+        </p:txBody>
+      </p:sp>
+      <p:sp>
+        <p:nvSpPr>
+          <p:cNvPr id="6" name="Slide Number Placeholder 5">
+            <a:extLst>
+              <a:ext uri="{FF2B5EF4-FFF2-40B4-BE49-F238E27FC236}">
+                <a16:creationId xmlns:a16="http://schemas.microsoft.com/office/drawing/2014/main" id="{7E7270E2-BCD7-C604-2FEC-BA1DFBE09359}"/>
+              </a:ext>
+            </a:extLst>
+          </p:cNvPr>
+          <p:cNvSpPr>
+            <a:spLocks noGrp="1"/>
+          </p:cNvSpPr>
+          <p:nvPr>
+            <p:ph type="sldNum" sz="quarter" idx="12"/>
+          </p:nvPr>
+        </p:nvSpPr>
+        <p:spPr>
+          <a:xfrm>
+            <a:off x="8610600" y="6356350"/>
+            <a:ext cx="2743200" cy="365125"/>
+          </a:xfrm>
+        </p:spPr>
+        <p:txBody>
+          <a:bodyPr>
+            <a:normAutofit/>
+          </a:bodyPr>
+          <a:lstStyle/>
+          <a:p>
+            <a:pPr>
+              <a:spcAft>
+                <a:spcPts val="600"/>
+              </a:spcAft>
+            </a:pPr>
+            <a:fld id="{BC1B8E0F-90D7-4F6F-9CC4-1E156486B9C1}" type="slidenum">
+              <a:rPr lang="en-CA">
+                <a:solidFill>
+                  <a:schemeClr val="bg1">
+                    <a:lumMod val="50000"/>
+                  </a:schemeClr>
+                </a:solidFill>
+              </a:rPr>
+              <a:pPr>
+                <a:spcAft>
+                  <a:spcPts val="600"/>
+                </a:spcAft>
+              </a:pPr>
+              <a:t>10</a:t>
+            </a:fld>
+            <a:endParaRPr lang="en-CA">
+              <a:solidFill>
+                <a:schemeClr val="bg1">
+                  <a:lumMod val="50000"/>
+                </a:schemeClr>
+              </a:solidFill>
+            </a:endParaRPr>
+          </a:p>
+        </p:txBody>
+      </p:sp>
+    </p:spTree>
+    <p:extLst>
+      <p:ext uri="{BB962C8B-B14F-4D97-AF65-F5344CB8AC3E}">
+        <p14:creationId xmlns:p14="http://schemas.microsoft.com/office/powerpoint/2010/main" val="2491263610"/>
+      </p:ext>
+    </p:extLst>
+  </p:cSld>
+  <p:clrMapOvr>
+    <a:masterClrMapping/>
+  </p:clrMapOvr>
+</p:sld>
+</file>
+
+<file path=ppt/slides/slide11.xml><?xml version="1.0" encoding="utf-8"?>
+<p:sld xmlns:a="http://schemas.openxmlformats.org/drawingml/2006/main" xmlns:r="http://schemas.openxmlformats.org/officeDocument/2006/relationships" xmlns:p="http://schemas.openxmlformats.org/presentationml/2006/main">
+  <p:cSld>
+    <p:bg>
+      <p:bgPr>
+        <a:solidFill>
+          <a:schemeClr val="bg1"/>
+        </a:solidFill>
+        <a:effectLst/>
+      </p:bgPr>
+    </p:bg>
+    <p:spTree>
+      <p:nvGrpSpPr>
+        <p:cNvPr id="1" name=""/>
+        <p:cNvGrpSpPr/>
+        <p:nvPr/>
+      </p:nvGrpSpPr>
+      <p:grpSpPr>
+        <a:xfrm>
+          <a:off x="0" y="0"/>
+          <a:ext cx="0" cy="0"/>
+          <a:chOff x="0" y="0"/>
+          <a:chExt cx="0" cy="0"/>
+        </a:xfrm>
+      </p:grpSpPr>
+      <p:sp>
+        <p:nvSpPr>
           <p:cNvPr id="21" name="Rectangle 20">
             <a:extLst>
               <a:ext uri="{FF2B5EF4-FFF2-40B4-BE49-F238E27FC236}">
@@ -11001,8 +11717,8 @@
         </p:nvSpPr>
         <p:spPr>
           <a:xfrm>
-            <a:off x="6976872" y="1759006"/>
-            <a:ext cx="5059415" cy="2862322"/>
+            <a:off x="7050024" y="1603770"/>
+            <a:ext cx="5059415" cy="3693319"/>
           </a:xfrm>
           <a:prstGeom prst="rect">
             <a:avLst/>
@@ -11141,6 +11857,41 @@
               </a:rPr>
               <a:t>The same trends of Spring/Winter are shown again in a few places.</a:t>
             </a:r>
+          </a:p>
+          <a:p>
+            <a:pPr marL="285750" indent="-285750">
+              <a:buFont typeface="Wingdings" panose="05000000000000000000" pitchFamily="2" charset="2"/>
+              <a:buChar char="v"/>
+            </a:pPr>
+            <a:r>
+              <a:rPr lang="en-US" dirty="0" err="1">
+                <a:solidFill>
+                  <a:schemeClr val="bg1"/>
+                </a:solidFill>
+              </a:rPr>
+              <a:t>SkTime</a:t>
+            </a:r>
+            <a:r>
+              <a:rPr lang="en-US" dirty="0">
+                <a:solidFill>
+                  <a:schemeClr val="bg1"/>
+                </a:solidFill>
+              </a:rPr>
+              <a:t> would be a better library to use for future data forecasting when you only have historical data and a future </a:t>
+            </a:r>
+            <a:r>
+              <a:rPr lang="en-US">
+                <a:solidFill>
+                  <a:schemeClr val="bg1"/>
+                </a:solidFill>
+              </a:rPr>
+              <a:t>time frame.</a:t>
+            </a:r>
+            <a:endParaRPr lang="en-US" dirty="0">
+              <a:solidFill>
+                <a:schemeClr val="bg1"/>
+              </a:solidFill>
+            </a:endParaRPr>
           </a:p>
           <a:p>
             <a:pPr marL="285750" indent="-285750">
@@ -11377,10 +12128,10 @@
       </p:grpSpPr>
       <p:sp>
         <p:nvSpPr>
-          <p:cNvPr id="11" name="Rectangle 10">
-            <a:extLst>
-              <a:ext uri="{FF2B5EF4-FFF2-40B4-BE49-F238E27FC236}">
-                <a16:creationId xmlns:a16="http://schemas.microsoft.com/office/drawing/2014/main" id="{A7AE9375-4664-4DB2-922D-2782A6E439AC}"/>
+          <p:cNvPr id="22" name="Rectangle 21">
+            <a:extLst>
+              <a:ext uri="{FF2B5EF4-FFF2-40B4-BE49-F238E27FC236}">
+                <a16:creationId xmlns:a16="http://schemas.microsoft.com/office/drawing/2014/main" id="{FB5B0058-AF13-4859-B429-4EDDE2A26F7F}"/>
               </a:ext>
               <a:ext uri="{C183D7F6-B498-43B3-948B-1728B52AA6E4}">
                 <adec:decorative xmlns:adec="http://schemas.microsoft.com/office/drawing/2017/decorative" val="1"/>
@@ -11450,7 +12201,7 @@
           <p:cNvPr id="2" name="Title 1">
             <a:extLst>
               <a:ext uri="{FF2B5EF4-FFF2-40B4-BE49-F238E27FC236}">
-                <a16:creationId xmlns:a16="http://schemas.microsoft.com/office/drawing/2014/main" id="{1BDDE9E2-35D5-82E3-D67C-48B1694FE836}"/>
+                <a16:creationId xmlns:a16="http://schemas.microsoft.com/office/drawing/2014/main" id="{8BC8A551-30D9-35B6-870F-6A923EA84886}"/>
               </a:ext>
             </a:extLst>
           </p:cNvPr>
@@ -11463,39 +12214,37 @@
         </p:nvSpPr>
         <p:spPr>
           <a:xfrm>
-            <a:off x="838200" y="669925"/>
-            <a:ext cx="4508946" cy="1325563"/>
+            <a:off x="8459961" y="922500"/>
+            <a:ext cx="3732039" cy="587202"/>
           </a:xfrm>
         </p:spPr>
         <p:txBody>
-          <a:bodyPr anchor="b">
-            <a:normAutofit/>
+          <a:bodyPr vert="horz" lIns="91440" tIns="45720" rIns="91440" bIns="45720" rtlCol="0" anchor="ctr">
+            <a:normAutofit fontScale="90000"/>
           </a:bodyPr>
           <a:lstStyle/>
           <a:p>
-            <a:pPr algn="r"/>
-            <a:r>
-              <a:rPr lang="en-US">
+            <a:pPr algn="ctr"/>
+            <a:r>
+              <a:rPr lang="en-US" sz="6000" kern="1200" dirty="0">
                 <a:solidFill>
                   <a:schemeClr val="bg1"/>
                 </a:solidFill>
-              </a:rPr>
-              <a:t>References</a:t>
-            </a:r>
-            <a:endParaRPr lang="en-CA">
-              <a:solidFill>
-                <a:schemeClr val="bg1"/>
-              </a:solidFill>
-            </a:endParaRPr>
+                <a:latin typeface="+mj-lt"/>
+                <a:ea typeface="+mj-ea"/>
+                <a:cs typeface="+mj-cs"/>
+              </a:rPr>
+              <a:t>Outcomes</a:t>
+            </a:r>
           </a:p>
         </p:txBody>
       </p:sp>
       <p:cxnSp>
         <p:nvCxnSpPr>
-          <p:cNvPr id="13" name="Straight Connector 12">
-            <a:extLst>
-              <a:ext uri="{FF2B5EF4-FFF2-40B4-BE49-F238E27FC236}">
-                <a16:creationId xmlns:a16="http://schemas.microsoft.com/office/drawing/2014/main" id="{EE504C98-6397-41C1-A8D8-2D9C4ED307E0}"/>
+          <p:cNvPr id="24" name="Straight Connector 23">
+            <a:extLst>
+              <a:ext uri="{FF2B5EF4-FFF2-40B4-BE49-F238E27FC236}">
+                <a16:creationId xmlns:a16="http://schemas.microsoft.com/office/drawing/2014/main" id="{E6D6B450-4278-45B8-88C7-C061710E3C7E}"/>
               </a:ext>
               <a:ext uri="{C183D7F6-B498-43B3-948B-1728B52AA6E4}">
                 <adec:decorative xmlns:adec="http://schemas.microsoft.com/office/drawing/2017/decorative" val="1"/>
@@ -11515,8 +12264,8 @@
         </p:nvCxnSpPr>
         <p:spPr>
           <a:xfrm flipH="1">
-            <a:off x="126210" y="2026340"/>
-            <a:ext cx="5220936" cy="0"/>
+            <a:off x="0" y="1560911"/>
+            <a:ext cx="3581400" cy="0"/>
           </a:xfrm>
           <a:prstGeom prst="line">
             <a:avLst/>
@@ -11542,267 +12291,21 @@
           </a:fontRef>
         </p:style>
       </p:cxnSp>
-      <p:sp>
-        <p:nvSpPr>
-          <p:cNvPr id="3" name="Content Placeholder 2">
-            <a:extLst>
-              <a:ext uri="{FF2B5EF4-FFF2-40B4-BE49-F238E27FC236}">
-                <a16:creationId xmlns:a16="http://schemas.microsoft.com/office/drawing/2014/main" id="{299635AB-7FEE-F05E-C2FC-12AC1BEB369E}"/>
-              </a:ext>
-            </a:extLst>
-          </p:cNvPr>
-          <p:cNvSpPr>
-            <a:spLocks noGrp="1"/>
-          </p:cNvSpPr>
-          <p:nvPr>
-            <p:ph idx="1"/>
-          </p:nvPr>
-        </p:nvSpPr>
-        <p:spPr>
-          <a:xfrm>
-            <a:off x="4038600" y="2199130"/>
-            <a:ext cx="7862451" cy="4099623"/>
-          </a:xfrm>
-        </p:spPr>
-        <p:txBody>
-          <a:bodyPr>
-            <a:normAutofit/>
-          </a:bodyPr>
-          <a:lstStyle/>
-          <a:p>
-            <a:pPr marL="457200" indent="-457200">
-              <a:buFont typeface="+mj-lt"/>
-              <a:buAutoNum type="arabicPeriod"/>
-            </a:pPr>
-            <a:r>
-              <a:rPr lang="en-US" sz="2000" dirty="0" err="1">
-                <a:solidFill>
-                  <a:schemeClr val="bg1"/>
-                </a:solidFill>
-              </a:rPr>
-              <a:t>Econoscent</a:t>
-            </a:r>
-            <a:r>
-              <a:rPr lang="en-US" sz="2000" dirty="0">
-                <a:solidFill>
-                  <a:schemeClr val="bg1"/>
-                </a:solidFill>
-              </a:rPr>
-              <a:t> – Aug 30, 2020 – </a:t>
-            </a:r>
-            <a:r>
-              <a:rPr lang="en-US" sz="2000" i="1" dirty="0">
-                <a:solidFill>
-                  <a:schemeClr val="bg1"/>
-                </a:solidFill>
-              </a:rPr>
-              <a:t>YouTube</a:t>
-            </a:r>
-            <a:r>
-              <a:rPr lang="en-US" sz="2000" dirty="0">
-                <a:solidFill>
-                  <a:schemeClr val="bg1"/>
-                </a:solidFill>
-              </a:rPr>
-              <a:t> – Visual Guide to Random Forest</a:t>
-            </a:r>
-          </a:p>
-          <a:p>
-            <a:pPr lvl="1"/>
-            <a:r>
-              <a:rPr lang="en-CA" sz="1600" dirty="0">
-                <a:solidFill>
-                  <a:schemeClr val="bg1"/>
-                </a:solidFill>
-                <a:hlinkClick r:id="rId2"/>
-              </a:rPr>
-              <a:t>https://www.youtube.com/watch?v=cIbj0WuK41w&amp;ab_channel=Econoscent</a:t>
-            </a:r>
-            <a:endParaRPr lang="en-CA" sz="1600" dirty="0">
-              <a:solidFill>
-                <a:schemeClr val="bg1"/>
-              </a:solidFill>
-            </a:endParaRPr>
-          </a:p>
-          <a:p>
-            <a:pPr marL="342900" indent="-342900">
-              <a:buFont typeface="+mj-lt"/>
-              <a:buAutoNum type="arabicPeriod"/>
-            </a:pPr>
-            <a:r>
-              <a:rPr lang="en-US" sz="1400" dirty="0">
-                <a:solidFill>
-                  <a:schemeClr val="bg1"/>
-                </a:solidFill>
-                <a:effectLst/>
-              </a:rPr>
-              <a:t>Canadian Real Estate Association. (2024) </a:t>
-            </a:r>
-            <a:r>
-              <a:rPr lang="en-US" sz="1400" i="1" dirty="0">
-                <a:solidFill>
-                  <a:schemeClr val="bg1"/>
-                </a:solidFill>
-                <a:effectLst/>
-              </a:rPr>
-              <a:t>National statistics</a:t>
-            </a:r>
-            <a:r>
-              <a:rPr lang="en-US" sz="1400" dirty="0">
-                <a:solidFill>
-                  <a:schemeClr val="bg1"/>
-                </a:solidFill>
-                <a:effectLst/>
-              </a:rPr>
-              <a:t>, </a:t>
-            </a:r>
-            <a:r>
-              <a:rPr lang="en-US" sz="1400" i="1" dirty="0">
-                <a:solidFill>
-                  <a:schemeClr val="bg1"/>
-                </a:solidFill>
-                <a:effectLst/>
-              </a:rPr>
-              <a:t>February 14 2024 News Release | CREA Statistics</a:t>
-            </a:r>
-            <a:r>
-              <a:rPr lang="en-US" sz="1400" dirty="0">
-                <a:solidFill>
-                  <a:schemeClr val="bg1"/>
-                </a:solidFill>
-                <a:effectLst/>
-              </a:rPr>
-              <a:t>. Available at: https://creastats.crea.ca/en-CA/ (Accessed: 11 March 2024). </a:t>
-            </a:r>
-          </a:p>
-          <a:p>
-            <a:pPr lvl="1"/>
-            <a:r>
-              <a:rPr lang="en-US" sz="1600" dirty="0">
-                <a:solidFill>
-                  <a:schemeClr val="bg1"/>
-                </a:solidFill>
-                <a:effectLst/>
-                <a:hlinkClick r:id="rId3"/>
-              </a:rPr>
-              <a:t>https://creastats.crea.ca/en-CA/</a:t>
-            </a:r>
-            <a:endParaRPr lang="en-US" sz="1600" dirty="0">
-              <a:solidFill>
-                <a:schemeClr val="bg1"/>
-              </a:solidFill>
-              <a:effectLst/>
-            </a:endParaRPr>
-          </a:p>
-          <a:p>
-            <a:pPr marL="457200" indent="-457200">
-              <a:buFont typeface="+mj-lt"/>
-              <a:buAutoNum type="arabicPeriod"/>
-            </a:pPr>
-            <a:r>
-              <a:rPr lang="en-US" sz="2000" dirty="0">
-                <a:solidFill>
-                  <a:schemeClr val="bg1"/>
-                </a:solidFill>
-                <a:hlinkClick r:id="rId4"/>
-              </a:rPr>
-              <a:t>https://stackoverflow.com/</a:t>
-            </a:r>
-            <a:r>
-              <a:rPr lang="en-US" sz="2000" dirty="0">
-                <a:solidFill>
-                  <a:schemeClr val="bg1"/>
-                </a:solidFill>
-              </a:rPr>
-              <a:t> - Non-stop Forum Searching.</a:t>
-            </a:r>
-          </a:p>
-          <a:p>
-            <a:pPr marL="457200" indent="-457200">
-              <a:buFont typeface="+mj-lt"/>
-              <a:buAutoNum type="arabicPeriod"/>
-            </a:pPr>
-            <a:r>
-              <a:rPr lang="en-US" sz="2000" dirty="0">
-                <a:solidFill>
-                  <a:schemeClr val="bg1"/>
-                </a:solidFill>
-                <a:hlinkClick r:id="rId5"/>
-              </a:rPr>
-              <a:t>https://scikit-learn.org/stable/user_guide.html</a:t>
-            </a:r>
-            <a:r>
-              <a:rPr lang="en-US" sz="2000" dirty="0">
-                <a:solidFill>
-                  <a:schemeClr val="bg1"/>
-                </a:solidFill>
-              </a:rPr>
-              <a:t> - </a:t>
-            </a:r>
-            <a:r>
-              <a:rPr lang="en-US" sz="2000" dirty="0" err="1">
-                <a:solidFill>
-                  <a:schemeClr val="bg1"/>
-                </a:solidFill>
-              </a:rPr>
-              <a:t>Sk.Learn</a:t>
-            </a:r>
-            <a:r>
-              <a:rPr lang="en-US" sz="2000" dirty="0">
-                <a:solidFill>
-                  <a:schemeClr val="bg1"/>
-                </a:solidFill>
-              </a:rPr>
-              <a:t> Documentation.</a:t>
-            </a:r>
-          </a:p>
-          <a:p>
-            <a:endParaRPr lang="en-US" sz="2000" dirty="0">
-              <a:solidFill>
-                <a:schemeClr val="bg1"/>
-              </a:solidFill>
-            </a:endParaRPr>
-          </a:p>
-          <a:p>
-            <a:pPr lvl="1"/>
-            <a:endParaRPr lang="en-US" sz="1000" dirty="0">
-              <a:solidFill>
-                <a:schemeClr val="bg1"/>
-              </a:solidFill>
-              <a:effectLst/>
-            </a:endParaRPr>
-          </a:p>
-          <a:p>
-            <a:endParaRPr lang="en-US" sz="2000" dirty="0">
-              <a:solidFill>
-                <a:schemeClr val="bg1"/>
-              </a:solidFill>
-            </a:endParaRPr>
-          </a:p>
-          <a:p>
-            <a:endParaRPr lang="en-CA" sz="2000" dirty="0">
-              <a:solidFill>
-                <a:schemeClr val="bg1"/>
-              </a:solidFill>
-            </a:endParaRPr>
-          </a:p>
-        </p:txBody>
-      </p:sp>
-      <p:sp>
-        <p:nvSpPr>
-          <p:cNvPr id="15" name="Rectangle 14">
-            <a:extLst>
-              <a:ext uri="{FF2B5EF4-FFF2-40B4-BE49-F238E27FC236}">
-                <a16:creationId xmlns:a16="http://schemas.microsoft.com/office/drawing/2014/main" id="{9DD005C1-8C51-42D6-9BEE-B9B83849743D}"/>
+      <p:cxnSp>
+        <p:nvCxnSpPr>
+          <p:cNvPr id="26" name="Straight Connector 25">
+            <a:extLst>
+              <a:ext uri="{FF2B5EF4-FFF2-40B4-BE49-F238E27FC236}">
+                <a16:creationId xmlns:a16="http://schemas.microsoft.com/office/drawing/2014/main" id="{EE7CEFB9-5672-4FC6-981B-C8DA3FE08EA2}"/>
               </a:ext>
               <a:ext uri="{C183D7F6-B498-43B3-948B-1728B52AA6E4}">
                 <adec:decorative xmlns:adec="http://schemas.microsoft.com/office/drawing/2017/decorative" val="1"/>
               </a:ext>
             </a:extLst>
           </p:cNvPr>
-          <p:cNvSpPr>
-            <a:spLocks noGrp="1" noRot="1" noChangeAspect="1" noMove="1" noResize="1" noEditPoints="1" noAdjustHandles="1" noChangeArrowheads="1" noChangeShapeType="1" noTextEdit="1"/>
-          </p:cNvSpPr>
+          <p:cNvCxnSpPr>
+            <a:cxnSpLocks noGrp="1" noRot="1" noChangeAspect="1" noMove="1" noResize="1" noEditPoints="1" noAdjustHandles="1" noChangeArrowheads="1" noChangeShapeType="1"/>
+          </p:cNvCxnSpPr>
           <p:nvPr>
             <p:extLst>
               <p:ext uri="{386F3935-93C4-4BCD-93E2-E3B085C9AB24}">
@@ -11810,16 +12313,15 @@
               </p:ext>
             </p:extLst>
           </p:nvPr>
-        </p:nvSpPr>
+        </p:nvCxnSpPr>
         <p:spPr>
-          <a:xfrm>
-            <a:off x="126206" y="115193"/>
-            <a:ext cx="11939588" cy="6627614"/>
+          <a:xfrm flipH="1">
+            <a:off x="8610600" y="1560911"/>
+            <a:ext cx="3581400" cy="0"/>
           </a:xfrm>
-          <a:prstGeom prst="rect">
+          <a:prstGeom prst="line">
             <a:avLst/>
           </a:prstGeom>
-          <a:noFill/>
           <a:ln w="12700">
             <a:solidFill>
               <a:schemeClr val="accent2"/>
@@ -11827,36 +12329,78 @@
           </a:ln>
         </p:spPr>
         <p:style>
-          <a:lnRef idx="2">
-            <a:schemeClr val="accent1">
-              <a:shade val="50000"/>
-            </a:schemeClr>
+          <a:lnRef idx="1">
+            <a:schemeClr val="accent1"/>
           </a:lnRef>
-          <a:fillRef idx="1">
+          <a:fillRef idx="0">
             <a:schemeClr val="accent1"/>
           </a:fillRef>
           <a:effectRef idx="0">
             <a:schemeClr val="accent1"/>
           </a:effectRef>
           <a:fontRef idx="minor">
-            <a:schemeClr val="lt1"/>
+            <a:schemeClr val="tx1"/>
           </a:fontRef>
         </p:style>
-        <p:txBody>
-          <a:bodyPr rtlCol="0" anchor="ctr"/>
-          <a:lstStyle/>
-          <a:p>
-            <a:pPr algn="ctr"/>
-            <a:endParaRPr lang="en-US"/>
-          </a:p>
-        </p:txBody>
-      </p:sp>
+      </p:cxnSp>
+      <p:cxnSp>
+        <p:nvCxnSpPr>
+          <p:cNvPr id="28" name="Straight Connector 27">
+            <a:extLst>
+              <a:ext uri="{FF2B5EF4-FFF2-40B4-BE49-F238E27FC236}">
+                <a16:creationId xmlns:a16="http://schemas.microsoft.com/office/drawing/2014/main" id="{74234A4C-A256-4139-A5F4-27078F0D6796}"/>
+              </a:ext>
+              <a:ext uri="{C183D7F6-B498-43B3-948B-1728B52AA6E4}">
+                <adec:decorative xmlns:adec="http://schemas.microsoft.com/office/drawing/2017/decorative" val="1"/>
+              </a:ext>
+            </a:extLst>
+          </p:cNvPr>
+          <p:cNvCxnSpPr>
+            <a:cxnSpLocks noGrp="1" noRot="1" noChangeAspect="1" noMove="1" noResize="1" noEditPoints="1" noAdjustHandles="1" noChangeArrowheads="1" noChangeShapeType="1"/>
+          </p:cNvCxnSpPr>
+          <p:nvPr>
+            <p:extLst>
+              <p:ext uri="{386F3935-93C4-4BCD-93E2-E3B085C9AB24}">
+                <p16:designElem xmlns:p16="http://schemas.microsoft.com/office/powerpoint/2015/main" val="1"/>
+              </p:ext>
+            </p:extLst>
+          </p:nvPr>
+        </p:nvCxnSpPr>
+        <p:spPr>
+          <a:xfrm flipH="1">
+            <a:off x="3048" y="5286237"/>
+            <a:ext cx="12188952" cy="0"/>
+          </a:xfrm>
+          <a:prstGeom prst="line">
+            <a:avLst/>
+          </a:prstGeom>
+          <a:ln w="12700">
+            <a:solidFill>
+              <a:schemeClr val="accent2"/>
+            </a:solidFill>
+          </a:ln>
+        </p:spPr>
+        <p:style>
+          <a:lnRef idx="1">
+            <a:schemeClr val="accent1"/>
+          </a:lnRef>
+          <a:fillRef idx="0">
+            <a:schemeClr val="accent1"/>
+          </a:fillRef>
+          <a:effectRef idx="0">
+            <a:schemeClr val="accent1"/>
+          </a:effectRef>
+          <a:fontRef idx="minor">
+            <a:schemeClr val="tx1"/>
+          </a:fontRef>
+        </p:style>
+      </p:cxnSp>
       <p:sp>
         <p:nvSpPr>
           <p:cNvPr id="4" name="Date Placeholder 3">
             <a:extLst>
               <a:ext uri="{FF2B5EF4-FFF2-40B4-BE49-F238E27FC236}">
-                <a16:creationId xmlns:a16="http://schemas.microsoft.com/office/drawing/2014/main" id="{E262571C-DFA6-7E05-20AD-B233CF1FC388}"/>
+                <a16:creationId xmlns:a16="http://schemas.microsoft.com/office/drawing/2014/main" id="{60AA39EA-1BD4-5ADF-82A5-488914B68D98}"/>
               </a:ext>
             </a:extLst>
           </p:cNvPr>
@@ -11874,7 +12418,7 @@
           </a:xfrm>
         </p:spPr>
         <p:txBody>
-          <a:bodyPr>
+          <a:bodyPr vert="horz" lIns="91440" tIns="45720" rIns="91440" bIns="45720" rtlCol="0" anchor="ctr">
             <a:normAutofit/>
           </a:bodyPr>
           <a:lstStyle/>
@@ -11885,7 +12429,7 @@
               </a:spcAft>
             </a:pPr>
             <a:fld id="{DD303E3B-074C-440F-86D1-3BB7E04505DE}" type="datetimeyyyy">
-              <a:rPr lang="en-CA">
+              <a:rPr lang="en-US">
                 <a:solidFill>
                   <a:schemeClr val="bg1">
                     <a:lumMod val="50000"/>
@@ -11899,7 +12443,7 @@
               </a:pPr>
               <a:t>2024</a:t>
             </a:fld>
-            <a:endParaRPr lang="en-CA">
+            <a:endParaRPr lang="en-US">
               <a:solidFill>
                 <a:schemeClr val="bg1">
                   <a:lumMod val="50000"/>
@@ -11914,7 +12458,7 @@
           <p:cNvPr id="5" name="Footer Placeholder 4">
             <a:extLst>
               <a:ext uri="{FF2B5EF4-FFF2-40B4-BE49-F238E27FC236}">
-                <a16:creationId xmlns:a16="http://schemas.microsoft.com/office/drawing/2014/main" id="{42349A59-061C-C214-BB5B-8E570A359C17}"/>
+                <a16:creationId xmlns:a16="http://schemas.microsoft.com/office/drawing/2014/main" id="{8251454E-77DD-4304-F4AF-245027455781}"/>
               </a:ext>
             </a:extLst>
           </p:cNvPr>
@@ -11932,7 +12476,7 @@
           </a:xfrm>
         </p:spPr>
         <p:txBody>
-          <a:bodyPr>
+          <a:bodyPr vert="horz" lIns="91440" tIns="45720" rIns="91440" bIns="45720" rtlCol="0" anchor="ctr">
             <a:normAutofit/>
           </a:bodyPr>
           <a:lstStyle/>
@@ -11943,12 +12487,15 @@
               </a:spcAft>
             </a:pPr>
             <a:r>
-              <a:rPr lang="en-CA">
+              <a:rPr lang="en-US" kern="1200">
                 <a:solidFill>
                   <a:schemeClr val="bg1">
                     <a:lumMod val="50000"/>
                   </a:schemeClr>
                 </a:solidFill>
+                <a:latin typeface="+mn-lt"/>
+                <a:ea typeface="+mn-ea"/>
+                <a:cs typeface="+mn-cs"/>
               </a:rPr>
               <a:t>GENG4500-60</a:t>
             </a:r>
@@ -11960,7 +12507,7 @@
           <p:cNvPr id="6" name="Slide Number Placeholder 5">
             <a:extLst>
               <a:ext uri="{FF2B5EF4-FFF2-40B4-BE49-F238E27FC236}">
-                <a16:creationId xmlns:a16="http://schemas.microsoft.com/office/drawing/2014/main" id="{7E7270E2-BCD7-C604-2FEC-BA1DFBE09359}"/>
+                <a16:creationId xmlns:a16="http://schemas.microsoft.com/office/drawing/2014/main" id="{525E3120-057C-155F-E7EF-176F72BED592}"/>
               </a:ext>
             </a:extLst>
           </p:cNvPr>
@@ -11978,7 +12525,7 @@
           </a:xfrm>
         </p:spPr>
         <p:txBody>
-          <a:bodyPr>
+          <a:bodyPr vert="horz" lIns="91440" tIns="45720" rIns="91440" bIns="45720" rtlCol="0" anchor="ctr">
             <a:normAutofit/>
           </a:bodyPr>
           <a:lstStyle/>
@@ -11989,7 +12536,7 @@
               </a:spcAft>
             </a:pPr>
             <a:fld id="{BC1B8E0F-90D7-4F6F-9CC4-1E156486B9C1}" type="slidenum">
-              <a:rPr lang="en-CA">
+              <a:rPr lang="en-US">
                 <a:solidFill>
                   <a:schemeClr val="bg1">
                     <a:lumMod val="50000"/>
@@ -12003,7 +12550,7 @@
               </a:pPr>
               <a:t>9</a:t>
             </a:fld>
-            <a:endParaRPr lang="en-CA">
+            <a:endParaRPr lang="en-US">
               <a:solidFill>
                 <a:schemeClr val="bg1">
                   <a:lumMod val="50000"/>
@@ -12013,10 +12560,171 @@
           </a:p>
         </p:txBody>
       </p:sp>
+      <p:pic>
+        <p:nvPicPr>
+          <p:cNvPr id="13" name="Graphic 12">
+            <a:extLst>
+              <a:ext uri="{FF2B5EF4-FFF2-40B4-BE49-F238E27FC236}">
+                <a16:creationId xmlns:a16="http://schemas.microsoft.com/office/drawing/2014/main" id="{5BE299D5-163C-B66F-4CBA-24AFD0AFCCDB}"/>
+              </a:ext>
+            </a:extLst>
+          </p:cNvPr>
+          <p:cNvPicPr>
+            <a:picLocks noChangeAspect="1"/>
+          </p:cNvPicPr>
+          <p:nvPr/>
+        </p:nvPicPr>
+        <p:blipFill>
+          <a:blip r:embed="rId2">
+            <a:extLst>
+              <a:ext uri="{28A0092B-C50C-407E-A947-70E740481C1C}">
+                <a14:useLocalDpi xmlns:a14="http://schemas.microsoft.com/office/drawing/2010/main" val="0"/>
+              </a:ext>
+              <a:ext uri="{96DAC541-7B7A-43D3-8B79-37D633B846F1}">
+                <asvg:svgBlip xmlns:asvg="http://schemas.microsoft.com/office/drawing/2016/SVG/main" r:embed="rId3"/>
+              </a:ext>
+            </a:extLst>
+          </a:blip>
+          <a:stretch>
+            <a:fillRect/>
+          </a:stretch>
+        </p:blipFill>
+        <p:spPr>
+          <a:xfrm>
+            <a:off x="129032" y="1663331"/>
+            <a:ext cx="4743640" cy="3520487"/>
+          </a:xfrm>
+          <a:prstGeom prst="rect">
+            <a:avLst/>
+          </a:prstGeom>
+        </p:spPr>
+      </p:pic>
+      <p:graphicFrame>
+        <p:nvGraphicFramePr>
+          <p:cNvPr id="23" name="Object 22">
+            <a:extLst>
+              <a:ext uri="{FF2B5EF4-FFF2-40B4-BE49-F238E27FC236}">
+                <a16:creationId xmlns:a16="http://schemas.microsoft.com/office/drawing/2014/main" id="{EDAA175F-8479-060C-B474-9039E31B52E4}"/>
+              </a:ext>
+            </a:extLst>
+          </p:cNvPr>
+          <p:cNvGraphicFramePr>
+            <a:graphicFrameLocks noChangeAspect="1"/>
+          </p:cNvGraphicFramePr>
+          <p:nvPr>
+            <p:extLst>
+              <p:ext uri="{D42A27DB-BD31-4B8C-83A1-F6EECF244321}">
+                <p14:modId xmlns:p14="http://schemas.microsoft.com/office/powerpoint/2010/main" val="238092692"/>
+              </p:ext>
+            </p:extLst>
+          </p:nvPr>
+        </p:nvGraphicFramePr>
+        <p:xfrm>
+          <a:off x="5044440" y="1777222"/>
+          <a:ext cx="7061200" cy="3254375"/>
+        </p:xfrm>
+        <a:graphic>
+          <a:graphicData uri="http://schemas.openxmlformats.org/presentationml/2006/ole">
+            <mc:AlternateContent xmlns:mc="http://schemas.openxmlformats.org/markup-compatibility/2006">
+              <mc:Choice xmlns:v="urn:schemas-microsoft-com:vml" Requires="v">
+                <p:oleObj name="Worksheet" r:id="rId4" imgW="6105449" imgH="2676449" progId="Excel.Sheet.12">
+                  <p:embed/>
+                </p:oleObj>
+              </mc:Choice>
+              <mc:Fallback>
+                <p:oleObj name="Worksheet" r:id="rId4" imgW="6105449" imgH="2676449" progId="Excel.Sheet.12">
+                  <p:embed/>
+                  <p:pic>
+                    <p:nvPicPr>
+                      <p:cNvPr id="0" name=""/>
+                      <p:cNvPicPr/>
+                      <p:nvPr/>
+                    </p:nvPicPr>
+                    <p:blipFill>
+                      <a:blip r:embed="rId5"/>
+                      <a:stretch>
+                        <a:fillRect/>
+                      </a:stretch>
+                    </p:blipFill>
+                    <p:spPr>
+                      <a:xfrm>
+                        <a:off x="5044440" y="1777222"/>
+                        <a:ext cx="7061200" cy="3254375"/>
+                      </a:xfrm>
+                      <a:prstGeom prst="rect">
+                        <a:avLst/>
+                      </a:prstGeom>
+                    </p:spPr>
+                  </p:pic>
+                </p:oleObj>
+              </mc:Fallback>
+            </mc:AlternateContent>
+          </a:graphicData>
+        </a:graphic>
+      </p:graphicFrame>
+      <p:sp>
+        <p:nvSpPr>
+          <p:cNvPr id="25" name="Title 1">
+            <a:extLst>
+              <a:ext uri="{FF2B5EF4-FFF2-40B4-BE49-F238E27FC236}">
+                <a16:creationId xmlns:a16="http://schemas.microsoft.com/office/drawing/2014/main" id="{3A36B855-25AF-02FC-13A1-747A5528BAC0}"/>
+              </a:ext>
+            </a:extLst>
+          </p:cNvPr>
+          <p:cNvSpPr txBox="1">
+            <a:spLocks/>
+          </p:cNvSpPr>
+          <p:nvPr/>
+        </p:nvSpPr>
+        <p:spPr>
+          <a:xfrm>
+            <a:off x="0" y="922500"/>
+            <a:ext cx="3732039" cy="587202"/>
+          </a:xfrm>
+          <a:prstGeom prst="rect">
+            <a:avLst/>
+          </a:prstGeom>
+        </p:spPr>
+        <p:txBody>
+          <a:bodyPr vert="horz" lIns="91440" tIns="45720" rIns="91440" bIns="45720" rtlCol="0" anchor="ctr">
+            <a:noAutofit/>
+          </a:bodyPr>
+          <a:lstStyle>
+            <a:lvl1pPr algn="l" defTabSz="914400" rtl="0" eaLnBrk="1" latinLnBrk="0" hangingPunct="1">
+              <a:lnSpc>
+                <a:spcPct val="90000"/>
+              </a:lnSpc>
+              <a:spcBef>
+                <a:spcPct val="0"/>
+              </a:spcBef>
+              <a:buNone/>
+              <a:defRPr sz="4400" kern="1200">
+                <a:solidFill>
+                  <a:schemeClr val="tx1"/>
+                </a:solidFill>
+                <a:latin typeface="+mj-lt"/>
+                <a:ea typeface="+mj-ea"/>
+                <a:cs typeface="+mj-cs"/>
+              </a:defRPr>
+            </a:lvl1pPr>
+          </a:lstStyle>
+          <a:p>
+            <a:pPr algn="ctr"/>
+            <a:r>
+              <a:rPr lang="en-US" sz="5400" dirty="0">
+                <a:solidFill>
+                  <a:schemeClr val="bg1"/>
+                </a:solidFill>
+              </a:rPr>
+              <a:t>Other</a:t>
+            </a:r>
+          </a:p>
+        </p:txBody>
+      </p:sp>
     </p:spTree>
     <p:extLst>
       <p:ext uri="{BB962C8B-B14F-4D97-AF65-F5344CB8AC3E}">
-        <p14:creationId xmlns:p14="http://schemas.microsoft.com/office/powerpoint/2010/main" val="2491263610"/>
+        <p14:creationId xmlns:p14="http://schemas.microsoft.com/office/powerpoint/2010/main" val="3411810196"/>
       </p:ext>
     </p:extLst>
   </p:cSld>

</xml_diff>

<commit_message>
-Added link to github page on main slide
P@

Signed-off-by: P@ <patmaynard452@gmail.com>
</commit_message>
<xml_diff>
--- a/Presentation/ALI_Raymond_MAYNARD_Patrick_GENG4500_Final_presentation_2024.pptx
+++ b/Presentation/ALI_Raymond_MAYNARD_Patrick_GENG4500_Final_presentation_2024.pptx
@@ -473,6 +473,90 @@
     </a:lvl9pPr>
   </p:notesStyle>
 </p:notesMaster>
+</file>
+
+<file path=ppt/notesSlides/notesSlide1.xml><?xml version="1.0" encoding="utf-8"?>
+<p:notes xmlns:a="http://schemas.openxmlformats.org/drawingml/2006/main" xmlns:r="http://schemas.openxmlformats.org/officeDocument/2006/relationships" xmlns:p="http://schemas.openxmlformats.org/presentationml/2006/main">
+  <p:cSld>
+    <p:spTree>
+      <p:nvGrpSpPr>
+        <p:cNvPr id="1" name=""/>
+        <p:cNvGrpSpPr/>
+        <p:nvPr/>
+      </p:nvGrpSpPr>
+      <p:grpSpPr>
+        <a:xfrm>
+          <a:off x="0" y="0"/>
+          <a:ext cx="0" cy="0"/>
+          <a:chOff x="0" y="0"/>
+          <a:chExt cx="0" cy="0"/>
+        </a:xfrm>
+      </p:grpSpPr>
+      <p:sp>
+        <p:nvSpPr>
+          <p:cNvPr id="2" name="Slide Image Placeholder 1"/>
+          <p:cNvSpPr>
+            <a:spLocks noGrp="1" noRot="1" noChangeAspect="1"/>
+          </p:cNvSpPr>
+          <p:nvPr>
+            <p:ph type="sldImg"/>
+          </p:nvPr>
+        </p:nvSpPr>
+        <p:spPr/>
+      </p:sp>
+      <p:sp>
+        <p:nvSpPr>
+          <p:cNvPr id="3" name="Notes Placeholder 2"/>
+          <p:cNvSpPr>
+            <a:spLocks noGrp="1"/>
+          </p:cNvSpPr>
+          <p:nvPr>
+            <p:ph type="body" idx="1"/>
+          </p:nvPr>
+        </p:nvSpPr>
+        <p:spPr/>
+        <p:txBody>
+          <a:bodyPr/>
+          <a:lstStyle/>
+          <a:p>
+            <a:endParaRPr lang="en-CA" dirty="0"/>
+          </a:p>
+        </p:txBody>
+      </p:sp>
+      <p:sp>
+        <p:nvSpPr>
+          <p:cNvPr id="4" name="Slide Number Placeholder 3"/>
+          <p:cNvSpPr>
+            <a:spLocks noGrp="1"/>
+          </p:cNvSpPr>
+          <p:nvPr>
+            <p:ph type="sldNum" sz="quarter" idx="5"/>
+          </p:nvPr>
+        </p:nvSpPr>
+        <p:spPr/>
+        <p:txBody>
+          <a:bodyPr/>
+          <a:lstStyle/>
+          <a:p>
+            <a:fld id="{DE2E87FF-7A71-44C5-A2F7-D2A53AA84D0A}" type="slidenum">
+              <a:rPr lang="en-CA" smtClean="0"/>
+              <a:t>1</a:t>
+            </a:fld>
+            <a:endParaRPr lang="en-CA"/>
+          </a:p>
+        </p:txBody>
+      </p:sp>
+    </p:spTree>
+    <p:extLst>
+      <p:ext uri="{BB962C8B-B14F-4D97-AF65-F5344CB8AC3E}">
+        <p14:creationId xmlns:p14="http://schemas.microsoft.com/office/powerpoint/2010/main" val="978717500"/>
+      </p:ext>
+    </p:extLst>
+  </p:cSld>
+  <p:clrMapOvr>
+    <a:masterClrMapping/>
+  </p:clrMapOvr>
+</p:notes>
 </file>
 
 <file path=ppt/slideLayouts/slideLayout1.xml><?xml version="1.0" encoding="utf-8"?>
@@ -3836,7 +3920,7 @@
           <p:nvPr/>
         </p:nvPicPr>
         <p:blipFill rotWithShape="1">
-          <a:blip r:embed="rId2">
+          <a:blip r:embed="rId3">
             <a:alphaModFix amt="40000"/>
             <a:extLst>
               <a:ext uri="{28A0092B-C50C-407E-A947-70E740481C1C}">
@@ -3899,14 +3983,14 @@
           <a:p>
             <a:pPr algn="l"/>
             <a:r>
-              <a:rPr lang="en-US" sz="5000" b="1">
+              <a:rPr lang="en-US" sz="5000" b="1" dirty="0">
                 <a:solidFill>
                   <a:schemeClr val="bg1"/>
                 </a:solidFill>
               </a:rPr>
               <a:t>Predicting House Costs in Canada</a:t>
             </a:r>
-            <a:endParaRPr lang="en-CA" sz="5000" b="1">
+            <a:endParaRPr lang="en-CA" sz="5000" b="1" dirty="0">
               <a:solidFill>
                 <a:schemeClr val="bg1"/>
               </a:solidFill>
@@ -3938,13 +4022,13 @@
         </p:spPr>
         <p:txBody>
           <a:bodyPr>
-            <a:normAutofit/>
+            <a:normAutofit fontScale="85000" lnSpcReduction="10000"/>
           </a:bodyPr>
           <a:lstStyle/>
           <a:p>
             <a:pPr algn="l"/>
             <a:r>
-              <a:rPr lang="en-US" sz="2000">
+              <a:rPr lang="en-US" sz="2000" dirty="0">
                 <a:solidFill>
                   <a:schemeClr val="bg1"/>
                 </a:solidFill>
@@ -3955,14 +4039,33 @@
           <a:p>
             <a:pPr algn="l"/>
             <a:r>
-              <a:rPr lang="en-US" sz="2000">
+              <a:rPr lang="en-US" sz="2000" dirty="0">
                 <a:solidFill>
                   <a:schemeClr val="bg1"/>
                 </a:solidFill>
               </a:rPr>
               <a:t>Raymond Ali</a:t>
             </a:r>
-            <a:endParaRPr lang="en-CA" sz="2000">
+          </a:p>
+          <a:p>
+            <a:pPr algn="l"/>
+            <a:endParaRPr lang="en-US" sz="2000" dirty="0">
+              <a:solidFill>
+                <a:schemeClr val="bg1"/>
+              </a:solidFill>
+            </a:endParaRPr>
+          </a:p>
+          <a:p>
+            <a:pPr algn="l"/>
+            <a:r>
+              <a:rPr lang="en-US" sz="2000" dirty="0">
+                <a:solidFill>
+                  <a:schemeClr val="bg1"/>
+                </a:solidFill>
+              </a:rPr>
+              <a:t>GitHub: https://github.com/PMcTwist/Machine_Learn_Project</a:t>
+            </a:r>
+            <a:endParaRPr lang="en-CA" sz="2000" dirty="0">
               <a:solidFill>
                 <a:schemeClr val="bg1"/>
               </a:solidFill>

</xml_diff>

<commit_message>
-Updated presentation with new outcomes and findings!
P@
</commit_message>
<xml_diff>
--- a/Presentation/ALI_Raymond_MAYNARD_Patrick_GENG4500_Final_presentation_2024.pptx
+++ b/Presentation/ALI_Raymond_MAYNARD_Patrick_GENG4500_Final_presentation_2024.pptx
@@ -5,7 +5,7 @@
     <p:sldMasterId id="2147483648" r:id="rId1"/>
   </p:sldMasterIdLst>
   <p:notesMasterIdLst>
-    <p:notesMasterId r:id="rId13"/>
+    <p:notesMasterId r:id="rId15"/>
   </p:notesMasterIdLst>
   <p:sldIdLst>
     <p:sldId id="256" r:id="rId2"/>
@@ -15,10 +15,12 @@
     <p:sldId id="272" r:id="rId6"/>
     <p:sldId id="271" r:id="rId7"/>
     <p:sldId id="275" r:id="rId8"/>
-    <p:sldId id="274" r:id="rId9"/>
-    <p:sldId id="276" r:id="rId10"/>
-    <p:sldId id="270" r:id="rId11"/>
-    <p:sldId id="267" r:id="rId12"/>
+    <p:sldId id="276" r:id="rId9"/>
+    <p:sldId id="277" r:id="rId10"/>
+    <p:sldId id="274" r:id="rId11"/>
+    <p:sldId id="278" r:id="rId12"/>
+    <p:sldId id="270" r:id="rId13"/>
+    <p:sldId id="267" r:id="rId14"/>
   </p:sldIdLst>
   <p:sldSz cx="12192000" cy="6858000"/>
   <p:notesSz cx="6858000" cy="9144000"/>
@@ -207,7 +209,7 @@
           <a:p>
             <a:fld id="{7E5E2DB3-6FEF-4CE5-A6A7-DA370F2E2760}" type="datetimeFigureOut">
               <a:rPr lang="en-CA" smtClean="0"/>
-              <a:t>2024-03-22</a:t>
+              <a:t>2024-03-24</a:t>
             </a:fld>
             <a:endParaRPr lang="en-CA"/>
           </a:p>
@@ -4176,10 +4178,10 @@
       </p:grpSpPr>
       <p:sp>
         <p:nvSpPr>
-          <p:cNvPr id="11" name="Rectangle 10">
-            <a:extLst>
-              <a:ext uri="{FF2B5EF4-FFF2-40B4-BE49-F238E27FC236}">
-                <a16:creationId xmlns:a16="http://schemas.microsoft.com/office/drawing/2014/main" id="{A7AE9375-4664-4DB2-922D-2782A6E439AC}"/>
+          <p:cNvPr id="22" name="Rectangle 21">
+            <a:extLst>
+              <a:ext uri="{FF2B5EF4-FFF2-40B4-BE49-F238E27FC236}">
+                <a16:creationId xmlns:a16="http://schemas.microsoft.com/office/drawing/2014/main" id="{FB5B0058-AF13-4859-B429-4EDDE2A26F7F}"/>
               </a:ext>
               <a:ext uri="{C183D7F6-B498-43B3-948B-1728B52AA6E4}">
                 <adec:decorative xmlns:adec="http://schemas.microsoft.com/office/drawing/2017/decorative" val="1"/>
@@ -4249,7 +4251,7 @@
           <p:cNvPr id="2" name="Title 1">
             <a:extLst>
               <a:ext uri="{FF2B5EF4-FFF2-40B4-BE49-F238E27FC236}">
-                <a16:creationId xmlns:a16="http://schemas.microsoft.com/office/drawing/2014/main" id="{1BDDE9E2-35D5-82E3-D67C-48B1694FE836}"/>
+                <a16:creationId xmlns:a16="http://schemas.microsoft.com/office/drawing/2014/main" id="{8BC8A551-30D9-35B6-870F-6A923EA84886}"/>
               </a:ext>
             </a:extLst>
           </p:cNvPr>
@@ -4262,39 +4264,37 @@
         </p:nvSpPr>
         <p:spPr>
           <a:xfrm>
-            <a:off x="838200" y="669925"/>
-            <a:ext cx="4508946" cy="1325563"/>
-          </a:xfrm>
-        </p:spPr>
-        <p:txBody>
-          <a:bodyPr anchor="b">
-            <a:normAutofit/>
+            <a:off x="0" y="900557"/>
+            <a:ext cx="3732039" cy="587202"/>
+          </a:xfrm>
+        </p:spPr>
+        <p:txBody>
+          <a:bodyPr vert="horz" lIns="91440" tIns="45720" rIns="91440" bIns="45720" rtlCol="0" anchor="ctr">
+            <a:normAutofit fontScale="90000"/>
           </a:bodyPr>
           <a:lstStyle/>
           <a:p>
-            <a:pPr algn="r"/>
-            <a:r>
-              <a:rPr lang="en-US">
+            <a:pPr algn="ctr"/>
+            <a:r>
+              <a:rPr lang="en-US" sz="6000" kern="1200" dirty="0">
                 <a:solidFill>
                   <a:schemeClr val="bg1"/>
                 </a:solidFill>
-              </a:rPr>
-              <a:t>References</a:t>
-            </a:r>
-            <a:endParaRPr lang="en-CA">
-              <a:solidFill>
-                <a:schemeClr val="bg1"/>
-              </a:solidFill>
-            </a:endParaRPr>
+                <a:latin typeface="+mj-lt"/>
+                <a:ea typeface="+mj-ea"/>
+                <a:cs typeface="+mj-cs"/>
+              </a:rPr>
+              <a:t>Outcomes</a:t>
+            </a:r>
           </a:p>
         </p:txBody>
       </p:sp>
       <p:cxnSp>
         <p:nvCxnSpPr>
-          <p:cNvPr id="13" name="Straight Connector 12">
-            <a:extLst>
-              <a:ext uri="{FF2B5EF4-FFF2-40B4-BE49-F238E27FC236}">
-                <a16:creationId xmlns:a16="http://schemas.microsoft.com/office/drawing/2014/main" id="{EE504C98-6397-41C1-A8D8-2D9C4ED307E0}"/>
+          <p:cNvPr id="24" name="Straight Connector 23">
+            <a:extLst>
+              <a:ext uri="{FF2B5EF4-FFF2-40B4-BE49-F238E27FC236}">
+                <a16:creationId xmlns:a16="http://schemas.microsoft.com/office/drawing/2014/main" id="{E6D6B450-4278-45B8-88C7-C061710E3C7E}"/>
               </a:ext>
               <a:ext uri="{C183D7F6-B498-43B3-948B-1728B52AA6E4}">
                 <adec:decorative xmlns:adec="http://schemas.microsoft.com/office/drawing/2017/decorative" val="1"/>
@@ -4314,8 +4314,8 @@
         </p:nvCxnSpPr>
         <p:spPr>
           <a:xfrm flipH="1">
-            <a:off x="126210" y="2026340"/>
-            <a:ext cx="5220936" cy="0"/>
+            <a:off x="0" y="1560911"/>
+            <a:ext cx="3581400" cy="0"/>
           </a:xfrm>
           <a:prstGeom prst="line">
             <a:avLst/>
@@ -4341,306 +4341,21 @@
           </a:fontRef>
         </p:style>
       </p:cxnSp>
-      <p:sp>
-        <p:nvSpPr>
-          <p:cNvPr id="3" name="Content Placeholder 2">
-            <a:extLst>
-              <a:ext uri="{FF2B5EF4-FFF2-40B4-BE49-F238E27FC236}">
-                <a16:creationId xmlns:a16="http://schemas.microsoft.com/office/drawing/2014/main" id="{299635AB-7FEE-F05E-C2FC-12AC1BEB369E}"/>
-              </a:ext>
-            </a:extLst>
-          </p:cNvPr>
-          <p:cNvSpPr>
-            <a:spLocks noGrp="1"/>
-          </p:cNvSpPr>
-          <p:nvPr>
-            <p:ph idx="1"/>
-          </p:nvPr>
-        </p:nvSpPr>
-        <p:spPr>
-          <a:xfrm>
-            <a:off x="4038600" y="2199130"/>
-            <a:ext cx="7862451" cy="4099623"/>
-          </a:xfrm>
-        </p:spPr>
-        <p:txBody>
-          <a:bodyPr>
-            <a:normAutofit/>
-          </a:bodyPr>
-          <a:lstStyle/>
-          <a:p>
-            <a:pPr marL="457200" indent="-457200">
-              <a:buFont typeface="+mj-lt"/>
-              <a:buAutoNum type="arabicPeriod"/>
-            </a:pPr>
-            <a:r>
-              <a:rPr lang="en-US" sz="2000" dirty="0" err="1">
-                <a:solidFill>
-                  <a:schemeClr val="bg1"/>
-                </a:solidFill>
-              </a:rPr>
-              <a:t>Econoscent</a:t>
-            </a:r>
-            <a:r>
-              <a:rPr lang="en-US" sz="2000" dirty="0">
-                <a:solidFill>
-                  <a:schemeClr val="bg1"/>
-                </a:solidFill>
-              </a:rPr>
-              <a:t> – Aug 30, 2020 – </a:t>
-            </a:r>
-            <a:r>
-              <a:rPr lang="en-US" sz="2000" i="1" dirty="0">
-                <a:solidFill>
-                  <a:schemeClr val="bg1"/>
-                </a:solidFill>
-              </a:rPr>
-              <a:t>YouTube</a:t>
-            </a:r>
-            <a:r>
-              <a:rPr lang="en-US" sz="2000" dirty="0">
-                <a:solidFill>
-                  <a:schemeClr val="bg1"/>
-                </a:solidFill>
-              </a:rPr>
-              <a:t> – Visual Guide to Random Forest</a:t>
-            </a:r>
-          </a:p>
-          <a:p>
-            <a:pPr lvl="1"/>
-            <a:r>
-              <a:rPr lang="en-CA" sz="1600" dirty="0">
-                <a:solidFill>
-                  <a:schemeClr val="bg1"/>
-                </a:solidFill>
-                <a:hlinkClick r:id="rId2"/>
-              </a:rPr>
-              <a:t>https://www.youtube.com/watch?v=cIbj0WuK41w&amp;ab_channel=Econoscent</a:t>
-            </a:r>
-            <a:endParaRPr lang="en-CA" sz="1600" dirty="0">
-              <a:solidFill>
-                <a:schemeClr val="bg1"/>
-              </a:solidFill>
-            </a:endParaRPr>
-          </a:p>
-          <a:p>
-            <a:pPr marL="342900" indent="-342900">
-              <a:buFont typeface="+mj-lt"/>
-              <a:buAutoNum type="arabicPeriod"/>
-            </a:pPr>
-            <a:r>
-              <a:rPr lang="en-US" sz="1400" dirty="0">
-                <a:solidFill>
-                  <a:schemeClr val="bg1"/>
-                </a:solidFill>
-                <a:effectLst/>
-              </a:rPr>
-              <a:t>Canadian Real Estate Association. (2024) </a:t>
-            </a:r>
-            <a:r>
-              <a:rPr lang="en-US" sz="1400" i="1" dirty="0">
-                <a:solidFill>
-                  <a:schemeClr val="bg1"/>
-                </a:solidFill>
-                <a:effectLst/>
-              </a:rPr>
-              <a:t>National statistics</a:t>
-            </a:r>
-            <a:r>
-              <a:rPr lang="en-US" sz="1400" dirty="0">
-                <a:solidFill>
-                  <a:schemeClr val="bg1"/>
-                </a:solidFill>
-                <a:effectLst/>
-              </a:rPr>
-              <a:t>, </a:t>
-            </a:r>
-            <a:r>
-              <a:rPr lang="en-US" sz="1400" i="1" dirty="0">
-                <a:solidFill>
-                  <a:schemeClr val="bg1"/>
-                </a:solidFill>
-                <a:effectLst/>
-              </a:rPr>
-              <a:t>February 14 2024 News Release | CREA Statistics</a:t>
-            </a:r>
-            <a:r>
-              <a:rPr lang="en-US" sz="1400" dirty="0">
-                <a:solidFill>
-                  <a:schemeClr val="bg1"/>
-                </a:solidFill>
-                <a:effectLst/>
-              </a:rPr>
-              <a:t>. Available at: https://creastats.crea.ca/en-CA/ (Accessed: 11 March 2024). </a:t>
-            </a:r>
-          </a:p>
-          <a:p>
-            <a:pPr lvl="1"/>
-            <a:r>
-              <a:rPr lang="en-US" sz="1600" dirty="0">
-                <a:solidFill>
-                  <a:schemeClr val="bg1"/>
-                </a:solidFill>
-                <a:effectLst/>
-                <a:hlinkClick r:id="rId3"/>
-              </a:rPr>
-              <a:t>https://creastats.crea.ca/en-CA/</a:t>
-            </a:r>
-            <a:endParaRPr lang="en-US" sz="1600" dirty="0">
-              <a:solidFill>
-                <a:schemeClr val="bg1"/>
-              </a:solidFill>
-              <a:effectLst/>
-            </a:endParaRPr>
-          </a:p>
-          <a:p>
-            <a:pPr marL="457200" indent="-457200">
-              <a:buFont typeface="+mj-lt"/>
-              <a:buAutoNum type="arabicPeriod"/>
-            </a:pPr>
-            <a:r>
-              <a:rPr lang="en-US" sz="2000" dirty="0">
-                <a:solidFill>
-                  <a:schemeClr val="bg1"/>
-                </a:solidFill>
-                <a:hlinkClick r:id="rId4"/>
-              </a:rPr>
-              <a:t>https://stackoverflow.com/</a:t>
-            </a:r>
-            <a:r>
-              <a:rPr lang="en-US" sz="2000" dirty="0">
-                <a:solidFill>
-                  <a:schemeClr val="bg1"/>
-                </a:solidFill>
-              </a:rPr>
-              <a:t> - Non-stop Forum Searching.</a:t>
-            </a:r>
-          </a:p>
-          <a:p>
-            <a:pPr marL="457200" indent="-457200">
-              <a:buFont typeface="+mj-lt"/>
-              <a:buAutoNum type="arabicPeriod"/>
-            </a:pPr>
-            <a:r>
-              <a:rPr lang="en-US" sz="2000" dirty="0">
-                <a:solidFill>
-                  <a:schemeClr val="bg1"/>
-                </a:solidFill>
-                <a:hlinkClick r:id="rId5"/>
-              </a:rPr>
-              <a:t>https://scikit-learn.org/stable/user_guide.html</a:t>
-            </a:r>
-            <a:r>
-              <a:rPr lang="en-US" sz="2000" dirty="0">
-                <a:solidFill>
-                  <a:schemeClr val="bg1"/>
-                </a:solidFill>
-              </a:rPr>
-              <a:t> - </a:t>
-            </a:r>
-            <a:r>
-              <a:rPr lang="en-US" sz="2000" dirty="0" err="1">
-                <a:solidFill>
-                  <a:schemeClr val="bg1"/>
-                </a:solidFill>
-              </a:rPr>
-              <a:t>SkLearn</a:t>
-            </a:r>
-            <a:r>
-              <a:rPr lang="en-US" sz="2000" dirty="0">
-                <a:solidFill>
-                  <a:schemeClr val="bg1"/>
-                </a:solidFill>
-              </a:rPr>
-              <a:t> Documentation.</a:t>
-            </a:r>
-          </a:p>
-          <a:p>
-            <a:pPr marL="457200" indent="-457200">
-              <a:buFont typeface="+mj-lt"/>
-              <a:buAutoNum type="arabicPeriod"/>
-            </a:pPr>
-            <a:r>
-              <a:rPr lang="en-US" sz="2000" dirty="0">
-                <a:solidFill>
-                  <a:schemeClr val="bg1"/>
-                </a:solidFill>
-                <a:hlinkClick r:id="rId6"/>
-              </a:rPr>
-              <a:t>https://www.sktime.net/en/stable/</a:t>
-            </a:r>
-            <a:r>
-              <a:rPr lang="en-US" sz="2000" dirty="0">
-                <a:solidFill>
-                  <a:schemeClr val="bg1"/>
-                </a:solidFill>
-              </a:rPr>
-              <a:t> - </a:t>
-            </a:r>
-            <a:r>
-              <a:rPr lang="en-US" sz="2000" dirty="0" err="1">
-                <a:solidFill>
-                  <a:schemeClr val="bg1"/>
-                </a:solidFill>
-              </a:rPr>
-              <a:t>SkTime</a:t>
-            </a:r>
-            <a:r>
-              <a:rPr lang="en-US" sz="2000" dirty="0">
-                <a:solidFill>
-                  <a:schemeClr val="bg1"/>
-                </a:solidFill>
-              </a:rPr>
-              <a:t> Documentation.</a:t>
-            </a:r>
-          </a:p>
-          <a:p>
-            <a:endParaRPr lang="en-US" sz="2000" dirty="0">
-              <a:solidFill>
-                <a:schemeClr val="bg1"/>
-              </a:solidFill>
-            </a:endParaRPr>
-          </a:p>
-          <a:p>
-            <a:pPr lvl="1"/>
-            <a:endParaRPr lang="en-US" sz="1000" dirty="0">
-              <a:solidFill>
-                <a:schemeClr val="bg1"/>
-              </a:solidFill>
-              <a:effectLst/>
-            </a:endParaRPr>
-          </a:p>
-          <a:p>
-            <a:endParaRPr lang="en-US" sz="2000" dirty="0">
-              <a:solidFill>
-                <a:schemeClr val="bg1"/>
-              </a:solidFill>
-            </a:endParaRPr>
-          </a:p>
-          <a:p>
-            <a:endParaRPr lang="en-CA" sz="2000" dirty="0">
-              <a:solidFill>
-                <a:schemeClr val="bg1"/>
-              </a:solidFill>
-            </a:endParaRPr>
-          </a:p>
-        </p:txBody>
-      </p:sp>
-      <p:sp>
-        <p:nvSpPr>
-          <p:cNvPr id="15" name="Rectangle 14">
-            <a:extLst>
-              <a:ext uri="{FF2B5EF4-FFF2-40B4-BE49-F238E27FC236}">
-                <a16:creationId xmlns:a16="http://schemas.microsoft.com/office/drawing/2014/main" id="{9DD005C1-8C51-42D6-9BEE-B9B83849743D}"/>
+      <p:cxnSp>
+        <p:nvCxnSpPr>
+          <p:cNvPr id="26" name="Straight Connector 25">
+            <a:extLst>
+              <a:ext uri="{FF2B5EF4-FFF2-40B4-BE49-F238E27FC236}">
+                <a16:creationId xmlns:a16="http://schemas.microsoft.com/office/drawing/2014/main" id="{EE7CEFB9-5672-4FC6-981B-C8DA3FE08EA2}"/>
               </a:ext>
               <a:ext uri="{C183D7F6-B498-43B3-948B-1728B52AA6E4}">
                 <adec:decorative xmlns:adec="http://schemas.microsoft.com/office/drawing/2017/decorative" val="1"/>
               </a:ext>
             </a:extLst>
           </p:cNvPr>
-          <p:cNvSpPr>
-            <a:spLocks noGrp="1" noRot="1" noChangeAspect="1" noMove="1" noResize="1" noEditPoints="1" noAdjustHandles="1" noChangeArrowheads="1" noChangeShapeType="1" noTextEdit="1"/>
-          </p:cNvSpPr>
+          <p:cNvCxnSpPr>
+            <a:cxnSpLocks noGrp="1" noRot="1" noChangeAspect="1" noMove="1" noResize="1" noEditPoints="1" noAdjustHandles="1" noChangeArrowheads="1" noChangeShapeType="1"/>
+          </p:cNvCxnSpPr>
           <p:nvPr>
             <p:extLst>
               <p:ext uri="{386F3935-93C4-4BCD-93E2-E3B085C9AB24}">
@@ -4648,20 +4363,737 @@
               </p:ext>
             </p:extLst>
           </p:nvPr>
-        </p:nvSpPr>
-        <p:spPr>
-          <a:xfrm>
-            <a:off x="126206" y="115193"/>
-            <a:ext cx="11939588" cy="6627614"/>
-          </a:xfrm>
-          <a:prstGeom prst="rect">
+        </p:nvCxnSpPr>
+        <p:spPr>
+          <a:xfrm flipH="1">
+            <a:off x="8610600" y="1560911"/>
+            <a:ext cx="3581400" cy="0"/>
+          </a:xfrm>
+          <a:prstGeom prst="line">
             <a:avLst/>
           </a:prstGeom>
-          <a:noFill/>
           <a:ln w="12700">
             <a:solidFill>
               <a:schemeClr val="accent2"/>
             </a:solidFill>
+          </a:ln>
+        </p:spPr>
+        <p:style>
+          <a:lnRef idx="1">
+            <a:schemeClr val="accent1"/>
+          </a:lnRef>
+          <a:fillRef idx="0">
+            <a:schemeClr val="accent1"/>
+          </a:fillRef>
+          <a:effectRef idx="0">
+            <a:schemeClr val="accent1"/>
+          </a:effectRef>
+          <a:fontRef idx="minor">
+            <a:schemeClr val="tx1"/>
+          </a:fontRef>
+        </p:style>
+      </p:cxnSp>
+      <p:cxnSp>
+        <p:nvCxnSpPr>
+          <p:cNvPr id="28" name="Straight Connector 27">
+            <a:extLst>
+              <a:ext uri="{FF2B5EF4-FFF2-40B4-BE49-F238E27FC236}">
+                <a16:creationId xmlns:a16="http://schemas.microsoft.com/office/drawing/2014/main" id="{74234A4C-A256-4139-A5F4-27078F0D6796}"/>
+              </a:ext>
+              <a:ext uri="{C183D7F6-B498-43B3-948B-1728B52AA6E4}">
+                <adec:decorative xmlns:adec="http://schemas.microsoft.com/office/drawing/2017/decorative" val="1"/>
+              </a:ext>
+            </a:extLst>
+          </p:cNvPr>
+          <p:cNvCxnSpPr>
+            <a:cxnSpLocks noGrp="1" noRot="1" noChangeAspect="1" noMove="1" noResize="1" noEditPoints="1" noAdjustHandles="1" noChangeArrowheads="1" noChangeShapeType="1"/>
+          </p:cNvCxnSpPr>
+          <p:nvPr>
+            <p:extLst>
+              <p:ext uri="{386F3935-93C4-4BCD-93E2-E3B085C9AB24}">
+                <p16:designElem xmlns:p16="http://schemas.microsoft.com/office/powerpoint/2015/main" val="1"/>
+              </p:ext>
+            </p:extLst>
+          </p:nvPr>
+        </p:nvCxnSpPr>
+        <p:spPr>
+          <a:xfrm flipH="1">
+            <a:off x="3048" y="5286237"/>
+            <a:ext cx="12188952" cy="0"/>
+          </a:xfrm>
+          <a:prstGeom prst="line">
+            <a:avLst/>
+          </a:prstGeom>
+          <a:ln w="12700">
+            <a:solidFill>
+              <a:schemeClr val="accent2"/>
+            </a:solidFill>
+          </a:ln>
+        </p:spPr>
+        <p:style>
+          <a:lnRef idx="1">
+            <a:schemeClr val="accent1"/>
+          </a:lnRef>
+          <a:fillRef idx="0">
+            <a:schemeClr val="accent1"/>
+          </a:fillRef>
+          <a:effectRef idx="0">
+            <a:schemeClr val="accent1"/>
+          </a:effectRef>
+          <a:fontRef idx="minor">
+            <a:schemeClr val="tx1"/>
+          </a:fontRef>
+        </p:style>
+      </p:cxnSp>
+      <p:sp>
+        <p:nvSpPr>
+          <p:cNvPr id="4" name="Date Placeholder 3">
+            <a:extLst>
+              <a:ext uri="{FF2B5EF4-FFF2-40B4-BE49-F238E27FC236}">
+                <a16:creationId xmlns:a16="http://schemas.microsoft.com/office/drawing/2014/main" id="{60AA39EA-1BD4-5ADF-82A5-488914B68D98}"/>
+              </a:ext>
+            </a:extLst>
+          </p:cNvPr>
+          <p:cNvSpPr>
+            <a:spLocks noGrp="1"/>
+          </p:cNvSpPr>
+          <p:nvPr>
+            <p:ph type="dt" sz="half" idx="10"/>
+          </p:nvPr>
+        </p:nvSpPr>
+        <p:spPr>
+          <a:xfrm>
+            <a:off x="838200" y="6356350"/>
+            <a:ext cx="2743200" cy="365125"/>
+          </a:xfrm>
+        </p:spPr>
+        <p:txBody>
+          <a:bodyPr vert="horz" lIns="91440" tIns="45720" rIns="91440" bIns="45720" rtlCol="0" anchor="ctr">
+            <a:normAutofit/>
+          </a:bodyPr>
+          <a:lstStyle/>
+          <a:p>
+            <a:pPr>
+              <a:spcAft>
+                <a:spcPts val="600"/>
+              </a:spcAft>
+            </a:pPr>
+            <a:fld id="{DD303E3B-074C-440F-86D1-3BB7E04505DE}" type="datetimeyyyy">
+              <a:rPr lang="en-US">
+                <a:solidFill>
+                  <a:schemeClr val="bg1">
+                    <a:lumMod val="50000"/>
+                  </a:schemeClr>
+                </a:solidFill>
+              </a:rPr>
+              <a:pPr>
+                <a:spcAft>
+                  <a:spcPts val="600"/>
+                </a:spcAft>
+              </a:pPr>
+              <a:t>2024</a:t>
+            </a:fld>
+            <a:endParaRPr lang="en-US">
+              <a:solidFill>
+                <a:schemeClr val="bg1">
+                  <a:lumMod val="50000"/>
+                </a:schemeClr>
+              </a:solidFill>
+            </a:endParaRPr>
+          </a:p>
+        </p:txBody>
+      </p:sp>
+      <p:sp>
+        <p:nvSpPr>
+          <p:cNvPr id="5" name="Footer Placeholder 4">
+            <a:extLst>
+              <a:ext uri="{FF2B5EF4-FFF2-40B4-BE49-F238E27FC236}">
+                <a16:creationId xmlns:a16="http://schemas.microsoft.com/office/drawing/2014/main" id="{8251454E-77DD-4304-F4AF-245027455781}"/>
+              </a:ext>
+            </a:extLst>
+          </p:cNvPr>
+          <p:cNvSpPr>
+            <a:spLocks noGrp="1"/>
+          </p:cNvSpPr>
+          <p:nvPr>
+            <p:ph type="ftr" sz="quarter" idx="11"/>
+          </p:nvPr>
+        </p:nvSpPr>
+        <p:spPr>
+          <a:xfrm>
+            <a:off x="4038600" y="6356350"/>
+            <a:ext cx="4114800" cy="365125"/>
+          </a:xfrm>
+        </p:spPr>
+        <p:txBody>
+          <a:bodyPr vert="horz" lIns="91440" tIns="45720" rIns="91440" bIns="45720" rtlCol="0" anchor="ctr">
+            <a:normAutofit/>
+          </a:bodyPr>
+          <a:lstStyle/>
+          <a:p>
+            <a:pPr>
+              <a:spcAft>
+                <a:spcPts val="600"/>
+              </a:spcAft>
+            </a:pPr>
+            <a:r>
+              <a:rPr lang="en-US" kern="1200">
+                <a:solidFill>
+                  <a:schemeClr val="bg1">
+                    <a:lumMod val="50000"/>
+                  </a:schemeClr>
+                </a:solidFill>
+                <a:latin typeface="+mn-lt"/>
+                <a:ea typeface="+mn-ea"/>
+                <a:cs typeface="+mn-cs"/>
+              </a:rPr>
+              <a:t>GENG4500-60</a:t>
+            </a:r>
+          </a:p>
+        </p:txBody>
+      </p:sp>
+      <p:sp>
+        <p:nvSpPr>
+          <p:cNvPr id="6" name="Slide Number Placeholder 5">
+            <a:extLst>
+              <a:ext uri="{FF2B5EF4-FFF2-40B4-BE49-F238E27FC236}">
+                <a16:creationId xmlns:a16="http://schemas.microsoft.com/office/drawing/2014/main" id="{525E3120-057C-155F-E7EF-176F72BED592}"/>
+              </a:ext>
+            </a:extLst>
+          </p:cNvPr>
+          <p:cNvSpPr>
+            <a:spLocks noGrp="1"/>
+          </p:cNvSpPr>
+          <p:nvPr>
+            <p:ph type="sldNum" sz="quarter" idx="12"/>
+          </p:nvPr>
+        </p:nvSpPr>
+        <p:spPr>
+          <a:xfrm>
+            <a:off x="8610600" y="6356350"/>
+            <a:ext cx="2743200" cy="365125"/>
+          </a:xfrm>
+        </p:spPr>
+        <p:txBody>
+          <a:bodyPr vert="horz" lIns="91440" tIns="45720" rIns="91440" bIns="45720" rtlCol="0" anchor="ctr">
+            <a:normAutofit/>
+          </a:bodyPr>
+          <a:lstStyle/>
+          <a:p>
+            <a:pPr>
+              <a:spcAft>
+                <a:spcPts val="600"/>
+              </a:spcAft>
+            </a:pPr>
+            <a:fld id="{BC1B8E0F-90D7-4F6F-9CC4-1E156486B9C1}" type="slidenum">
+              <a:rPr lang="en-US">
+                <a:solidFill>
+                  <a:schemeClr val="bg1">
+                    <a:lumMod val="50000"/>
+                  </a:schemeClr>
+                </a:solidFill>
+              </a:rPr>
+              <a:pPr>
+                <a:spcAft>
+                  <a:spcPts val="600"/>
+                </a:spcAft>
+              </a:pPr>
+              <a:t>10</a:t>
+            </a:fld>
+            <a:endParaRPr lang="en-US">
+              <a:solidFill>
+                <a:schemeClr val="bg1">
+                  <a:lumMod val="50000"/>
+                </a:schemeClr>
+              </a:solidFill>
+            </a:endParaRPr>
+          </a:p>
+        </p:txBody>
+      </p:sp>
+      <p:pic>
+        <p:nvPicPr>
+          <p:cNvPr id="10" name="Graphic 9">
+            <a:extLst>
+              <a:ext uri="{FF2B5EF4-FFF2-40B4-BE49-F238E27FC236}">
+                <a16:creationId xmlns:a16="http://schemas.microsoft.com/office/drawing/2014/main" id="{747E059B-53EE-437F-9B0A-CF6AC4D74308}"/>
+              </a:ext>
+            </a:extLst>
+          </p:cNvPr>
+          <p:cNvPicPr>
+            <a:picLocks noChangeAspect="1"/>
+          </p:cNvPicPr>
+          <p:nvPr/>
+        </p:nvPicPr>
+        <p:blipFill>
+          <a:blip r:embed="rId2">
+            <a:extLst>
+              <a:ext uri="{28A0092B-C50C-407E-A947-70E740481C1C}">
+                <a14:useLocalDpi xmlns:a14="http://schemas.microsoft.com/office/drawing/2010/main" val="0"/>
+              </a:ext>
+              <a:ext uri="{96DAC541-7B7A-43D3-8B79-37D633B846F1}">
+                <asvg:svgBlip xmlns:asvg="http://schemas.microsoft.com/office/drawing/2016/SVG/main" r:embed="rId3"/>
+              </a:ext>
+            </a:extLst>
+          </a:blip>
+          <a:stretch>
+            <a:fillRect/>
+          </a:stretch>
+        </p:blipFill>
+        <p:spPr>
+          <a:xfrm>
+            <a:off x="387069" y="1656417"/>
+            <a:ext cx="4630891" cy="3436810"/>
+          </a:xfrm>
+          <a:prstGeom prst="rect">
+            <a:avLst/>
+          </a:prstGeom>
+        </p:spPr>
+      </p:pic>
+      <p:sp>
+        <p:nvSpPr>
+          <p:cNvPr id="3" name="Oval 2">
+            <a:extLst>
+              <a:ext uri="{FF2B5EF4-FFF2-40B4-BE49-F238E27FC236}">
+                <a16:creationId xmlns:a16="http://schemas.microsoft.com/office/drawing/2014/main" id="{7E41FF53-FA93-B8AC-E4D7-264F7ACF5CB6}"/>
+              </a:ext>
+            </a:extLst>
+          </p:cNvPr>
+          <p:cNvSpPr/>
+          <p:nvPr/>
+        </p:nvSpPr>
+        <p:spPr>
+          <a:xfrm>
+            <a:off x="2304288" y="3063240"/>
+            <a:ext cx="557784" cy="731520"/>
+          </a:xfrm>
+          <a:prstGeom prst="ellipse">
+            <a:avLst/>
+          </a:prstGeom>
+          <a:noFill/>
+        </p:spPr>
+        <p:style>
+          <a:lnRef idx="2">
+            <a:schemeClr val="accent2"/>
+          </a:lnRef>
+          <a:fillRef idx="1">
+            <a:schemeClr val="lt1"/>
+          </a:fillRef>
+          <a:effectRef idx="0">
+            <a:schemeClr val="accent2"/>
+          </a:effectRef>
+          <a:fontRef idx="minor">
+            <a:schemeClr val="dk1"/>
+          </a:fontRef>
+        </p:style>
+        <p:txBody>
+          <a:bodyPr rtlCol="0" anchor="ctr"/>
+          <a:lstStyle/>
+          <a:p>
+            <a:pPr algn="ctr"/>
+            <a:endParaRPr lang="en-CA"/>
+          </a:p>
+        </p:txBody>
+      </p:sp>
+      <p:sp>
+        <p:nvSpPr>
+          <p:cNvPr id="9" name="Oval 8">
+            <a:extLst>
+              <a:ext uri="{FF2B5EF4-FFF2-40B4-BE49-F238E27FC236}">
+                <a16:creationId xmlns:a16="http://schemas.microsoft.com/office/drawing/2014/main" id="{1D28FCD0-F751-5CE1-43A6-9EB0384A629A}"/>
+              </a:ext>
+            </a:extLst>
+          </p:cNvPr>
+          <p:cNvSpPr/>
+          <p:nvPr/>
+        </p:nvSpPr>
+        <p:spPr>
+          <a:xfrm>
+            <a:off x="2970249" y="2778416"/>
+            <a:ext cx="467895" cy="531712"/>
+          </a:xfrm>
+          <a:prstGeom prst="ellipse">
+            <a:avLst/>
+          </a:prstGeom>
+          <a:noFill/>
+        </p:spPr>
+        <p:style>
+          <a:lnRef idx="2">
+            <a:schemeClr val="accent2"/>
+          </a:lnRef>
+          <a:fillRef idx="1">
+            <a:schemeClr val="lt1"/>
+          </a:fillRef>
+          <a:effectRef idx="0">
+            <a:schemeClr val="accent2"/>
+          </a:effectRef>
+          <a:fontRef idx="minor">
+            <a:schemeClr val="dk1"/>
+          </a:fontRef>
+        </p:style>
+        <p:txBody>
+          <a:bodyPr rtlCol="0" anchor="ctr"/>
+          <a:lstStyle/>
+          <a:p>
+            <a:pPr algn="ctr"/>
+            <a:endParaRPr lang="en-CA"/>
+          </a:p>
+        </p:txBody>
+      </p:sp>
+      <p:sp>
+        <p:nvSpPr>
+          <p:cNvPr id="11" name="Oval 10">
+            <a:extLst>
+              <a:ext uri="{FF2B5EF4-FFF2-40B4-BE49-F238E27FC236}">
+                <a16:creationId xmlns:a16="http://schemas.microsoft.com/office/drawing/2014/main" id="{A46F3365-A092-80FF-4DBE-3DA2F9EE1814}"/>
+              </a:ext>
+            </a:extLst>
+          </p:cNvPr>
+          <p:cNvSpPr/>
+          <p:nvPr/>
+        </p:nvSpPr>
+        <p:spPr>
+          <a:xfrm>
+            <a:off x="3705062" y="2292015"/>
+            <a:ext cx="467895" cy="531712"/>
+          </a:xfrm>
+          <a:prstGeom prst="ellipse">
+            <a:avLst/>
+          </a:prstGeom>
+          <a:noFill/>
+        </p:spPr>
+        <p:style>
+          <a:lnRef idx="2">
+            <a:schemeClr val="accent2"/>
+          </a:lnRef>
+          <a:fillRef idx="1">
+            <a:schemeClr val="lt1"/>
+          </a:fillRef>
+          <a:effectRef idx="0">
+            <a:schemeClr val="accent2"/>
+          </a:effectRef>
+          <a:fontRef idx="minor">
+            <a:schemeClr val="dk1"/>
+          </a:fontRef>
+        </p:style>
+        <p:txBody>
+          <a:bodyPr rtlCol="0" anchor="ctr"/>
+          <a:lstStyle/>
+          <a:p>
+            <a:pPr algn="ctr"/>
+            <a:endParaRPr lang="en-CA"/>
+          </a:p>
+        </p:txBody>
+      </p:sp>
+      <p:sp>
+        <p:nvSpPr>
+          <p:cNvPr id="12" name="Title 1">
+            <a:extLst>
+              <a:ext uri="{FF2B5EF4-FFF2-40B4-BE49-F238E27FC236}">
+                <a16:creationId xmlns:a16="http://schemas.microsoft.com/office/drawing/2014/main" id="{50F3F5DB-9116-E470-FA34-4BAEA2E9375A}"/>
+              </a:ext>
+            </a:extLst>
+          </p:cNvPr>
+          <p:cNvSpPr txBox="1">
+            <a:spLocks/>
+          </p:cNvSpPr>
+          <p:nvPr/>
+        </p:nvSpPr>
+        <p:spPr>
+          <a:xfrm>
+            <a:off x="8459961" y="973709"/>
+            <a:ext cx="3732039" cy="587202"/>
+          </a:xfrm>
+          <a:prstGeom prst="rect">
+            <a:avLst/>
+          </a:prstGeom>
+        </p:spPr>
+        <p:txBody>
+          <a:bodyPr vert="horz" lIns="91440" tIns="45720" rIns="91440" bIns="45720" rtlCol="0" anchor="ctr">
+            <a:normAutofit fontScale="67500" lnSpcReduction="20000"/>
+          </a:bodyPr>
+          <a:lstStyle>
+            <a:lvl1pPr algn="l" defTabSz="914400" rtl="0" eaLnBrk="1" latinLnBrk="0" hangingPunct="1">
+              <a:lnSpc>
+                <a:spcPct val="90000"/>
+              </a:lnSpc>
+              <a:spcBef>
+                <a:spcPct val="0"/>
+              </a:spcBef>
+              <a:buNone/>
+              <a:defRPr sz="4400" kern="1200">
+                <a:solidFill>
+                  <a:schemeClr val="tx1"/>
+                </a:solidFill>
+                <a:latin typeface="+mj-lt"/>
+                <a:ea typeface="+mj-ea"/>
+                <a:cs typeface="+mj-cs"/>
+              </a:defRPr>
+            </a:lvl1pPr>
+          </a:lstStyle>
+          <a:p>
+            <a:pPr algn="ctr"/>
+            <a:r>
+              <a:rPr lang="en-US" sz="6000" dirty="0">
+                <a:solidFill>
+                  <a:schemeClr val="bg1"/>
+                </a:solidFill>
+              </a:rPr>
+              <a:t>Final Graph</a:t>
+            </a:r>
+          </a:p>
+        </p:txBody>
+      </p:sp>
+      <p:pic>
+        <p:nvPicPr>
+          <p:cNvPr id="14" name="Graphic 13">
+            <a:extLst>
+              <a:ext uri="{FF2B5EF4-FFF2-40B4-BE49-F238E27FC236}">
+                <a16:creationId xmlns:a16="http://schemas.microsoft.com/office/drawing/2014/main" id="{EFF52BAA-0AE2-0CF8-D3DE-6B722C699F28}"/>
+              </a:ext>
+            </a:extLst>
+          </p:cNvPr>
+          <p:cNvPicPr>
+            <a:picLocks noChangeAspect="1"/>
+          </p:cNvPicPr>
+          <p:nvPr/>
+        </p:nvPicPr>
+        <p:blipFill>
+          <a:blip r:embed="rId4">
+            <a:extLst>
+              <a:ext uri="{28A0092B-C50C-407E-A947-70E740481C1C}">
+                <a14:useLocalDpi xmlns:a14="http://schemas.microsoft.com/office/drawing/2010/main" val="0"/>
+              </a:ext>
+              <a:ext uri="{96DAC541-7B7A-43D3-8B79-37D633B846F1}">
+                <asvg:svgBlip xmlns:asvg="http://schemas.microsoft.com/office/drawing/2016/SVG/main" r:embed="rId5"/>
+              </a:ext>
+            </a:extLst>
+          </a:blip>
+          <a:stretch>
+            <a:fillRect/>
+          </a:stretch>
+        </p:blipFill>
+        <p:spPr>
+          <a:xfrm>
+            <a:off x="7355176" y="1656417"/>
+            <a:ext cx="4630891" cy="3436810"/>
+          </a:xfrm>
+          <a:prstGeom prst="rect">
+            <a:avLst/>
+          </a:prstGeom>
+        </p:spPr>
+      </p:pic>
+      <p:sp>
+        <p:nvSpPr>
+          <p:cNvPr id="15" name="Oval 14">
+            <a:extLst>
+              <a:ext uri="{FF2B5EF4-FFF2-40B4-BE49-F238E27FC236}">
+                <a16:creationId xmlns:a16="http://schemas.microsoft.com/office/drawing/2014/main" id="{D53197E9-900A-9E7C-67D3-35A0B42C735C}"/>
+              </a:ext>
+            </a:extLst>
+          </p:cNvPr>
+          <p:cNvSpPr/>
+          <p:nvPr/>
+        </p:nvSpPr>
+        <p:spPr>
+          <a:xfrm>
+            <a:off x="9202928" y="3348714"/>
+            <a:ext cx="794512" cy="1009925"/>
+          </a:xfrm>
+          <a:prstGeom prst="ellipse">
+            <a:avLst/>
+          </a:prstGeom>
+          <a:noFill/>
+        </p:spPr>
+        <p:style>
+          <a:lnRef idx="2">
+            <a:schemeClr val="accent2"/>
+          </a:lnRef>
+          <a:fillRef idx="1">
+            <a:schemeClr val="lt1"/>
+          </a:fillRef>
+          <a:effectRef idx="0">
+            <a:schemeClr val="accent2"/>
+          </a:effectRef>
+          <a:fontRef idx="minor">
+            <a:schemeClr val="dk1"/>
+          </a:fontRef>
+        </p:style>
+        <p:txBody>
+          <a:bodyPr rtlCol="0" anchor="ctr"/>
+          <a:lstStyle/>
+          <a:p>
+            <a:pPr algn="ctr"/>
+            <a:endParaRPr lang="en-CA"/>
+          </a:p>
+        </p:txBody>
+      </p:sp>
+      <p:sp>
+        <p:nvSpPr>
+          <p:cNvPr id="16" name="Oval 15">
+            <a:extLst>
+              <a:ext uri="{FF2B5EF4-FFF2-40B4-BE49-F238E27FC236}">
+                <a16:creationId xmlns:a16="http://schemas.microsoft.com/office/drawing/2014/main" id="{F8E7D74C-ED90-1B51-A95A-7FA3634DA067}"/>
+              </a:ext>
+            </a:extLst>
+          </p:cNvPr>
+          <p:cNvSpPr/>
+          <p:nvPr/>
+        </p:nvSpPr>
+        <p:spPr>
+          <a:xfrm>
+            <a:off x="9982200" y="3044272"/>
+            <a:ext cx="467895" cy="531712"/>
+          </a:xfrm>
+          <a:prstGeom prst="ellipse">
+            <a:avLst/>
+          </a:prstGeom>
+          <a:noFill/>
+        </p:spPr>
+        <p:style>
+          <a:lnRef idx="2">
+            <a:schemeClr val="accent2"/>
+          </a:lnRef>
+          <a:fillRef idx="1">
+            <a:schemeClr val="lt1"/>
+          </a:fillRef>
+          <a:effectRef idx="0">
+            <a:schemeClr val="accent2"/>
+          </a:effectRef>
+          <a:fontRef idx="minor">
+            <a:schemeClr val="dk1"/>
+          </a:fontRef>
+        </p:style>
+        <p:txBody>
+          <a:bodyPr rtlCol="0" anchor="ctr"/>
+          <a:lstStyle/>
+          <a:p>
+            <a:pPr algn="ctr"/>
+            <a:endParaRPr lang="en-CA"/>
+          </a:p>
+        </p:txBody>
+      </p:sp>
+      <p:sp>
+        <p:nvSpPr>
+          <p:cNvPr id="17" name="Oval 16">
+            <a:extLst>
+              <a:ext uri="{FF2B5EF4-FFF2-40B4-BE49-F238E27FC236}">
+                <a16:creationId xmlns:a16="http://schemas.microsoft.com/office/drawing/2014/main" id="{424194E6-5EAA-8FA8-9E07-C0EA4072214A}"/>
+              </a:ext>
+            </a:extLst>
+          </p:cNvPr>
+          <p:cNvSpPr/>
+          <p:nvPr/>
+        </p:nvSpPr>
+        <p:spPr>
+          <a:xfrm>
+            <a:off x="10691849" y="2365167"/>
+            <a:ext cx="467895" cy="531712"/>
+          </a:xfrm>
+          <a:prstGeom prst="ellipse">
+            <a:avLst/>
+          </a:prstGeom>
+          <a:noFill/>
+        </p:spPr>
+        <p:style>
+          <a:lnRef idx="2">
+            <a:schemeClr val="accent2"/>
+          </a:lnRef>
+          <a:fillRef idx="1">
+            <a:schemeClr val="lt1"/>
+          </a:fillRef>
+          <a:effectRef idx="0">
+            <a:schemeClr val="accent2"/>
+          </a:effectRef>
+          <a:fontRef idx="minor">
+            <a:schemeClr val="dk1"/>
+          </a:fontRef>
+        </p:style>
+        <p:txBody>
+          <a:bodyPr rtlCol="0" anchor="ctr"/>
+          <a:lstStyle/>
+          <a:p>
+            <a:pPr algn="ctr"/>
+            <a:endParaRPr lang="en-CA"/>
+          </a:p>
+        </p:txBody>
+      </p:sp>
+    </p:spTree>
+    <p:extLst>
+      <p:ext uri="{BB962C8B-B14F-4D97-AF65-F5344CB8AC3E}">
+        <p14:creationId xmlns:p14="http://schemas.microsoft.com/office/powerpoint/2010/main" val="795103504"/>
+      </p:ext>
+    </p:extLst>
+  </p:cSld>
+  <p:clrMapOvr>
+    <a:masterClrMapping/>
+  </p:clrMapOvr>
+</p:sld>
+</file>
+
+<file path=ppt/slides/slide11.xml><?xml version="1.0" encoding="utf-8"?>
+<p:sld xmlns:a="http://schemas.openxmlformats.org/drawingml/2006/main" xmlns:r="http://schemas.openxmlformats.org/officeDocument/2006/relationships" xmlns:p="http://schemas.openxmlformats.org/presentationml/2006/main">
+  <p:cSld>
+    <p:bg>
+      <p:bgPr>
+        <a:solidFill>
+          <a:schemeClr val="bg1"/>
+        </a:solidFill>
+        <a:effectLst/>
+      </p:bgPr>
+    </p:bg>
+    <p:spTree>
+      <p:nvGrpSpPr>
+        <p:cNvPr id="1" name=""/>
+        <p:cNvGrpSpPr/>
+        <p:nvPr/>
+      </p:nvGrpSpPr>
+      <p:grpSpPr>
+        <a:xfrm>
+          <a:off x="0" y="0"/>
+          <a:ext cx="0" cy="0"/>
+          <a:chOff x="0" y="0"/>
+          <a:chExt cx="0" cy="0"/>
+        </a:xfrm>
+      </p:grpSpPr>
+      <p:sp>
+        <p:nvSpPr>
+          <p:cNvPr id="22" name="Rectangle 21">
+            <a:extLst>
+              <a:ext uri="{FF2B5EF4-FFF2-40B4-BE49-F238E27FC236}">
+                <a16:creationId xmlns:a16="http://schemas.microsoft.com/office/drawing/2014/main" id="{FB5B0058-AF13-4859-B429-4EDDE2A26F7F}"/>
+              </a:ext>
+              <a:ext uri="{C183D7F6-B498-43B3-948B-1728B52AA6E4}">
+                <adec:decorative xmlns:adec="http://schemas.microsoft.com/office/drawing/2017/decorative" val="1"/>
+              </a:ext>
+            </a:extLst>
+          </p:cNvPr>
+          <p:cNvSpPr>
+            <a:spLocks noGrp="1" noRot="1" noChangeAspect="1" noMove="1" noResize="1" noEditPoints="1" noAdjustHandles="1" noChangeArrowheads="1" noChangeShapeType="1" noTextEdit="1"/>
+          </p:cNvSpPr>
+          <p:nvPr>
+            <p:extLst>
+              <p:ext uri="{386F3935-93C4-4BCD-93E2-E3B085C9AB24}">
+                <p16:designElem xmlns:p16="http://schemas.microsoft.com/office/powerpoint/2015/main" val="1"/>
+              </p:ext>
+            </p:extLst>
+          </p:nvPr>
+        </p:nvSpPr>
+        <p:spPr>
+          <a:xfrm>
+            <a:off x="0" y="0"/>
+            <a:ext cx="12192000" cy="6858000"/>
+          </a:xfrm>
+          <a:prstGeom prst="rect">
+            <a:avLst/>
+          </a:prstGeom>
+          <a:solidFill>
+            <a:schemeClr val="tx1">
+              <a:lumMod val="95000"/>
+              <a:lumOff val="5000"/>
+            </a:schemeClr>
+          </a:solidFill>
+          <a:ln>
+            <a:noFill/>
           </a:ln>
         </p:spPr>
         <p:style>
@@ -4685,6 +5117,1233 @@
           <a:lstStyle/>
           <a:p>
             <a:pPr algn="ctr"/>
+            <a:endParaRPr lang="en-US" dirty="0">
+              <a:solidFill>
+                <a:schemeClr val="tx1"/>
+              </a:solidFill>
+            </a:endParaRPr>
+          </a:p>
+        </p:txBody>
+      </p:sp>
+      <p:cxnSp>
+        <p:nvCxnSpPr>
+          <p:cNvPr id="24" name="Straight Connector 23">
+            <a:extLst>
+              <a:ext uri="{FF2B5EF4-FFF2-40B4-BE49-F238E27FC236}">
+                <a16:creationId xmlns:a16="http://schemas.microsoft.com/office/drawing/2014/main" id="{E6D6B450-4278-45B8-88C7-C061710E3C7E}"/>
+              </a:ext>
+              <a:ext uri="{C183D7F6-B498-43B3-948B-1728B52AA6E4}">
+                <adec:decorative xmlns:adec="http://schemas.microsoft.com/office/drawing/2017/decorative" val="1"/>
+              </a:ext>
+            </a:extLst>
+          </p:cNvPr>
+          <p:cNvCxnSpPr>
+            <a:cxnSpLocks noGrp="1" noRot="1" noChangeAspect="1" noMove="1" noResize="1" noEditPoints="1" noAdjustHandles="1" noChangeArrowheads="1" noChangeShapeType="1"/>
+          </p:cNvCxnSpPr>
+          <p:nvPr>
+            <p:extLst>
+              <p:ext uri="{386F3935-93C4-4BCD-93E2-E3B085C9AB24}">
+                <p16:designElem xmlns:p16="http://schemas.microsoft.com/office/powerpoint/2015/main" val="1"/>
+              </p:ext>
+            </p:extLst>
+          </p:nvPr>
+        </p:nvCxnSpPr>
+        <p:spPr>
+          <a:xfrm flipH="1">
+            <a:off x="0" y="1560911"/>
+            <a:ext cx="3581400" cy="0"/>
+          </a:xfrm>
+          <a:prstGeom prst="line">
+            <a:avLst/>
+          </a:prstGeom>
+          <a:ln w="12700">
+            <a:solidFill>
+              <a:schemeClr val="accent2"/>
+            </a:solidFill>
+          </a:ln>
+        </p:spPr>
+        <p:style>
+          <a:lnRef idx="1">
+            <a:schemeClr val="accent1"/>
+          </a:lnRef>
+          <a:fillRef idx="0">
+            <a:schemeClr val="accent1"/>
+          </a:fillRef>
+          <a:effectRef idx="0">
+            <a:schemeClr val="accent1"/>
+          </a:effectRef>
+          <a:fontRef idx="minor">
+            <a:schemeClr val="tx1"/>
+          </a:fontRef>
+        </p:style>
+      </p:cxnSp>
+      <p:cxnSp>
+        <p:nvCxnSpPr>
+          <p:cNvPr id="26" name="Straight Connector 25">
+            <a:extLst>
+              <a:ext uri="{FF2B5EF4-FFF2-40B4-BE49-F238E27FC236}">
+                <a16:creationId xmlns:a16="http://schemas.microsoft.com/office/drawing/2014/main" id="{EE7CEFB9-5672-4FC6-981B-C8DA3FE08EA2}"/>
+              </a:ext>
+              <a:ext uri="{C183D7F6-B498-43B3-948B-1728B52AA6E4}">
+                <adec:decorative xmlns:adec="http://schemas.microsoft.com/office/drawing/2017/decorative" val="1"/>
+              </a:ext>
+            </a:extLst>
+          </p:cNvPr>
+          <p:cNvCxnSpPr>
+            <a:cxnSpLocks noGrp="1" noRot="1" noChangeAspect="1" noMove="1" noResize="1" noEditPoints="1" noAdjustHandles="1" noChangeArrowheads="1" noChangeShapeType="1"/>
+          </p:cNvCxnSpPr>
+          <p:nvPr>
+            <p:extLst>
+              <p:ext uri="{386F3935-93C4-4BCD-93E2-E3B085C9AB24}">
+                <p16:designElem xmlns:p16="http://schemas.microsoft.com/office/powerpoint/2015/main" val="1"/>
+              </p:ext>
+            </p:extLst>
+          </p:nvPr>
+        </p:nvCxnSpPr>
+        <p:spPr>
+          <a:xfrm flipH="1">
+            <a:off x="8610600" y="1560911"/>
+            <a:ext cx="3581400" cy="0"/>
+          </a:xfrm>
+          <a:prstGeom prst="line">
+            <a:avLst/>
+          </a:prstGeom>
+          <a:ln w="12700">
+            <a:solidFill>
+              <a:schemeClr val="accent2"/>
+            </a:solidFill>
+          </a:ln>
+        </p:spPr>
+        <p:style>
+          <a:lnRef idx="1">
+            <a:schemeClr val="accent1"/>
+          </a:lnRef>
+          <a:fillRef idx="0">
+            <a:schemeClr val="accent1"/>
+          </a:fillRef>
+          <a:effectRef idx="0">
+            <a:schemeClr val="accent1"/>
+          </a:effectRef>
+          <a:fontRef idx="minor">
+            <a:schemeClr val="tx1"/>
+          </a:fontRef>
+        </p:style>
+      </p:cxnSp>
+      <p:cxnSp>
+        <p:nvCxnSpPr>
+          <p:cNvPr id="28" name="Straight Connector 27">
+            <a:extLst>
+              <a:ext uri="{FF2B5EF4-FFF2-40B4-BE49-F238E27FC236}">
+                <a16:creationId xmlns:a16="http://schemas.microsoft.com/office/drawing/2014/main" id="{74234A4C-A256-4139-A5F4-27078F0D6796}"/>
+              </a:ext>
+              <a:ext uri="{C183D7F6-B498-43B3-948B-1728B52AA6E4}">
+                <adec:decorative xmlns:adec="http://schemas.microsoft.com/office/drawing/2017/decorative" val="1"/>
+              </a:ext>
+            </a:extLst>
+          </p:cNvPr>
+          <p:cNvCxnSpPr>
+            <a:cxnSpLocks noGrp="1" noRot="1" noChangeAspect="1" noMove="1" noResize="1" noEditPoints="1" noAdjustHandles="1" noChangeArrowheads="1" noChangeShapeType="1"/>
+          </p:cNvCxnSpPr>
+          <p:nvPr>
+            <p:extLst>
+              <p:ext uri="{386F3935-93C4-4BCD-93E2-E3B085C9AB24}">
+                <p16:designElem xmlns:p16="http://schemas.microsoft.com/office/powerpoint/2015/main" val="1"/>
+              </p:ext>
+            </p:extLst>
+          </p:nvPr>
+        </p:nvCxnSpPr>
+        <p:spPr>
+          <a:xfrm flipH="1">
+            <a:off x="3048" y="5286237"/>
+            <a:ext cx="12188952" cy="0"/>
+          </a:xfrm>
+          <a:prstGeom prst="line">
+            <a:avLst/>
+          </a:prstGeom>
+          <a:ln w="12700">
+            <a:solidFill>
+              <a:schemeClr val="accent2"/>
+            </a:solidFill>
+          </a:ln>
+        </p:spPr>
+        <p:style>
+          <a:lnRef idx="1">
+            <a:schemeClr val="accent1"/>
+          </a:lnRef>
+          <a:fillRef idx="0">
+            <a:schemeClr val="accent1"/>
+          </a:fillRef>
+          <a:effectRef idx="0">
+            <a:schemeClr val="accent1"/>
+          </a:effectRef>
+          <a:fontRef idx="minor">
+            <a:schemeClr val="tx1"/>
+          </a:fontRef>
+        </p:style>
+      </p:cxnSp>
+      <p:sp>
+        <p:nvSpPr>
+          <p:cNvPr id="4" name="Date Placeholder 3">
+            <a:extLst>
+              <a:ext uri="{FF2B5EF4-FFF2-40B4-BE49-F238E27FC236}">
+                <a16:creationId xmlns:a16="http://schemas.microsoft.com/office/drawing/2014/main" id="{60AA39EA-1BD4-5ADF-82A5-488914B68D98}"/>
+              </a:ext>
+            </a:extLst>
+          </p:cNvPr>
+          <p:cNvSpPr>
+            <a:spLocks noGrp="1"/>
+          </p:cNvSpPr>
+          <p:nvPr>
+            <p:ph type="dt" sz="half" idx="10"/>
+          </p:nvPr>
+        </p:nvSpPr>
+        <p:spPr>
+          <a:xfrm>
+            <a:off x="838200" y="6356350"/>
+            <a:ext cx="2743200" cy="365125"/>
+          </a:xfrm>
+        </p:spPr>
+        <p:txBody>
+          <a:bodyPr vert="horz" lIns="91440" tIns="45720" rIns="91440" bIns="45720" rtlCol="0" anchor="ctr">
+            <a:normAutofit/>
+          </a:bodyPr>
+          <a:lstStyle/>
+          <a:p>
+            <a:pPr>
+              <a:spcAft>
+                <a:spcPts val="600"/>
+              </a:spcAft>
+            </a:pPr>
+            <a:fld id="{DD303E3B-074C-440F-86D1-3BB7E04505DE}" type="datetimeyyyy">
+              <a:rPr lang="en-US">
+                <a:solidFill>
+                  <a:schemeClr val="bg1">
+                    <a:lumMod val="50000"/>
+                  </a:schemeClr>
+                </a:solidFill>
+              </a:rPr>
+              <a:pPr>
+                <a:spcAft>
+                  <a:spcPts val="600"/>
+                </a:spcAft>
+              </a:pPr>
+              <a:t>2024</a:t>
+            </a:fld>
+            <a:endParaRPr lang="en-US">
+              <a:solidFill>
+                <a:schemeClr val="bg1">
+                  <a:lumMod val="50000"/>
+                </a:schemeClr>
+              </a:solidFill>
+            </a:endParaRPr>
+          </a:p>
+        </p:txBody>
+      </p:sp>
+      <p:sp>
+        <p:nvSpPr>
+          <p:cNvPr id="5" name="Footer Placeholder 4">
+            <a:extLst>
+              <a:ext uri="{FF2B5EF4-FFF2-40B4-BE49-F238E27FC236}">
+                <a16:creationId xmlns:a16="http://schemas.microsoft.com/office/drawing/2014/main" id="{8251454E-77DD-4304-F4AF-245027455781}"/>
+              </a:ext>
+            </a:extLst>
+          </p:cNvPr>
+          <p:cNvSpPr>
+            <a:spLocks noGrp="1"/>
+          </p:cNvSpPr>
+          <p:nvPr>
+            <p:ph type="ftr" sz="quarter" idx="11"/>
+          </p:nvPr>
+        </p:nvSpPr>
+        <p:spPr>
+          <a:xfrm>
+            <a:off x="4038600" y="6356350"/>
+            <a:ext cx="4114800" cy="365125"/>
+          </a:xfrm>
+        </p:spPr>
+        <p:txBody>
+          <a:bodyPr vert="horz" lIns="91440" tIns="45720" rIns="91440" bIns="45720" rtlCol="0" anchor="ctr">
+            <a:normAutofit/>
+          </a:bodyPr>
+          <a:lstStyle/>
+          <a:p>
+            <a:pPr>
+              <a:spcAft>
+                <a:spcPts val="600"/>
+              </a:spcAft>
+            </a:pPr>
+            <a:r>
+              <a:rPr lang="en-US" kern="1200">
+                <a:solidFill>
+                  <a:schemeClr val="bg1">
+                    <a:lumMod val="50000"/>
+                  </a:schemeClr>
+                </a:solidFill>
+                <a:latin typeface="+mn-lt"/>
+                <a:ea typeface="+mn-ea"/>
+                <a:cs typeface="+mn-cs"/>
+              </a:rPr>
+              <a:t>GENG4500-60</a:t>
+            </a:r>
+          </a:p>
+        </p:txBody>
+      </p:sp>
+      <p:sp>
+        <p:nvSpPr>
+          <p:cNvPr id="6" name="Slide Number Placeholder 5">
+            <a:extLst>
+              <a:ext uri="{FF2B5EF4-FFF2-40B4-BE49-F238E27FC236}">
+                <a16:creationId xmlns:a16="http://schemas.microsoft.com/office/drawing/2014/main" id="{525E3120-057C-155F-E7EF-176F72BED592}"/>
+              </a:ext>
+            </a:extLst>
+          </p:cNvPr>
+          <p:cNvSpPr>
+            <a:spLocks noGrp="1"/>
+          </p:cNvSpPr>
+          <p:nvPr>
+            <p:ph type="sldNum" sz="quarter" idx="12"/>
+          </p:nvPr>
+        </p:nvSpPr>
+        <p:spPr>
+          <a:xfrm>
+            <a:off x="8610600" y="6356350"/>
+            <a:ext cx="2743200" cy="365125"/>
+          </a:xfrm>
+        </p:spPr>
+        <p:txBody>
+          <a:bodyPr vert="horz" lIns="91440" tIns="45720" rIns="91440" bIns="45720" rtlCol="0" anchor="ctr">
+            <a:normAutofit/>
+          </a:bodyPr>
+          <a:lstStyle/>
+          <a:p>
+            <a:pPr>
+              <a:spcAft>
+                <a:spcPts val="600"/>
+              </a:spcAft>
+            </a:pPr>
+            <a:fld id="{BC1B8E0F-90D7-4F6F-9CC4-1E156486B9C1}" type="slidenum">
+              <a:rPr lang="en-US">
+                <a:solidFill>
+                  <a:schemeClr val="bg1">
+                    <a:lumMod val="50000"/>
+                  </a:schemeClr>
+                </a:solidFill>
+              </a:rPr>
+              <a:pPr>
+                <a:spcAft>
+                  <a:spcPts val="600"/>
+                </a:spcAft>
+              </a:pPr>
+              <a:t>11</a:t>
+            </a:fld>
+            <a:endParaRPr lang="en-US">
+              <a:solidFill>
+                <a:schemeClr val="bg1">
+                  <a:lumMod val="50000"/>
+                </a:schemeClr>
+              </a:solidFill>
+            </a:endParaRPr>
+          </a:p>
+        </p:txBody>
+      </p:sp>
+      <p:sp>
+        <p:nvSpPr>
+          <p:cNvPr id="7" name="Title 1">
+            <a:extLst>
+              <a:ext uri="{FF2B5EF4-FFF2-40B4-BE49-F238E27FC236}">
+                <a16:creationId xmlns:a16="http://schemas.microsoft.com/office/drawing/2014/main" id="{30C267E0-EF80-EF3B-247C-1841020E6D0F}"/>
+              </a:ext>
+            </a:extLst>
+          </p:cNvPr>
+          <p:cNvSpPr txBox="1">
+            <a:spLocks/>
+          </p:cNvSpPr>
+          <p:nvPr/>
+        </p:nvSpPr>
+        <p:spPr>
+          <a:xfrm>
+            <a:off x="8226552" y="973709"/>
+            <a:ext cx="3304032" cy="587202"/>
+          </a:xfrm>
+          <a:prstGeom prst="rect">
+            <a:avLst/>
+          </a:prstGeom>
+        </p:spPr>
+        <p:txBody>
+          <a:bodyPr vert="horz" lIns="91440" tIns="45720" rIns="91440" bIns="45720" rtlCol="0" anchor="ctr">
+            <a:normAutofit fontScale="67500" lnSpcReduction="20000"/>
+          </a:bodyPr>
+          <a:lstStyle>
+            <a:lvl1pPr algn="l" defTabSz="914400" rtl="0" eaLnBrk="1" latinLnBrk="0" hangingPunct="1">
+              <a:lnSpc>
+                <a:spcPct val="90000"/>
+              </a:lnSpc>
+              <a:spcBef>
+                <a:spcPct val="0"/>
+              </a:spcBef>
+              <a:buNone/>
+              <a:defRPr sz="4400" kern="1200">
+                <a:solidFill>
+                  <a:schemeClr val="tx1"/>
+                </a:solidFill>
+                <a:latin typeface="+mj-lt"/>
+                <a:ea typeface="+mj-ea"/>
+                <a:cs typeface="+mj-cs"/>
+              </a:defRPr>
+            </a:lvl1pPr>
+          </a:lstStyle>
+          <a:p>
+            <a:pPr algn="ctr"/>
+            <a:r>
+              <a:rPr lang="en-US" sz="6000" dirty="0">
+                <a:solidFill>
+                  <a:schemeClr val="bg1"/>
+                </a:solidFill>
+              </a:rPr>
+              <a:t>Conclusions</a:t>
+            </a:r>
+          </a:p>
+        </p:txBody>
+      </p:sp>
+      <p:sp>
+        <p:nvSpPr>
+          <p:cNvPr id="8" name="TextBox 7">
+            <a:extLst>
+              <a:ext uri="{FF2B5EF4-FFF2-40B4-BE49-F238E27FC236}">
+                <a16:creationId xmlns:a16="http://schemas.microsoft.com/office/drawing/2014/main" id="{976ECA01-4DFB-CAD8-F5BE-29C157FD097F}"/>
+              </a:ext>
+            </a:extLst>
+          </p:cNvPr>
+          <p:cNvSpPr txBox="1"/>
+          <p:nvPr/>
+        </p:nvSpPr>
+        <p:spPr>
+          <a:xfrm>
+            <a:off x="7050024" y="1603770"/>
+            <a:ext cx="5059415" cy="3693319"/>
+          </a:xfrm>
+          <a:prstGeom prst="rect">
+            <a:avLst/>
+          </a:prstGeom>
+          <a:noFill/>
+        </p:spPr>
+        <p:txBody>
+          <a:bodyPr wrap="square" rtlCol="0">
+            <a:spAutoFit/>
+          </a:bodyPr>
+          <a:lstStyle/>
+          <a:p>
+            <a:pPr marL="285750" indent="-285750">
+              <a:buFont typeface="Wingdings" panose="05000000000000000000" pitchFamily="2" charset="2"/>
+              <a:buChar char="v"/>
+            </a:pPr>
+            <a:r>
+              <a:rPr lang="en-US" dirty="0">
+                <a:solidFill>
+                  <a:schemeClr val="bg1"/>
+                </a:solidFill>
+              </a:rPr>
+              <a:t> The scale of the output price ranges could be off.</a:t>
+            </a:r>
+          </a:p>
+          <a:p>
+            <a:pPr marL="285750" indent="-285750">
+              <a:buFont typeface="Wingdings" panose="05000000000000000000" pitchFamily="2" charset="2"/>
+              <a:buChar char="v"/>
+            </a:pPr>
+            <a:endParaRPr lang="en-US" dirty="0">
+              <a:solidFill>
+                <a:schemeClr val="bg1"/>
+              </a:solidFill>
+            </a:endParaRPr>
+          </a:p>
+          <a:p>
+            <a:pPr marL="285750" indent="-285750">
+              <a:buFont typeface="Wingdings" panose="05000000000000000000" pitchFamily="2" charset="2"/>
+              <a:buChar char="v"/>
+            </a:pPr>
+            <a:r>
+              <a:rPr lang="en-US" dirty="0">
+                <a:solidFill>
+                  <a:schemeClr val="bg1"/>
+                </a:solidFill>
+              </a:rPr>
+              <a:t>Scale issue </a:t>
+            </a:r>
+            <a:r>
+              <a:rPr lang="en-US" dirty="0">
+                <a:solidFill>
+                  <a:srgbClr val="FFFF00"/>
+                </a:solidFill>
+              </a:rPr>
+              <a:t>could</a:t>
+            </a:r>
+            <a:r>
+              <a:rPr lang="en-US" dirty="0">
+                <a:solidFill>
+                  <a:schemeClr val="bg1"/>
+                </a:solidFill>
+              </a:rPr>
+              <a:t> be due to a lower starting point in historical data and the scaler methods used.</a:t>
+            </a:r>
+          </a:p>
+          <a:p>
+            <a:pPr marL="285750" indent="-285750">
+              <a:buFont typeface="Wingdings" panose="05000000000000000000" pitchFamily="2" charset="2"/>
+              <a:buChar char="v"/>
+            </a:pPr>
+            <a:endParaRPr lang="en-US" dirty="0">
+              <a:solidFill>
+                <a:schemeClr val="bg1"/>
+              </a:solidFill>
+            </a:endParaRPr>
+          </a:p>
+          <a:p>
+            <a:pPr marL="285750" indent="-285750">
+              <a:buFont typeface="Wingdings" panose="05000000000000000000" pitchFamily="2" charset="2"/>
+              <a:buChar char="v"/>
+            </a:pPr>
+            <a:r>
+              <a:rPr lang="en-US" dirty="0">
+                <a:solidFill>
+                  <a:srgbClr val="FF0000"/>
+                </a:solidFill>
+              </a:rPr>
+              <a:t>Sell</a:t>
+            </a:r>
+            <a:r>
+              <a:rPr lang="en-US" dirty="0">
+                <a:solidFill>
+                  <a:schemeClr val="bg1"/>
+                </a:solidFill>
+              </a:rPr>
+              <a:t> Spring of </a:t>
+            </a:r>
+            <a:r>
+              <a:rPr lang="en-US" dirty="0">
+                <a:solidFill>
+                  <a:srgbClr val="FF0000"/>
+                </a:solidFill>
+              </a:rPr>
+              <a:t>2027</a:t>
+            </a:r>
+            <a:r>
+              <a:rPr lang="en-US" dirty="0">
+                <a:solidFill>
+                  <a:schemeClr val="bg1"/>
+                </a:solidFill>
+              </a:rPr>
+              <a:t>, </a:t>
+            </a:r>
+            <a:r>
+              <a:rPr lang="en-US" dirty="0">
+                <a:solidFill>
+                  <a:srgbClr val="FFFF00"/>
+                </a:solidFill>
+              </a:rPr>
+              <a:t>Buy</a:t>
+            </a:r>
+            <a:r>
+              <a:rPr lang="en-US" dirty="0">
+                <a:solidFill>
+                  <a:schemeClr val="bg1"/>
+                </a:solidFill>
+              </a:rPr>
+              <a:t> Winter of </a:t>
+            </a:r>
+            <a:r>
+              <a:rPr lang="en-US" dirty="0">
+                <a:solidFill>
+                  <a:srgbClr val="FFFF00"/>
+                </a:solidFill>
+              </a:rPr>
+              <a:t>2028</a:t>
+            </a:r>
+            <a:r>
+              <a:rPr lang="en-US" dirty="0">
+                <a:solidFill>
+                  <a:schemeClr val="bg1"/>
+                </a:solidFill>
+              </a:rPr>
+              <a:t>!</a:t>
+            </a:r>
+          </a:p>
+          <a:p>
+            <a:pPr marL="285750" indent="-285750">
+              <a:buFont typeface="Wingdings" panose="05000000000000000000" pitchFamily="2" charset="2"/>
+              <a:buChar char="v"/>
+            </a:pPr>
+            <a:endParaRPr lang="en-US" dirty="0">
+              <a:solidFill>
+                <a:schemeClr val="bg1"/>
+              </a:solidFill>
+            </a:endParaRPr>
+          </a:p>
+          <a:p>
+            <a:pPr marL="285750" indent="-285750">
+              <a:buFont typeface="Wingdings" panose="05000000000000000000" pitchFamily="2" charset="2"/>
+              <a:buChar char="v"/>
+            </a:pPr>
+            <a:r>
+              <a:rPr lang="en-US" dirty="0">
+                <a:solidFill>
+                  <a:schemeClr val="bg1"/>
+                </a:solidFill>
+              </a:rPr>
+              <a:t>The same trends of Spring/Winter are shown again in a few places.</a:t>
+            </a:r>
+          </a:p>
+          <a:p>
+            <a:pPr marL="285750" indent="-285750">
+              <a:buFont typeface="Wingdings" panose="05000000000000000000" pitchFamily="2" charset="2"/>
+              <a:buChar char="v"/>
+            </a:pPr>
+            <a:endParaRPr lang="en-US" dirty="0">
+              <a:solidFill>
+                <a:schemeClr val="bg1"/>
+              </a:solidFill>
+            </a:endParaRPr>
+          </a:p>
+          <a:p>
+            <a:pPr marL="285750" indent="-285750">
+              <a:buFont typeface="Wingdings" panose="05000000000000000000" pitchFamily="2" charset="2"/>
+              <a:buChar char="v"/>
+            </a:pPr>
+            <a:r>
+              <a:rPr lang="en-US" dirty="0" err="1">
+                <a:solidFill>
+                  <a:schemeClr val="bg1"/>
+                </a:solidFill>
+              </a:rPr>
+              <a:t>SkTime</a:t>
+            </a:r>
+            <a:r>
+              <a:rPr lang="en-US" dirty="0">
+                <a:solidFill>
+                  <a:schemeClr val="bg1"/>
+                </a:solidFill>
+              </a:rPr>
+              <a:t> would be a better library to use for future data forecasting when you only have historical data and a future time frame.</a:t>
+            </a:r>
+          </a:p>
+        </p:txBody>
+      </p:sp>
+      <p:pic>
+        <p:nvPicPr>
+          <p:cNvPr id="15" name="Picture 14" descr="A house for sale sign&#10;&#10;Description automatically generated">
+            <a:extLst>
+              <a:ext uri="{FF2B5EF4-FFF2-40B4-BE49-F238E27FC236}">
+                <a16:creationId xmlns:a16="http://schemas.microsoft.com/office/drawing/2014/main" id="{FFA659E4-0029-D9AC-C7EA-DE5ED2247796}"/>
+              </a:ext>
+            </a:extLst>
+          </p:cNvPr>
+          <p:cNvPicPr>
+            <a:picLocks noChangeAspect="1"/>
+          </p:cNvPicPr>
+          <p:nvPr/>
+        </p:nvPicPr>
+        <p:blipFill rotWithShape="1">
+          <a:blip r:embed="rId2">
+            <a:extLst>
+              <a:ext uri="{28A0092B-C50C-407E-A947-70E740481C1C}">
+                <a14:useLocalDpi xmlns:a14="http://schemas.microsoft.com/office/drawing/2010/main" val="0"/>
+              </a:ext>
+            </a:extLst>
+          </a:blip>
+          <a:srcRect b="9221"/>
+          <a:stretch/>
+        </p:blipFill>
+        <p:spPr>
+          <a:xfrm>
+            <a:off x="1094082" y="1980151"/>
+            <a:ext cx="2944518" cy="2886847"/>
+          </a:xfrm>
+          <a:prstGeom prst="rect">
+            <a:avLst/>
+          </a:prstGeom>
+          <a:solidFill>
+            <a:srgbClr val="FFFFFF">
+              <a:shade val="85000"/>
+            </a:srgbClr>
+          </a:solidFill>
+          <a:ln w="190500" cap="sq">
+            <a:solidFill>
+              <a:srgbClr val="FFFFFF"/>
+            </a:solidFill>
+            <a:miter lim="800000"/>
+          </a:ln>
+          <a:effectLst>
+            <a:outerShdw blurRad="65000" dist="50800" dir="12900000" kx="195000" ky="145000" algn="tl" rotWithShape="0">
+              <a:srgbClr val="000000">
+                <a:alpha val="30000"/>
+              </a:srgbClr>
+            </a:outerShdw>
+          </a:effectLst>
+          <a:scene3d>
+            <a:camera prst="orthographicFront">
+              <a:rot lat="0" lon="0" rev="360000"/>
+            </a:camera>
+            <a:lightRig rig="twoPt" dir="t">
+              <a:rot lat="0" lon="0" rev="7200000"/>
+            </a:lightRig>
+          </a:scene3d>
+          <a:sp3d contourW="12700">
+            <a:bevelT w="25400" h="19050"/>
+            <a:contourClr>
+              <a:srgbClr val="969696"/>
+            </a:contourClr>
+          </a:sp3d>
+        </p:spPr>
+      </p:pic>
+    </p:spTree>
+    <p:extLst>
+      <p:ext uri="{BB962C8B-B14F-4D97-AF65-F5344CB8AC3E}">
+        <p14:creationId xmlns:p14="http://schemas.microsoft.com/office/powerpoint/2010/main" val="1083665153"/>
+      </p:ext>
+    </p:extLst>
+  </p:cSld>
+  <p:clrMapOvr>
+    <a:masterClrMapping/>
+  </p:clrMapOvr>
+</p:sld>
+</file>
+
+<file path=ppt/slides/slide12.xml><?xml version="1.0" encoding="utf-8"?>
+<p:sld xmlns:a="http://schemas.openxmlformats.org/drawingml/2006/main" xmlns:r="http://schemas.openxmlformats.org/officeDocument/2006/relationships" xmlns:p="http://schemas.openxmlformats.org/presentationml/2006/main">
+  <p:cSld>
+    <p:bg>
+      <p:bgPr>
+        <a:solidFill>
+          <a:schemeClr val="bg1"/>
+        </a:solidFill>
+        <a:effectLst/>
+      </p:bgPr>
+    </p:bg>
+    <p:spTree>
+      <p:nvGrpSpPr>
+        <p:cNvPr id="1" name=""/>
+        <p:cNvGrpSpPr/>
+        <p:nvPr/>
+      </p:nvGrpSpPr>
+      <p:grpSpPr>
+        <a:xfrm>
+          <a:off x="0" y="0"/>
+          <a:ext cx="0" cy="0"/>
+          <a:chOff x="0" y="0"/>
+          <a:chExt cx="0" cy="0"/>
+        </a:xfrm>
+      </p:grpSpPr>
+      <p:sp>
+        <p:nvSpPr>
+          <p:cNvPr id="11" name="Rectangle 10">
+            <a:extLst>
+              <a:ext uri="{FF2B5EF4-FFF2-40B4-BE49-F238E27FC236}">
+                <a16:creationId xmlns:a16="http://schemas.microsoft.com/office/drawing/2014/main" id="{A7AE9375-4664-4DB2-922D-2782A6E439AC}"/>
+              </a:ext>
+              <a:ext uri="{C183D7F6-B498-43B3-948B-1728B52AA6E4}">
+                <adec:decorative xmlns:adec="http://schemas.microsoft.com/office/drawing/2017/decorative" val="1"/>
+              </a:ext>
+            </a:extLst>
+          </p:cNvPr>
+          <p:cNvSpPr>
+            <a:spLocks noGrp="1" noRot="1" noChangeAspect="1" noMove="1" noResize="1" noEditPoints="1" noAdjustHandles="1" noChangeArrowheads="1" noChangeShapeType="1" noTextEdit="1"/>
+          </p:cNvSpPr>
+          <p:nvPr>
+            <p:extLst>
+              <p:ext uri="{386F3935-93C4-4BCD-93E2-E3B085C9AB24}">
+                <p16:designElem xmlns:p16="http://schemas.microsoft.com/office/powerpoint/2015/main" val="1"/>
+              </p:ext>
+            </p:extLst>
+          </p:nvPr>
+        </p:nvSpPr>
+        <p:spPr>
+          <a:xfrm>
+            <a:off x="0" y="0"/>
+            <a:ext cx="12192000" cy="6858000"/>
+          </a:xfrm>
+          <a:prstGeom prst="rect">
+            <a:avLst/>
+          </a:prstGeom>
+          <a:solidFill>
+            <a:schemeClr val="tx1">
+              <a:lumMod val="95000"/>
+              <a:lumOff val="5000"/>
+            </a:schemeClr>
+          </a:solidFill>
+          <a:ln>
+            <a:noFill/>
+          </a:ln>
+        </p:spPr>
+        <p:style>
+          <a:lnRef idx="2">
+            <a:schemeClr val="accent1">
+              <a:shade val="50000"/>
+            </a:schemeClr>
+          </a:lnRef>
+          <a:fillRef idx="1">
+            <a:schemeClr val="accent1"/>
+          </a:fillRef>
+          <a:effectRef idx="0">
+            <a:schemeClr val="accent1"/>
+          </a:effectRef>
+          <a:fontRef idx="minor">
+            <a:schemeClr val="lt1"/>
+          </a:fontRef>
+        </p:style>
+        <p:txBody>
+          <a:bodyPr rtlCol="0" anchor="ctr"/>
+          <a:lstStyle/>
+          <a:p>
+            <a:pPr algn="ctr"/>
+            <a:endParaRPr lang="en-US" dirty="0">
+              <a:solidFill>
+                <a:schemeClr val="tx1"/>
+              </a:solidFill>
+            </a:endParaRPr>
+          </a:p>
+        </p:txBody>
+      </p:sp>
+      <p:sp>
+        <p:nvSpPr>
+          <p:cNvPr id="2" name="Title 1">
+            <a:extLst>
+              <a:ext uri="{FF2B5EF4-FFF2-40B4-BE49-F238E27FC236}">
+                <a16:creationId xmlns:a16="http://schemas.microsoft.com/office/drawing/2014/main" id="{1BDDE9E2-35D5-82E3-D67C-48B1694FE836}"/>
+              </a:ext>
+            </a:extLst>
+          </p:cNvPr>
+          <p:cNvSpPr>
+            <a:spLocks noGrp="1"/>
+          </p:cNvSpPr>
+          <p:nvPr>
+            <p:ph type="title"/>
+          </p:nvPr>
+        </p:nvSpPr>
+        <p:spPr>
+          <a:xfrm>
+            <a:off x="838200" y="669925"/>
+            <a:ext cx="4508946" cy="1325563"/>
+          </a:xfrm>
+        </p:spPr>
+        <p:txBody>
+          <a:bodyPr anchor="b">
+            <a:normAutofit/>
+          </a:bodyPr>
+          <a:lstStyle/>
+          <a:p>
+            <a:pPr algn="r"/>
+            <a:r>
+              <a:rPr lang="en-US">
+                <a:solidFill>
+                  <a:schemeClr val="bg1"/>
+                </a:solidFill>
+              </a:rPr>
+              <a:t>References</a:t>
+            </a:r>
+            <a:endParaRPr lang="en-CA">
+              <a:solidFill>
+                <a:schemeClr val="bg1"/>
+              </a:solidFill>
+            </a:endParaRPr>
+          </a:p>
+        </p:txBody>
+      </p:sp>
+      <p:cxnSp>
+        <p:nvCxnSpPr>
+          <p:cNvPr id="13" name="Straight Connector 12">
+            <a:extLst>
+              <a:ext uri="{FF2B5EF4-FFF2-40B4-BE49-F238E27FC236}">
+                <a16:creationId xmlns:a16="http://schemas.microsoft.com/office/drawing/2014/main" id="{EE504C98-6397-41C1-A8D8-2D9C4ED307E0}"/>
+              </a:ext>
+              <a:ext uri="{C183D7F6-B498-43B3-948B-1728B52AA6E4}">
+                <adec:decorative xmlns:adec="http://schemas.microsoft.com/office/drawing/2017/decorative" val="1"/>
+              </a:ext>
+            </a:extLst>
+          </p:cNvPr>
+          <p:cNvCxnSpPr>
+            <a:cxnSpLocks noGrp="1" noRot="1" noChangeAspect="1" noMove="1" noResize="1" noEditPoints="1" noAdjustHandles="1" noChangeArrowheads="1" noChangeShapeType="1"/>
+          </p:cNvCxnSpPr>
+          <p:nvPr>
+            <p:extLst>
+              <p:ext uri="{386F3935-93C4-4BCD-93E2-E3B085C9AB24}">
+                <p16:designElem xmlns:p16="http://schemas.microsoft.com/office/powerpoint/2015/main" val="1"/>
+              </p:ext>
+            </p:extLst>
+          </p:nvPr>
+        </p:nvCxnSpPr>
+        <p:spPr>
+          <a:xfrm flipH="1">
+            <a:off x="126210" y="2026340"/>
+            <a:ext cx="5220936" cy="0"/>
+          </a:xfrm>
+          <a:prstGeom prst="line">
+            <a:avLst/>
+          </a:prstGeom>
+          <a:ln w="12700">
+            <a:solidFill>
+              <a:schemeClr val="accent2"/>
+            </a:solidFill>
+          </a:ln>
+        </p:spPr>
+        <p:style>
+          <a:lnRef idx="1">
+            <a:schemeClr val="accent1"/>
+          </a:lnRef>
+          <a:fillRef idx="0">
+            <a:schemeClr val="accent1"/>
+          </a:fillRef>
+          <a:effectRef idx="0">
+            <a:schemeClr val="accent1"/>
+          </a:effectRef>
+          <a:fontRef idx="minor">
+            <a:schemeClr val="tx1"/>
+          </a:fontRef>
+        </p:style>
+      </p:cxnSp>
+      <p:sp>
+        <p:nvSpPr>
+          <p:cNvPr id="3" name="Content Placeholder 2">
+            <a:extLst>
+              <a:ext uri="{FF2B5EF4-FFF2-40B4-BE49-F238E27FC236}">
+                <a16:creationId xmlns:a16="http://schemas.microsoft.com/office/drawing/2014/main" id="{299635AB-7FEE-F05E-C2FC-12AC1BEB369E}"/>
+              </a:ext>
+            </a:extLst>
+          </p:cNvPr>
+          <p:cNvSpPr>
+            <a:spLocks noGrp="1"/>
+          </p:cNvSpPr>
+          <p:nvPr>
+            <p:ph idx="1"/>
+          </p:nvPr>
+        </p:nvSpPr>
+        <p:spPr>
+          <a:xfrm>
+            <a:off x="4038600" y="2199130"/>
+            <a:ext cx="7862451" cy="4099623"/>
+          </a:xfrm>
+        </p:spPr>
+        <p:txBody>
+          <a:bodyPr>
+            <a:normAutofit/>
+          </a:bodyPr>
+          <a:lstStyle/>
+          <a:p>
+            <a:pPr marL="457200" indent="-457200">
+              <a:buFont typeface="+mj-lt"/>
+              <a:buAutoNum type="arabicPeriod"/>
+            </a:pPr>
+            <a:r>
+              <a:rPr lang="en-US" sz="2000" dirty="0" err="1">
+                <a:solidFill>
+                  <a:schemeClr val="bg1"/>
+                </a:solidFill>
+              </a:rPr>
+              <a:t>Econoscent</a:t>
+            </a:r>
+            <a:r>
+              <a:rPr lang="en-US" sz="2000" dirty="0">
+                <a:solidFill>
+                  <a:schemeClr val="bg1"/>
+                </a:solidFill>
+              </a:rPr>
+              <a:t> – Aug 30, 2020 – </a:t>
+            </a:r>
+            <a:r>
+              <a:rPr lang="en-US" sz="2000" i="1" dirty="0">
+                <a:solidFill>
+                  <a:schemeClr val="bg1"/>
+                </a:solidFill>
+              </a:rPr>
+              <a:t>YouTube</a:t>
+            </a:r>
+            <a:r>
+              <a:rPr lang="en-US" sz="2000" dirty="0">
+                <a:solidFill>
+                  <a:schemeClr val="bg1"/>
+                </a:solidFill>
+              </a:rPr>
+              <a:t> – Visual Guide to Random Forest</a:t>
+            </a:r>
+          </a:p>
+          <a:p>
+            <a:pPr lvl="1"/>
+            <a:r>
+              <a:rPr lang="en-CA" sz="1600" dirty="0">
+                <a:solidFill>
+                  <a:schemeClr val="bg1"/>
+                </a:solidFill>
+                <a:hlinkClick r:id="rId2"/>
+              </a:rPr>
+              <a:t>https://www.youtube.com/watch?v=cIbj0WuK41w&amp;ab_channel=Econoscent</a:t>
+            </a:r>
+            <a:endParaRPr lang="en-CA" sz="1600" dirty="0">
+              <a:solidFill>
+                <a:schemeClr val="bg1"/>
+              </a:solidFill>
+            </a:endParaRPr>
+          </a:p>
+          <a:p>
+            <a:pPr marL="342900" indent="-342900">
+              <a:buFont typeface="+mj-lt"/>
+              <a:buAutoNum type="arabicPeriod"/>
+            </a:pPr>
+            <a:r>
+              <a:rPr lang="en-US" sz="1400" dirty="0">
+                <a:solidFill>
+                  <a:schemeClr val="bg1"/>
+                </a:solidFill>
+                <a:effectLst/>
+              </a:rPr>
+              <a:t>Canadian Real Estate Association. (2024) </a:t>
+            </a:r>
+            <a:r>
+              <a:rPr lang="en-US" sz="1400" i="1" dirty="0">
+                <a:solidFill>
+                  <a:schemeClr val="bg1"/>
+                </a:solidFill>
+                <a:effectLst/>
+              </a:rPr>
+              <a:t>National statistics</a:t>
+            </a:r>
+            <a:r>
+              <a:rPr lang="en-US" sz="1400" dirty="0">
+                <a:solidFill>
+                  <a:schemeClr val="bg1"/>
+                </a:solidFill>
+                <a:effectLst/>
+              </a:rPr>
+              <a:t>, </a:t>
+            </a:r>
+            <a:r>
+              <a:rPr lang="en-US" sz="1400" i="1" dirty="0">
+                <a:solidFill>
+                  <a:schemeClr val="bg1"/>
+                </a:solidFill>
+                <a:effectLst/>
+              </a:rPr>
+              <a:t>February 14 2024 News Release | CREA Statistics</a:t>
+            </a:r>
+            <a:r>
+              <a:rPr lang="en-US" sz="1400" dirty="0">
+                <a:solidFill>
+                  <a:schemeClr val="bg1"/>
+                </a:solidFill>
+                <a:effectLst/>
+              </a:rPr>
+              <a:t>. Available at: https://creastats.crea.ca/en-CA/ (Accessed: 11 March 2024). </a:t>
+            </a:r>
+          </a:p>
+          <a:p>
+            <a:pPr lvl="1"/>
+            <a:r>
+              <a:rPr lang="en-US" sz="1600" dirty="0">
+                <a:solidFill>
+                  <a:schemeClr val="bg1"/>
+                </a:solidFill>
+                <a:effectLst/>
+                <a:hlinkClick r:id="rId3"/>
+              </a:rPr>
+              <a:t>https://creastats.crea.ca/en-CA/</a:t>
+            </a:r>
+            <a:endParaRPr lang="en-US" sz="1600" dirty="0">
+              <a:solidFill>
+                <a:schemeClr val="bg1"/>
+              </a:solidFill>
+              <a:effectLst/>
+            </a:endParaRPr>
+          </a:p>
+          <a:p>
+            <a:pPr marL="457200" indent="-457200">
+              <a:buFont typeface="+mj-lt"/>
+              <a:buAutoNum type="arabicPeriod"/>
+            </a:pPr>
+            <a:r>
+              <a:rPr lang="en-US" sz="2000" dirty="0">
+                <a:solidFill>
+                  <a:schemeClr val="bg1"/>
+                </a:solidFill>
+                <a:hlinkClick r:id="rId4"/>
+              </a:rPr>
+              <a:t>https://stackoverflow.com/</a:t>
+            </a:r>
+            <a:r>
+              <a:rPr lang="en-US" sz="2000" dirty="0">
+                <a:solidFill>
+                  <a:schemeClr val="bg1"/>
+                </a:solidFill>
+              </a:rPr>
+              <a:t> - Non-stop Forum Searching.</a:t>
+            </a:r>
+          </a:p>
+          <a:p>
+            <a:pPr marL="457200" indent="-457200">
+              <a:buFont typeface="+mj-lt"/>
+              <a:buAutoNum type="arabicPeriod"/>
+            </a:pPr>
+            <a:r>
+              <a:rPr lang="en-US" sz="2000" dirty="0">
+                <a:solidFill>
+                  <a:schemeClr val="bg1"/>
+                </a:solidFill>
+                <a:hlinkClick r:id="rId5"/>
+              </a:rPr>
+              <a:t>https://scikit-learn.org/stable/user_guide.html</a:t>
+            </a:r>
+            <a:r>
+              <a:rPr lang="en-US" sz="2000" dirty="0">
+                <a:solidFill>
+                  <a:schemeClr val="bg1"/>
+                </a:solidFill>
+              </a:rPr>
+              <a:t> - </a:t>
+            </a:r>
+            <a:r>
+              <a:rPr lang="en-US" sz="2000" dirty="0" err="1">
+                <a:solidFill>
+                  <a:schemeClr val="bg1"/>
+                </a:solidFill>
+              </a:rPr>
+              <a:t>SkLearn</a:t>
+            </a:r>
+            <a:r>
+              <a:rPr lang="en-US" sz="2000" dirty="0">
+                <a:solidFill>
+                  <a:schemeClr val="bg1"/>
+                </a:solidFill>
+              </a:rPr>
+              <a:t> Documentation.</a:t>
+            </a:r>
+          </a:p>
+          <a:p>
+            <a:pPr marL="457200" indent="-457200">
+              <a:buFont typeface="+mj-lt"/>
+              <a:buAutoNum type="arabicPeriod"/>
+            </a:pPr>
+            <a:r>
+              <a:rPr lang="en-US" sz="2000" dirty="0">
+                <a:solidFill>
+                  <a:schemeClr val="bg1"/>
+                </a:solidFill>
+                <a:hlinkClick r:id="rId6"/>
+              </a:rPr>
+              <a:t>https://www.sktime.net/en/stable/</a:t>
+            </a:r>
+            <a:r>
+              <a:rPr lang="en-US" sz="2000" dirty="0">
+                <a:solidFill>
+                  <a:schemeClr val="bg1"/>
+                </a:solidFill>
+              </a:rPr>
+              <a:t> - </a:t>
+            </a:r>
+            <a:r>
+              <a:rPr lang="en-US" sz="2000" dirty="0" err="1">
+                <a:solidFill>
+                  <a:schemeClr val="bg1"/>
+                </a:solidFill>
+              </a:rPr>
+              <a:t>SkTime</a:t>
+            </a:r>
+            <a:r>
+              <a:rPr lang="en-US" sz="2000" dirty="0">
+                <a:solidFill>
+                  <a:schemeClr val="bg1"/>
+                </a:solidFill>
+              </a:rPr>
+              <a:t> Documentation.</a:t>
+            </a:r>
+          </a:p>
+          <a:p>
+            <a:endParaRPr lang="en-US" sz="2000" dirty="0">
+              <a:solidFill>
+                <a:schemeClr val="bg1"/>
+              </a:solidFill>
+            </a:endParaRPr>
+          </a:p>
+          <a:p>
+            <a:pPr lvl="1"/>
+            <a:endParaRPr lang="en-US" sz="1000" dirty="0">
+              <a:solidFill>
+                <a:schemeClr val="bg1"/>
+              </a:solidFill>
+              <a:effectLst/>
+            </a:endParaRPr>
+          </a:p>
+          <a:p>
+            <a:endParaRPr lang="en-US" sz="2000" dirty="0">
+              <a:solidFill>
+                <a:schemeClr val="bg1"/>
+              </a:solidFill>
+            </a:endParaRPr>
+          </a:p>
+          <a:p>
+            <a:endParaRPr lang="en-CA" sz="2000" dirty="0">
+              <a:solidFill>
+                <a:schemeClr val="bg1"/>
+              </a:solidFill>
+            </a:endParaRPr>
+          </a:p>
+        </p:txBody>
+      </p:sp>
+      <p:sp>
+        <p:nvSpPr>
+          <p:cNvPr id="15" name="Rectangle 14">
+            <a:extLst>
+              <a:ext uri="{FF2B5EF4-FFF2-40B4-BE49-F238E27FC236}">
+                <a16:creationId xmlns:a16="http://schemas.microsoft.com/office/drawing/2014/main" id="{9DD005C1-8C51-42D6-9BEE-B9B83849743D}"/>
+              </a:ext>
+              <a:ext uri="{C183D7F6-B498-43B3-948B-1728B52AA6E4}">
+                <adec:decorative xmlns:adec="http://schemas.microsoft.com/office/drawing/2017/decorative" val="1"/>
+              </a:ext>
+            </a:extLst>
+          </p:cNvPr>
+          <p:cNvSpPr>
+            <a:spLocks noGrp="1" noRot="1" noChangeAspect="1" noMove="1" noResize="1" noEditPoints="1" noAdjustHandles="1" noChangeArrowheads="1" noChangeShapeType="1" noTextEdit="1"/>
+          </p:cNvSpPr>
+          <p:nvPr>
+            <p:extLst>
+              <p:ext uri="{386F3935-93C4-4BCD-93E2-E3B085C9AB24}">
+                <p16:designElem xmlns:p16="http://schemas.microsoft.com/office/powerpoint/2015/main" val="1"/>
+              </p:ext>
+            </p:extLst>
+          </p:nvPr>
+        </p:nvSpPr>
+        <p:spPr>
+          <a:xfrm>
+            <a:off x="126206" y="115193"/>
+            <a:ext cx="11939588" cy="6627614"/>
+          </a:xfrm>
+          <a:prstGeom prst="rect">
+            <a:avLst/>
+          </a:prstGeom>
+          <a:noFill/>
+          <a:ln w="12700">
+            <a:solidFill>
+              <a:schemeClr val="accent2"/>
+            </a:solidFill>
+          </a:ln>
+        </p:spPr>
+        <p:style>
+          <a:lnRef idx="2">
+            <a:schemeClr val="accent1">
+              <a:shade val="50000"/>
+            </a:schemeClr>
+          </a:lnRef>
+          <a:fillRef idx="1">
+            <a:schemeClr val="accent1"/>
+          </a:fillRef>
+          <a:effectRef idx="0">
+            <a:schemeClr val="accent1"/>
+          </a:effectRef>
+          <a:fontRef idx="minor">
+            <a:schemeClr val="lt1"/>
+          </a:fontRef>
+        </p:style>
+        <p:txBody>
+          <a:bodyPr rtlCol="0" anchor="ctr"/>
+          <a:lstStyle/>
+          <a:p>
+            <a:pPr algn="ctr"/>
             <a:endParaRPr lang="en-US"/>
           </a:p>
         </p:txBody>
@@ -4839,7 +6498,7 @@
                   <a:spcPts val="600"/>
                 </a:spcAft>
               </a:pPr>
-              <a:t>10</a:t>
+              <a:t>12</a:t>
             </a:fld>
             <a:endParaRPr lang="en-CA">
               <a:solidFill>
@@ -4864,7 +6523,7 @@
 </p:sld>
 </file>
 
-<file path=ppt/slides/slide11.xml><?xml version="1.0" encoding="utf-8"?>
+<file path=ppt/slides/slide13.xml><?xml version="1.0" encoding="utf-8"?>
 <p:sld xmlns:a="http://schemas.openxmlformats.org/drawingml/2006/main" xmlns:r="http://schemas.openxmlformats.org/officeDocument/2006/relationships" xmlns:p="http://schemas.openxmlformats.org/presentationml/2006/main">
   <p:cSld>
     <p:bg>
@@ -11275,6 +12934,125 @@
           </a:fontRef>
         </p:style>
       </p:cxnSp>
+      <p:sp>
+        <p:nvSpPr>
+          <p:cNvPr id="21" name="Rectangle 4">
+            <a:extLst>
+              <a:ext uri="{FF2B5EF4-FFF2-40B4-BE49-F238E27FC236}">
+                <a16:creationId xmlns:a16="http://schemas.microsoft.com/office/drawing/2014/main" id="{8615F962-2EA8-445F-E5F4-0549E2E24926}"/>
+              </a:ext>
+            </a:extLst>
+          </p:cNvPr>
+          <p:cNvSpPr>
+            <a:spLocks noChangeArrowheads="1"/>
+          </p:cNvSpPr>
+          <p:nvPr/>
+        </p:nvSpPr>
+        <p:spPr bwMode="auto">
+          <a:xfrm>
+            <a:off x="165211" y="5638373"/>
+            <a:ext cx="5142930" cy="338554"/>
+          </a:xfrm>
+          <a:prstGeom prst="rect">
+            <a:avLst/>
+          </a:prstGeom>
+          <a:noFill/>
+          <a:ln>
+            <a:noFill/>
+          </a:ln>
+          <a:effectLst/>
+          <a:extLst>
+            <a:ext uri="{909E8E84-426E-40DD-AFC4-6F175D3DCCD1}">
+              <a14:hiddenFill xmlns:a14="http://schemas.microsoft.com/office/drawing/2010/main">
+                <a:solidFill>
+                  <a:schemeClr val="accent1"/>
+                </a:solidFill>
+              </a14:hiddenFill>
+            </a:ext>
+            <a:ext uri="{91240B29-F687-4F45-9708-019B960494DF}">
+              <a14:hiddenLine xmlns:a14="http://schemas.microsoft.com/office/drawing/2010/main" w="9525">
+                <a:solidFill>
+                  <a:schemeClr val="tx1"/>
+                </a:solidFill>
+                <a:miter lim="800000"/>
+                <a:headEnd/>
+                <a:tailEnd/>
+              </a14:hiddenLine>
+            </a:ext>
+            <a:ext uri="{AF507438-7753-43E0-B8FC-AC1667EBCBE1}">
+              <a14:hiddenEffects xmlns:a14="http://schemas.microsoft.com/office/drawing/2010/main">
+                <a:effectLst>
+                  <a:outerShdw dist="35921" dir="2700000" algn="ctr" rotWithShape="0">
+                    <a:schemeClr val="bg2"/>
+                  </a:outerShdw>
+                </a:effectLst>
+              </a14:hiddenEffects>
+            </a:ext>
+          </a:extLst>
+        </p:spPr>
+        <p:txBody>
+          <a:bodyPr vert="horz" wrap="square" lIns="91440" tIns="45720" rIns="91440" bIns="45720" numCol="1" anchor="ctr" anchorCtr="0" compatLnSpc="1">
+            <a:prstTxWarp prst="textNoShape">
+              <a:avLst/>
+            </a:prstTxWarp>
+            <a:spAutoFit/>
+          </a:bodyPr>
+          <a:lstStyle/>
+          <a:p>
+            <a:pPr marL="0" marR="0" lvl="0" indent="0" algn="l" defTabSz="914400" rtl="0" eaLnBrk="0" fontAlgn="base" latinLnBrk="0" hangingPunct="0">
+              <a:lnSpc>
+                <a:spcPct val="100000"/>
+              </a:lnSpc>
+              <a:spcBef>
+                <a:spcPct val="0"/>
+              </a:spcBef>
+              <a:spcAft>
+                <a:spcPct val="0"/>
+              </a:spcAft>
+              <a:buClrTx/>
+              <a:buSzTx/>
+              <a:buFontTx/>
+              <a:buNone/>
+              <a:tabLst/>
+            </a:pPr>
+            <a:r>
+              <a:rPr kumimoji="0" lang="en-US" altLang="en-US" sz="1600" b="0" i="0" u="none" strike="noStrike" cap="none" normalizeH="0" baseline="0" dirty="0">
+                <a:ln>
+                  <a:noFill/>
+                </a:ln>
+                <a:solidFill>
+                  <a:schemeClr val="bg1"/>
+                </a:solidFill>
+                <a:effectLst/>
+                <a:latin typeface="Arial Unicode MS"/>
+              </a:rPr>
+              <a:t>R-Squared Error: 0.9993086327577407</a:t>
+            </a:r>
+            <a:r>
+              <a:rPr kumimoji="0" lang="en-US" altLang="en-US" sz="1600" b="0" i="0" u="none" strike="noStrike" cap="none" normalizeH="0" baseline="0" dirty="0">
+                <a:ln>
+                  <a:noFill/>
+                </a:ln>
+                <a:solidFill>
+                  <a:schemeClr val="bg1"/>
+                </a:solidFill>
+                <a:effectLst/>
+              </a:rPr>
+              <a:t> </a:t>
+            </a:r>
+            <a:endParaRPr kumimoji="0" lang="en-US" altLang="en-US" sz="1600" b="0" i="0" u="none" strike="noStrike" cap="none" normalizeH="0" baseline="0" dirty="0">
+              <a:ln>
+                <a:noFill/>
+              </a:ln>
+              <a:solidFill>
+                <a:schemeClr val="bg1"/>
+              </a:solidFill>
+              <a:effectLst/>
+              <a:latin typeface="Arial" panose="020B0604020202020204" pitchFamily="34" charset="0"/>
+            </a:endParaRPr>
+          </a:p>
+        </p:txBody>
+      </p:sp>
     </p:spTree>
     <p:extLst>
       <p:ext uri="{BB962C8B-B14F-4D97-AF65-F5344CB8AC3E}">
@@ -11401,7 +13179,7 @@
         </p:nvSpPr>
         <p:spPr>
           <a:xfrm>
-            <a:off x="0" y="900557"/>
+            <a:off x="8459961" y="922500"/>
             <a:ext cx="3732039" cy="587202"/>
           </a:xfrm>
         </p:spPr>
@@ -11736,922 +13514,6 @@
                 </a:spcAft>
               </a:pPr>
               <a:t>8</a:t>
-            </a:fld>
-            <a:endParaRPr lang="en-US">
-              <a:solidFill>
-                <a:schemeClr val="bg1">
-                  <a:lumMod val="50000"/>
-                </a:schemeClr>
-              </a:solidFill>
-            </a:endParaRPr>
-          </a:p>
-        </p:txBody>
-      </p:sp>
-      <p:sp>
-        <p:nvSpPr>
-          <p:cNvPr id="7" name="Title 1">
-            <a:extLst>
-              <a:ext uri="{FF2B5EF4-FFF2-40B4-BE49-F238E27FC236}">
-                <a16:creationId xmlns:a16="http://schemas.microsoft.com/office/drawing/2014/main" id="{30C267E0-EF80-EF3B-247C-1841020E6D0F}"/>
-              </a:ext>
-            </a:extLst>
-          </p:cNvPr>
-          <p:cNvSpPr txBox="1">
-            <a:spLocks/>
-          </p:cNvSpPr>
-          <p:nvPr/>
-        </p:nvSpPr>
-        <p:spPr>
-          <a:xfrm>
-            <a:off x="8226552" y="973709"/>
-            <a:ext cx="3304032" cy="587202"/>
-          </a:xfrm>
-          <a:prstGeom prst="rect">
-            <a:avLst/>
-          </a:prstGeom>
-        </p:spPr>
-        <p:txBody>
-          <a:bodyPr vert="horz" lIns="91440" tIns="45720" rIns="91440" bIns="45720" rtlCol="0" anchor="ctr">
-            <a:normAutofit fontScale="67500" lnSpcReduction="20000"/>
-          </a:bodyPr>
-          <a:lstStyle>
-            <a:lvl1pPr algn="l" defTabSz="914400" rtl="0" eaLnBrk="1" latinLnBrk="0" hangingPunct="1">
-              <a:lnSpc>
-                <a:spcPct val="90000"/>
-              </a:lnSpc>
-              <a:spcBef>
-                <a:spcPct val="0"/>
-              </a:spcBef>
-              <a:buNone/>
-              <a:defRPr sz="4400" kern="1200">
-                <a:solidFill>
-                  <a:schemeClr val="tx1"/>
-                </a:solidFill>
-                <a:latin typeface="+mj-lt"/>
-                <a:ea typeface="+mj-ea"/>
-                <a:cs typeface="+mj-cs"/>
-              </a:defRPr>
-            </a:lvl1pPr>
-          </a:lstStyle>
-          <a:p>
-            <a:pPr algn="ctr"/>
-            <a:r>
-              <a:rPr lang="en-US" sz="6000" dirty="0">
-                <a:solidFill>
-                  <a:schemeClr val="bg1"/>
-                </a:solidFill>
-              </a:rPr>
-              <a:t>Conclusions</a:t>
-            </a:r>
-          </a:p>
-        </p:txBody>
-      </p:sp>
-      <p:sp>
-        <p:nvSpPr>
-          <p:cNvPr id="8" name="TextBox 7">
-            <a:extLst>
-              <a:ext uri="{FF2B5EF4-FFF2-40B4-BE49-F238E27FC236}">
-                <a16:creationId xmlns:a16="http://schemas.microsoft.com/office/drawing/2014/main" id="{976ECA01-4DFB-CAD8-F5BE-29C157FD097F}"/>
-              </a:ext>
-            </a:extLst>
-          </p:cNvPr>
-          <p:cNvSpPr txBox="1"/>
-          <p:nvPr/>
-        </p:nvSpPr>
-        <p:spPr>
-          <a:xfrm>
-            <a:off x="7050024" y="1603770"/>
-            <a:ext cx="5059415" cy="3693319"/>
-          </a:xfrm>
-          <a:prstGeom prst="rect">
-            <a:avLst/>
-          </a:prstGeom>
-          <a:noFill/>
-        </p:spPr>
-        <p:txBody>
-          <a:bodyPr wrap="square" rtlCol="0">
-            <a:spAutoFit/>
-          </a:bodyPr>
-          <a:lstStyle/>
-          <a:p>
-            <a:pPr marL="285750" indent="-285750">
-              <a:buFont typeface="Wingdings" panose="05000000000000000000" pitchFamily="2" charset="2"/>
-              <a:buChar char="v"/>
-            </a:pPr>
-            <a:r>
-              <a:rPr lang="en-US" dirty="0">
-                <a:solidFill>
-                  <a:schemeClr val="bg1"/>
-                </a:solidFill>
-              </a:rPr>
-              <a:t> The scale of the output price ranges is possibly off, but hard to verify.</a:t>
-            </a:r>
-          </a:p>
-          <a:p>
-            <a:pPr marL="285750" indent="-285750">
-              <a:buFont typeface="Wingdings" panose="05000000000000000000" pitchFamily="2" charset="2"/>
-              <a:buChar char="v"/>
-            </a:pPr>
-            <a:r>
-              <a:rPr lang="en-US" dirty="0">
-                <a:solidFill>
-                  <a:schemeClr val="bg1"/>
-                </a:solidFill>
-              </a:rPr>
-              <a:t>Scale issue </a:t>
-            </a:r>
-            <a:r>
-              <a:rPr lang="en-US" dirty="0">
-                <a:solidFill>
-                  <a:srgbClr val="FFFF00"/>
-                </a:solidFill>
-              </a:rPr>
-              <a:t>could</a:t>
-            </a:r>
-            <a:r>
-              <a:rPr lang="en-US" dirty="0">
-                <a:solidFill>
-                  <a:schemeClr val="bg1"/>
-                </a:solidFill>
-              </a:rPr>
-              <a:t> be due to a lower starting point in historical data.</a:t>
-            </a:r>
-          </a:p>
-          <a:p>
-            <a:pPr marL="285750" indent="-285750">
-              <a:buFont typeface="Wingdings" panose="05000000000000000000" pitchFamily="2" charset="2"/>
-              <a:buChar char="v"/>
-            </a:pPr>
-            <a:r>
-              <a:rPr lang="en-US" dirty="0">
-                <a:solidFill>
-                  <a:srgbClr val="FF0000"/>
-                </a:solidFill>
-              </a:rPr>
-              <a:t>Sell</a:t>
-            </a:r>
-            <a:r>
-              <a:rPr lang="en-US" dirty="0">
-                <a:solidFill>
-                  <a:schemeClr val="bg1"/>
-                </a:solidFill>
-              </a:rPr>
-              <a:t> Spring of </a:t>
-            </a:r>
-            <a:r>
-              <a:rPr lang="en-US" dirty="0">
-                <a:solidFill>
-                  <a:srgbClr val="FF0000"/>
-                </a:solidFill>
-              </a:rPr>
-              <a:t>2027</a:t>
-            </a:r>
-            <a:r>
-              <a:rPr lang="en-US" dirty="0">
-                <a:solidFill>
-                  <a:schemeClr val="bg1"/>
-                </a:solidFill>
-              </a:rPr>
-              <a:t>, </a:t>
-            </a:r>
-            <a:r>
-              <a:rPr lang="en-US" dirty="0">
-                <a:solidFill>
-                  <a:srgbClr val="FFFF00"/>
-                </a:solidFill>
-              </a:rPr>
-              <a:t>Buy</a:t>
-            </a:r>
-            <a:r>
-              <a:rPr lang="en-US" dirty="0">
-                <a:solidFill>
-                  <a:schemeClr val="bg1"/>
-                </a:solidFill>
-              </a:rPr>
-              <a:t> Winter of </a:t>
-            </a:r>
-            <a:r>
-              <a:rPr lang="en-US" dirty="0">
-                <a:solidFill>
-                  <a:srgbClr val="FFFF00"/>
-                </a:solidFill>
-              </a:rPr>
-              <a:t>2028</a:t>
-            </a:r>
-            <a:r>
-              <a:rPr lang="en-US" dirty="0">
-                <a:solidFill>
-                  <a:schemeClr val="bg1"/>
-                </a:solidFill>
-              </a:rPr>
-              <a:t>!</a:t>
-            </a:r>
-          </a:p>
-          <a:p>
-            <a:pPr marL="285750" indent="-285750">
-              <a:buFont typeface="Wingdings" panose="05000000000000000000" pitchFamily="2" charset="2"/>
-              <a:buChar char="v"/>
-            </a:pPr>
-            <a:r>
-              <a:rPr lang="en-US" dirty="0">
-                <a:solidFill>
-                  <a:schemeClr val="bg1"/>
-                </a:solidFill>
-              </a:rPr>
-              <a:t>The same trends of Spring/Winter are shown again in a few places.</a:t>
-            </a:r>
-          </a:p>
-          <a:p>
-            <a:pPr marL="285750" indent="-285750">
-              <a:buFont typeface="Wingdings" panose="05000000000000000000" pitchFamily="2" charset="2"/>
-              <a:buChar char="v"/>
-            </a:pPr>
-            <a:r>
-              <a:rPr lang="en-US" dirty="0" err="1">
-                <a:solidFill>
-                  <a:schemeClr val="bg1"/>
-                </a:solidFill>
-              </a:rPr>
-              <a:t>SkTime</a:t>
-            </a:r>
-            <a:r>
-              <a:rPr lang="en-US" dirty="0">
-                <a:solidFill>
-                  <a:schemeClr val="bg1"/>
-                </a:solidFill>
-              </a:rPr>
-              <a:t> would be a better library to use for future data forecasting when you only have historical data and a future </a:t>
-            </a:r>
-            <a:r>
-              <a:rPr lang="en-US">
-                <a:solidFill>
-                  <a:schemeClr val="bg1"/>
-                </a:solidFill>
-              </a:rPr>
-              <a:t>time frame.</a:t>
-            </a:r>
-            <a:endParaRPr lang="en-US" dirty="0">
-              <a:solidFill>
-                <a:schemeClr val="bg1"/>
-              </a:solidFill>
-            </a:endParaRPr>
-          </a:p>
-          <a:p>
-            <a:pPr marL="285750" indent="-285750">
-              <a:buFont typeface="Wingdings" panose="05000000000000000000" pitchFamily="2" charset="2"/>
-              <a:buChar char="v"/>
-            </a:pPr>
-            <a:r>
-              <a:rPr lang="en-US" dirty="0">
-                <a:solidFill>
-                  <a:schemeClr val="bg1"/>
-                </a:solidFill>
-              </a:rPr>
-              <a:t>A more in-depth course on machine learning would need to be taken to tackle such a large problem.</a:t>
-            </a:r>
-            <a:endParaRPr lang="en-CA" dirty="0">
-              <a:solidFill>
-                <a:schemeClr val="bg1"/>
-              </a:solidFill>
-            </a:endParaRPr>
-          </a:p>
-        </p:txBody>
-      </p:sp>
-      <p:pic>
-        <p:nvPicPr>
-          <p:cNvPr id="10" name="Graphic 9">
-            <a:extLst>
-              <a:ext uri="{FF2B5EF4-FFF2-40B4-BE49-F238E27FC236}">
-                <a16:creationId xmlns:a16="http://schemas.microsoft.com/office/drawing/2014/main" id="{747E059B-53EE-437F-9B0A-CF6AC4D74308}"/>
-              </a:ext>
-            </a:extLst>
-          </p:cNvPr>
-          <p:cNvPicPr>
-            <a:picLocks noChangeAspect="1"/>
-          </p:cNvPicPr>
-          <p:nvPr/>
-        </p:nvPicPr>
-        <p:blipFill>
-          <a:blip r:embed="rId2">
-            <a:extLst>
-              <a:ext uri="{28A0092B-C50C-407E-A947-70E740481C1C}">
-                <a14:useLocalDpi xmlns:a14="http://schemas.microsoft.com/office/drawing/2010/main" val="0"/>
-              </a:ext>
-              <a:ext uri="{96DAC541-7B7A-43D3-8B79-37D633B846F1}">
-                <asvg:svgBlip xmlns:asvg="http://schemas.microsoft.com/office/drawing/2016/SVG/main" r:embed="rId3"/>
-              </a:ext>
-            </a:extLst>
-          </a:blip>
-          <a:stretch>
-            <a:fillRect/>
-          </a:stretch>
-        </p:blipFill>
-        <p:spPr>
-          <a:xfrm>
-            <a:off x="387069" y="1656417"/>
-            <a:ext cx="4630891" cy="3436810"/>
-          </a:xfrm>
-          <a:prstGeom prst="rect">
-            <a:avLst/>
-          </a:prstGeom>
-        </p:spPr>
-      </p:pic>
-      <p:sp>
-        <p:nvSpPr>
-          <p:cNvPr id="3" name="Oval 2">
-            <a:extLst>
-              <a:ext uri="{FF2B5EF4-FFF2-40B4-BE49-F238E27FC236}">
-                <a16:creationId xmlns:a16="http://schemas.microsoft.com/office/drawing/2014/main" id="{7E41FF53-FA93-B8AC-E4D7-264F7ACF5CB6}"/>
-              </a:ext>
-            </a:extLst>
-          </p:cNvPr>
-          <p:cNvSpPr/>
-          <p:nvPr/>
-        </p:nvSpPr>
-        <p:spPr>
-          <a:xfrm>
-            <a:off x="2304288" y="3063240"/>
-            <a:ext cx="557784" cy="731520"/>
-          </a:xfrm>
-          <a:prstGeom prst="ellipse">
-            <a:avLst/>
-          </a:prstGeom>
-          <a:noFill/>
-        </p:spPr>
-        <p:style>
-          <a:lnRef idx="2">
-            <a:schemeClr val="accent2"/>
-          </a:lnRef>
-          <a:fillRef idx="1">
-            <a:schemeClr val="lt1"/>
-          </a:fillRef>
-          <a:effectRef idx="0">
-            <a:schemeClr val="accent2"/>
-          </a:effectRef>
-          <a:fontRef idx="minor">
-            <a:schemeClr val="dk1"/>
-          </a:fontRef>
-        </p:style>
-        <p:txBody>
-          <a:bodyPr rtlCol="0" anchor="ctr"/>
-          <a:lstStyle/>
-          <a:p>
-            <a:pPr algn="ctr"/>
-            <a:endParaRPr lang="en-CA"/>
-          </a:p>
-        </p:txBody>
-      </p:sp>
-      <p:sp>
-        <p:nvSpPr>
-          <p:cNvPr id="9" name="Oval 8">
-            <a:extLst>
-              <a:ext uri="{FF2B5EF4-FFF2-40B4-BE49-F238E27FC236}">
-                <a16:creationId xmlns:a16="http://schemas.microsoft.com/office/drawing/2014/main" id="{1D28FCD0-F751-5CE1-43A6-9EB0384A629A}"/>
-              </a:ext>
-            </a:extLst>
-          </p:cNvPr>
-          <p:cNvSpPr/>
-          <p:nvPr/>
-        </p:nvSpPr>
-        <p:spPr>
-          <a:xfrm>
-            <a:off x="2970249" y="2778416"/>
-            <a:ext cx="467895" cy="531712"/>
-          </a:xfrm>
-          <a:prstGeom prst="ellipse">
-            <a:avLst/>
-          </a:prstGeom>
-          <a:noFill/>
-        </p:spPr>
-        <p:style>
-          <a:lnRef idx="2">
-            <a:schemeClr val="accent2"/>
-          </a:lnRef>
-          <a:fillRef idx="1">
-            <a:schemeClr val="lt1"/>
-          </a:fillRef>
-          <a:effectRef idx="0">
-            <a:schemeClr val="accent2"/>
-          </a:effectRef>
-          <a:fontRef idx="minor">
-            <a:schemeClr val="dk1"/>
-          </a:fontRef>
-        </p:style>
-        <p:txBody>
-          <a:bodyPr rtlCol="0" anchor="ctr"/>
-          <a:lstStyle/>
-          <a:p>
-            <a:pPr algn="ctr"/>
-            <a:endParaRPr lang="en-CA"/>
-          </a:p>
-        </p:txBody>
-      </p:sp>
-      <p:sp>
-        <p:nvSpPr>
-          <p:cNvPr id="11" name="Oval 10">
-            <a:extLst>
-              <a:ext uri="{FF2B5EF4-FFF2-40B4-BE49-F238E27FC236}">
-                <a16:creationId xmlns:a16="http://schemas.microsoft.com/office/drawing/2014/main" id="{A46F3365-A092-80FF-4DBE-3DA2F9EE1814}"/>
-              </a:ext>
-            </a:extLst>
-          </p:cNvPr>
-          <p:cNvSpPr/>
-          <p:nvPr/>
-        </p:nvSpPr>
-        <p:spPr>
-          <a:xfrm>
-            <a:off x="3705062" y="2292015"/>
-            <a:ext cx="467895" cy="531712"/>
-          </a:xfrm>
-          <a:prstGeom prst="ellipse">
-            <a:avLst/>
-          </a:prstGeom>
-          <a:noFill/>
-        </p:spPr>
-        <p:style>
-          <a:lnRef idx="2">
-            <a:schemeClr val="accent2"/>
-          </a:lnRef>
-          <a:fillRef idx="1">
-            <a:schemeClr val="lt1"/>
-          </a:fillRef>
-          <a:effectRef idx="0">
-            <a:schemeClr val="accent2"/>
-          </a:effectRef>
-          <a:fontRef idx="minor">
-            <a:schemeClr val="dk1"/>
-          </a:fontRef>
-        </p:style>
-        <p:txBody>
-          <a:bodyPr rtlCol="0" anchor="ctr"/>
-          <a:lstStyle/>
-          <a:p>
-            <a:pPr algn="ctr"/>
-            <a:endParaRPr lang="en-CA"/>
-          </a:p>
-        </p:txBody>
-      </p:sp>
-    </p:spTree>
-    <p:extLst>
-      <p:ext uri="{BB962C8B-B14F-4D97-AF65-F5344CB8AC3E}">
-        <p14:creationId xmlns:p14="http://schemas.microsoft.com/office/powerpoint/2010/main" val="795103504"/>
-      </p:ext>
-    </p:extLst>
-  </p:cSld>
-  <p:clrMapOvr>
-    <a:masterClrMapping/>
-  </p:clrMapOvr>
-</p:sld>
-</file>
-
-<file path=ppt/slides/slide9.xml><?xml version="1.0" encoding="utf-8"?>
-<p:sld xmlns:a="http://schemas.openxmlformats.org/drawingml/2006/main" xmlns:r="http://schemas.openxmlformats.org/officeDocument/2006/relationships" xmlns:p="http://schemas.openxmlformats.org/presentationml/2006/main">
-  <p:cSld>
-    <p:bg>
-      <p:bgPr>
-        <a:solidFill>
-          <a:schemeClr val="bg1"/>
-        </a:solidFill>
-        <a:effectLst/>
-      </p:bgPr>
-    </p:bg>
-    <p:spTree>
-      <p:nvGrpSpPr>
-        <p:cNvPr id="1" name=""/>
-        <p:cNvGrpSpPr/>
-        <p:nvPr/>
-      </p:nvGrpSpPr>
-      <p:grpSpPr>
-        <a:xfrm>
-          <a:off x="0" y="0"/>
-          <a:ext cx="0" cy="0"/>
-          <a:chOff x="0" y="0"/>
-          <a:chExt cx="0" cy="0"/>
-        </a:xfrm>
-      </p:grpSpPr>
-      <p:sp>
-        <p:nvSpPr>
-          <p:cNvPr id="22" name="Rectangle 21">
-            <a:extLst>
-              <a:ext uri="{FF2B5EF4-FFF2-40B4-BE49-F238E27FC236}">
-                <a16:creationId xmlns:a16="http://schemas.microsoft.com/office/drawing/2014/main" id="{FB5B0058-AF13-4859-B429-4EDDE2A26F7F}"/>
-              </a:ext>
-              <a:ext uri="{C183D7F6-B498-43B3-948B-1728B52AA6E4}">
-                <adec:decorative xmlns:adec="http://schemas.microsoft.com/office/drawing/2017/decorative" val="1"/>
-              </a:ext>
-            </a:extLst>
-          </p:cNvPr>
-          <p:cNvSpPr>
-            <a:spLocks noGrp="1" noRot="1" noChangeAspect="1" noMove="1" noResize="1" noEditPoints="1" noAdjustHandles="1" noChangeArrowheads="1" noChangeShapeType="1" noTextEdit="1"/>
-          </p:cNvSpPr>
-          <p:nvPr>
-            <p:extLst>
-              <p:ext uri="{386F3935-93C4-4BCD-93E2-E3B085C9AB24}">
-                <p16:designElem xmlns:p16="http://schemas.microsoft.com/office/powerpoint/2015/main" val="1"/>
-              </p:ext>
-            </p:extLst>
-          </p:nvPr>
-        </p:nvSpPr>
-        <p:spPr>
-          <a:xfrm>
-            <a:off x="0" y="0"/>
-            <a:ext cx="12192000" cy="6858000"/>
-          </a:xfrm>
-          <a:prstGeom prst="rect">
-            <a:avLst/>
-          </a:prstGeom>
-          <a:solidFill>
-            <a:schemeClr val="tx1">
-              <a:lumMod val="95000"/>
-              <a:lumOff val="5000"/>
-            </a:schemeClr>
-          </a:solidFill>
-          <a:ln>
-            <a:noFill/>
-          </a:ln>
-        </p:spPr>
-        <p:style>
-          <a:lnRef idx="2">
-            <a:schemeClr val="accent1">
-              <a:shade val="50000"/>
-            </a:schemeClr>
-          </a:lnRef>
-          <a:fillRef idx="1">
-            <a:schemeClr val="accent1"/>
-          </a:fillRef>
-          <a:effectRef idx="0">
-            <a:schemeClr val="accent1"/>
-          </a:effectRef>
-          <a:fontRef idx="minor">
-            <a:schemeClr val="lt1"/>
-          </a:fontRef>
-        </p:style>
-        <p:txBody>
-          <a:bodyPr rtlCol="0" anchor="ctr"/>
-          <a:lstStyle/>
-          <a:p>
-            <a:pPr algn="ctr"/>
-            <a:endParaRPr lang="en-US" dirty="0">
-              <a:solidFill>
-                <a:schemeClr val="tx1"/>
-              </a:solidFill>
-            </a:endParaRPr>
-          </a:p>
-        </p:txBody>
-      </p:sp>
-      <p:sp>
-        <p:nvSpPr>
-          <p:cNvPr id="2" name="Title 1">
-            <a:extLst>
-              <a:ext uri="{FF2B5EF4-FFF2-40B4-BE49-F238E27FC236}">
-                <a16:creationId xmlns:a16="http://schemas.microsoft.com/office/drawing/2014/main" id="{8BC8A551-30D9-35B6-870F-6A923EA84886}"/>
-              </a:ext>
-            </a:extLst>
-          </p:cNvPr>
-          <p:cNvSpPr>
-            <a:spLocks noGrp="1"/>
-          </p:cNvSpPr>
-          <p:nvPr>
-            <p:ph type="title"/>
-          </p:nvPr>
-        </p:nvSpPr>
-        <p:spPr>
-          <a:xfrm>
-            <a:off x="8459961" y="922500"/>
-            <a:ext cx="3732039" cy="587202"/>
-          </a:xfrm>
-        </p:spPr>
-        <p:txBody>
-          <a:bodyPr vert="horz" lIns="91440" tIns="45720" rIns="91440" bIns="45720" rtlCol="0" anchor="ctr">
-            <a:normAutofit fontScale="90000"/>
-          </a:bodyPr>
-          <a:lstStyle/>
-          <a:p>
-            <a:pPr algn="ctr"/>
-            <a:r>
-              <a:rPr lang="en-US" sz="6000" kern="1200" dirty="0">
-                <a:solidFill>
-                  <a:schemeClr val="bg1"/>
-                </a:solidFill>
-                <a:latin typeface="+mj-lt"/>
-                <a:ea typeface="+mj-ea"/>
-                <a:cs typeface="+mj-cs"/>
-              </a:rPr>
-              <a:t>Outcomes</a:t>
-            </a:r>
-          </a:p>
-        </p:txBody>
-      </p:sp>
-      <p:cxnSp>
-        <p:nvCxnSpPr>
-          <p:cNvPr id="24" name="Straight Connector 23">
-            <a:extLst>
-              <a:ext uri="{FF2B5EF4-FFF2-40B4-BE49-F238E27FC236}">
-                <a16:creationId xmlns:a16="http://schemas.microsoft.com/office/drawing/2014/main" id="{E6D6B450-4278-45B8-88C7-C061710E3C7E}"/>
-              </a:ext>
-              <a:ext uri="{C183D7F6-B498-43B3-948B-1728B52AA6E4}">
-                <adec:decorative xmlns:adec="http://schemas.microsoft.com/office/drawing/2017/decorative" val="1"/>
-              </a:ext>
-            </a:extLst>
-          </p:cNvPr>
-          <p:cNvCxnSpPr>
-            <a:cxnSpLocks noGrp="1" noRot="1" noChangeAspect="1" noMove="1" noResize="1" noEditPoints="1" noAdjustHandles="1" noChangeArrowheads="1" noChangeShapeType="1"/>
-          </p:cNvCxnSpPr>
-          <p:nvPr>
-            <p:extLst>
-              <p:ext uri="{386F3935-93C4-4BCD-93E2-E3B085C9AB24}">
-                <p16:designElem xmlns:p16="http://schemas.microsoft.com/office/powerpoint/2015/main" val="1"/>
-              </p:ext>
-            </p:extLst>
-          </p:nvPr>
-        </p:nvCxnSpPr>
-        <p:spPr>
-          <a:xfrm flipH="1">
-            <a:off x="0" y="1560911"/>
-            <a:ext cx="3581400" cy="0"/>
-          </a:xfrm>
-          <a:prstGeom prst="line">
-            <a:avLst/>
-          </a:prstGeom>
-          <a:ln w="12700">
-            <a:solidFill>
-              <a:schemeClr val="accent2"/>
-            </a:solidFill>
-          </a:ln>
-        </p:spPr>
-        <p:style>
-          <a:lnRef idx="1">
-            <a:schemeClr val="accent1"/>
-          </a:lnRef>
-          <a:fillRef idx="0">
-            <a:schemeClr val="accent1"/>
-          </a:fillRef>
-          <a:effectRef idx="0">
-            <a:schemeClr val="accent1"/>
-          </a:effectRef>
-          <a:fontRef idx="minor">
-            <a:schemeClr val="tx1"/>
-          </a:fontRef>
-        </p:style>
-      </p:cxnSp>
-      <p:cxnSp>
-        <p:nvCxnSpPr>
-          <p:cNvPr id="26" name="Straight Connector 25">
-            <a:extLst>
-              <a:ext uri="{FF2B5EF4-FFF2-40B4-BE49-F238E27FC236}">
-                <a16:creationId xmlns:a16="http://schemas.microsoft.com/office/drawing/2014/main" id="{EE7CEFB9-5672-4FC6-981B-C8DA3FE08EA2}"/>
-              </a:ext>
-              <a:ext uri="{C183D7F6-B498-43B3-948B-1728B52AA6E4}">
-                <adec:decorative xmlns:adec="http://schemas.microsoft.com/office/drawing/2017/decorative" val="1"/>
-              </a:ext>
-            </a:extLst>
-          </p:cNvPr>
-          <p:cNvCxnSpPr>
-            <a:cxnSpLocks noGrp="1" noRot="1" noChangeAspect="1" noMove="1" noResize="1" noEditPoints="1" noAdjustHandles="1" noChangeArrowheads="1" noChangeShapeType="1"/>
-          </p:cNvCxnSpPr>
-          <p:nvPr>
-            <p:extLst>
-              <p:ext uri="{386F3935-93C4-4BCD-93E2-E3B085C9AB24}">
-                <p16:designElem xmlns:p16="http://schemas.microsoft.com/office/powerpoint/2015/main" val="1"/>
-              </p:ext>
-            </p:extLst>
-          </p:nvPr>
-        </p:nvCxnSpPr>
-        <p:spPr>
-          <a:xfrm flipH="1">
-            <a:off x="8610600" y="1560911"/>
-            <a:ext cx="3581400" cy="0"/>
-          </a:xfrm>
-          <a:prstGeom prst="line">
-            <a:avLst/>
-          </a:prstGeom>
-          <a:ln w="12700">
-            <a:solidFill>
-              <a:schemeClr val="accent2"/>
-            </a:solidFill>
-          </a:ln>
-        </p:spPr>
-        <p:style>
-          <a:lnRef idx="1">
-            <a:schemeClr val="accent1"/>
-          </a:lnRef>
-          <a:fillRef idx="0">
-            <a:schemeClr val="accent1"/>
-          </a:fillRef>
-          <a:effectRef idx="0">
-            <a:schemeClr val="accent1"/>
-          </a:effectRef>
-          <a:fontRef idx="minor">
-            <a:schemeClr val="tx1"/>
-          </a:fontRef>
-        </p:style>
-      </p:cxnSp>
-      <p:cxnSp>
-        <p:nvCxnSpPr>
-          <p:cNvPr id="28" name="Straight Connector 27">
-            <a:extLst>
-              <a:ext uri="{FF2B5EF4-FFF2-40B4-BE49-F238E27FC236}">
-                <a16:creationId xmlns:a16="http://schemas.microsoft.com/office/drawing/2014/main" id="{74234A4C-A256-4139-A5F4-27078F0D6796}"/>
-              </a:ext>
-              <a:ext uri="{C183D7F6-B498-43B3-948B-1728B52AA6E4}">
-                <adec:decorative xmlns:adec="http://schemas.microsoft.com/office/drawing/2017/decorative" val="1"/>
-              </a:ext>
-            </a:extLst>
-          </p:cNvPr>
-          <p:cNvCxnSpPr>
-            <a:cxnSpLocks noGrp="1" noRot="1" noChangeAspect="1" noMove="1" noResize="1" noEditPoints="1" noAdjustHandles="1" noChangeArrowheads="1" noChangeShapeType="1"/>
-          </p:cNvCxnSpPr>
-          <p:nvPr>
-            <p:extLst>
-              <p:ext uri="{386F3935-93C4-4BCD-93E2-E3B085C9AB24}">
-                <p16:designElem xmlns:p16="http://schemas.microsoft.com/office/powerpoint/2015/main" val="1"/>
-              </p:ext>
-            </p:extLst>
-          </p:nvPr>
-        </p:nvCxnSpPr>
-        <p:spPr>
-          <a:xfrm flipH="1">
-            <a:off x="3048" y="5286237"/>
-            <a:ext cx="12188952" cy="0"/>
-          </a:xfrm>
-          <a:prstGeom prst="line">
-            <a:avLst/>
-          </a:prstGeom>
-          <a:ln w="12700">
-            <a:solidFill>
-              <a:schemeClr val="accent2"/>
-            </a:solidFill>
-          </a:ln>
-        </p:spPr>
-        <p:style>
-          <a:lnRef idx="1">
-            <a:schemeClr val="accent1"/>
-          </a:lnRef>
-          <a:fillRef idx="0">
-            <a:schemeClr val="accent1"/>
-          </a:fillRef>
-          <a:effectRef idx="0">
-            <a:schemeClr val="accent1"/>
-          </a:effectRef>
-          <a:fontRef idx="minor">
-            <a:schemeClr val="tx1"/>
-          </a:fontRef>
-        </p:style>
-      </p:cxnSp>
-      <p:sp>
-        <p:nvSpPr>
-          <p:cNvPr id="4" name="Date Placeholder 3">
-            <a:extLst>
-              <a:ext uri="{FF2B5EF4-FFF2-40B4-BE49-F238E27FC236}">
-                <a16:creationId xmlns:a16="http://schemas.microsoft.com/office/drawing/2014/main" id="{60AA39EA-1BD4-5ADF-82A5-488914B68D98}"/>
-              </a:ext>
-            </a:extLst>
-          </p:cNvPr>
-          <p:cNvSpPr>
-            <a:spLocks noGrp="1"/>
-          </p:cNvSpPr>
-          <p:nvPr>
-            <p:ph type="dt" sz="half" idx="10"/>
-          </p:nvPr>
-        </p:nvSpPr>
-        <p:spPr>
-          <a:xfrm>
-            <a:off x="838200" y="6356350"/>
-            <a:ext cx="2743200" cy="365125"/>
-          </a:xfrm>
-        </p:spPr>
-        <p:txBody>
-          <a:bodyPr vert="horz" lIns="91440" tIns="45720" rIns="91440" bIns="45720" rtlCol="0" anchor="ctr">
-            <a:normAutofit/>
-          </a:bodyPr>
-          <a:lstStyle/>
-          <a:p>
-            <a:pPr>
-              <a:spcAft>
-                <a:spcPts val="600"/>
-              </a:spcAft>
-            </a:pPr>
-            <a:fld id="{DD303E3B-074C-440F-86D1-3BB7E04505DE}" type="datetimeyyyy">
-              <a:rPr lang="en-US">
-                <a:solidFill>
-                  <a:schemeClr val="bg1">
-                    <a:lumMod val="50000"/>
-                  </a:schemeClr>
-                </a:solidFill>
-              </a:rPr>
-              <a:pPr>
-                <a:spcAft>
-                  <a:spcPts val="600"/>
-                </a:spcAft>
-              </a:pPr>
-              <a:t>2024</a:t>
-            </a:fld>
-            <a:endParaRPr lang="en-US">
-              <a:solidFill>
-                <a:schemeClr val="bg1">
-                  <a:lumMod val="50000"/>
-                </a:schemeClr>
-              </a:solidFill>
-            </a:endParaRPr>
-          </a:p>
-        </p:txBody>
-      </p:sp>
-      <p:sp>
-        <p:nvSpPr>
-          <p:cNvPr id="5" name="Footer Placeholder 4">
-            <a:extLst>
-              <a:ext uri="{FF2B5EF4-FFF2-40B4-BE49-F238E27FC236}">
-                <a16:creationId xmlns:a16="http://schemas.microsoft.com/office/drawing/2014/main" id="{8251454E-77DD-4304-F4AF-245027455781}"/>
-              </a:ext>
-            </a:extLst>
-          </p:cNvPr>
-          <p:cNvSpPr>
-            <a:spLocks noGrp="1"/>
-          </p:cNvSpPr>
-          <p:nvPr>
-            <p:ph type="ftr" sz="quarter" idx="11"/>
-          </p:nvPr>
-        </p:nvSpPr>
-        <p:spPr>
-          <a:xfrm>
-            <a:off x="4038600" y="6356350"/>
-            <a:ext cx="4114800" cy="365125"/>
-          </a:xfrm>
-        </p:spPr>
-        <p:txBody>
-          <a:bodyPr vert="horz" lIns="91440" tIns="45720" rIns="91440" bIns="45720" rtlCol="0" anchor="ctr">
-            <a:normAutofit/>
-          </a:bodyPr>
-          <a:lstStyle/>
-          <a:p>
-            <a:pPr>
-              <a:spcAft>
-                <a:spcPts val="600"/>
-              </a:spcAft>
-            </a:pPr>
-            <a:r>
-              <a:rPr lang="en-US" kern="1200">
-                <a:solidFill>
-                  <a:schemeClr val="bg1">
-                    <a:lumMod val="50000"/>
-                  </a:schemeClr>
-                </a:solidFill>
-                <a:latin typeface="+mn-lt"/>
-                <a:ea typeface="+mn-ea"/>
-                <a:cs typeface="+mn-cs"/>
-              </a:rPr>
-              <a:t>GENG4500-60</a:t>
-            </a:r>
-          </a:p>
-        </p:txBody>
-      </p:sp>
-      <p:sp>
-        <p:nvSpPr>
-          <p:cNvPr id="6" name="Slide Number Placeholder 5">
-            <a:extLst>
-              <a:ext uri="{FF2B5EF4-FFF2-40B4-BE49-F238E27FC236}">
-                <a16:creationId xmlns:a16="http://schemas.microsoft.com/office/drawing/2014/main" id="{525E3120-057C-155F-E7EF-176F72BED592}"/>
-              </a:ext>
-            </a:extLst>
-          </p:cNvPr>
-          <p:cNvSpPr>
-            <a:spLocks noGrp="1"/>
-          </p:cNvSpPr>
-          <p:nvPr>
-            <p:ph type="sldNum" sz="quarter" idx="12"/>
-          </p:nvPr>
-        </p:nvSpPr>
-        <p:spPr>
-          <a:xfrm>
-            <a:off x="8610600" y="6356350"/>
-            <a:ext cx="2743200" cy="365125"/>
-          </a:xfrm>
-        </p:spPr>
-        <p:txBody>
-          <a:bodyPr vert="horz" lIns="91440" tIns="45720" rIns="91440" bIns="45720" rtlCol="0" anchor="ctr">
-            <a:normAutofit/>
-          </a:bodyPr>
-          <a:lstStyle/>
-          <a:p>
-            <a:pPr>
-              <a:spcAft>
-                <a:spcPts val="600"/>
-              </a:spcAft>
-            </a:pPr>
-            <a:fld id="{BC1B8E0F-90D7-4F6F-9CC4-1E156486B9C1}" type="slidenum">
-              <a:rPr lang="en-US">
-                <a:solidFill>
-                  <a:schemeClr val="bg1">
-                    <a:lumMod val="50000"/>
-                  </a:schemeClr>
-                </a:solidFill>
-              </a:rPr>
-              <a:pPr>
-                <a:spcAft>
-                  <a:spcPts val="600"/>
-                </a:spcAft>
-              </a:pPr>
-              <a:t>9</a:t>
             </a:fld>
             <a:endParaRPr lang="en-US">
               <a:solidFill>
@@ -12765,69 +13627,560 @@
           </a:graphicData>
         </a:graphic>
       </p:graphicFrame>
-      <p:sp>
-        <p:nvSpPr>
-          <p:cNvPr id="25" name="Title 1">
-            <a:extLst>
-              <a:ext uri="{FF2B5EF4-FFF2-40B4-BE49-F238E27FC236}">
-                <a16:creationId xmlns:a16="http://schemas.microsoft.com/office/drawing/2014/main" id="{3A36B855-25AF-02FC-13A1-747A5528BAC0}"/>
-              </a:ext>
-            </a:extLst>
-          </p:cNvPr>
-          <p:cNvSpPr txBox="1">
-            <a:spLocks/>
-          </p:cNvSpPr>
-          <p:nvPr/>
-        </p:nvSpPr>
-        <p:spPr>
-          <a:xfrm>
-            <a:off x="0" y="922500"/>
-            <a:ext cx="3732039" cy="587202"/>
-          </a:xfrm>
-          <a:prstGeom prst="rect">
-            <a:avLst/>
-          </a:prstGeom>
-        </p:spPr>
-        <p:txBody>
-          <a:bodyPr vert="horz" lIns="91440" tIns="45720" rIns="91440" bIns="45720" rtlCol="0" anchor="ctr">
-            <a:noAutofit/>
-          </a:bodyPr>
-          <a:lstStyle>
-            <a:lvl1pPr algn="l" defTabSz="914400" rtl="0" eaLnBrk="1" latinLnBrk="0" hangingPunct="1">
-              <a:lnSpc>
-                <a:spcPct val="90000"/>
-              </a:lnSpc>
-              <a:spcBef>
-                <a:spcPct val="0"/>
-              </a:spcBef>
-              <a:buNone/>
-              <a:defRPr sz="4400" kern="1200">
-                <a:solidFill>
-                  <a:schemeClr val="tx1"/>
-                </a:solidFill>
-                <a:latin typeface="+mj-lt"/>
-                <a:ea typeface="+mj-ea"/>
-                <a:cs typeface="+mj-cs"/>
-              </a:defRPr>
-            </a:lvl1pPr>
-          </a:lstStyle>
-          <a:p>
-            <a:pPr algn="ctr"/>
-            <a:r>
-              <a:rPr lang="en-US" sz="5400" dirty="0">
-                <a:solidFill>
-                  <a:schemeClr val="bg1"/>
-                </a:solidFill>
-              </a:rPr>
-              <a:t>Other</a:t>
-            </a:r>
-          </a:p>
-        </p:txBody>
-      </p:sp>
     </p:spTree>
     <p:extLst>
       <p:ext uri="{BB962C8B-B14F-4D97-AF65-F5344CB8AC3E}">
         <p14:creationId xmlns:p14="http://schemas.microsoft.com/office/powerpoint/2010/main" val="3411810196"/>
+      </p:ext>
+    </p:extLst>
+  </p:cSld>
+  <p:clrMapOvr>
+    <a:masterClrMapping/>
+  </p:clrMapOvr>
+</p:sld>
+</file>
+
+<file path=ppt/slides/slide9.xml><?xml version="1.0" encoding="utf-8"?>
+<p:sld xmlns:a="http://schemas.openxmlformats.org/drawingml/2006/main" xmlns:r="http://schemas.openxmlformats.org/officeDocument/2006/relationships" xmlns:p="http://schemas.openxmlformats.org/presentationml/2006/main">
+  <p:cSld>
+    <p:bg>
+      <p:bgPr>
+        <a:solidFill>
+          <a:schemeClr val="bg1"/>
+        </a:solidFill>
+        <a:effectLst/>
+      </p:bgPr>
+    </p:bg>
+    <p:spTree>
+      <p:nvGrpSpPr>
+        <p:cNvPr id="1" name=""/>
+        <p:cNvGrpSpPr/>
+        <p:nvPr/>
+      </p:nvGrpSpPr>
+      <p:grpSpPr>
+        <a:xfrm>
+          <a:off x="0" y="0"/>
+          <a:ext cx="0" cy="0"/>
+          <a:chOff x="0" y="0"/>
+          <a:chExt cx="0" cy="0"/>
+        </a:xfrm>
+      </p:grpSpPr>
+      <p:sp>
+        <p:nvSpPr>
+          <p:cNvPr id="22" name="Rectangle 21">
+            <a:extLst>
+              <a:ext uri="{FF2B5EF4-FFF2-40B4-BE49-F238E27FC236}">
+                <a16:creationId xmlns:a16="http://schemas.microsoft.com/office/drawing/2014/main" id="{FB5B0058-AF13-4859-B429-4EDDE2A26F7F}"/>
+              </a:ext>
+              <a:ext uri="{C183D7F6-B498-43B3-948B-1728B52AA6E4}">
+                <adec:decorative xmlns:adec="http://schemas.microsoft.com/office/drawing/2017/decorative" val="1"/>
+              </a:ext>
+            </a:extLst>
+          </p:cNvPr>
+          <p:cNvSpPr>
+            <a:spLocks noGrp="1" noRot="1" noChangeAspect="1" noMove="1" noResize="1" noEditPoints="1" noAdjustHandles="1" noChangeArrowheads="1" noChangeShapeType="1" noTextEdit="1"/>
+          </p:cNvSpPr>
+          <p:nvPr>
+            <p:extLst>
+              <p:ext uri="{386F3935-93C4-4BCD-93E2-E3B085C9AB24}">
+                <p16:designElem xmlns:p16="http://schemas.microsoft.com/office/powerpoint/2015/main" val="1"/>
+              </p:ext>
+            </p:extLst>
+          </p:nvPr>
+        </p:nvSpPr>
+        <p:spPr>
+          <a:xfrm>
+            <a:off x="0" y="0"/>
+            <a:ext cx="12192000" cy="6858000"/>
+          </a:xfrm>
+          <a:prstGeom prst="rect">
+            <a:avLst/>
+          </a:prstGeom>
+          <a:solidFill>
+            <a:schemeClr val="tx1">
+              <a:lumMod val="95000"/>
+              <a:lumOff val="5000"/>
+            </a:schemeClr>
+          </a:solidFill>
+          <a:ln>
+            <a:noFill/>
+          </a:ln>
+        </p:spPr>
+        <p:style>
+          <a:lnRef idx="2">
+            <a:schemeClr val="accent1">
+              <a:shade val="50000"/>
+            </a:schemeClr>
+          </a:lnRef>
+          <a:fillRef idx="1">
+            <a:schemeClr val="accent1"/>
+          </a:fillRef>
+          <a:effectRef idx="0">
+            <a:schemeClr val="accent1"/>
+          </a:effectRef>
+          <a:fontRef idx="minor">
+            <a:schemeClr val="lt1"/>
+          </a:fontRef>
+        </p:style>
+        <p:txBody>
+          <a:bodyPr rtlCol="0" anchor="ctr"/>
+          <a:lstStyle/>
+          <a:p>
+            <a:pPr algn="ctr"/>
+            <a:endParaRPr lang="en-US" dirty="0">
+              <a:solidFill>
+                <a:schemeClr val="tx1"/>
+              </a:solidFill>
+            </a:endParaRPr>
+          </a:p>
+        </p:txBody>
+      </p:sp>
+      <p:sp>
+        <p:nvSpPr>
+          <p:cNvPr id="2" name="Title 1">
+            <a:extLst>
+              <a:ext uri="{FF2B5EF4-FFF2-40B4-BE49-F238E27FC236}">
+                <a16:creationId xmlns:a16="http://schemas.microsoft.com/office/drawing/2014/main" id="{8BC8A551-30D9-35B6-870F-6A923EA84886}"/>
+              </a:ext>
+            </a:extLst>
+          </p:cNvPr>
+          <p:cNvSpPr>
+            <a:spLocks noGrp="1"/>
+          </p:cNvSpPr>
+          <p:nvPr>
+            <p:ph type="title"/>
+          </p:nvPr>
+        </p:nvSpPr>
+        <p:spPr>
+          <a:xfrm>
+            <a:off x="0" y="973709"/>
+            <a:ext cx="3732039" cy="587202"/>
+          </a:xfrm>
+        </p:spPr>
+        <p:txBody>
+          <a:bodyPr vert="horz" lIns="91440" tIns="45720" rIns="91440" bIns="45720" rtlCol="0" anchor="ctr">
+            <a:normAutofit fontScale="90000"/>
+          </a:bodyPr>
+          <a:lstStyle/>
+          <a:p>
+            <a:pPr algn="ctr"/>
+            <a:r>
+              <a:rPr lang="en-US" sz="6000" kern="1200" dirty="0">
+                <a:solidFill>
+                  <a:schemeClr val="bg1"/>
+                </a:solidFill>
+                <a:latin typeface="+mj-lt"/>
+                <a:ea typeface="+mj-ea"/>
+                <a:cs typeface="+mj-cs"/>
+              </a:rPr>
+              <a:t>Outcomes</a:t>
+            </a:r>
+          </a:p>
+        </p:txBody>
+      </p:sp>
+      <p:cxnSp>
+        <p:nvCxnSpPr>
+          <p:cNvPr id="24" name="Straight Connector 23">
+            <a:extLst>
+              <a:ext uri="{FF2B5EF4-FFF2-40B4-BE49-F238E27FC236}">
+                <a16:creationId xmlns:a16="http://schemas.microsoft.com/office/drawing/2014/main" id="{E6D6B450-4278-45B8-88C7-C061710E3C7E}"/>
+              </a:ext>
+              <a:ext uri="{C183D7F6-B498-43B3-948B-1728B52AA6E4}">
+                <adec:decorative xmlns:adec="http://schemas.microsoft.com/office/drawing/2017/decorative" val="1"/>
+              </a:ext>
+            </a:extLst>
+          </p:cNvPr>
+          <p:cNvCxnSpPr>
+            <a:cxnSpLocks noGrp="1" noRot="1" noChangeAspect="1" noMove="1" noResize="1" noEditPoints="1" noAdjustHandles="1" noChangeArrowheads="1" noChangeShapeType="1"/>
+          </p:cNvCxnSpPr>
+          <p:nvPr>
+            <p:extLst>
+              <p:ext uri="{386F3935-93C4-4BCD-93E2-E3B085C9AB24}">
+                <p16:designElem xmlns:p16="http://schemas.microsoft.com/office/powerpoint/2015/main" val="1"/>
+              </p:ext>
+            </p:extLst>
+          </p:nvPr>
+        </p:nvCxnSpPr>
+        <p:spPr>
+          <a:xfrm flipH="1">
+            <a:off x="0" y="1560911"/>
+            <a:ext cx="3581400" cy="0"/>
+          </a:xfrm>
+          <a:prstGeom prst="line">
+            <a:avLst/>
+          </a:prstGeom>
+          <a:ln w="12700">
+            <a:solidFill>
+              <a:schemeClr val="accent2"/>
+            </a:solidFill>
+          </a:ln>
+        </p:spPr>
+        <p:style>
+          <a:lnRef idx="1">
+            <a:schemeClr val="accent1"/>
+          </a:lnRef>
+          <a:fillRef idx="0">
+            <a:schemeClr val="accent1"/>
+          </a:fillRef>
+          <a:effectRef idx="0">
+            <a:schemeClr val="accent1"/>
+          </a:effectRef>
+          <a:fontRef idx="minor">
+            <a:schemeClr val="tx1"/>
+          </a:fontRef>
+        </p:style>
+      </p:cxnSp>
+      <p:cxnSp>
+        <p:nvCxnSpPr>
+          <p:cNvPr id="26" name="Straight Connector 25">
+            <a:extLst>
+              <a:ext uri="{FF2B5EF4-FFF2-40B4-BE49-F238E27FC236}">
+                <a16:creationId xmlns:a16="http://schemas.microsoft.com/office/drawing/2014/main" id="{EE7CEFB9-5672-4FC6-981B-C8DA3FE08EA2}"/>
+              </a:ext>
+              <a:ext uri="{C183D7F6-B498-43B3-948B-1728B52AA6E4}">
+                <adec:decorative xmlns:adec="http://schemas.microsoft.com/office/drawing/2017/decorative" val="1"/>
+              </a:ext>
+            </a:extLst>
+          </p:cNvPr>
+          <p:cNvCxnSpPr>
+            <a:cxnSpLocks noGrp="1" noRot="1" noChangeAspect="1" noMove="1" noResize="1" noEditPoints="1" noAdjustHandles="1" noChangeArrowheads="1" noChangeShapeType="1"/>
+          </p:cNvCxnSpPr>
+          <p:nvPr>
+            <p:extLst>
+              <p:ext uri="{386F3935-93C4-4BCD-93E2-E3B085C9AB24}">
+                <p16:designElem xmlns:p16="http://schemas.microsoft.com/office/powerpoint/2015/main" val="1"/>
+              </p:ext>
+            </p:extLst>
+          </p:nvPr>
+        </p:nvCxnSpPr>
+        <p:spPr>
+          <a:xfrm flipH="1">
+            <a:off x="8610600" y="1560911"/>
+            <a:ext cx="3581400" cy="0"/>
+          </a:xfrm>
+          <a:prstGeom prst="line">
+            <a:avLst/>
+          </a:prstGeom>
+          <a:ln w="12700">
+            <a:solidFill>
+              <a:schemeClr val="accent2"/>
+            </a:solidFill>
+          </a:ln>
+        </p:spPr>
+        <p:style>
+          <a:lnRef idx="1">
+            <a:schemeClr val="accent1"/>
+          </a:lnRef>
+          <a:fillRef idx="0">
+            <a:schemeClr val="accent1"/>
+          </a:fillRef>
+          <a:effectRef idx="0">
+            <a:schemeClr val="accent1"/>
+          </a:effectRef>
+          <a:fontRef idx="minor">
+            <a:schemeClr val="tx1"/>
+          </a:fontRef>
+        </p:style>
+      </p:cxnSp>
+      <p:cxnSp>
+        <p:nvCxnSpPr>
+          <p:cNvPr id="28" name="Straight Connector 27">
+            <a:extLst>
+              <a:ext uri="{FF2B5EF4-FFF2-40B4-BE49-F238E27FC236}">
+                <a16:creationId xmlns:a16="http://schemas.microsoft.com/office/drawing/2014/main" id="{74234A4C-A256-4139-A5F4-27078F0D6796}"/>
+              </a:ext>
+              <a:ext uri="{C183D7F6-B498-43B3-948B-1728B52AA6E4}">
+                <adec:decorative xmlns:adec="http://schemas.microsoft.com/office/drawing/2017/decorative" val="1"/>
+              </a:ext>
+            </a:extLst>
+          </p:cNvPr>
+          <p:cNvCxnSpPr>
+            <a:cxnSpLocks noGrp="1" noRot="1" noChangeAspect="1" noMove="1" noResize="1" noEditPoints="1" noAdjustHandles="1" noChangeArrowheads="1" noChangeShapeType="1"/>
+          </p:cNvCxnSpPr>
+          <p:nvPr>
+            <p:extLst>
+              <p:ext uri="{386F3935-93C4-4BCD-93E2-E3B085C9AB24}">
+                <p16:designElem xmlns:p16="http://schemas.microsoft.com/office/powerpoint/2015/main" val="1"/>
+              </p:ext>
+            </p:extLst>
+          </p:nvPr>
+        </p:nvCxnSpPr>
+        <p:spPr>
+          <a:xfrm flipH="1">
+            <a:off x="3048" y="5286237"/>
+            <a:ext cx="12188952" cy="0"/>
+          </a:xfrm>
+          <a:prstGeom prst="line">
+            <a:avLst/>
+          </a:prstGeom>
+          <a:ln w="12700">
+            <a:solidFill>
+              <a:schemeClr val="accent2"/>
+            </a:solidFill>
+          </a:ln>
+        </p:spPr>
+        <p:style>
+          <a:lnRef idx="1">
+            <a:schemeClr val="accent1"/>
+          </a:lnRef>
+          <a:fillRef idx="0">
+            <a:schemeClr val="accent1"/>
+          </a:fillRef>
+          <a:effectRef idx="0">
+            <a:schemeClr val="accent1"/>
+          </a:effectRef>
+          <a:fontRef idx="minor">
+            <a:schemeClr val="tx1"/>
+          </a:fontRef>
+        </p:style>
+      </p:cxnSp>
+      <p:sp>
+        <p:nvSpPr>
+          <p:cNvPr id="4" name="Date Placeholder 3">
+            <a:extLst>
+              <a:ext uri="{FF2B5EF4-FFF2-40B4-BE49-F238E27FC236}">
+                <a16:creationId xmlns:a16="http://schemas.microsoft.com/office/drawing/2014/main" id="{60AA39EA-1BD4-5ADF-82A5-488914B68D98}"/>
+              </a:ext>
+            </a:extLst>
+          </p:cNvPr>
+          <p:cNvSpPr>
+            <a:spLocks noGrp="1"/>
+          </p:cNvSpPr>
+          <p:nvPr>
+            <p:ph type="dt" sz="half" idx="10"/>
+          </p:nvPr>
+        </p:nvSpPr>
+        <p:spPr>
+          <a:xfrm>
+            <a:off x="838200" y="6356350"/>
+            <a:ext cx="2743200" cy="365125"/>
+          </a:xfrm>
+        </p:spPr>
+        <p:txBody>
+          <a:bodyPr vert="horz" lIns="91440" tIns="45720" rIns="91440" bIns="45720" rtlCol="0" anchor="ctr">
+            <a:normAutofit/>
+          </a:bodyPr>
+          <a:lstStyle/>
+          <a:p>
+            <a:pPr>
+              <a:spcAft>
+                <a:spcPts val="600"/>
+              </a:spcAft>
+            </a:pPr>
+            <a:fld id="{DD303E3B-074C-440F-86D1-3BB7E04505DE}" type="datetimeyyyy">
+              <a:rPr lang="en-US">
+                <a:solidFill>
+                  <a:schemeClr val="bg1">
+                    <a:lumMod val="50000"/>
+                  </a:schemeClr>
+                </a:solidFill>
+              </a:rPr>
+              <a:pPr>
+                <a:spcAft>
+                  <a:spcPts val="600"/>
+                </a:spcAft>
+              </a:pPr>
+              <a:t>2024</a:t>
+            </a:fld>
+            <a:endParaRPr lang="en-US">
+              <a:solidFill>
+                <a:schemeClr val="bg1">
+                  <a:lumMod val="50000"/>
+                </a:schemeClr>
+              </a:solidFill>
+            </a:endParaRPr>
+          </a:p>
+        </p:txBody>
+      </p:sp>
+      <p:sp>
+        <p:nvSpPr>
+          <p:cNvPr id="5" name="Footer Placeholder 4">
+            <a:extLst>
+              <a:ext uri="{FF2B5EF4-FFF2-40B4-BE49-F238E27FC236}">
+                <a16:creationId xmlns:a16="http://schemas.microsoft.com/office/drawing/2014/main" id="{8251454E-77DD-4304-F4AF-245027455781}"/>
+              </a:ext>
+            </a:extLst>
+          </p:cNvPr>
+          <p:cNvSpPr>
+            <a:spLocks noGrp="1"/>
+          </p:cNvSpPr>
+          <p:nvPr>
+            <p:ph type="ftr" sz="quarter" idx="11"/>
+          </p:nvPr>
+        </p:nvSpPr>
+        <p:spPr>
+          <a:xfrm>
+            <a:off x="4038600" y="6356350"/>
+            <a:ext cx="4114800" cy="365125"/>
+          </a:xfrm>
+        </p:spPr>
+        <p:txBody>
+          <a:bodyPr vert="horz" lIns="91440" tIns="45720" rIns="91440" bIns="45720" rtlCol="0" anchor="ctr">
+            <a:normAutofit/>
+          </a:bodyPr>
+          <a:lstStyle/>
+          <a:p>
+            <a:pPr>
+              <a:spcAft>
+                <a:spcPts val="600"/>
+              </a:spcAft>
+            </a:pPr>
+            <a:r>
+              <a:rPr lang="en-US" kern="1200">
+                <a:solidFill>
+                  <a:schemeClr val="bg1">
+                    <a:lumMod val="50000"/>
+                  </a:schemeClr>
+                </a:solidFill>
+                <a:latin typeface="+mn-lt"/>
+                <a:ea typeface="+mn-ea"/>
+                <a:cs typeface="+mn-cs"/>
+              </a:rPr>
+              <a:t>GENG4500-60</a:t>
+            </a:r>
+          </a:p>
+        </p:txBody>
+      </p:sp>
+      <p:sp>
+        <p:nvSpPr>
+          <p:cNvPr id="6" name="Slide Number Placeholder 5">
+            <a:extLst>
+              <a:ext uri="{FF2B5EF4-FFF2-40B4-BE49-F238E27FC236}">
+                <a16:creationId xmlns:a16="http://schemas.microsoft.com/office/drawing/2014/main" id="{525E3120-057C-155F-E7EF-176F72BED592}"/>
+              </a:ext>
+            </a:extLst>
+          </p:cNvPr>
+          <p:cNvSpPr>
+            <a:spLocks noGrp="1"/>
+          </p:cNvSpPr>
+          <p:nvPr>
+            <p:ph type="sldNum" sz="quarter" idx="12"/>
+          </p:nvPr>
+        </p:nvSpPr>
+        <p:spPr>
+          <a:xfrm>
+            <a:off x="8610600" y="6356350"/>
+            <a:ext cx="2743200" cy="365125"/>
+          </a:xfrm>
+        </p:spPr>
+        <p:txBody>
+          <a:bodyPr vert="horz" lIns="91440" tIns="45720" rIns="91440" bIns="45720" rtlCol="0" anchor="ctr">
+            <a:normAutofit/>
+          </a:bodyPr>
+          <a:lstStyle/>
+          <a:p>
+            <a:pPr>
+              <a:spcAft>
+                <a:spcPts val="600"/>
+              </a:spcAft>
+            </a:pPr>
+            <a:fld id="{BC1B8E0F-90D7-4F6F-9CC4-1E156486B9C1}" type="slidenum">
+              <a:rPr lang="en-US">
+                <a:solidFill>
+                  <a:schemeClr val="bg1">
+                    <a:lumMod val="50000"/>
+                  </a:schemeClr>
+                </a:solidFill>
+              </a:rPr>
+              <a:pPr>
+                <a:spcAft>
+                  <a:spcPts val="600"/>
+                </a:spcAft>
+              </a:pPr>
+              <a:t>9</a:t>
+            </a:fld>
+            <a:endParaRPr lang="en-US">
+              <a:solidFill>
+                <a:schemeClr val="bg1">
+                  <a:lumMod val="50000"/>
+                </a:schemeClr>
+              </a:solidFill>
+            </a:endParaRPr>
+          </a:p>
+        </p:txBody>
+      </p:sp>
+      <p:pic>
+        <p:nvPicPr>
+          <p:cNvPr id="7" name="Graphic 6">
+            <a:extLst>
+              <a:ext uri="{FF2B5EF4-FFF2-40B4-BE49-F238E27FC236}">
+                <a16:creationId xmlns:a16="http://schemas.microsoft.com/office/drawing/2014/main" id="{5BE07C6B-A5B6-19A0-E362-F0E268678255}"/>
+              </a:ext>
+            </a:extLst>
+          </p:cNvPr>
+          <p:cNvPicPr>
+            <a:picLocks noChangeAspect="1"/>
+          </p:cNvPicPr>
+          <p:nvPr/>
+        </p:nvPicPr>
+        <p:blipFill>
+          <a:blip r:embed="rId2">
+            <a:extLst>
+              <a:ext uri="{28A0092B-C50C-407E-A947-70E740481C1C}">
+                <a14:useLocalDpi xmlns:a14="http://schemas.microsoft.com/office/drawing/2010/main" val="0"/>
+              </a:ext>
+              <a:ext uri="{96DAC541-7B7A-43D3-8B79-37D633B846F1}">
+                <asvg:svgBlip xmlns:asvg="http://schemas.microsoft.com/office/drawing/2016/SVG/main" r:embed="rId3"/>
+              </a:ext>
+            </a:extLst>
+          </a:blip>
+          <a:stretch>
+            <a:fillRect/>
+          </a:stretch>
+        </p:blipFill>
+        <p:spPr>
+          <a:xfrm>
+            <a:off x="128016" y="1625408"/>
+            <a:ext cx="4748784" cy="3524304"/>
+          </a:xfrm>
+          <a:prstGeom prst="rect">
+            <a:avLst/>
+          </a:prstGeom>
+        </p:spPr>
+      </p:pic>
+      <p:pic>
+        <p:nvPicPr>
+          <p:cNvPr id="9" name="Graphic 8">
+            <a:extLst>
+              <a:ext uri="{FF2B5EF4-FFF2-40B4-BE49-F238E27FC236}">
+                <a16:creationId xmlns:a16="http://schemas.microsoft.com/office/drawing/2014/main" id="{B1E28D3C-54B0-066A-6250-64EF7ED78FD0}"/>
+              </a:ext>
+            </a:extLst>
+          </p:cNvPr>
+          <p:cNvPicPr>
+            <a:picLocks noChangeAspect="1"/>
+          </p:cNvPicPr>
+          <p:nvPr/>
+        </p:nvPicPr>
+        <p:blipFill>
+          <a:blip r:embed="rId4">
+            <a:extLst>
+              <a:ext uri="{28A0092B-C50C-407E-A947-70E740481C1C}">
+                <a14:useLocalDpi xmlns:a14="http://schemas.microsoft.com/office/drawing/2010/main" val="0"/>
+              </a:ext>
+              <a:ext uri="{96DAC541-7B7A-43D3-8B79-37D633B846F1}">
+                <asvg:svgBlip xmlns:asvg="http://schemas.microsoft.com/office/drawing/2016/SVG/main" r:embed="rId5"/>
+              </a:ext>
+            </a:extLst>
+          </a:blip>
+          <a:stretch>
+            <a:fillRect/>
+          </a:stretch>
+        </p:blipFill>
+        <p:spPr>
+          <a:xfrm>
+            <a:off x="7241034" y="1625408"/>
+            <a:ext cx="4822950" cy="3579346"/>
+          </a:xfrm>
+          <a:prstGeom prst="rect">
+            <a:avLst/>
+          </a:prstGeom>
+        </p:spPr>
+      </p:pic>
+    </p:spTree>
+    <p:extLst>
+      <p:ext uri="{BB962C8B-B14F-4D97-AF65-F5344CB8AC3E}">
+        <p14:creationId xmlns:p14="http://schemas.microsoft.com/office/powerpoint/2010/main" val="393509544"/>
       </p:ext>
     </p:extLst>
   </p:cSld>

</xml_diff>

<commit_message>
-Added code snippet slide for scaling
P@

Signed-off-by: P@ <patmaynard452@gmail.com>
</commit_message>
<xml_diff>
--- a/Presentation/ALI_Raymond_MAYNARD_Patrick_GENG4500_Final_presentation_2024.pptx
+++ b/Presentation/ALI_Raymond_MAYNARD_Patrick_GENG4500_Final_presentation_2024.pptx
@@ -5,7 +5,7 @@
     <p:sldMasterId id="2147483648" r:id="rId1"/>
   </p:sldMasterIdLst>
   <p:notesMasterIdLst>
-    <p:notesMasterId r:id="rId15"/>
+    <p:notesMasterId r:id="rId16"/>
   </p:notesMasterIdLst>
   <p:sldIdLst>
     <p:sldId id="256" r:id="rId2"/>
@@ -15,12 +15,13 @@
     <p:sldId id="272" r:id="rId6"/>
     <p:sldId id="271" r:id="rId7"/>
     <p:sldId id="275" r:id="rId8"/>
-    <p:sldId id="276" r:id="rId9"/>
-    <p:sldId id="277" r:id="rId10"/>
-    <p:sldId id="274" r:id="rId11"/>
-    <p:sldId id="278" r:id="rId12"/>
-    <p:sldId id="270" r:id="rId13"/>
-    <p:sldId id="267" r:id="rId14"/>
+    <p:sldId id="279" r:id="rId9"/>
+    <p:sldId id="276" r:id="rId10"/>
+    <p:sldId id="277" r:id="rId11"/>
+    <p:sldId id="274" r:id="rId12"/>
+    <p:sldId id="278" r:id="rId13"/>
+    <p:sldId id="270" r:id="rId14"/>
+    <p:sldId id="267" r:id="rId15"/>
   </p:sldIdLst>
   <p:sldSz cx="12192000" cy="6858000"/>
   <p:notesSz cx="6858000" cy="9144000"/>
@@ -209,7 +210,7 @@
           <a:p>
             <a:fld id="{7E5E2DB3-6FEF-4CE5-A6A7-DA370F2E2760}" type="datetimeFigureOut">
               <a:rPr lang="en-CA" smtClean="0"/>
-              <a:t>2024-03-24</a:t>
+              <a:t>2024-03-25</a:t>
             </a:fld>
             <a:endParaRPr lang="en-CA"/>
           </a:p>
@@ -4264,7 +4265,7 @@
         </p:nvSpPr>
         <p:spPr>
           <a:xfrm>
-            <a:off x="0" y="900557"/>
+            <a:off x="0" y="973709"/>
             <a:ext cx="3732039" cy="587202"/>
           </a:xfrm>
         </p:spPr>
@@ -4612,10 +4613,10 @@
       </p:sp>
       <p:pic>
         <p:nvPicPr>
-          <p:cNvPr id="10" name="Graphic 9">
-            <a:extLst>
-              <a:ext uri="{FF2B5EF4-FFF2-40B4-BE49-F238E27FC236}">
-                <a16:creationId xmlns:a16="http://schemas.microsoft.com/office/drawing/2014/main" id="{747E059B-53EE-437F-9B0A-CF6AC4D74308}"/>
+          <p:cNvPr id="7" name="Graphic 6">
+            <a:extLst>
+              <a:ext uri="{FF2B5EF4-FFF2-40B4-BE49-F238E27FC236}">
+                <a16:creationId xmlns:a16="http://schemas.microsoft.com/office/drawing/2014/main" id="{5BE07C6B-A5B6-19A0-E362-F0E268678255}"/>
               </a:ext>
             </a:extLst>
           </p:cNvPr>
@@ -4641,214 +4642,20 @@
         </p:blipFill>
         <p:spPr>
           <a:xfrm>
-            <a:off x="387069" y="1656417"/>
-            <a:ext cx="4630891" cy="3436810"/>
+            <a:off x="128016" y="1625408"/>
+            <a:ext cx="4748784" cy="3524304"/>
           </a:xfrm>
           <a:prstGeom prst="rect">
             <a:avLst/>
           </a:prstGeom>
         </p:spPr>
       </p:pic>
-      <p:sp>
-        <p:nvSpPr>
-          <p:cNvPr id="3" name="Oval 2">
-            <a:extLst>
-              <a:ext uri="{FF2B5EF4-FFF2-40B4-BE49-F238E27FC236}">
-                <a16:creationId xmlns:a16="http://schemas.microsoft.com/office/drawing/2014/main" id="{7E41FF53-FA93-B8AC-E4D7-264F7ACF5CB6}"/>
-              </a:ext>
-            </a:extLst>
-          </p:cNvPr>
-          <p:cNvSpPr/>
-          <p:nvPr/>
-        </p:nvSpPr>
-        <p:spPr>
-          <a:xfrm>
-            <a:off x="2304288" y="3063240"/>
-            <a:ext cx="557784" cy="731520"/>
-          </a:xfrm>
-          <a:prstGeom prst="ellipse">
-            <a:avLst/>
-          </a:prstGeom>
-          <a:noFill/>
-        </p:spPr>
-        <p:style>
-          <a:lnRef idx="2">
-            <a:schemeClr val="accent2"/>
-          </a:lnRef>
-          <a:fillRef idx="1">
-            <a:schemeClr val="lt1"/>
-          </a:fillRef>
-          <a:effectRef idx="0">
-            <a:schemeClr val="accent2"/>
-          </a:effectRef>
-          <a:fontRef idx="minor">
-            <a:schemeClr val="dk1"/>
-          </a:fontRef>
-        </p:style>
-        <p:txBody>
-          <a:bodyPr rtlCol="0" anchor="ctr"/>
-          <a:lstStyle/>
-          <a:p>
-            <a:pPr algn="ctr"/>
-            <a:endParaRPr lang="en-CA"/>
-          </a:p>
-        </p:txBody>
-      </p:sp>
-      <p:sp>
-        <p:nvSpPr>
-          <p:cNvPr id="9" name="Oval 8">
-            <a:extLst>
-              <a:ext uri="{FF2B5EF4-FFF2-40B4-BE49-F238E27FC236}">
-                <a16:creationId xmlns:a16="http://schemas.microsoft.com/office/drawing/2014/main" id="{1D28FCD0-F751-5CE1-43A6-9EB0384A629A}"/>
-              </a:ext>
-            </a:extLst>
-          </p:cNvPr>
-          <p:cNvSpPr/>
-          <p:nvPr/>
-        </p:nvSpPr>
-        <p:spPr>
-          <a:xfrm>
-            <a:off x="2970249" y="2778416"/>
-            <a:ext cx="467895" cy="531712"/>
-          </a:xfrm>
-          <a:prstGeom prst="ellipse">
-            <a:avLst/>
-          </a:prstGeom>
-          <a:noFill/>
-        </p:spPr>
-        <p:style>
-          <a:lnRef idx="2">
-            <a:schemeClr val="accent2"/>
-          </a:lnRef>
-          <a:fillRef idx="1">
-            <a:schemeClr val="lt1"/>
-          </a:fillRef>
-          <a:effectRef idx="0">
-            <a:schemeClr val="accent2"/>
-          </a:effectRef>
-          <a:fontRef idx="minor">
-            <a:schemeClr val="dk1"/>
-          </a:fontRef>
-        </p:style>
-        <p:txBody>
-          <a:bodyPr rtlCol="0" anchor="ctr"/>
-          <a:lstStyle/>
-          <a:p>
-            <a:pPr algn="ctr"/>
-            <a:endParaRPr lang="en-CA"/>
-          </a:p>
-        </p:txBody>
-      </p:sp>
-      <p:sp>
-        <p:nvSpPr>
-          <p:cNvPr id="11" name="Oval 10">
-            <a:extLst>
-              <a:ext uri="{FF2B5EF4-FFF2-40B4-BE49-F238E27FC236}">
-                <a16:creationId xmlns:a16="http://schemas.microsoft.com/office/drawing/2014/main" id="{A46F3365-A092-80FF-4DBE-3DA2F9EE1814}"/>
-              </a:ext>
-            </a:extLst>
-          </p:cNvPr>
-          <p:cNvSpPr/>
-          <p:nvPr/>
-        </p:nvSpPr>
-        <p:spPr>
-          <a:xfrm>
-            <a:off x="3705062" y="2292015"/>
-            <a:ext cx="467895" cy="531712"/>
-          </a:xfrm>
-          <a:prstGeom prst="ellipse">
-            <a:avLst/>
-          </a:prstGeom>
-          <a:noFill/>
-        </p:spPr>
-        <p:style>
-          <a:lnRef idx="2">
-            <a:schemeClr val="accent2"/>
-          </a:lnRef>
-          <a:fillRef idx="1">
-            <a:schemeClr val="lt1"/>
-          </a:fillRef>
-          <a:effectRef idx="0">
-            <a:schemeClr val="accent2"/>
-          </a:effectRef>
-          <a:fontRef idx="minor">
-            <a:schemeClr val="dk1"/>
-          </a:fontRef>
-        </p:style>
-        <p:txBody>
-          <a:bodyPr rtlCol="0" anchor="ctr"/>
-          <a:lstStyle/>
-          <a:p>
-            <a:pPr algn="ctr"/>
-            <a:endParaRPr lang="en-CA"/>
-          </a:p>
-        </p:txBody>
-      </p:sp>
-      <p:sp>
-        <p:nvSpPr>
-          <p:cNvPr id="12" name="Title 1">
-            <a:extLst>
-              <a:ext uri="{FF2B5EF4-FFF2-40B4-BE49-F238E27FC236}">
-                <a16:creationId xmlns:a16="http://schemas.microsoft.com/office/drawing/2014/main" id="{50F3F5DB-9116-E470-FA34-4BAEA2E9375A}"/>
-              </a:ext>
-            </a:extLst>
-          </p:cNvPr>
-          <p:cNvSpPr txBox="1">
-            <a:spLocks/>
-          </p:cNvSpPr>
-          <p:nvPr/>
-        </p:nvSpPr>
-        <p:spPr>
-          <a:xfrm>
-            <a:off x="8459961" y="973709"/>
-            <a:ext cx="3732039" cy="587202"/>
-          </a:xfrm>
-          <a:prstGeom prst="rect">
-            <a:avLst/>
-          </a:prstGeom>
-        </p:spPr>
-        <p:txBody>
-          <a:bodyPr vert="horz" lIns="91440" tIns="45720" rIns="91440" bIns="45720" rtlCol="0" anchor="ctr">
-            <a:normAutofit fontScale="67500" lnSpcReduction="20000"/>
-          </a:bodyPr>
-          <a:lstStyle>
-            <a:lvl1pPr algn="l" defTabSz="914400" rtl="0" eaLnBrk="1" latinLnBrk="0" hangingPunct="1">
-              <a:lnSpc>
-                <a:spcPct val="90000"/>
-              </a:lnSpc>
-              <a:spcBef>
-                <a:spcPct val="0"/>
-              </a:spcBef>
-              <a:buNone/>
-              <a:defRPr sz="4400" kern="1200">
-                <a:solidFill>
-                  <a:schemeClr val="tx1"/>
-                </a:solidFill>
-                <a:latin typeface="+mj-lt"/>
-                <a:ea typeface="+mj-ea"/>
-                <a:cs typeface="+mj-cs"/>
-              </a:defRPr>
-            </a:lvl1pPr>
-          </a:lstStyle>
-          <a:p>
-            <a:pPr algn="ctr"/>
-            <a:r>
-              <a:rPr lang="en-US" sz="6000" dirty="0">
-                <a:solidFill>
-                  <a:schemeClr val="bg1"/>
-                </a:solidFill>
-              </a:rPr>
-              <a:t>Final Graph</a:t>
-            </a:r>
-          </a:p>
-        </p:txBody>
-      </p:sp>
       <p:pic>
         <p:nvPicPr>
-          <p:cNvPr id="14" name="Graphic 13">
-            <a:extLst>
-              <a:ext uri="{FF2B5EF4-FFF2-40B4-BE49-F238E27FC236}">
-                <a16:creationId xmlns:a16="http://schemas.microsoft.com/office/drawing/2014/main" id="{EFF52BAA-0AE2-0CF8-D3DE-6B722C699F28}"/>
+          <p:cNvPr id="9" name="Graphic 8">
+            <a:extLst>
+              <a:ext uri="{FF2B5EF4-FFF2-40B4-BE49-F238E27FC236}">
+                <a16:creationId xmlns:a16="http://schemas.microsoft.com/office/drawing/2014/main" id="{B1E28D3C-54B0-066A-6250-64EF7ED78FD0}"/>
               </a:ext>
             </a:extLst>
           </p:cNvPr>
@@ -4874,153 +4681,18 @@
         </p:blipFill>
         <p:spPr>
           <a:xfrm>
-            <a:off x="7355176" y="1656417"/>
-            <a:ext cx="4630891" cy="3436810"/>
+            <a:off x="7241034" y="1625408"/>
+            <a:ext cx="4822950" cy="3579346"/>
           </a:xfrm>
           <a:prstGeom prst="rect">
             <a:avLst/>
           </a:prstGeom>
         </p:spPr>
       </p:pic>
-      <p:sp>
-        <p:nvSpPr>
-          <p:cNvPr id="15" name="Oval 14">
-            <a:extLst>
-              <a:ext uri="{FF2B5EF4-FFF2-40B4-BE49-F238E27FC236}">
-                <a16:creationId xmlns:a16="http://schemas.microsoft.com/office/drawing/2014/main" id="{D53197E9-900A-9E7C-67D3-35A0B42C735C}"/>
-              </a:ext>
-            </a:extLst>
-          </p:cNvPr>
-          <p:cNvSpPr/>
-          <p:nvPr/>
-        </p:nvSpPr>
-        <p:spPr>
-          <a:xfrm>
-            <a:off x="9202928" y="3348714"/>
-            <a:ext cx="794512" cy="1009925"/>
-          </a:xfrm>
-          <a:prstGeom prst="ellipse">
-            <a:avLst/>
-          </a:prstGeom>
-          <a:noFill/>
-        </p:spPr>
-        <p:style>
-          <a:lnRef idx="2">
-            <a:schemeClr val="accent2"/>
-          </a:lnRef>
-          <a:fillRef idx="1">
-            <a:schemeClr val="lt1"/>
-          </a:fillRef>
-          <a:effectRef idx="0">
-            <a:schemeClr val="accent2"/>
-          </a:effectRef>
-          <a:fontRef idx="minor">
-            <a:schemeClr val="dk1"/>
-          </a:fontRef>
-        </p:style>
-        <p:txBody>
-          <a:bodyPr rtlCol="0" anchor="ctr"/>
-          <a:lstStyle/>
-          <a:p>
-            <a:pPr algn="ctr"/>
-            <a:endParaRPr lang="en-CA"/>
-          </a:p>
-        </p:txBody>
-      </p:sp>
-      <p:sp>
-        <p:nvSpPr>
-          <p:cNvPr id="16" name="Oval 15">
-            <a:extLst>
-              <a:ext uri="{FF2B5EF4-FFF2-40B4-BE49-F238E27FC236}">
-                <a16:creationId xmlns:a16="http://schemas.microsoft.com/office/drawing/2014/main" id="{F8E7D74C-ED90-1B51-A95A-7FA3634DA067}"/>
-              </a:ext>
-            </a:extLst>
-          </p:cNvPr>
-          <p:cNvSpPr/>
-          <p:nvPr/>
-        </p:nvSpPr>
-        <p:spPr>
-          <a:xfrm>
-            <a:off x="9982200" y="3044272"/>
-            <a:ext cx="467895" cy="531712"/>
-          </a:xfrm>
-          <a:prstGeom prst="ellipse">
-            <a:avLst/>
-          </a:prstGeom>
-          <a:noFill/>
-        </p:spPr>
-        <p:style>
-          <a:lnRef idx="2">
-            <a:schemeClr val="accent2"/>
-          </a:lnRef>
-          <a:fillRef idx="1">
-            <a:schemeClr val="lt1"/>
-          </a:fillRef>
-          <a:effectRef idx="0">
-            <a:schemeClr val="accent2"/>
-          </a:effectRef>
-          <a:fontRef idx="minor">
-            <a:schemeClr val="dk1"/>
-          </a:fontRef>
-        </p:style>
-        <p:txBody>
-          <a:bodyPr rtlCol="0" anchor="ctr"/>
-          <a:lstStyle/>
-          <a:p>
-            <a:pPr algn="ctr"/>
-            <a:endParaRPr lang="en-CA"/>
-          </a:p>
-        </p:txBody>
-      </p:sp>
-      <p:sp>
-        <p:nvSpPr>
-          <p:cNvPr id="17" name="Oval 16">
-            <a:extLst>
-              <a:ext uri="{FF2B5EF4-FFF2-40B4-BE49-F238E27FC236}">
-                <a16:creationId xmlns:a16="http://schemas.microsoft.com/office/drawing/2014/main" id="{424194E6-5EAA-8FA8-9E07-C0EA4072214A}"/>
-              </a:ext>
-            </a:extLst>
-          </p:cNvPr>
-          <p:cNvSpPr/>
-          <p:nvPr/>
-        </p:nvSpPr>
-        <p:spPr>
-          <a:xfrm>
-            <a:off x="10691849" y="2365167"/>
-            <a:ext cx="467895" cy="531712"/>
-          </a:xfrm>
-          <a:prstGeom prst="ellipse">
-            <a:avLst/>
-          </a:prstGeom>
-          <a:noFill/>
-        </p:spPr>
-        <p:style>
-          <a:lnRef idx="2">
-            <a:schemeClr val="accent2"/>
-          </a:lnRef>
-          <a:fillRef idx="1">
-            <a:schemeClr val="lt1"/>
-          </a:fillRef>
-          <a:effectRef idx="0">
-            <a:schemeClr val="accent2"/>
-          </a:effectRef>
-          <a:fontRef idx="minor">
-            <a:schemeClr val="dk1"/>
-          </a:fontRef>
-        </p:style>
-        <p:txBody>
-          <a:bodyPr rtlCol="0" anchor="ctr"/>
-          <a:lstStyle/>
-          <a:p>
-            <a:pPr algn="ctr"/>
-            <a:endParaRPr lang="en-CA"/>
-          </a:p>
-        </p:txBody>
-      </p:sp>
     </p:spTree>
     <p:extLst>
       <p:ext uri="{BB962C8B-B14F-4D97-AF65-F5344CB8AC3E}">
-        <p14:creationId xmlns:p14="http://schemas.microsoft.com/office/powerpoint/2010/main" val="795103504"/>
+        <p14:creationId xmlns:p14="http://schemas.microsoft.com/office/powerpoint/2010/main" val="393509544"/>
       </p:ext>
     </p:extLst>
   </p:cSld>
@@ -5125,6 +4797,49 @@
           </a:p>
         </p:txBody>
       </p:sp>
+      <p:sp>
+        <p:nvSpPr>
+          <p:cNvPr id="2" name="Title 1">
+            <a:extLst>
+              <a:ext uri="{FF2B5EF4-FFF2-40B4-BE49-F238E27FC236}">
+                <a16:creationId xmlns:a16="http://schemas.microsoft.com/office/drawing/2014/main" id="{8BC8A551-30D9-35B6-870F-6A923EA84886}"/>
+              </a:ext>
+            </a:extLst>
+          </p:cNvPr>
+          <p:cNvSpPr>
+            <a:spLocks noGrp="1"/>
+          </p:cNvSpPr>
+          <p:nvPr>
+            <p:ph type="title"/>
+          </p:nvPr>
+        </p:nvSpPr>
+        <p:spPr>
+          <a:xfrm>
+            <a:off x="0" y="900557"/>
+            <a:ext cx="3732039" cy="587202"/>
+          </a:xfrm>
+        </p:spPr>
+        <p:txBody>
+          <a:bodyPr vert="horz" lIns="91440" tIns="45720" rIns="91440" bIns="45720" rtlCol="0" anchor="ctr">
+            <a:normAutofit fontScale="90000"/>
+          </a:bodyPr>
+          <a:lstStyle/>
+          <a:p>
+            <a:pPr algn="ctr"/>
+            <a:r>
+              <a:rPr lang="en-US" sz="6000" kern="1200" dirty="0">
+                <a:solidFill>
+                  <a:schemeClr val="bg1"/>
+                </a:solidFill>
+                <a:latin typeface="+mj-lt"/>
+                <a:ea typeface="+mj-ea"/>
+                <a:cs typeface="+mj-cs"/>
+              </a:rPr>
+              <a:t>Outcomes</a:t>
+            </a:r>
+          </a:p>
+        </p:txBody>
+      </p:sp>
       <p:cxnSp>
         <p:nvCxnSpPr>
           <p:cNvPr id="24" name="Straight Connector 23">
@@ -5435,6 +5150,842 @@
                 </a:spcAft>
               </a:pPr>
               <a:t>11</a:t>
+            </a:fld>
+            <a:endParaRPr lang="en-US">
+              <a:solidFill>
+                <a:schemeClr val="bg1">
+                  <a:lumMod val="50000"/>
+                </a:schemeClr>
+              </a:solidFill>
+            </a:endParaRPr>
+          </a:p>
+        </p:txBody>
+      </p:sp>
+      <p:pic>
+        <p:nvPicPr>
+          <p:cNvPr id="10" name="Graphic 9">
+            <a:extLst>
+              <a:ext uri="{FF2B5EF4-FFF2-40B4-BE49-F238E27FC236}">
+                <a16:creationId xmlns:a16="http://schemas.microsoft.com/office/drawing/2014/main" id="{747E059B-53EE-437F-9B0A-CF6AC4D74308}"/>
+              </a:ext>
+            </a:extLst>
+          </p:cNvPr>
+          <p:cNvPicPr>
+            <a:picLocks noChangeAspect="1"/>
+          </p:cNvPicPr>
+          <p:nvPr/>
+        </p:nvPicPr>
+        <p:blipFill>
+          <a:blip r:embed="rId2">
+            <a:extLst>
+              <a:ext uri="{28A0092B-C50C-407E-A947-70E740481C1C}">
+                <a14:useLocalDpi xmlns:a14="http://schemas.microsoft.com/office/drawing/2010/main" val="0"/>
+              </a:ext>
+              <a:ext uri="{96DAC541-7B7A-43D3-8B79-37D633B846F1}">
+                <asvg:svgBlip xmlns:asvg="http://schemas.microsoft.com/office/drawing/2016/SVG/main" r:embed="rId3"/>
+              </a:ext>
+            </a:extLst>
+          </a:blip>
+          <a:stretch>
+            <a:fillRect/>
+          </a:stretch>
+        </p:blipFill>
+        <p:spPr>
+          <a:xfrm>
+            <a:off x="387069" y="1656417"/>
+            <a:ext cx="4630891" cy="3436810"/>
+          </a:xfrm>
+          <a:prstGeom prst="rect">
+            <a:avLst/>
+          </a:prstGeom>
+        </p:spPr>
+      </p:pic>
+      <p:sp>
+        <p:nvSpPr>
+          <p:cNvPr id="3" name="Oval 2">
+            <a:extLst>
+              <a:ext uri="{FF2B5EF4-FFF2-40B4-BE49-F238E27FC236}">
+                <a16:creationId xmlns:a16="http://schemas.microsoft.com/office/drawing/2014/main" id="{7E41FF53-FA93-B8AC-E4D7-264F7ACF5CB6}"/>
+              </a:ext>
+            </a:extLst>
+          </p:cNvPr>
+          <p:cNvSpPr/>
+          <p:nvPr/>
+        </p:nvSpPr>
+        <p:spPr>
+          <a:xfrm>
+            <a:off x="2304288" y="3063240"/>
+            <a:ext cx="557784" cy="731520"/>
+          </a:xfrm>
+          <a:prstGeom prst="ellipse">
+            <a:avLst/>
+          </a:prstGeom>
+          <a:noFill/>
+        </p:spPr>
+        <p:style>
+          <a:lnRef idx="2">
+            <a:schemeClr val="accent2"/>
+          </a:lnRef>
+          <a:fillRef idx="1">
+            <a:schemeClr val="lt1"/>
+          </a:fillRef>
+          <a:effectRef idx="0">
+            <a:schemeClr val="accent2"/>
+          </a:effectRef>
+          <a:fontRef idx="minor">
+            <a:schemeClr val="dk1"/>
+          </a:fontRef>
+        </p:style>
+        <p:txBody>
+          <a:bodyPr rtlCol="0" anchor="ctr"/>
+          <a:lstStyle/>
+          <a:p>
+            <a:pPr algn="ctr"/>
+            <a:endParaRPr lang="en-CA"/>
+          </a:p>
+        </p:txBody>
+      </p:sp>
+      <p:sp>
+        <p:nvSpPr>
+          <p:cNvPr id="9" name="Oval 8">
+            <a:extLst>
+              <a:ext uri="{FF2B5EF4-FFF2-40B4-BE49-F238E27FC236}">
+                <a16:creationId xmlns:a16="http://schemas.microsoft.com/office/drawing/2014/main" id="{1D28FCD0-F751-5CE1-43A6-9EB0384A629A}"/>
+              </a:ext>
+            </a:extLst>
+          </p:cNvPr>
+          <p:cNvSpPr/>
+          <p:nvPr/>
+        </p:nvSpPr>
+        <p:spPr>
+          <a:xfrm>
+            <a:off x="2970249" y="2778416"/>
+            <a:ext cx="467895" cy="531712"/>
+          </a:xfrm>
+          <a:prstGeom prst="ellipse">
+            <a:avLst/>
+          </a:prstGeom>
+          <a:noFill/>
+        </p:spPr>
+        <p:style>
+          <a:lnRef idx="2">
+            <a:schemeClr val="accent2"/>
+          </a:lnRef>
+          <a:fillRef idx="1">
+            <a:schemeClr val="lt1"/>
+          </a:fillRef>
+          <a:effectRef idx="0">
+            <a:schemeClr val="accent2"/>
+          </a:effectRef>
+          <a:fontRef idx="minor">
+            <a:schemeClr val="dk1"/>
+          </a:fontRef>
+        </p:style>
+        <p:txBody>
+          <a:bodyPr rtlCol="0" anchor="ctr"/>
+          <a:lstStyle/>
+          <a:p>
+            <a:pPr algn="ctr"/>
+            <a:endParaRPr lang="en-CA"/>
+          </a:p>
+        </p:txBody>
+      </p:sp>
+      <p:sp>
+        <p:nvSpPr>
+          <p:cNvPr id="11" name="Oval 10">
+            <a:extLst>
+              <a:ext uri="{FF2B5EF4-FFF2-40B4-BE49-F238E27FC236}">
+                <a16:creationId xmlns:a16="http://schemas.microsoft.com/office/drawing/2014/main" id="{A46F3365-A092-80FF-4DBE-3DA2F9EE1814}"/>
+              </a:ext>
+            </a:extLst>
+          </p:cNvPr>
+          <p:cNvSpPr/>
+          <p:nvPr/>
+        </p:nvSpPr>
+        <p:spPr>
+          <a:xfrm>
+            <a:off x="3705062" y="2292015"/>
+            <a:ext cx="467895" cy="531712"/>
+          </a:xfrm>
+          <a:prstGeom prst="ellipse">
+            <a:avLst/>
+          </a:prstGeom>
+          <a:noFill/>
+        </p:spPr>
+        <p:style>
+          <a:lnRef idx="2">
+            <a:schemeClr val="accent2"/>
+          </a:lnRef>
+          <a:fillRef idx="1">
+            <a:schemeClr val="lt1"/>
+          </a:fillRef>
+          <a:effectRef idx="0">
+            <a:schemeClr val="accent2"/>
+          </a:effectRef>
+          <a:fontRef idx="minor">
+            <a:schemeClr val="dk1"/>
+          </a:fontRef>
+        </p:style>
+        <p:txBody>
+          <a:bodyPr rtlCol="0" anchor="ctr"/>
+          <a:lstStyle/>
+          <a:p>
+            <a:pPr algn="ctr"/>
+            <a:endParaRPr lang="en-CA"/>
+          </a:p>
+        </p:txBody>
+      </p:sp>
+      <p:sp>
+        <p:nvSpPr>
+          <p:cNvPr id="12" name="Title 1">
+            <a:extLst>
+              <a:ext uri="{FF2B5EF4-FFF2-40B4-BE49-F238E27FC236}">
+                <a16:creationId xmlns:a16="http://schemas.microsoft.com/office/drawing/2014/main" id="{50F3F5DB-9116-E470-FA34-4BAEA2E9375A}"/>
+              </a:ext>
+            </a:extLst>
+          </p:cNvPr>
+          <p:cNvSpPr txBox="1">
+            <a:spLocks/>
+          </p:cNvSpPr>
+          <p:nvPr/>
+        </p:nvSpPr>
+        <p:spPr>
+          <a:xfrm>
+            <a:off x="8459961" y="973709"/>
+            <a:ext cx="3732039" cy="587202"/>
+          </a:xfrm>
+          <a:prstGeom prst="rect">
+            <a:avLst/>
+          </a:prstGeom>
+        </p:spPr>
+        <p:txBody>
+          <a:bodyPr vert="horz" lIns="91440" tIns="45720" rIns="91440" bIns="45720" rtlCol="0" anchor="ctr">
+            <a:normAutofit fontScale="67500" lnSpcReduction="20000"/>
+          </a:bodyPr>
+          <a:lstStyle>
+            <a:lvl1pPr algn="l" defTabSz="914400" rtl="0" eaLnBrk="1" latinLnBrk="0" hangingPunct="1">
+              <a:lnSpc>
+                <a:spcPct val="90000"/>
+              </a:lnSpc>
+              <a:spcBef>
+                <a:spcPct val="0"/>
+              </a:spcBef>
+              <a:buNone/>
+              <a:defRPr sz="4400" kern="1200">
+                <a:solidFill>
+                  <a:schemeClr val="tx1"/>
+                </a:solidFill>
+                <a:latin typeface="+mj-lt"/>
+                <a:ea typeface="+mj-ea"/>
+                <a:cs typeface="+mj-cs"/>
+              </a:defRPr>
+            </a:lvl1pPr>
+          </a:lstStyle>
+          <a:p>
+            <a:pPr algn="ctr"/>
+            <a:r>
+              <a:rPr lang="en-US" sz="6000" dirty="0">
+                <a:solidFill>
+                  <a:schemeClr val="bg1"/>
+                </a:solidFill>
+              </a:rPr>
+              <a:t>Final Graph</a:t>
+            </a:r>
+          </a:p>
+        </p:txBody>
+      </p:sp>
+      <p:pic>
+        <p:nvPicPr>
+          <p:cNvPr id="14" name="Graphic 13">
+            <a:extLst>
+              <a:ext uri="{FF2B5EF4-FFF2-40B4-BE49-F238E27FC236}">
+                <a16:creationId xmlns:a16="http://schemas.microsoft.com/office/drawing/2014/main" id="{EFF52BAA-0AE2-0CF8-D3DE-6B722C699F28}"/>
+              </a:ext>
+            </a:extLst>
+          </p:cNvPr>
+          <p:cNvPicPr>
+            <a:picLocks noChangeAspect="1"/>
+          </p:cNvPicPr>
+          <p:nvPr/>
+        </p:nvPicPr>
+        <p:blipFill>
+          <a:blip r:embed="rId4">
+            <a:extLst>
+              <a:ext uri="{28A0092B-C50C-407E-A947-70E740481C1C}">
+                <a14:useLocalDpi xmlns:a14="http://schemas.microsoft.com/office/drawing/2010/main" val="0"/>
+              </a:ext>
+              <a:ext uri="{96DAC541-7B7A-43D3-8B79-37D633B846F1}">
+                <asvg:svgBlip xmlns:asvg="http://schemas.microsoft.com/office/drawing/2016/SVG/main" r:embed="rId5"/>
+              </a:ext>
+            </a:extLst>
+          </a:blip>
+          <a:stretch>
+            <a:fillRect/>
+          </a:stretch>
+        </p:blipFill>
+        <p:spPr>
+          <a:xfrm>
+            <a:off x="7355176" y="1656417"/>
+            <a:ext cx="4630891" cy="3436810"/>
+          </a:xfrm>
+          <a:prstGeom prst="rect">
+            <a:avLst/>
+          </a:prstGeom>
+        </p:spPr>
+      </p:pic>
+      <p:sp>
+        <p:nvSpPr>
+          <p:cNvPr id="15" name="Oval 14">
+            <a:extLst>
+              <a:ext uri="{FF2B5EF4-FFF2-40B4-BE49-F238E27FC236}">
+                <a16:creationId xmlns:a16="http://schemas.microsoft.com/office/drawing/2014/main" id="{D53197E9-900A-9E7C-67D3-35A0B42C735C}"/>
+              </a:ext>
+            </a:extLst>
+          </p:cNvPr>
+          <p:cNvSpPr/>
+          <p:nvPr/>
+        </p:nvSpPr>
+        <p:spPr>
+          <a:xfrm>
+            <a:off x="9202928" y="3348714"/>
+            <a:ext cx="794512" cy="1009925"/>
+          </a:xfrm>
+          <a:prstGeom prst="ellipse">
+            <a:avLst/>
+          </a:prstGeom>
+          <a:noFill/>
+        </p:spPr>
+        <p:style>
+          <a:lnRef idx="2">
+            <a:schemeClr val="accent2"/>
+          </a:lnRef>
+          <a:fillRef idx="1">
+            <a:schemeClr val="lt1"/>
+          </a:fillRef>
+          <a:effectRef idx="0">
+            <a:schemeClr val="accent2"/>
+          </a:effectRef>
+          <a:fontRef idx="minor">
+            <a:schemeClr val="dk1"/>
+          </a:fontRef>
+        </p:style>
+        <p:txBody>
+          <a:bodyPr rtlCol="0" anchor="ctr"/>
+          <a:lstStyle/>
+          <a:p>
+            <a:pPr algn="ctr"/>
+            <a:endParaRPr lang="en-CA"/>
+          </a:p>
+        </p:txBody>
+      </p:sp>
+      <p:sp>
+        <p:nvSpPr>
+          <p:cNvPr id="16" name="Oval 15">
+            <a:extLst>
+              <a:ext uri="{FF2B5EF4-FFF2-40B4-BE49-F238E27FC236}">
+                <a16:creationId xmlns:a16="http://schemas.microsoft.com/office/drawing/2014/main" id="{F8E7D74C-ED90-1B51-A95A-7FA3634DA067}"/>
+              </a:ext>
+            </a:extLst>
+          </p:cNvPr>
+          <p:cNvSpPr/>
+          <p:nvPr/>
+        </p:nvSpPr>
+        <p:spPr>
+          <a:xfrm>
+            <a:off x="9982200" y="3044272"/>
+            <a:ext cx="467895" cy="531712"/>
+          </a:xfrm>
+          <a:prstGeom prst="ellipse">
+            <a:avLst/>
+          </a:prstGeom>
+          <a:noFill/>
+        </p:spPr>
+        <p:style>
+          <a:lnRef idx="2">
+            <a:schemeClr val="accent2"/>
+          </a:lnRef>
+          <a:fillRef idx="1">
+            <a:schemeClr val="lt1"/>
+          </a:fillRef>
+          <a:effectRef idx="0">
+            <a:schemeClr val="accent2"/>
+          </a:effectRef>
+          <a:fontRef idx="minor">
+            <a:schemeClr val="dk1"/>
+          </a:fontRef>
+        </p:style>
+        <p:txBody>
+          <a:bodyPr rtlCol="0" anchor="ctr"/>
+          <a:lstStyle/>
+          <a:p>
+            <a:pPr algn="ctr"/>
+            <a:endParaRPr lang="en-CA"/>
+          </a:p>
+        </p:txBody>
+      </p:sp>
+      <p:sp>
+        <p:nvSpPr>
+          <p:cNvPr id="17" name="Oval 16">
+            <a:extLst>
+              <a:ext uri="{FF2B5EF4-FFF2-40B4-BE49-F238E27FC236}">
+                <a16:creationId xmlns:a16="http://schemas.microsoft.com/office/drawing/2014/main" id="{424194E6-5EAA-8FA8-9E07-C0EA4072214A}"/>
+              </a:ext>
+            </a:extLst>
+          </p:cNvPr>
+          <p:cNvSpPr/>
+          <p:nvPr/>
+        </p:nvSpPr>
+        <p:spPr>
+          <a:xfrm>
+            <a:off x="10691849" y="2365167"/>
+            <a:ext cx="467895" cy="531712"/>
+          </a:xfrm>
+          <a:prstGeom prst="ellipse">
+            <a:avLst/>
+          </a:prstGeom>
+          <a:noFill/>
+        </p:spPr>
+        <p:style>
+          <a:lnRef idx="2">
+            <a:schemeClr val="accent2"/>
+          </a:lnRef>
+          <a:fillRef idx="1">
+            <a:schemeClr val="lt1"/>
+          </a:fillRef>
+          <a:effectRef idx="0">
+            <a:schemeClr val="accent2"/>
+          </a:effectRef>
+          <a:fontRef idx="minor">
+            <a:schemeClr val="dk1"/>
+          </a:fontRef>
+        </p:style>
+        <p:txBody>
+          <a:bodyPr rtlCol="0" anchor="ctr"/>
+          <a:lstStyle/>
+          <a:p>
+            <a:pPr algn="ctr"/>
+            <a:endParaRPr lang="en-CA"/>
+          </a:p>
+        </p:txBody>
+      </p:sp>
+    </p:spTree>
+    <p:extLst>
+      <p:ext uri="{BB962C8B-B14F-4D97-AF65-F5344CB8AC3E}">
+        <p14:creationId xmlns:p14="http://schemas.microsoft.com/office/powerpoint/2010/main" val="795103504"/>
+      </p:ext>
+    </p:extLst>
+  </p:cSld>
+  <p:clrMapOvr>
+    <a:masterClrMapping/>
+  </p:clrMapOvr>
+</p:sld>
+</file>
+
+<file path=ppt/slides/slide12.xml><?xml version="1.0" encoding="utf-8"?>
+<p:sld xmlns:a="http://schemas.openxmlformats.org/drawingml/2006/main" xmlns:r="http://schemas.openxmlformats.org/officeDocument/2006/relationships" xmlns:p="http://schemas.openxmlformats.org/presentationml/2006/main">
+  <p:cSld>
+    <p:bg>
+      <p:bgPr>
+        <a:solidFill>
+          <a:schemeClr val="bg1"/>
+        </a:solidFill>
+        <a:effectLst/>
+      </p:bgPr>
+    </p:bg>
+    <p:spTree>
+      <p:nvGrpSpPr>
+        <p:cNvPr id="1" name=""/>
+        <p:cNvGrpSpPr/>
+        <p:nvPr/>
+      </p:nvGrpSpPr>
+      <p:grpSpPr>
+        <a:xfrm>
+          <a:off x="0" y="0"/>
+          <a:ext cx="0" cy="0"/>
+          <a:chOff x="0" y="0"/>
+          <a:chExt cx="0" cy="0"/>
+        </a:xfrm>
+      </p:grpSpPr>
+      <p:sp>
+        <p:nvSpPr>
+          <p:cNvPr id="22" name="Rectangle 21">
+            <a:extLst>
+              <a:ext uri="{FF2B5EF4-FFF2-40B4-BE49-F238E27FC236}">
+                <a16:creationId xmlns:a16="http://schemas.microsoft.com/office/drawing/2014/main" id="{FB5B0058-AF13-4859-B429-4EDDE2A26F7F}"/>
+              </a:ext>
+              <a:ext uri="{C183D7F6-B498-43B3-948B-1728B52AA6E4}">
+                <adec:decorative xmlns:adec="http://schemas.microsoft.com/office/drawing/2017/decorative" val="1"/>
+              </a:ext>
+            </a:extLst>
+          </p:cNvPr>
+          <p:cNvSpPr>
+            <a:spLocks noGrp="1" noRot="1" noChangeAspect="1" noMove="1" noResize="1" noEditPoints="1" noAdjustHandles="1" noChangeArrowheads="1" noChangeShapeType="1" noTextEdit="1"/>
+          </p:cNvSpPr>
+          <p:nvPr>
+            <p:extLst>
+              <p:ext uri="{386F3935-93C4-4BCD-93E2-E3B085C9AB24}">
+                <p16:designElem xmlns:p16="http://schemas.microsoft.com/office/powerpoint/2015/main" val="1"/>
+              </p:ext>
+            </p:extLst>
+          </p:nvPr>
+        </p:nvSpPr>
+        <p:spPr>
+          <a:xfrm>
+            <a:off x="0" y="0"/>
+            <a:ext cx="12192000" cy="6858000"/>
+          </a:xfrm>
+          <a:prstGeom prst="rect">
+            <a:avLst/>
+          </a:prstGeom>
+          <a:solidFill>
+            <a:schemeClr val="tx1">
+              <a:lumMod val="95000"/>
+              <a:lumOff val="5000"/>
+            </a:schemeClr>
+          </a:solidFill>
+          <a:ln>
+            <a:noFill/>
+          </a:ln>
+        </p:spPr>
+        <p:style>
+          <a:lnRef idx="2">
+            <a:schemeClr val="accent1">
+              <a:shade val="50000"/>
+            </a:schemeClr>
+          </a:lnRef>
+          <a:fillRef idx="1">
+            <a:schemeClr val="accent1"/>
+          </a:fillRef>
+          <a:effectRef idx="0">
+            <a:schemeClr val="accent1"/>
+          </a:effectRef>
+          <a:fontRef idx="minor">
+            <a:schemeClr val="lt1"/>
+          </a:fontRef>
+        </p:style>
+        <p:txBody>
+          <a:bodyPr rtlCol="0" anchor="ctr"/>
+          <a:lstStyle/>
+          <a:p>
+            <a:pPr algn="ctr"/>
+            <a:endParaRPr lang="en-US" dirty="0">
+              <a:solidFill>
+                <a:schemeClr val="tx1"/>
+              </a:solidFill>
+            </a:endParaRPr>
+          </a:p>
+        </p:txBody>
+      </p:sp>
+      <p:cxnSp>
+        <p:nvCxnSpPr>
+          <p:cNvPr id="24" name="Straight Connector 23">
+            <a:extLst>
+              <a:ext uri="{FF2B5EF4-FFF2-40B4-BE49-F238E27FC236}">
+                <a16:creationId xmlns:a16="http://schemas.microsoft.com/office/drawing/2014/main" id="{E6D6B450-4278-45B8-88C7-C061710E3C7E}"/>
+              </a:ext>
+              <a:ext uri="{C183D7F6-B498-43B3-948B-1728B52AA6E4}">
+                <adec:decorative xmlns:adec="http://schemas.microsoft.com/office/drawing/2017/decorative" val="1"/>
+              </a:ext>
+            </a:extLst>
+          </p:cNvPr>
+          <p:cNvCxnSpPr>
+            <a:cxnSpLocks noGrp="1" noRot="1" noChangeAspect="1" noMove="1" noResize="1" noEditPoints="1" noAdjustHandles="1" noChangeArrowheads="1" noChangeShapeType="1"/>
+          </p:cNvCxnSpPr>
+          <p:nvPr>
+            <p:extLst>
+              <p:ext uri="{386F3935-93C4-4BCD-93E2-E3B085C9AB24}">
+                <p16:designElem xmlns:p16="http://schemas.microsoft.com/office/powerpoint/2015/main" val="1"/>
+              </p:ext>
+            </p:extLst>
+          </p:nvPr>
+        </p:nvCxnSpPr>
+        <p:spPr>
+          <a:xfrm flipH="1">
+            <a:off x="0" y="1560911"/>
+            <a:ext cx="3581400" cy="0"/>
+          </a:xfrm>
+          <a:prstGeom prst="line">
+            <a:avLst/>
+          </a:prstGeom>
+          <a:ln w="12700">
+            <a:solidFill>
+              <a:schemeClr val="accent2"/>
+            </a:solidFill>
+          </a:ln>
+        </p:spPr>
+        <p:style>
+          <a:lnRef idx="1">
+            <a:schemeClr val="accent1"/>
+          </a:lnRef>
+          <a:fillRef idx="0">
+            <a:schemeClr val="accent1"/>
+          </a:fillRef>
+          <a:effectRef idx="0">
+            <a:schemeClr val="accent1"/>
+          </a:effectRef>
+          <a:fontRef idx="minor">
+            <a:schemeClr val="tx1"/>
+          </a:fontRef>
+        </p:style>
+      </p:cxnSp>
+      <p:cxnSp>
+        <p:nvCxnSpPr>
+          <p:cNvPr id="26" name="Straight Connector 25">
+            <a:extLst>
+              <a:ext uri="{FF2B5EF4-FFF2-40B4-BE49-F238E27FC236}">
+                <a16:creationId xmlns:a16="http://schemas.microsoft.com/office/drawing/2014/main" id="{EE7CEFB9-5672-4FC6-981B-C8DA3FE08EA2}"/>
+              </a:ext>
+              <a:ext uri="{C183D7F6-B498-43B3-948B-1728B52AA6E4}">
+                <adec:decorative xmlns:adec="http://schemas.microsoft.com/office/drawing/2017/decorative" val="1"/>
+              </a:ext>
+            </a:extLst>
+          </p:cNvPr>
+          <p:cNvCxnSpPr>
+            <a:cxnSpLocks noGrp="1" noRot="1" noChangeAspect="1" noMove="1" noResize="1" noEditPoints="1" noAdjustHandles="1" noChangeArrowheads="1" noChangeShapeType="1"/>
+          </p:cNvCxnSpPr>
+          <p:nvPr>
+            <p:extLst>
+              <p:ext uri="{386F3935-93C4-4BCD-93E2-E3B085C9AB24}">
+                <p16:designElem xmlns:p16="http://schemas.microsoft.com/office/powerpoint/2015/main" val="1"/>
+              </p:ext>
+            </p:extLst>
+          </p:nvPr>
+        </p:nvCxnSpPr>
+        <p:spPr>
+          <a:xfrm flipH="1">
+            <a:off x="8610600" y="1560911"/>
+            <a:ext cx="3581400" cy="0"/>
+          </a:xfrm>
+          <a:prstGeom prst="line">
+            <a:avLst/>
+          </a:prstGeom>
+          <a:ln w="12700">
+            <a:solidFill>
+              <a:schemeClr val="accent2"/>
+            </a:solidFill>
+          </a:ln>
+        </p:spPr>
+        <p:style>
+          <a:lnRef idx="1">
+            <a:schemeClr val="accent1"/>
+          </a:lnRef>
+          <a:fillRef idx="0">
+            <a:schemeClr val="accent1"/>
+          </a:fillRef>
+          <a:effectRef idx="0">
+            <a:schemeClr val="accent1"/>
+          </a:effectRef>
+          <a:fontRef idx="minor">
+            <a:schemeClr val="tx1"/>
+          </a:fontRef>
+        </p:style>
+      </p:cxnSp>
+      <p:cxnSp>
+        <p:nvCxnSpPr>
+          <p:cNvPr id="28" name="Straight Connector 27">
+            <a:extLst>
+              <a:ext uri="{FF2B5EF4-FFF2-40B4-BE49-F238E27FC236}">
+                <a16:creationId xmlns:a16="http://schemas.microsoft.com/office/drawing/2014/main" id="{74234A4C-A256-4139-A5F4-27078F0D6796}"/>
+              </a:ext>
+              <a:ext uri="{C183D7F6-B498-43B3-948B-1728B52AA6E4}">
+                <adec:decorative xmlns:adec="http://schemas.microsoft.com/office/drawing/2017/decorative" val="1"/>
+              </a:ext>
+            </a:extLst>
+          </p:cNvPr>
+          <p:cNvCxnSpPr>
+            <a:cxnSpLocks noGrp="1" noRot="1" noChangeAspect="1" noMove="1" noResize="1" noEditPoints="1" noAdjustHandles="1" noChangeArrowheads="1" noChangeShapeType="1"/>
+          </p:cNvCxnSpPr>
+          <p:nvPr>
+            <p:extLst>
+              <p:ext uri="{386F3935-93C4-4BCD-93E2-E3B085C9AB24}">
+                <p16:designElem xmlns:p16="http://schemas.microsoft.com/office/powerpoint/2015/main" val="1"/>
+              </p:ext>
+            </p:extLst>
+          </p:nvPr>
+        </p:nvCxnSpPr>
+        <p:spPr>
+          <a:xfrm flipH="1">
+            <a:off x="3048" y="5286237"/>
+            <a:ext cx="12188952" cy="0"/>
+          </a:xfrm>
+          <a:prstGeom prst="line">
+            <a:avLst/>
+          </a:prstGeom>
+          <a:ln w="12700">
+            <a:solidFill>
+              <a:schemeClr val="accent2"/>
+            </a:solidFill>
+          </a:ln>
+        </p:spPr>
+        <p:style>
+          <a:lnRef idx="1">
+            <a:schemeClr val="accent1"/>
+          </a:lnRef>
+          <a:fillRef idx="0">
+            <a:schemeClr val="accent1"/>
+          </a:fillRef>
+          <a:effectRef idx="0">
+            <a:schemeClr val="accent1"/>
+          </a:effectRef>
+          <a:fontRef idx="minor">
+            <a:schemeClr val="tx1"/>
+          </a:fontRef>
+        </p:style>
+      </p:cxnSp>
+      <p:sp>
+        <p:nvSpPr>
+          <p:cNvPr id="4" name="Date Placeholder 3">
+            <a:extLst>
+              <a:ext uri="{FF2B5EF4-FFF2-40B4-BE49-F238E27FC236}">
+                <a16:creationId xmlns:a16="http://schemas.microsoft.com/office/drawing/2014/main" id="{60AA39EA-1BD4-5ADF-82A5-488914B68D98}"/>
+              </a:ext>
+            </a:extLst>
+          </p:cNvPr>
+          <p:cNvSpPr>
+            <a:spLocks noGrp="1"/>
+          </p:cNvSpPr>
+          <p:nvPr>
+            <p:ph type="dt" sz="half" idx="10"/>
+          </p:nvPr>
+        </p:nvSpPr>
+        <p:spPr>
+          <a:xfrm>
+            <a:off x="838200" y="6356350"/>
+            <a:ext cx="2743200" cy="365125"/>
+          </a:xfrm>
+        </p:spPr>
+        <p:txBody>
+          <a:bodyPr vert="horz" lIns="91440" tIns="45720" rIns="91440" bIns="45720" rtlCol="0" anchor="ctr">
+            <a:normAutofit/>
+          </a:bodyPr>
+          <a:lstStyle/>
+          <a:p>
+            <a:pPr>
+              <a:spcAft>
+                <a:spcPts val="600"/>
+              </a:spcAft>
+            </a:pPr>
+            <a:fld id="{DD303E3B-074C-440F-86D1-3BB7E04505DE}" type="datetimeyyyy">
+              <a:rPr lang="en-US">
+                <a:solidFill>
+                  <a:schemeClr val="bg1">
+                    <a:lumMod val="50000"/>
+                  </a:schemeClr>
+                </a:solidFill>
+              </a:rPr>
+              <a:pPr>
+                <a:spcAft>
+                  <a:spcPts val="600"/>
+                </a:spcAft>
+              </a:pPr>
+              <a:t>2024</a:t>
+            </a:fld>
+            <a:endParaRPr lang="en-US">
+              <a:solidFill>
+                <a:schemeClr val="bg1">
+                  <a:lumMod val="50000"/>
+                </a:schemeClr>
+              </a:solidFill>
+            </a:endParaRPr>
+          </a:p>
+        </p:txBody>
+      </p:sp>
+      <p:sp>
+        <p:nvSpPr>
+          <p:cNvPr id="5" name="Footer Placeholder 4">
+            <a:extLst>
+              <a:ext uri="{FF2B5EF4-FFF2-40B4-BE49-F238E27FC236}">
+                <a16:creationId xmlns:a16="http://schemas.microsoft.com/office/drawing/2014/main" id="{8251454E-77DD-4304-F4AF-245027455781}"/>
+              </a:ext>
+            </a:extLst>
+          </p:cNvPr>
+          <p:cNvSpPr>
+            <a:spLocks noGrp="1"/>
+          </p:cNvSpPr>
+          <p:nvPr>
+            <p:ph type="ftr" sz="quarter" idx="11"/>
+          </p:nvPr>
+        </p:nvSpPr>
+        <p:spPr>
+          <a:xfrm>
+            <a:off x="4038600" y="6356350"/>
+            <a:ext cx="4114800" cy="365125"/>
+          </a:xfrm>
+        </p:spPr>
+        <p:txBody>
+          <a:bodyPr vert="horz" lIns="91440" tIns="45720" rIns="91440" bIns="45720" rtlCol="0" anchor="ctr">
+            <a:normAutofit/>
+          </a:bodyPr>
+          <a:lstStyle/>
+          <a:p>
+            <a:pPr>
+              <a:spcAft>
+                <a:spcPts val="600"/>
+              </a:spcAft>
+            </a:pPr>
+            <a:r>
+              <a:rPr lang="en-US" kern="1200">
+                <a:solidFill>
+                  <a:schemeClr val="bg1">
+                    <a:lumMod val="50000"/>
+                  </a:schemeClr>
+                </a:solidFill>
+                <a:latin typeface="+mn-lt"/>
+                <a:ea typeface="+mn-ea"/>
+                <a:cs typeface="+mn-cs"/>
+              </a:rPr>
+              <a:t>GENG4500-60</a:t>
+            </a:r>
+          </a:p>
+        </p:txBody>
+      </p:sp>
+      <p:sp>
+        <p:nvSpPr>
+          <p:cNvPr id="6" name="Slide Number Placeholder 5">
+            <a:extLst>
+              <a:ext uri="{FF2B5EF4-FFF2-40B4-BE49-F238E27FC236}">
+                <a16:creationId xmlns:a16="http://schemas.microsoft.com/office/drawing/2014/main" id="{525E3120-057C-155F-E7EF-176F72BED592}"/>
+              </a:ext>
+            </a:extLst>
+          </p:cNvPr>
+          <p:cNvSpPr>
+            <a:spLocks noGrp="1"/>
+          </p:cNvSpPr>
+          <p:nvPr>
+            <p:ph type="sldNum" sz="quarter" idx="12"/>
+          </p:nvPr>
+        </p:nvSpPr>
+        <p:spPr>
+          <a:xfrm>
+            <a:off x="8610600" y="6356350"/>
+            <a:ext cx="2743200" cy="365125"/>
+          </a:xfrm>
+        </p:spPr>
+        <p:txBody>
+          <a:bodyPr vert="horz" lIns="91440" tIns="45720" rIns="91440" bIns="45720" rtlCol="0" anchor="ctr">
+            <a:normAutofit/>
+          </a:bodyPr>
+          <a:lstStyle/>
+          <a:p>
+            <a:pPr>
+              <a:spcAft>
+                <a:spcPts val="600"/>
+              </a:spcAft>
+            </a:pPr>
+            <a:fld id="{BC1B8E0F-90D7-4F6F-9CC4-1E156486B9C1}" type="slidenum">
+              <a:rPr lang="en-US">
+                <a:solidFill>
+                  <a:schemeClr val="bg1">
+                    <a:lumMod val="50000"/>
+                  </a:schemeClr>
+                </a:solidFill>
+              </a:rPr>
+              <a:pPr>
+                <a:spcAft>
+                  <a:spcPts val="600"/>
+                </a:spcAft>
+              </a:pPr>
+              <a:t>12</a:t>
             </a:fld>
             <a:endParaRPr lang="en-US">
               <a:solidFill>
@@ -5808,7 +6359,7 @@
 </p:sld>
 </file>
 
-<file path=ppt/slides/slide12.xml><?xml version="1.0" encoding="utf-8"?>
+<file path=ppt/slides/slide13.xml><?xml version="1.0" encoding="utf-8"?>
 <p:sld xmlns:a="http://schemas.openxmlformats.org/drawingml/2006/main" xmlns:r="http://schemas.openxmlformats.org/officeDocument/2006/relationships" xmlns:p="http://schemas.openxmlformats.org/presentationml/2006/main">
   <p:cSld>
     <p:bg>
@@ -6220,11 +6771,121 @@
               <a:buAutoNum type="arabicPeriod"/>
             </a:pPr>
             <a:r>
+              <a:rPr lang="en-US" sz="1400" dirty="0">
+                <a:solidFill>
+                  <a:schemeClr val="bg1"/>
+                </a:solidFill>
+              </a:rPr>
+              <a:t>(2023, October 24). </a:t>
+            </a:r>
+            <a:r>
+              <a:rPr lang="en-US" sz="1400" i="1" dirty="0">
+                <a:solidFill>
+                  <a:schemeClr val="bg1"/>
+                </a:solidFill>
+              </a:rPr>
+              <a:t>Full guide to feature scaling in </a:t>
+            </a:r>
+            <a:r>
+              <a:rPr lang="en-US" sz="1400" i="1" dirty="0" err="1">
+                <a:solidFill>
+                  <a:schemeClr val="bg1"/>
+                </a:solidFill>
+              </a:rPr>
+              <a:t>SciKit</a:t>
+            </a:r>
+            <a:r>
+              <a:rPr lang="en-US" sz="1400" i="1" dirty="0">
+                <a:solidFill>
+                  <a:schemeClr val="bg1"/>
+                </a:solidFill>
+              </a:rPr>
+              <a:t>-Learn - </a:t>
+            </a:r>
+            <a:r>
+              <a:rPr lang="en-US" sz="1400" i="1" dirty="0" err="1">
+                <a:solidFill>
+                  <a:schemeClr val="bg1"/>
+                </a:solidFill>
+              </a:rPr>
+              <a:t>Pierian</a:t>
+            </a:r>
+            <a:r>
+              <a:rPr lang="en-US" sz="1400" i="1" dirty="0">
+                <a:solidFill>
+                  <a:schemeClr val="bg1"/>
+                </a:solidFill>
+              </a:rPr>
+              <a:t> Training</a:t>
+            </a:r>
+            <a:r>
+              <a:rPr lang="en-US" sz="1400" dirty="0">
+                <a:solidFill>
+                  <a:schemeClr val="bg1"/>
+                </a:solidFill>
+              </a:rPr>
+              <a:t>. </a:t>
+            </a:r>
+            <a:r>
+              <a:rPr lang="en-US" sz="1400" dirty="0" err="1">
+                <a:solidFill>
+                  <a:schemeClr val="bg1"/>
+                </a:solidFill>
+              </a:rPr>
+              <a:t>Pierian</a:t>
+            </a:r>
+            <a:r>
+              <a:rPr lang="en-US" sz="1400" dirty="0">
+                <a:solidFill>
+                  <a:schemeClr val="bg1"/>
+                </a:solidFill>
+              </a:rPr>
+              <a:t> Training.  </a:t>
+            </a:r>
+            <a:r>
+              <a:rPr lang="en-US" sz="1400">
+                <a:solidFill>
+                  <a:schemeClr val="bg1"/>
+                </a:solidFill>
+                <a:hlinkClick r:id="rId6"/>
+              </a:rPr>
+              <a:t>https</a:t>
+            </a:r>
+            <a:r>
+              <a:rPr lang="en-US" sz="1400" dirty="0">
+                <a:solidFill>
+                  <a:schemeClr val="bg1"/>
+                </a:solidFill>
+                <a:hlinkClick r:id="rId6"/>
+              </a:rPr>
+              <a:t>://pieriantraining.com</a:t>
+            </a:r>
+            <a:r>
+              <a:rPr lang="en-US" sz="1400">
+                <a:solidFill>
+                  <a:schemeClr val="bg1"/>
+                </a:solidFill>
+                <a:hlinkClick r:id="rId6"/>
+              </a:rPr>
+              <a:t>/complete-guide-to-feature-scaling-in-scikit-learn</a:t>
+            </a:r>
+            <a:endParaRPr lang="en-US" sz="2000" dirty="0">
+              <a:solidFill>
+                <a:schemeClr val="bg1"/>
+              </a:solidFill>
+            </a:endParaRPr>
+          </a:p>
+          <a:p>
+            <a:pPr marL="457200" indent="-457200">
+              <a:buFont typeface="+mj-lt"/>
+              <a:buAutoNum type="arabicPeriod"/>
+            </a:pPr>
+            <a:r>
               <a:rPr lang="en-US" sz="2000" dirty="0">
                 <a:solidFill>
                   <a:schemeClr val="bg1"/>
                 </a:solidFill>
-                <a:hlinkClick r:id="rId6"/>
+                <a:hlinkClick r:id="rId7"/>
               </a:rPr>
               <a:t>https://www.sktime.net/en/stable/</a:t>
             </a:r>
@@ -6498,7 +7159,7 @@
                   <a:spcPts val="600"/>
                 </a:spcAft>
               </a:pPr>
-              <a:t>12</a:t>
+              <a:t>13</a:t>
             </a:fld>
             <a:endParaRPr lang="en-CA">
               <a:solidFill>
@@ -6523,7 +7184,7 @@
 </p:sld>
 </file>
 
-<file path=ppt/slides/slide13.xml><?xml version="1.0" encoding="utf-8"?>
+<file path=ppt/slides/slide14.xml><?xml version="1.0" encoding="utf-8"?>
 <p:sld xmlns:a="http://schemas.openxmlformats.org/drawingml/2006/main" xmlns:r="http://schemas.openxmlformats.org/officeDocument/2006/relationships" xmlns:p="http://schemas.openxmlformats.org/presentationml/2006/main">
   <p:cSld>
     <p:bg>
@@ -9235,7 +9896,7 @@
           <p:nvPr>
             <p:extLst>
               <p:ext uri="{D42A27DB-BD31-4B8C-83A1-F6EECF244321}">
-                <p14:modId xmlns:p14="http://schemas.microsoft.com/office/powerpoint/2010/main" val="3097741284"/>
+                <p14:modId xmlns:p14="http://schemas.microsoft.com/office/powerpoint/2010/main" val="771428220"/>
               </p:ext>
             </p:extLst>
           </p:nvPr>
@@ -9248,12 +9909,12 @@
           <a:graphicData uri="http://schemas.openxmlformats.org/presentationml/2006/ole">
             <mc:AlternateContent xmlns:mc="http://schemas.openxmlformats.org/markup-compatibility/2006">
               <mc:Choice xmlns:v="urn:schemas-microsoft-com:vml" Requires="v">
-                <p:oleObj name="Worksheet" r:id="rId4" imgW="7934249" imgH="1914525" progId="Excel.Sheet.12">
+                <p:oleObj name="Worksheet" r:id="rId4" imgW="7934547" imgH="1914761" progId="Excel.Sheet.12">
                   <p:embed/>
                 </p:oleObj>
               </mc:Choice>
               <mc:Fallback>
-                <p:oleObj name="Worksheet" r:id="rId4" imgW="7934249" imgH="1914525" progId="Excel.Sheet.12">
+                <p:oleObj name="Worksheet" r:id="rId4" imgW="7934547" imgH="1914761" progId="Excel.Sheet.12">
                   <p:embed/>
                   <p:pic>
                     <p:nvPicPr>
@@ -13093,6 +13754,1244 @@
       </p:grpSpPr>
       <p:sp>
         <p:nvSpPr>
+          <p:cNvPr id="23" name="Rectangle 22">
+            <a:extLst>
+              <a:ext uri="{FF2B5EF4-FFF2-40B4-BE49-F238E27FC236}">
+                <a16:creationId xmlns:a16="http://schemas.microsoft.com/office/drawing/2014/main" id="{FB5B0058-AF13-4859-B429-4EDDE2A26F7F}"/>
+              </a:ext>
+              <a:ext uri="{C183D7F6-B498-43B3-948B-1728B52AA6E4}">
+                <adec:decorative xmlns:adec="http://schemas.microsoft.com/office/drawing/2017/decorative" val="1"/>
+              </a:ext>
+            </a:extLst>
+          </p:cNvPr>
+          <p:cNvSpPr>
+            <a:spLocks noGrp="1" noRot="1" noChangeAspect="1" noMove="1" noResize="1" noEditPoints="1" noAdjustHandles="1" noChangeArrowheads="1" noChangeShapeType="1" noTextEdit="1"/>
+          </p:cNvSpPr>
+          <p:nvPr>
+            <p:extLst>
+              <p:ext uri="{386F3935-93C4-4BCD-93E2-E3B085C9AB24}">
+                <p16:designElem xmlns:p16="http://schemas.microsoft.com/office/powerpoint/2015/main" val="1"/>
+              </p:ext>
+            </p:extLst>
+          </p:nvPr>
+        </p:nvSpPr>
+        <p:spPr>
+          <a:xfrm>
+            <a:off x="0" y="0"/>
+            <a:ext cx="12192000" cy="6858000"/>
+          </a:xfrm>
+          <a:prstGeom prst="rect">
+            <a:avLst/>
+          </a:prstGeom>
+          <a:solidFill>
+            <a:schemeClr val="tx1">
+              <a:lumMod val="95000"/>
+              <a:lumOff val="5000"/>
+            </a:schemeClr>
+          </a:solidFill>
+          <a:ln>
+            <a:noFill/>
+          </a:ln>
+        </p:spPr>
+        <p:style>
+          <a:lnRef idx="2">
+            <a:schemeClr val="accent1">
+              <a:shade val="50000"/>
+            </a:schemeClr>
+          </a:lnRef>
+          <a:fillRef idx="1">
+            <a:schemeClr val="accent1"/>
+          </a:fillRef>
+          <a:effectRef idx="0">
+            <a:schemeClr val="accent1"/>
+          </a:effectRef>
+          <a:fontRef idx="minor">
+            <a:schemeClr val="lt1"/>
+          </a:fontRef>
+        </p:style>
+        <p:txBody>
+          <a:bodyPr rtlCol="0" anchor="ctr"/>
+          <a:lstStyle/>
+          <a:p>
+            <a:pPr algn="ctr"/>
+            <a:endParaRPr lang="en-US"/>
+          </a:p>
+        </p:txBody>
+      </p:sp>
+      <p:sp>
+        <p:nvSpPr>
+          <p:cNvPr id="2" name="Title 1">
+            <a:extLst>
+              <a:ext uri="{FF2B5EF4-FFF2-40B4-BE49-F238E27FC236}">
+                <a16:creationId xmlns:a16="http://schemas.microsoft.com/office/drawing/2014/main" id="{36D455F1-1E35-A688-9311-D3D136F4A327}"/>
+              </a:ext>
+            </a:extLst>
+          </p:cNvPr>
+          <p:cNvSpPr>
+            <a:spLocks noGrp="1"/>
+          </p:cNvSpPr>
+          <p:nvPr>
+            <p:ph type="title"/>
+          </p:nvPr>
+        </p:nvSpPr>
+        <p:spPr>
+          <a:xfrm>
+            <a:off x="5212091" y="146537"/>
+            <a:ext cx="5162354" cy="607925"/>
+          </a:xfrm>
+        </p:spPr>
+        <p:txBody>
+          <a:bodyPr vert="horz" lIns="91440" tIns="45720" rIns="91440" bIns="45720" rtlCol="0" anchor="b">
+            <a:normAutofit fontScale="90000"/>
+          </a:bodyPr>
+          <a:lstStyle/>
+          <a:p>
+            <a:pPr algn="ctr"/>
+            <a:r>
+              <a:rPr lang="en-US" sz="4200" kern="1200" dirty="0">
+                <a:solidFill>
+                  <a:schemeClr val="bg1"/>
+                </a:solidFill>
+                <a:latin typeface="+mj-lt"/>
+                <a:ea typeface="+mj-ea"/>
+                <a:cs typeface="+mj-cs"/>
+              </a:rPr>
+              <a:t>Scaling Code Snippets</a:t>
+            </a:r>
+          </a:p>
+        </p:txBody>
+      </p:sp>
+      <p:sp>
+        <p:nvSpPr>
+          <p:cNvPr id="4" name="Date Placeholder 3">
+            <a:extLst>
+              <a:ext uri="{FF2B5EF4-FFF2-40B4-BE49-F238E27FC236}">
+                <a16:creationId xmlns:a16="http://schemas.microsoft.com/office/drawing/2014/main" id="{2302E614-F52E-86EB-42FD-897361051A04}"/>
+              </a:ext>
+            </a:extLst>
+          </p:cNvPr>
+          <p:cNvSpPr>
+            <a:spLocks noGrp="1"/>
+          </p:cNvSpPr>
+          <p:nvPr>
+            <p:ph type="dt" sz="half" idx="10"/>
+          </p:nvPr>
+        </p:nvSpPr>
+        <p:spPr>
+          <a:xfrm>
+            <a:off x="474033" y="6346337"/>
+            <a:ext cx="751985" cy="365125"/>
+          </a:xfrm>
+        </p:spPr>
+        <p:txBody>
+          <a:bodyPr vert="horz" lIns="91440" tIns="45720" rIns="91440" bIns="45720" rtlCol="0" anchor="ctr">
+            <a:normAutofit/>
+          </a:bodyPr>
+          <a:lstStyle/>
+          <a:p>
+            <a:pPr>
+              <a:spcAft>
+                <a:spcPts val="600"/>
+              </a:spcAft>
+              <a:defRPr/>
+            </a:pPr>
+            <a:fld id="{DD303E3B-074C-440F-86D1-3BB7E04505DE}" type="datetimeyyyy">
+              <a:rPr lang="en-US">
+                <a:solidFill>
+                  <a:schemeClr val="bg1">
+                    <a:lumMod val="50000"/>
+                  </a:schemeClr>
+                </a:solidFill>
+              </a:rPr>
+              <a:pPr>
+                <a:spcAft>
+                  <a:spcPts val="600"/>
+                </a:spcAft>
+                <a:defRPr/>
+              </a:pPr>
+              <a:t>2024</a:t>
+            </a:fld>
+            <a:endParaRPr lang="en-US" dirty="0">
+              <a:solidFill>
+                <a:schemeClr val="bg1">
+                  <a:lumMod val="50000"/>
+                </a:schemeClr>
+              </a:solidFill>
+            </a:endParaRPr>
+          </a:p>
+        </p:txBody>
+      </p:sp>
+      <p:cxnSp>
+        <p:nvCxnSpPr>
+          <p:cNvPr id="25" name="Straight Connector 24">
+            <a:extLst>
+              <a:ext uri="{FF2B5EF4-FFF2-40B4-BE49-F238E27FC236}">
+                <a16:creationId xmlns:a16="http://schemas.microsoft.com/office/drawing/2014/main" id="{FEA8332D-EA74-40A2-8709-00EDB23792E1}"/>
+              </a:ext>
+              <a:ext uri="{C183D7F6-B498-43B3-948B-1728B52AA6E4}">
+                <adec:decorative xmlns:adec="http://schemas.microsoft.com/office/drawing/2017/decorative" val="1"/>
+              </a:ext>
+            </a:extLst>
+          </p:cNvPr>
+          <p:cNvCxnSpPr>
+            <a:cxnSpLocks noGrp="1" noRot="1" noChangeAspect="1" noMove="1" noResize="1" noEditPoints="1" noAdjustHandles="1" noChangeArrowheads="1" noChangeShapeType="1"/>
+          </p:cNvCxnSpPr>
+          <p:nvPr>
+            <p:extLst>
+              <p:ext uri="{386F3935-93C4-4BCD-93E2-E3B085C9AB24}">
+                <p16:designElem xmlns:p16="http://schemas.microsoft.com/office/powerpoint/2015/main" val="1"/>
+              </p:ext>
+            </p:extLst>
+          </p:nvPr>
+        </p:nvCxnSpPr>
+        <p:spPr>
+          <a:xfrm>
+            <a:off x="317240" y="3429000"/>
+            <a:ext cx="0" cy="3164872"/>
+          </a:xfrm>
+          <a:prstGeom prst="line">
+            <a:avLst/>
+          </a:prstGeom>
+          <a:ln w="12700">
+            <a:solidFill>
+              <a:schemeClr val="accent2"/>
+            </a:solidFill>
+          </a:ln>
+        </p:spPr>
+        <p:style>
+          <a:lnRef idx="1">
+            <a:schemeClr val="accent1"/>
+          </a:lnRef>
+          <a:fillRef idx="0">
+            <a:schemeClr val="accent1"/>
+          </a:fillRef>
+          <a:effectRef idx="0">
+            <a:schemeClr val="accent1"/>
+          </a:effectRef>
+          <a:fontRef idx="minor">
+            <a:schemeClr val="tx1"/>
+          </a:fontRef>
+        </p:style>
+      </p:cxnSp>
+      <p:sp>
+        <p:nvSpPr>
+          <p:cNvPr id="6" name="Slide Number Placeholder 5">
+            <a:extLst>
+              <a:ext uri="{FF2B5EF4-FFF2-40B4-BE49-F238E27FC236}">
+                <a16:creationId xmlns:a16="http://schemas.microsoft.com/office/drawing/2014/main" id="{F61D429F-9044-88F6-7609-FFE708B70CF7}"/>
+              </a:ext>
+            </a:extLst>
+          </p:cNvPr>
+          <p:cNvSpPr>
+            <a:spLocks noGrp="1"/>
+          </p:cNvSpPr>
+          <p:nvPr>
+            <p:ph type="sldNum" sz="quarter" idx="12"/>
+          </p:nvPr>
+        </p:nvSpPr>
+        <p:spPr>
+          <a:xfrm>
+            <a:off x="11379614" y="6346339"/>
+            <a:ext cx="677708" cy="365125"/>
+          </a:xfrm>
+        </p:spPr>
+        <p:txBody>
+          <a:bodyPr vert="horz" lIns="91440" tIns="45720" rIns="91440" bIns="45720" rtlCol="0" anchor="ctr">
+            <a:normAutofit/>
+          </a:bodyPr>
+          <a:lstStyle/>
+          <a:p>
+            <a:pPr>
+              <a:spcAft>
+                <a:spcPts val="600"/>
+              </a:spcAft>
+              <a:defRPr/>
+            </a:pPr>
+            <a:fld id="{BC1B8E0F-90D7-4F6F-9CC4-1E156486B9C1}" type="slidenum">
+              <a:rPr lang="en-US">
+                <a:solidFill>
+                  <a:schemeClr val="bg1">
+                    <a:lumMod val="50000"/>
+                  </a:schemeClr>
+                </a:solidFill>
+              </a:rPr>
+              <a:pPr>
+                <a:spcAft>
+                  <a:spcPts val="600"/>
+                </a:spcAft>
+                <a:defRPr/>
+              </a:pPr>
+              <a:t>8</a:t>
+            </a:fld>
+            <a:endParaRPr lang="en-US" dirty="0">
+              <a:solidFill>
+                <a:schemeClr val="bg1">
+                  <a:lumMod val="50000"/>
+                </a:schemeClr>
+              </a:solidFill>
+            </a:endParaRPr>
+          </a:p>
+        </p:txBody>
+      </p:sp>
+      <p:sp>
+        <p:nvSpPr>
+          <p:cNvPr id="27" name="Rectangle 26">
+            <a:extLst>
+              <a:ext uri="{FF2B5EF4-FFF2-40B4-BE49-F238E27FC236}">
+                <a16:creationId xmlns:a16="http://schemas.microsoft.com/office/drawing/2014/main" id="{9358801C-1E89-48FF-B14F-D76A2EA14C8E}"/>
+              </a:ext>
+              <a:ext uri="{C183D7F6-B498-43B3-948B-1728B52AA6E4}">
+                <adec:decorative xmlns:adec="http://schemas.microsoft.com/office/drawing/2017/decorative" val="1"/>
+              </a:ext>
+            </a:extLst>
+          </p:cNvPr>
+          <p:cNvSpPr>
+            <a:spLocks noGrp="1" noRot="1" noChangeAspect="1" noMove="1" noResize="1" noEditPoints="1" noAdjustHandles="1" noChangeArrowheads="1" noChangeShapeType="1" noTextEdit="1"/>
+          </p:cNvSpPr>
+          <p:nvPr>
+            <p:extLst>
+              <p:ext uri="{386F3935-93C4-4BCD-93E2-E3B085C9AB24}">
+                <p16:designElem xmlns:p16="http://schemas.microsoft.com/office/powerpoint/2015/main" val="1"/>
+              </p:ext>
+            </p:extLst>
+          </p:nvPr>
+        </p:nvSpPr>
+        <p:spPr>
+          <a:xfrm>
+            <a:off x="2134797" y="816429"/>
+            <a:ext cx="8239647" cy="5225143"/>
+          </a:xfrm>
+          <a:prstGeom prst="rect">
+            <a:avLst/>
+          </a:prstGeom>
+          <a:noFill/>
+          <a:ln>
+            <a:solidFill>
+              <a:schemeClr val="accent2"/>
+            </a:solidFill>
+          </a:ln>
+        </p:spPr>
+        <p:style>
+          <a:lnRef idx="2">
+            <a:schemeClr val="accent1">
+              <a:shade val="50000"/>
+            </a:schemeClr>
+          </a:lnRef>
+          <a:fillRef idx="1">
+            <a:schemeClr val="accent1"/>
+          </a:fillRef>
+          <a:effectRef idx="0">
+            <a:schemeClr val="accent1"/>
+          </a:effectRef>
+          <a:fontRef idx="minor">
+            <a:schemeClr val="lt1"/>
+          </a:fontRef>
+        </p:style>
+        <p:txBody>
+          <a:bodyPr rtlCol="0" anchor="ctr"/>
+          <a:lstStyle/>
+          <a:p>
+            <a:pPr algn="ctr"/>
+            <a:endParaRPr lang="en-US"/>
+          </a:p>
+        </p:txBody>
+      </p:sp>
+      <p:cxnSp>
+        <p:nvCxnSpPr>
+          <p:cNvPr id="29" name="Straight Connector 28">
+            <a:extLst>
+              <a:ext uri="{FF2B5EF4-FFF2-40B4-BE49-F238E27FC236}">
+                <a16:creationId xmlns:a16="http://schemas.microsoft.com/office/drawing/2014/main" id="{AB88284F-ED00-40CA-B57D-89C49E8EC6E9}"/>
+              </a:ext>
+              <a:ext uri="{C183D7F6-B498-43B3-948B-1728B52AA6E4}">
+                <adec:decorative xmlns:adec="http://schemas.microsoft.com/office/drawing/2017/decorative" val="1"/>
+              </a:ext>
+            </a:extLst>
+          </p:cNvPr>
+          <p:cNvCxnSpPr>
+            <a:cxnSpLocks noGrp="1" noRot="1" noChangeAspect="1" noMove="1" noResize="1" noEditPoints="1" noAdjustHandles="1" noChangeArrowheads="1" noChangeShapeType="1"/>
+          </p:cNvCxnSpPr>
+          <p:nvPr>
+            <p:extLst>
+              <p:ext uri="{386F3935-93C4-4BCD-93E2-E3B085C9AB24}">
+                <p16:designElem xmlns:p16="http://schemas.microsoft.com/office/powerpoint/2015/main" val="1"/>
+              </p:ext>
+            </p:extLst>
+          </p:nvPr>
+        </p:nvCxnSpPr>
+        <p:spPr>
+          <a:xfrm>
+            <a:off x="11900357" y="272979"/>
+            <a:ext cx="0" cy="2906211"/>
+          </a:xfrm>
+          <a:prstGeom prst="line">
+            <a:avLst/>
+          </a:prstGeom>
+          <a:ln w="12700">
+            <a:solidFill>
+              <a:schemeClr val="accent2"/>
+            </a:solidFill>
+          </a:ln>
+        </p:spPr>
+        <p:style>
+          <a:lnRef idx="1">
+            <a:schemeClr val="accent1"/>
+          </a:lnRef>
+          <a:fillRef idx="0">
+            <a:schemeClr val="accent1"/>
+          </a:fillRef>
+          <a:effectRef idx="0">
+            <a:schemeClr val="accent1"/>
+          </a:effectRef>
+          <a:fontRef idx="minor">
+            <a:schemeClr val="tx1"/>
+          </a:fontRef>
+        </p:style>
+      </p:cxnSp>
+      <p:sp>
+        <p:nvSpPr>
+          <p:cNvPr id="5" name="Footer Placeholder 4">
+            <a:extLst>
+              <a:ext uri="{FF2B5EF4-FFF2-40B4-BE49-F238E27FC236}">
+                <a16:creationId xmlns:a16="http://schemas.microsoft.com/office/drawing/2014/main" id="{0C7A8648-1807-0813-E6CF-EB4EAB3C8E7F}"/>
+              </a:ext>
+            </a:extLst>
+          </p:cNvPr>
+          <p:cNvSpPr>
+            <a:spLocks noGrp="1"/>
+          </p:cNvSpPr>
+          <p:nvPr>
+            <p:ph type="ftr" sz="quarter" idx="11"/>
+          </p:nvPr>
+        </p:nvSpPr>
+        <p:spPr>
+          <a:xfrm>
+            <a:off x="5742529" y="6346338"/>
+            <a:ext cx="1941900" cy="365125"/>
+          </a:xfrm>
+        </p:spPr>
+        <p:txBody>
+          <a:bodyPr vert="horz" lIns="91440" tIns="45720" rIns="91440" bIns="45720" rtlCol="0" anchor="ctr">
+            <a:normAutofit/>
+          </a:bodyPr>
+          <a:lstStyle/>
+          <a:p>
+            <a:pPr algn="l">
+              <a:spcAft>
+                <a:spcPts val="600"/>
+              </a:spcAft>
+              <a:defRPr/>
+            </a:pPr>
+            <a:r>
+              <a:rPr lang="en-US" kern="1200" dirty="0">
+                <a:solidFill>
+                  <a:schemeClr val="bg1">
+                    <a:lumMod val="50000"/>
+                  </a:schemeClr>
+                </a:solidFill>
+                <a:latin typeface="+mn-lt"/>
+                <a:ea typeface="+mn-ea"/>
+                <a:cs typeface="+mn-cs"/>
+              </a:rPr>
+              <a:t>GENG4500-60</a:t>
+            </a:r>
+          </a:p>
+        </p:txBody>
+      </p:sp>
+      <p:sp>
+        <p:nvSpPr>
+          <p:cNvPr id="3" name="TextBox 2">
+            <a:extLst>
+              <a:ext uri="{FF2B5EF4-FFF2-40B4-BE49-F238E27FC236}">
+                <a16:creationId xmlns:a16="http://schemas.microsoft.com/office/drawing/2014/main" id="{38967615-A0EC-835E-6E53-2C64B07BD653}"/>
+              </a:ext>
+            </a:extLst>
+          </p:cNvPr>
+          <p:cNvSpPr txBox="1"/>
+          <p:nvPr/>
+        </p:nvSpPr>
+        <p:spPr>
+          <a:xfrm>
+            <a:off x="2337131" y="816428"/>
+            <a:ext cx="7388352" cy="4801314"/>
+          </a:xfrm>
+          <a:prstGeom prst="rect">
+            <a:avLst/>
+          </a:prstGeom>
+          <a:noFill/>
+        </p:spPr>
+        <p:txBody>
+          <a:bodyPr wrap="square" rtlCol="0">
+            <a:spAutoFit/>
+          </a:bodyPr>
+          <a:lstStyle/>
+          <a:p>
+            <a:r>
+              <a:rPr lang="en-CA" b="0" dirty="0">
+                <a:solidFill>
+                  <a:srgbClr val="6AA94F"/>
+                </a:solidFill>
+                <a:effectLst/>
+                <a:latin typeface="Courier New" panose="02070309020205020404" pitchFamily="49" charset="0"/>
+              </a:rPr>
+              <a:t># Create an instance of the scaler</a:t>
+            </a:r>
+            <a:endParaRPr lang="en-CA" b="0" dirty="0">
+              <a:solidFill>
+                <a:srgbClr val="D4D4D4"/>
+              </a:solidFill>
+              <a:effectLst/>
+              <a:latin typeface="Courier New" panose="02070309020205020404" pitchFamily="49" charset="0"/>
+            </a:endParaRPr>
+          </a:p>
+          <a:p>
+            <a:r>
+              <a:rPr lang="en-CA" b="0" dirty="0">
+                <a:solidFill>
+                  <a:srgbClr val="D4D4D4"/>
+                </a:solidFill>
+                <a:effectLst/>
+                <a:latin typeface="Courier New" panose="02070309020205020404" pitchFamily="49" charset="0"/>
+              </a:rPr>
+              <a:t>scaler = </a:t>
+            </a:r>
+            <a:r>
+              <a:rPr lang="en-CA" b="0" dirty="0" err="1">
+                <a:solidFill>
+                  <a:srgbClr val="D4D4D4"/>
+                </a:solidFill>
+                <a:effectLst/>
+                <a:latin typeface="Courier New" panose="02070309020205020404" pitchFamily="49" charset="0"/>
+              </a:rPr>
+              <a:t>RobustScaler</a:t>
+            </a:r>
+            <a:r>
+              <a:rPr lang="en-CA" b="0" dirty="0">
+                <a:solidFill>
+                  <a:srgbClr val="DCDCDC"/>
+                </a:solidFill>
+                <a:effectLst/>
+                <a:latin typeface="Courier New" panose="02070309020205020404" pitchFamily="49" charset="0"/>
+              </a:rPr>
+              <a:t>()</a:t>
+            </a:r>
+            <a:br>
+              <a:rPr lang="en-CA" b="0" dirty="0">
+                <a:solidFill>
+                  <a:srgbClr val="D4D4D4"/>
+                </a:solidFill>
+                <a:effectLst/>
+                <a:latin typeface="Courier New" panose="02070309020205020404" pitchFamily="49" charset="0"/>
+              </a:rPr>
+            </a:br>
+            <a:r>
+              <a:rPr lang="en-CA" b="0" dirty="0">
+                <a:solidFill>
+                  <a:srgbClr val="6AA94F"/>
+                </a:solidFill>
+                <a:effectLst/>
+                <a:latin typeface="Courier New" panose="02070309020205020404" pitchFamily="49" charset="0"/>
+              </a:rPr>
+              <a:t># Initialize a loop to iterate the train columns</a:t>
+            </a:r>
+            <a:endParaRPr lang="en-CA" b="0" dirty="0">
+              <a:solidFill>
+                <a:srgbClr val="D4D4D4"/>
+              </a:solidFill>
+              <a:effectLst/>
+              <a:latin typeface="Courier New" panose="02070309020205020404" pitchFamily="49" charset="0"/>
+            </a:endParaRPr>
+          </a:p>
+          <a:p>
+            <a:r>
+              <a:rPr lang="en-CA" b="0" dirty="0">
+                <a:solidFill>
+                  <a:srgbClr val="C586C0"/>
+                </a:solidFill>
+                <a:effectLst/>
+                <a:latin typeface="Courier New" panose="02070309020205020404" pitchFamily="49" charset="0"/>
+              </a:rPr>
+              <a:t>for</a:t>
+            </a:r>
+            <a:r>
+              <a:rPr lang="en-CA" b="0" dirty="0">
+                <a:solidFill>
+                  <a:srgbClr val="D4D4D4"/>
+                </a:solidFill>
+                <a:effectLst/>
+                <a:latin typeface="Courier New" panose="02070309020205020404" pitchFamily="49" charset="0"/>
+              </a:rPr>
+              <a:t> col </a:t>
+            </a:r>
+            <a:r>
+              <a:rPr lang="en-CA" b="0" dirty="0">
+                <a:solidFill>
+                  <a:srgbClr val="82C6FF"/>
+                </a:solidFill>
+                <a:effectLst/>
+                <a:latin typeface="Courier New" panose="02070309020205020404" pitchFamily="49" charset="0"/>
+              </a:rPr>
+              <a:t>in</a:t>
+            </a:r>
+            <a:r>
+              <a:rPr lang="en-CA" b="0" dirty="0">
+                <a:solidFill>
+                  <a:srgbClr val="D4D4D4"/>
+                </a:solidFill>
+                <a:effectLst/>
+                <a:latin typeface="Courier New" panose="02070309020205020404" pitchFamily="49" charset="0"/>
+              </a:rPr>
+              <a:t> </a:t>
+            </a:r>
+            <a:r>
+              <a:rPr lang="en-CA" b="0" dirty="0" err="1">
+                <a:solidFill>
+                  <a:srgbClr val="D4D4D4"/>
+                </a:solidFill>
+                <a:effectLst/>
+                <a:latin typeface="Courier New" panose="02070309020205020404" pitchFamily="49" charset="0"/>
+              </a:rPr>
+              <a:t>X_train.columns</a:t>
+            </a:r>
+            <a:r>
+              <a:rPr lang="en-CA" b="0" dirty="0">
+                <a:solidFill>
+                  <a:srgbClr val="DCDCDC"/>
+                </a:solidFill>
+                <a:effectLst/>
+                <a:latin typeface="Courier New" panose="02070309020205020404" pitchFamily="49" charset="0"/>
+              </a:rPr>
+              <a:t>:</a:t>
+            </a:r>
+            <a:endParaRPr lang="en-CA" b="0" dirty="0">
+              <a:solidFill>
+                <a:srgbClr val="D4D4D4"/>
+              </a:solidFill>
+              <a:effectLst/>
+              <a:latin typeface="Courier New" panose="02070309020205020404" pitchFamily="49" charset="0"/>
+            </a:endParaRPr>
+          </a:p>
+          <a:p>
+            <a:r>
+              <a:rPr lang="en-CA" b="0" dirty="0">
+                <a:solidFill>
+                  <a:srgbClr val="D4D4D4"/>
+                </a:solidFill>
+                <a:effectLst/>
+                <a:latin typeface="Courier New" panose="02070309020205020404" pitchFamily="49" charset="0"/>
+              </a:rPr>
+              <a:t>  </a:t>
+            </a:r>
+            <a:r>
+              <a:rPr lang="en-CA" b="0" dirty="0" err="1">
+                <a:solidFill>
+                  <a:srgbClr val="D4D4D4"/>
+                </a:solidFill>
+                <a:effectLst/>
+                <a:latin typeface="Courier New" panose="02070309020205020404" pitchFamily="49" charset="0"/>
+              </a:rPr>
+              <a:t>col_scaled</a:t>
+            </a:r>
+            <a:r>
+              <a:rPr lang="en-CA" b="0" dirty="0">
+                <a:solidFill>
+                  <a:srgbClr val="D4D4D4"/>
+                </a:solidFill>
+                <a:effectLst/>
+                <a:latin typeface="Courier New" panose="02070309020205020404" pitchFamily="49" charset="0"/>
+              </a:rPr>
+              <a:t> = </a:t>
+            </a:r>
+            <a:r>
+              <a:rPr lang="en-CA" b="0" dirty="0" err="1">
+                <a:solidFill>
+                  <a:srgbClr val="D4D4D4"/>
+                </a:solidFill>
+                <a:effectLst/>
+                <a:latin typeface="Courier New" panose="02070309020205020404" pitchFamily="49" charset="0"/>
+              </a:rPr>
+              <a:t>scaler.fit_transform</a:t>
+            </a:r>
+            <a:r>
+              <a:rPr lang="en-CA" b="0" dirty="0">
+                <a:solidFill>
+                  <a:srgbClr val="DCDCDC"/>
+                </a:solidFill>
+                <a:effectLst/>
+                <a:latin typeface="Courier New" panose="02070309020205020404" pitchFamily="49" charset="0"/>
+              </a:rPr>
+              <a:t>(</a:t>
+            </a:r>
+            <a:r>
+              <a:rPr lang="en-CA" b="0" dirty="0" err="1">
+                <a:solidFill>
+                  <a:srgbClr val="D4D4D4"/>
+                </a:solidFill>
+                <a:effectLst/>
+                <a:latin typeface="Courier New" panose="02070309020205020404" pitchFamily="49" charset="0"/>
+              </a:rPr>
+              <a:t>X_train</a:t>
+            </a:r>
+            <a:r>
+              <a:rPr lang="en-CA" b="0" dirty="0">
+                <a:solidFill>
+                  <a:srgbClr val="DCDCDC"/>
+                </a:solidFill>
+                <a:effectLst/>
+                <a:latin typeface="Courier New" panose="02070309020205020404" pitchFamily="49" charset="0"/>
+              </a:rPr>
+              <a:t>[[</a:t>
+            </a:r>
+            <a:r>
+              <a:rPr lang="en-CA" b="0" dirty="0">
+                <a:solidFill>
+                  <a:srgbClr val="D4D4D4"/>
+                </a:solidFill>
+                <a:effectLst/>
+                <a:latin typeface="Courier New" panose="02070309020205020404" pitchFamily="49" charset="0"/>
+              </a:rPr>
+              <a:t>col</a:t>
+            </a:r>
+            <a:r>
+              <a:rPr lang="en-CA" b="0" dirty="0">
+                <a:solidFill>
+                  <a:srgbClr val="DCDCDC"/>
+                </a:solidFill>
+                <a:effectLst/>
+                <a:latin typeface="Courier New" panose="02070309020205020404" pitchFamily="49" charset="0"/>
+              </a:rPr>
+              <a:t>]])</a:t>
+            </a:r>
+            <a:br>
+              <a:rPr lang="en-CA" b="0" dirty="0">
+                <a:solidFill>
+                  <a:srgbClr val="D4D4D4"/>
+                </a:solidFill>
+                <a:effectLst/>
+                <a:latin typeface="Courier New" panose="02070309020205020404" pitchFamily="49" charset="0"/>
+              </a:rPr>
+            </a:br>
+            <a:r>
+              <a:rPr lang="en-CA" b="0" dirty="0">
+                <a:solidFill>
+                  <a:srgbClr val="D4D4D4"/>
+                </a:solidFill>
+                <a:effectLst/>
+                <a:latin typeface="Courier New" panose="02070309020205020404" pitchFamily="49" charset="0"/>
+              </a:rPr>
+              <a:t>  </a:t>
+            </a:r>
+            <a:r>
+              <a:rPr lang="en-CA" b="0" dirty="0">
+                <a:solidFill>
+                  <a:srgbClr val="6AA94F"/>
+                </a:solidFill>
+                <a:effectLst/>
+                <a:latin typeface="Courier New" panose="02070309020205020404" pitchFamily="49" charset="0"/>
+              </a:rPr>
+              <a:t># Append scaled data to empty </a:t>
+            </a:r>
+            <a:r>
+              <a:rPr lang="en-CA" b="0" dirty="0" err="1">
+                <a:solidFill>
+                  <a:srgbClr val="6AA94F"/>
+                </a:solidFill>
+                <a:effectLst/>
+                <a:latin typeface="Courier New" panose="02070309020205020404" pitchFamily="49" charset="0"/>
+              </a:rPr>
+              <a:t>dataframe</a:t>
+            </a:r>
+            <a:endParaRPr lang="en-CA" b="0" dirty="0">
+              <a:solidFill>
+                <a:srgbClr val="D4D4D4"/>
+              </a:solidFill>
+              <a:effectLst/>
+              <a:latin typeface="Courier New" panose="02070309020205020404" pitchFamily="49" charset="0"/>
+            </a:endParaRPr>
+          </a:p>
+          <a:p>
+            <a:r>
+              <a:rPr lang="en-CA" b="0" dirty="0">
+                <a:solidFill>
+                  <a:srgbClr val="D4D4D4"/>
+                </a:solidFill>
+                <a:effectLst/>
+                <a:latin typeface="Courier New" panose="02070309020205020404" pitchFamily="49" charset="0"/>
+              </a:rPr>
+              <a:t>  </a:t>
+            </a:r>
+            <a:r>
+              <a:rPr lang="en-CA" b="0" dirty="0" err="1">
+                <a:solidFill>
+                  <a:srgbClr val="D4D4D4"/>
+                </a:solidFill>
+                <a:effectLst/>
+                <a:latin typeface="Courier New" panose="02070309020205020404" pitchFamily="49" charset="0"/>
+              </a:rPr>
+              <a:t>X_train_scaled</a:t>
+            </a:r>
+            <a:r>
+              <a:rPr lang="en-CA" b="0" dirty="0">
+                <a:solidFill>
+                  <a:srgbClr val="DCDCDC"/>
+                </a:solidFill>
+                <a:effectLst/>
+                <a:latin typeface="Courier New" panose="02070309020205020404" pitchFamily="49" charset="0"/>
+              </a:rPr>
+              <a:t>[</a:t>
+            </a:r>
+            <a:r>
+              <a:rPr lang="en-CA" b="0" dirty="0">
+                <a:solidFill>
+                  <a:srgbClr val="D4D4D4"/>
+                </a:solidFill>
+                <a:effectLst/>
+                <a:latin typeface="Courier New" panose="02070309020205020404" pitchFamily="49" charset="0"/>
+              </a:rPr>
+              <a:t>col</a:t>
+            </a:r>
+            <a:r>
+              <a:rPr lang="en-CA" b="0" dirty="0">
+                <a:solidFill>
+                  <a:srgbClr val="DCDCDC"/>
+                </a:solidFill>
+                <a:effectLst/>
+                <a:latin typeface="Courier New" panose="02070309020205020404" pitchFamily="49" charset="0"/>
+              </a:rPr>
+              <a:t>]</a:t>
+            </a:r>
+            <a:r>
+              <a:rPr lang="en-CA" b="0" dirty="0">
+                <a:solidFill>
+                  <a:srgbClr val="D4D4D4"/>
+                </a:solidFill>
+                <a:effectLst/>
+                <a:latin typeface="Courier New" panose="02070309020205020404" pitchFamily="49" charset="0"/>
+              </a:rPr>
+              <a:t> = </a:t>
+            </a:r>
+            <a:r>
+              <a:rPr lang="en-CA" b="0" dirty="0" err="1">
+                <a:solidFill>
+                  <a:srgbClr val="D4D4D4"/>
+                </a:solidFill>
+                <a:effectLst/>
+                <a:latin typeface="Courier New" panose="02070309020205020404" pitchFamily="49" charset="0"/>
+              </a:rPr>
+              <a:t>col_scaled.flatten</a:t>
+            </a:r>
+            <a:r>
+              <a:rPr lang="en-CA" b="0" dirty="0">
+                <a:solidFill>
+                  <a:srgbClr val="DCDCDC"/>
+                </a:solidFill>
+                <a:effectLst/>
+                <a:latin typeface="Courier New" panose="02070309020205020404" pitchFamily="49" charset="0"/>
+              </a:rPr>
+              <a:t>()</a:t>
+            </a:r>
+            <a:br>
+              <a:rPr lang="en-CA" b="0" dirty="0">
+                <a:solidFill>
+                  <a:srgbClr val="D4D4D4"/>
+                </a:solidFill>
+                <a:effectLst/>
+                <a:latin typeface="Courier New" panose="02070309020205020404" pitchFamily="49" charset="0"/>
+              </a:rPr>
+            </a:br>
+            <a:r>
+              <a:rPr lang="en-CA" b="0" dirty="0">
+                <a:solidFill>
+                  <a:srgbClr val="D4D4D4"/>
+                </a:solidFill>
+                <a:effectLst/>
+                <a:latin typeface="Courier New" panose="02070309020205020404" pitchFamily="49" charset="0"/>
+              </a:rPr>
+              <a:t>  </a:t>
+            </a:r>
+            <a:r>
+              <a:rPr lang="en-CA" b="0" dirty="0">
+                <a:solidFill>
+                  <a:srgbClr val="6AA94F"/>
+                </a:solidFill>
+                <a:effectLst/>
+                <a:latin typeface="Courier New" panose="02070309020205020404" pitchFamily="49" charset="0"/>
+              </a:rPr>
+              <a:t># Transform test column data</a:t>
+            </a:r>
+            <a:endParaRPr lang="en-CA" b="0" dirty="0">
+              <a:solidFill>
+                <a:srgbClr val="D4D4D4"/>
+              </a:solidFill>
+              <a:effectLst/>
+              <a:latin typeface="Courier New" panose="02070309020205020404" pitchFamily="49" charset="0"/>
+            </a:endParaRPr>
+          </a:p>
+          <a:p>
+            <a:r>
+              <a:rPr lang="en-CA" b="0" dirty="0">
+                <a:solidFill>
+                  <a:srgbClr val="D4D4D4"/>
+                </a:solidFill>
+                <a:effectLst/>
+                <a:latin typeface="Courier New" panose="02070309020205020404" pitchFamily="49" charset="0"/>
+              </a:rPr>
+              <a:t>  </a:t>
+            </a:r>
+            <a:r>
+              <a:rPr lang="en-CA" b="0" dirty="0" err="1">
+                <a:solidFill>
+                  <a:srgbClr val="D4D4D4"/>
+                </a:solidFill>
+                <a:effectLst/>
+                <a:latin typeface="Courier New" panose="02070309020205020404" pitchFamily="49" charset="0"/>
+              </a:rPr>
+              <a:t>col_scaled_test</a:t>
+            </a:r>
+            <a:r>
+              <a:rPr lang="en-CA" b="0" dirty="0">
+                <a:solidFill>
+                  <a:srgbClr val="D4D4D4"/>
+                </a:solidFill>
+                <a:effectLst/>
+                <a:latin typeface="Courier New" panose="02070309020205020404" pitchFamily="49" charset="0"/>
+              </a:rPr>
+              <a:t> = </a:t>
+            </a:r>
+            <a:r>
+              <a:rPr lang="en-CA" b="0" dirty="0" err="1">
+                <a:solidFill>
+                  <a:srgbClr val="D4D4D4"/>
+                </a:solidFill>
+                <a:effectLst/>
+                <a:latin typeface="Courier New" panose="02070309020205020404" pitchFamily="49" charset="0"/>
+              </a:rPr>
+              <a:t>scaler.transform</a:t>
+            </a:r>
+            <a:r>
+              <a:rPr lang="en-CA" b="0" dirty="0">
+                <a:solidFill>
+                  <a:srgbClr val="DCDCDC"/>
+                </a:solidFill>
+                <a:effectLst/>
+                <a:latin typeface="Courier New" panose="02070309020205020404" pitchFamily="49" charset="0"/>
+              </a:rPr>
+              <a:t>(</a:t>
+            </a:r>
+            <a:r>
+              <a:rPr lang="en-CA" b="0" dirty="0" err="1">
+                <a:solidFill>
+                  <a:srgbClr val="D4D4D4"/>
+                </a:solidFill>
+                <a:effectLst/>
+                <a:latin typeface="Courier New" panose="02070309020205020404" pitchFamily="49" charset="0"/>
+              </a:rPr>
+              <a:t>X_test</a:t>
+            </a:r>
+            <a:r>
+              <a:rPr lang="en-CA" b="0" dirty="0">
+                <a:solidFill>
+                  <a:srgbClr val="DCDCDC"/>
+                </a:solidFill>
+                <a:effectLst/>
+                <a:latin typeface="Courier New" panose="02070309020205020404" pitchFamily="49" charset="0"/>
+              </a:rPr>
+              <a:t>[[</a:t>
+            </a:r>
+            <a:r>
+              <a:rPr lang="en-CA" b="0" dirty="0">
+                <a:solidFill>
+                  <a:srgbClr val="D4D4D4"/>
+                </a:solidFill>
+                <a:effectLst/>
+                <a:latin typeface="Courier New" panose="02070309020205020404" pitchFamily="49" charset="0"/>
+              </a:rPr>
+              <a:t>col</a:t>
+            </a:r>
+            <a:r>
+              <a:rPr lang="en-CA" b="0" dirty="0">
+                <a:solidFill>
+                  <a:srgbClr val="DCDCDC"/>
+                </a:solidFill>
+                <a:effectLst/>
+                <a:latin typeface="Courier New" panose="02070309020205020404" pitchFamily="49" charset="0"/>
+              </a:rPr>
+              <a:t>]])</a:t>
+            </a:r>
+            <a:br>
+              <a:rPr lang="en-CA" b="0" dirty="0">
+                <a:solidFill>
+                  <a:srgbClr val="D4D4D4"/>
+                </a:solidFill>
+                <a:effectLst/>
+                <a:latin typeface="Courier New" panose="02070309020205020404" pitchFamily="49" charset="0"/>
+              </a:rPr>
+            </a:br>
+            <a:r>
+              <a:rPr lang="en-CA" b="0" dirty="0">
+                <a:solidFill>
+                  <a:srgbClr val="D4D4D4"/>
+                </a:solidFill>
+                <a:effectLst/>
+                <a:latin typeface="Courier New" panose="02070309020205020404" pitchFamily="49" charset="0"/>
+              </a:rPr>
+              <a:t>  </a:t>
+            </a:r>
+            <a:r>
+              <a:rPr lang="en-CA" b="0" dirty="0">
+                <a:solidFill>
+                  <a:srgbClr val="6AA94F"/>
+                </a:solidFill>
+                <a:effectLst/>
+                <a:latin typeface="Courier New" panose="02070309020205020404" pitchFamily="49" charset="0"/>
+              </a:rPr>
+              <a:t># Append scaled data to empty </a:t>
+            </a:r>
+            <a:r>
+              <a:rPr lang="en-CA" b="0" dirty="0" err="1">
+                <a:solidFill>
+                  <a:srgbClr val="6AA94F"/>
+                </a:solidFill>
+                <a:effectLst/>
+                <a:latin typeface="Courier New" panose="02070309020205020404" pitchFamily="49" charset="0"/>
+              </a:rPr>
+              <a:t>dataframe</a:t>
+            </a:r>
+            <a:endParaRPr lang="en-CA" b="0" dirty="0">
+              <a:solidFill>
+                <a:srgbClr val="D4D4D4"/>
+              </a:solidFill>
+              <a:effectLst/>
+              <a:latin typeface="Courier New" panose="02070309020205020404" pitchFamily="49" charset="0"/>
+            </a:endParaRPr>
+          </a:p>
+          <a:p>
+            <a:r>
+              <a:rPr lang="en-CA" b="0" dirty="0">
+                <a:solidFill>
+                  <a:srgbClr val="D4D4D4"/>
+                </a:solidFill>
+                <a:effectLst/>
+                <a:latin typeface="Courier New" panose="02070309020205020404" pitchFamily="49" charset="0"/>
+              </a:rPr>
+              <a:t>  </a:t>
+            </a:r>
+            <a:r>
+              <a:rPr lang="en-CA" b="0" dirty="0" err="1">
+                <a:solidFill>
+                  <a:srgbClr val="D4D4D4"/>
+                </a:solidFill>
+                <a:effectLst/>
+                <a:latin typeface="Courier New" panose="02070309020205020404" pitchFamily="49" charset="0"/>
+              </a:rPr>
+              <a:t>X_test_scaled</a:t>
+            </a:r>
+            <a:r>
+              <a:rPr lang="en-CA" b="0" dirty="0">
+                <a:solidFill>
+                  <a:srgbClr val="DCDCDC"/>
+                </a:solidFill>
+                <a:effectLst/>
+                <a:latin typeface="Courier New" panose="02070309020205020404" pitchFamily="49" charset="0"/>
+              </a:rPr>
+              <a:t>[</a:t>
+            </a:r>
+            <a:r>
+              <a:rPr lang="en-CA" b="0" dirty="0">
+                <a:solidFill>
+                  <a:srgbClr val="D4D4D4"/>
+                </a:solidFill>
+                <a:effectLst/>
+                <a:latin typeface="Courier New" panose="02070309020205020404" pitchFamily="49" charset="0"/>
+              </a:rPr>
+              <a:t>col</a:t>
+            </a:r>
+            <a:r>
+              <a:rPr lang="en-CA" b="0" dirty="0">
+                <a:solidFill>
+                  <a:srgbClr val="DCDCDC"/>
+                </a:solidFill>
+                <a:effectLst/>
+                <a:latin typeface="Courier New" panose="02070309020205020404" pitchFamily="49" charset="0"/>
+              </a:rPr>
+              <a:t>]</a:t>
+            </a:r>
+            <a:r>
+              <a:rPr lang="en-CA" b="0" dirty="0">
+                <a:solidFill>
+                  <a:srgbClr val="D4D4D4"/>
+                </a:solidFill>
+                <a:effectLst/>
+                <a:latin typeface="Courier New" panose="02070309020205020404" pitchFamily="49" charset="0"/>
+              </a:rPr>
+              <a:t> = </a:t>
+            </a:r>
+            <a:r>
+              <a:rPr lang="en-CA" b="0" dirty="0" err="1">
+                <a:solidFill>
+                  <a:srgbClr val="D4D4D4"/>
+                </a:solidFill>
+                <a:effectLst/>
+                <a:latin typeface="Courier New" panose="02070309020205020404" pitchFamily="49" charset="0"/>
+              </a:rPr>
+              <a:t>col_scaled_test.flatten</a:t>
+            </a:r>
+            <a:r>
+              <a:rPr lang="en-CA" b="0" dirty="0">
+                <a:solidFill>
+                  <a:srgbClr val="DCDCDC"/>
+                </a:solidFill>
+                <a:effectLst/>
+                <a:latin typeface="Courier New" panose="02070309020205020404" pitchFamily="49" charset="0"/>
+              </a:rPr>
+              <a:t>()</a:t>
+            </a:r>
+          </a:p>
+          <a:p>
+            <a:endParaRPr lang="en-CA" dirty="0">
+              <a:solidFill>
+                <a:srgbClr val="DCDCDC"/>
+              </a:solidFill>
+              <a:latin typeface="Courier New" panose="02070309020205020404" pitchFamily="49" charset="0"/>
+            </a:endParaRPr>
+          </a:p>
+          <a:p>
+            <a:endParaRPr lang="en-CA" b="0" dirty="0">
+              <a:solidFill>
+                <a:srgbClr val="DCDCDC"/>
+              </a:solidFill>
+              <a:effectLst/>
+              <a:latin typeface="Courier New" panose="02070309020205020404" pitchFamily="49" charset="0"/>
+            </a:endParaRPr>
+          </a:p>
+          <a:p>
+            <a:endParaRPr lang="en-CA" dirty="0">
+              <a:solidFill>
+                <a:srgbClr val="DCDCDC"/>
+              </a:solidFill>
+              <a:latin typeface="Courier New" panose="02070309020205020404" pitchFamily="49" charset="0"/>
+            </a:endParaRPr>
+          </a:p>
+          <a:p>
+            <a:r>
+              <a:rPr lang="en-US" b="0" dirty="0" err="1">
+                <a:solidFill>
+                  <a:srgbClr val="D4D4D4"/>
+                </a:solidFill>
+                <a:effectLst/>
+                <a:latin typeface="Courier New" panose="02070309020205020404" pitchFamily="49" charset="0"/>
+              </a:rPr>
+              <a:t>scaled_features_for_prediction</a:t>
+            </a:r>
+            <a:r>
+              <a:rPr lang="en-US" b="0" dirty="0">
+                <a:solidFill>
+                  <a:srgbClr val="D4D4D4"/>
+                </a:solidFill>
+                <a:effectLst/>
+                <a:latin typeface="Courier New" panose="02070309020205020404" pitchFamily="49" charset="0"/>
+              </a:rPr>
+              <a:t> = </a:t>
+            </a:r>
+            <a:r>
+              <a:rPr lang="en-US" b="0" dirty="0" err="1">
+                <a:solidFill>
+                  <a:srgbClr val="D4D4D4"/>
+                </a:solidFill>
+                <a:effectLst/>
+                <a:latin typeface="Courier New" panose="02070309020205020404" pitchFamily="49" charset="0"/>
+              </a:rPr>
+              <a:t>scaler.transform</a:t>
+            </a:r>
+            <a:r>
+              <a:rPr lang="en-US" b="0" dirty="0">
+                <a:solidFill>
+                  <a:srgbClr val="DCDCDC"/>
+                </a:solidFill>
+                <a:effectLst/>
+                <a:latin typeface="Courier New" panose="02070309020205020404" pitchFamily="49" charset="0"/>
+              </a:rPr>
+              <a:t>(</a:t>
+            </a:r>
+            <a:r>
+              <a:rPr lang="en-US" b="0" dirty="0" err="1">
+                <a:solidFill>
+                  <a:srgbClr val="D4D4D4"/>
+                </a:solidFill>
+                <a:effectLst/>
+                <a:latin typeface="Courier New" panose="02070309020205020404" pitchFamily="49" charset="0"/>
+              </a:rPr>
+              <a:t>features_for_prediction</a:t>
+            </a:r>
+            <a:r>
+              <a:rPr lang="en-US" b="0" dirty="0">
+                <a:solidFill>
+                  <a:srgbClr val="DCDCDC"/>
+                </a:solidFill>
+                <a:effectLst/>
+                <a:latin typeface="Courier New" panose="02070309020205020404" pitchFamily="49" charset="0"/>
+              </a:rPr>
+              <a:t>)</a:t>
+            </a:r>
+            <a:endParaRPr lang="en-US" b="0" dirty="0">
+              <a:solidFill>
+                <a:srgbClr val="D4D4D4"/>
+              </a:solidFill>
+              <a:effectLst/>
+              <a:latin typeface="Courier New" panose="02070309020205020404" pitchFamily="49" charset="0"/>
+            </a:endParaRPr>
+          </a:p>
+          <a:p>
+            <a:endParaRPr lang="en-CA" b="0" dirty="0">
+              <a:solidFill>
+                <a:srgbClr val="D4D4D4"/>
+              </a:solidFill>
+              <a:effectLst/>
+              <a:latin typeface="Courier New" panose="02070309020205020404" pitchFamily="49" charset="0"/>
+            </a:endParaRPr>
+          </a:p>
+        </p:txBody>
+      </p:sp>
+    </p:spTree>
+    <p:extLst>
+      <p:ext uri="{BB962C8B-B14F-4D97-AF65-F5344CB8AC3E}">
+        <p14:creationId xmlns:p14="http://schemas.microsoft.com/office/powerpoint/2010/main" val="2356121805"/>
+      </p:ext>
+    </p:extLst>
+  </p:cSld>
+  <p:clrMapOvr>
+    <a:masterClrMapping/>
+  </p:clrMapOvr>
+</p:sld>
+</file>
+
+<file path=ppt/slides/slide9.xml><?xml version="1.0" encoding="utf-8"?>
+<p:sld xmlns:a="http://schemas.openxmlformats.org/drawingml/2006/main" xmlns:r="http://schemas.openxmlformats.org/officeDocument/2006/relationships" xmlns:p="http://schemas.openxmlformats.org/presentationml/2006/main">
+  <p:cSld>
+    <p:bg>
+      <p:bgPr>
+        <a:solidFill>
+          <a:schemeClr val="bg1"/>
+        </a:solidFill>
+        <a:effectLst/>
+      </p:bgPr>
+    </p:bg>
+    <p:spTree>
+      <p:nvGrpSpPr>
+        <p:cNvPr id="1" name=""/>
+        <p:cNvGrpSpPr/>
+        <p:nvPr/>
+      </p:nvGrpSpPr>
+      <p:grpSpPr>
+        <a:xfrm>
+          <a:off x="0" y="0"/>
+          <a:ext cx="0" cy="0"/>
+          <a:chOff x="0" y="0"/>
+          <a:chExt cx="0" cy="0"/>
+        </a:xfrm>
+      </p:grpSpPr>
+      <p:sp>
+        <p:nvSpPr>
           <p:cNvPr id="22" name="Rectangle 21">
             <a:extLst>
               <a:ext uri="{FF2B5EF4-FFF2-40B4-BE49-F238E27FC236}">
@@ -13513,7 +15412,7 @@
                   <a:spcPts val="600"/>
                 </a:spcAft>
               </a:pPr>
-              <a:t>8</a:t>
+              <a:t>9</a:t>
             </a:fld>
             <a:endParaRPr lang="en-US">
               <a:solidFill>
@@ -13631,556 +15530,6 @@
     <p:extLst>
       <p:ext uri="{BB962C8B-B14F-4D97-AF65-F5344CB8AC3E}">
         <p14:creationId xmlns:p14="http://schemas.microsoft.com/office/powerpoint/2010/main" val="3411810196"/>
-      </p:ext>
-    </p:extLst>
-  </p:cSld>
-  <p:clrMapOvr>
-    <a:masterClrMapping/>
-  </p:clrMapOvr>
-</p:sld>
-</file>
-
-<file path=ppt/slides/slide9.xml><?xml version="1.0" encoding="utf-8"?>
-<p:sld xmlns:a="http://schemas.openxmlformats.org/drawingml/2006/main" xmlns:r="http://schemas.openxmlformats.org/officeDocument/2006/relationships" xmlns:p="http://schemas.openxmlformats.org/presentationml/2006/main">
-  <p:cSld>
-    <p:bg>
-      <p:bgPr>
-        <a:solidFill>
-          <a:schemeClr val="bg1"/>
-        </a:solidFill>
-        <a:effectLst/>
-      </p:bgPr>
-    </p:bg>
-    <p:spTree>
-      <p:nvGrpSpPr>
-        <p:cNvPr id="1" name=""/>
-        <p:cNvGrpSpPr/>
-        <p:nvPr/>
-      </p:nvGrpSpPr>
-      <p:grpSpPr>
-        <a:xfrm>
-          <a:off x="0" y="0"/>
-          <a:ext cx="0" cy="0"/>
-          <a:chOff x="0" y="0"/>
-          <a:chExt cx="0" cy="0"/>
-        </a:xfrm>
-      </p:grpSpPr>
-      <p:sp>
-        <p:nvSpPr>
-          <p:cNvPr id="22" name="Rectangle 21">
-            <a:extLst>
-              <a:ext uri="{FF2B5EF4-FFF2-40B4-BE49-F238E27FC236}">
-                <a16:creationId xmlns:a16="http://schemas.microsoft.com/office/drawing/2014/main" id="{FB5B0058-AF13-4859-B429-4EDDE2A26F7F}"/>
-              </a:ext>
-              <a:ext uri="{C183D7F6-B498-43B3-948B-1728B52AA6E4}">
-                <adec:decorative xmlns:adec="http://schemas.microsoft.com/office/drawing/2017/decorative" val="1"/>
-              </a:ext>
-            </a:extLst>
-          </p:cNvPr>
-          <p:cNvSpPr>
-            <a:spLocks noGrp="1" noRot="1" noChangeAspect="1" noMove="1" noResize="1" noEditPoints="1" noAdjustHandles="1" noChangeArrowheads="1" noChangeShapeType="1" noTextEdit="1"/>
-          </p:cNvSpPr>
-          <p:nvPr>
-            <p:extLst>
-              <p:ext uri="{386F3935-93C4-4BCD-93E2-E3B085C9AB24}">
-                <p16:designElem xmlns:p16="http://schemas.microsoft.com/office/powerpoint/2015/main" val="1"/>
-              </p:ext>
-            </p:extLst>
-          </p:nvPr>
-        </p:nvSpPr>
-        <p:spPr>
-          <a:xfrm>
-            <a:off x="0" y="0"/>
-            <a:ext cx="12192000" cy="6858000"/>
-          </a:xfrm>
-          <a:prstGeom prst="rect">
-            <a:avLst/>
-          </a:prstGeom>
-          <a:solidFill>
-            <a:schemeClr val="tx1">
-              <a:lumMod val="95000"/>
-              <a:lumOff val="5000"/>
-            </a:schemeClr>
-          </a:solidFill>
-          <a:ln>
-            <a:noFill/>
-          </a:ln>
-        </p:spPr>
-        <p:style>
-          <a:lnRef idx="2">
-            <a:schemeClr val="accent1">
-              <a:shade val="50000"/>
-            </a:schemeClr>
-          </a:lnRef>
-          <a:fillRef idx="1">
-            <a:schemeClr val="accent1"/>
-          </a:fillRef>
-          <a:effectRef idx="0">
-            <a:schemeClr val="accent1"/>
-          </a:effectRef>
-          <a:fontRef idx="minor">
-            <a:schemeClr val="lt1"/>
-          </a:fontRef>
-        </p:style>
-        <p:txBody>
-          <a:bodyPr rtlCol="0" anchor="ctr"/>
-          <a:lstStyle/>
-          <a:p>
-            <a:pPr algn="ctr"/>
-            <a:endParaRPr lang="en-US" dirty="0">
-              <a:solidFill>
-                <a:schemeClr val="tx1"/>
-              </a:solidFill>
-            </a:endParaRPr>
-          </a:p>
-        </p:txBody>
-      </p:sp>
-      <p:sp>
-        <p:nvSpPr>
-          <p:cNvPr id="2" name="Title 1">
-            <a:extLst>
-              <a:ext uri="{FF2B5EF4-FFF2-40B4-BE49-F238E27FC236}">
-                <a16:creationId xmlns:a16="http://schemas.microsoft.com/office/drawing/2014/main" id="{8BC8A551-30D9-35B6-870F-6A923EA84886}"/>
-              </a:ext>
-            </a:extLst>
-          </p:cNvPr>
-          <p:cNvSpPr>
-            <a:spLocks noGrp="1"/>
-          </p:cNvSpPr>
-          <p:nvPr>
-            <p:ph type="title"/>
-          </p:nvPr>
-        </p:nvSpPr>
-        <p:spPr>
-          <a:xfrm>
-            <a:off x="0" y="973709"/>
-            <a:ext cx="3732039" cy="587202"/>
-          </a:xfrm>
-        </p:spPr>
-        <p:txBody>
-          <a:bodyPr vert="horz" lIns="91440" tIns="45720" rIns="91440" bIns="45720" rtlCol="0" anchor="ctr">
-            <a:normAutofit fontScale="90000"/>
-          </a:bodyPr>
-          <a:lstStyle/>
-          <a:p>
-            <a:pPr algn="ctr"/>
-            <a:r>
-              <a:rPr lang="en-US" sz="6000" kern="1200" dirty="0">
-                <a:solidFill>
-                  <a:schemeClr val="bg1"/>
-                </a:solidFill>
-                <a:latin typeface="+mj-lt"/>
-                <a:ea typeface="+mj-ea"/>
-                <a:cs typeface="+mj-cs"/>
-              </a:rPr>
-              <a:t>Outcomes</a:t>
-            </a:r>
-          </a:p>
-        </p:txBody>
-      </p:sp>
-      <p:cxnSp>
-        <p:nvCxnSpPr>
-          <p:cNvPr id="24" name="Straight Connector 23">
-            <a:extLst>
-              <a:ext uri="{FF2B5EF4-FFF2-40B4-BE49-F238E27FC236}">
-                <a16:creationId xmlns:a16="http://schemas.microsoft.com/office/drawing/2014/main" id="{E6D6B450-4278-45B8-88C7-C061710E3C7E}"/>
-              </a:ext>
-              <a:ext uri="{C183D7F6-B498-43B3-948B-1728B52AA6E4}">
-                <adec:decorative xmlns:adec="http://schemas.microsoft.com/office/drawing/2017/decorative" val="1"/>
-              </a:ext>
-            </a:extLst>
-          </p:cNvPr>
-          <p:cNvCxnSpPr>
-            <a:cxnSpLocks noGrp="1" noRot="1" noChangeAspect="1" noMove="1" noResize="1" noEditPoints="1" noAdjustHandles="1" noChangeArrowheads="1" noChangeShapeType="1"/>
-          </p:cNvCxnSpPr>
-          <p:nvPr>
-            <p:extLst>
-              <p:ext uri="{386F3935-93C4-4BCD-93E2-E3B085C9AB24}">
-                <p16:designElem xmlns:p16="http://schemas.microsoft.com/office/powerpoint/2015/main" val="1"/>
-              </p:ext>
-            </p:extLst>
-          </p:nvPr>
-        </p:nvCxnSpPr>
-        <p:spPr>
-          <a:xfrm flipH="1">
-            <a:off x="0" y="1560911"/>
-            <a:ext cx="3581400" cy="0"/>
-          </a:xfrm>
-          <a:prstGeom prst="line">
-            <a:avLst/>
-          </a:prstGeom>
-          <a:ln w="12700">
-            <a:solidFill>
-              <a:schemeClr val="accent2"/>
-            </a:solidFill>
-          </a:ln>
-        </p:spPr>
-        <p:style>
-          <a:lnRef idx="1">
-            <a:schemeClr val="accent1"/>
-          </a:lnRef>
-          <a:fillRef idx="0">
-            <a:schemeClr val="accent1"/>
-          </a:fillRef>
-          <a:effectRef idx="0">
-            <a:schemeClr val="accent1"/>
-          </a:effectRef>
-          <a:fontRef idx="minor">
-            <a:schemeClr val="tx1"/>
-          </a:fontRef>
-        </p:style>
-      </p:cxnSp>
-      <p:cxnSp>
-        <p:nvCxnSpPr>
-          <p:cNvPr id="26" name="Straight Connector 25">
-            <a:extLst>
-              <a:ext uri="{FF2B5EF4-FFF2-40B4-BE49-F238E27FC236}">
-                <a16:creationId xmlns:a16="http://schemas.microsoft.com/office/drawing/2014/main" id="{EE7CEFB9-5672-4FC6-981B-C8DA3FE08EA2}"/>
-              </a:ext>
-              <a:ext uri="{C183D7F6-B498-43B3-948B-1728B52AA6E4}">
-                <adec:decorative xmlns:adec="http://schemas.microsoft.com/office/drawing/2017/decorative" val="1"/>
-              </a:ext>
-            </a:extLst>
-          </p:cNvPr>
-          <p:cNvCxnSpPr>
-            <a:cxnSpLocks noGrp="1" noRot="1" noChangeAspect="1" noMove="1" noResize="1" noEditPoints="1" noAdjustHandles="1" noChangeArrowheads="1" noChangeShapeType="1"/>
-          </p:cNvCxnSpPr>
-          <p:nvPr>
-            <p:extLst>
-              <p:ext uri="{386F3935-93C4-4BCD-93E2-E3B085C9AB24}">
-                <p16:designElem xmlns:p16="http://schemas.microsoft.com/office/powerpoint/2015/main" val="1"/>
-              </p:ext>
-            </p:extLst>
-          </p:nvPr>
-        </p:nvCxnSpPr>
-        <p:spPr>
-          <a:xfrm flipH="1">
-            <a:off x="8610600" y="1560911"/>
-            <a:ext cx="3581400" cy="0"/>
-          </a:xfrm>
-          <a:prstGeom prst="line">
-            <a:avLst/>
-          </a:prstGeom>
-          <a:ln w="12700">
-            <a:solidFill>
-              <a:schemeClr val="accent2"/>
-            </a:solidFill>
-          </a:ln>
-        </p:spPr>
-        <p:style>
-          <a:lnRef idx="1">
-            <a:schemeClr val="accent1"/>
-          </a:lnRef>
-          <a:fillRef idx="0">
-            <a:schemeClr val="accent1"/>
-          </a:fillRef>
-          <a:effectRef idx="0">
-            <a:schemeClr val="accent1"/>
-          </a:effectRef>
-          <a:fontRef idx="minor">
-            <a:schemeClr val="tx1"/>
-          </a:fontRef>
-        </p:style>
-      </p:cxnSp>
-      <p:cxnSp>
-        <p:nvCxnSpPr>
-          <p:cNvPr id="28" name="Straight Connector 27">
-            <a:extLst>
-              <a:ext uri="{FF2B5EF4-FFF2-40B4-BE49-F238E27FC236}">
-                <a16:creationId xmlns:a16="http://schemas.microsoft.com/office/drawing/2014/main" id="{74234A4C-A256-4139-A5F4-27078F0D6796}"/>
-              </a:ext>
-              <a:ext uri="{C183D7F6-B498-43B3-948B-1728B52AA6E4}">
-                <adec:decorative xmlns:adec="http://schemas.microsoft.com/office/drawing/2017/decorative" val="1"/>
-              </a:ext>
-            </a:extLst>
-          </p:cNvPr>
-          <p:cNvCxnSpPr>
-            <a:cxnSpLocks noGrp="1" noRot="1" noChangeAspect="1" noMove="1" noResize="1" noEditPoints="1" noAdjustHandles="1" noChangeArrowheads="1" noChangeShapeType="1"/>
-          </p:cNvCxnSpPr>
-          <p:nvPr>
-            <p:extLst>
-              <p:ext uri="{386F3935-93C4-4BCD-93E2-E3B085C9AB24}">
-                <p16:designElem xmlns:p16="http://schemas.microsoft.com/office/powerpoint/2015/main" val="1"/>
-              </p:ext>
-            </p:extLst>
-          </p:nvPr>
-        </p:nvCxnSpPr>
-        <p:spPr>
-          <a:xfrm flipH="1">
-            <a:off x="3048" y="5286237"/>
-            <a:ext cx="12188952" cy="0"/>
-          </a:xfrm>
-          <a:prstGeom prst="line">
-            <a:avLst/>
-          </a:prstGeom>
-          <a:ln w="12700">
-            <a:solidFill>
-              <a:schemeClr val="accent2"/>
-            </a:solidFill>
-          </a:ln>
-        </p:spPr>
-        <p:style>
-          <a:lnRef idx="1">
-            <a:schemeClr val="accent1"/>
-          </a:lnRef>
-          <a:fillRef idx="0">
-            <a:schemeClr val="accent1"/>
-          </a:fillRef>
-          <a:effectRef idx="0">
-            <a:schemeClr val="accent1"/>
-          </a:effectRef>
-          <a:fontRef idx="minor">
-            <a:schemeClr val="tx1"/>
-          </a:fontRef>
-        </p:style>
-      </p:cxnSp>
-      <p:sp>
-        <p:nvSpPr>
-          <p:cNvPr id="4" name="Date Placeholder 3">
-            <a:extLst>
-              <a:ext uri="{FF2B5EF4-FFF2-40B4-BE49-F238E27FC236}">
-                <a16:creationId xmlns:a16="http://schemas.microsoft.com/office/drawing/2014/main" id="{60AA39EA-1BD4-5ADF-82A5-488914B68D98}"/>
-              </a:ext>
-            </a:extLst>
-          </p:cNvPr>
-          <p:cNvSpPr>
-            <a:spLocks noGrp="1"/>
-          </p:cNvSpPr>
-          <p:nvPr>
-            <p:ph type="dt" sz="half" idx="10"/>
-          </p:nvPr>
-        </p:nvSpPr>
-        <p:spPr>
-          <a:xfrm>
-            <a:off x="838200" y="6356350"/>
-            <a:ext cx="2743200" cy="365125"/>
-          </a:xfrm>
-        </p:spPr>
-        <p:txBody>
-          <a:bodyPr vert="horz" lIns="91440" tIns="45720" rIns="91440" bIns="45720" rtlCol="0" anchor="ctr">
-            <a:normAutofit/>
-          </a:bodyPr>
-          <a:lstStyle/>
-          <a:p>
-            <a:pPr>
-              <a:spcAft>
-                <a:spcPts val="600"/>
-              </a:spcAft>
-            </a:pPr>
-            <a:fld id="{DD303E3B-074C-440F-86D1-3BB7E04505DE}" type="datetimeyyyy">
-              <a:rPr lang="en-US">
-                <a:solidFill>
-                  <a:schemeClr val="bg1">
-                    <a:lumMod val="50000"/>
-                  </a:schemeClr>
-                </a:solidFill>
-              </a:rPr>
-              <a:pPr>
-                <a:spcAft>
-                  <a:spcPts val="600"/>
-                </a:spcAft>
-              </a:pPr>
-              <a:t>2024</a:t>
-            </a:fld>
-            <a:endParaRPr lang="en-US">
-              <a:solidFill>
-                <a:schemeClr val="bg1">
-                  <a:lumMod val="50000"/>
-                </a:schemeClr>
-              </a:solidFill>
-            </a:endParaRPr>
-          </a:p>
-        </p:txBody>
-      </p:sp>
-      <p:sp>
-        <p:nvSpPr>
-          <p:cNvPr id="5" name="Footer Placeholder 4">
-            <a:extLst>
-              <a:ext uri="{FF2B5EF4-FFF2-40B4-BE49-F238E27FC236}">
-                <a16:creationId xmlns:a16="http://schemas.microsoft.com/office/drawing/2014/main" id="{8251454E-77DD-4304-F4AF-245027455781}"/>
-              </a:ext>
-            </a:extLst>
-          </p:cNvPr>
-          <p:cNvSpPr>
-            <a:spLocks noGrp="1"/>
-          </p:cNvSpPr>
-          <p:nvPr>
-            <p:ph type="ftr" sz="quarter" idx="11"/>
-          </p:nvPr>
-        </p:nvSpPr>
-        <p:spPr>
-          <a:xfrm>
-            <a:off x="4038600" y="6356350"/>
-            <a:ext cx="4114800" cy="365125"/>
-          </a:xfrm>
-        </p:spPr>
-        <p:txBody>
-          <a:bodyPr vert="horz" lIns="91440" tIns="45720" rIns="91440" bIns="45720" rtlCol="0" anchor="ctr">
-            <a:normAutofit/>
-          </a:bodyPr>
-          <a:lstStyle/>
-          <a:p>
-            <a:pPr>
-              <a:spcAft>
-                <a:spcPts val="600"/>
-              </a:spcAft>
-            </a:pPr>
-            <a:r>
-              <a:rPr lang="en-US" kern="1200">
-                <a:solidFill>
-                  <a:schemeClr val="bg1">
-                    <a:lumMod val="50000"/>
-                  </a:schemeClr>
-                </a:solidFill>
-                <a:latin typeface="+mn-lt"/>
-                <a:ea typeface="+mn-ea"/>
-                <a:cs typeface="+mn-cs"/>
-              </a:rPr>
-              <a:t>GENG4500-60</a:t>
-            </a:r>
-          </a:p>
-        </p:txBody>
-      </p:sp>
-      <p:sp>
-        <p:nvSpPr>
-          <p:cNvPr id="6" name="Slide Number Placeholder 5">
-            <a:extLst>
-              <a:ext uri="{FF2B5EF4-FFF2-40B4-BE49-F238E27FC236}">
-                <a16:creationId xmlns:a16="http://schemas.microsoft.com/office/drawing/2014/main" id="{525E3120-057C-155F-E7EF-176F72BED592}"/>
-              </a:ext>
-            </a:extLst>
-          </p:cNvPr>
-          <p:cNvSpPr>
-            <a:spLocks noGrp="1"/>
-          </p:cNvSpPr>
-          <p:nvPr>
-            <p:ph type="sldNum" sz="quarter" idx="12"/>
-          </p:nvPr>
-        </p:nvSpPr>
-        <p:spPr>
-          <a:xfrm>
-            <a:off x="8610600" y="6356350"/>
-            <a:ext cx="2743200" cy="365125"/>
-          </a:xfrm>
-        </p:spPr>
-        <p:txBody>
-          <a:bodyPr vert="horz" lIns="91440" tIns="45720" rIns="91440" bIns="45720" rtlCol="0" anchor="ctr">
-            <a:normAutofit/>
-          </a:bodyPr>
-          <a:lstStyle/>
-          <a:p>
-            <a:pPr>
-              <a:spcAft>
-                <a:spcPts val="600"/>
-              </a:spcAft>
-            </a:pPr>
-            <a:fld id="{BC1B8E0F-90D7-4F6F-9CC4-1E156486B9C1}" type="slidenum">
-              <a:rPr lang="en-US">
-                <a:solidFill>
-                  <a:schemeClr val="bg1">
-                    <a:lumMod val="50000"/>
-                  </a:schemeClr>
-                </a:solidFill>
-              </a:rPr>
-              <a:pPr>
-                <a:spcAft>
-                  <a:spcPts val="600"/>
-                </a:spcAft>
-              </a:pPr>
-              <a:t>9</a:t>
-            </a:fld>
-            <a:endParaRPr lang="en-US">
-              <a:solidFill>
-                <a:schemeClr val="bg1">
-                  <a:lumMod val="50000"/>
-                </a:schemeClr>
-              </a:solidFill>
-            </a:endParaRPr>
-          </a:p>
-        </p:txBody>
-      </p:sp>
-      <p:pic>
-        <p:nvPicPr>
-          <p:cNvPr id="7" name="Graphic 6">
-            <a:extLst>
-              <a:ext uri="{FF2B5EF4-FFF2-40B4-BE49-F238E27FC236}">
-                <a16:creationId xmlns:a16="http://schemas.microsoft.com/office/drawing/2014/main" id="{5BE07C6B-A5B6-19A0-E362-F0E268678255}"/>
-              </a:ext>
-            </a:extLst>
-          </p:cNvPr>
-          <p:cNvPicPr>
-            <a:picLocks noChangeAspect="1"/>
-          </p:cNvPicPr>
-          <p:nvPr/>
-        </p:nvPicPr>
-        <p:blipFill>
-          <a:blip r:embed="rId2">
-            <a:extLst>
-              <a:ext uri="{28A0092B-C50C-407E-A947-70E740481C1C}">
-                <a14:useLocalDpi xmlns:a14="http://schemas.microsoft.com/office/drawing/2010/main" val="0"/>
-              </a:ext>
-              <a:ext uri="{96DAC541-7B7A-43D3-8B79-37D633B846F1}">
-                <asvg:svgBlip xmlns:asvg="http://schemas.microsoft.com/office/drawing/2016/SVG/main" r:embed="rId3"/>
-              </a:ext>
-            </a:extLst>
-          </a:blip>
-          <a:stretch>
-            <a:fillRect/>
-          </a:stretch>
-        </p:blipFill>
-        <p:spPr>
-          <a:xfrm>
-            <a:off x="128016" y="1625408"/>
-            <a:ext cx="4748784" cy="3524304"/>
-          </a:xfrm>
-          <a:prstGeom prst="rect">
-            <a:avLst/>
-          </a:prstGeom>
-        </p:spPr>
-      </p:pic>
-      <p:pic>
-        <p:nvPicPr>
-          <p:cNvPr id="9" name="Graphic 8">
-            <a:extLst>
-              <a:ext uri="{FF2B5EF4-FFF2-40B4-BE49-F238E27FC236}">
-                <a16:creationId xmlns:a16="http://schemas.microsoft.com/office/drawing/2014/main" id="{B1E28D3C-54B0-066A-6250-64EF7ED78FD0}"/>
-              </a:ext>
-            </a:extLst>
-          </p:cNvPr>
-          <p:cNvPicPr>
-            <a:picLocks noChangeAspect="1"/>
-          </p:cNvPicPr>
-          <p:nvPr/>
-        </p:nvPicPr>
-        <p:blipFill>
-          <a:blip r:embed="rId4">
-            <a:extLst>
-              <a:ext uri="{28A0092B-C50C-407E-A947-70E740481C1C}">
-                <a14:useLocalDpi xmlns:a14="http://schemas.microsoft.com/office/drawing/2010/main" val="0"/>
-              </a:ext>
-              <a:ext uri="{96DAC541-7B7A-43D3-8B79-37D633B846F1}">
-                <asvg:svgBlip xmlns:asvg="http://schemas.microsoft.com/office/drawing/2016/SVG/main" r:embed="rId5"/>
-              </a:ext>
-            </a:extLst>
-          </a:blip>
-          <a:stretch>
-            <a:fillRect/>
-          </a:stretch>
-        </p:blipFill>
-        <p:spPr>
-          <a:xfrm>
-            <a:off x="7241034" y="1625408"/>
-            <a:ext cx="4822950" cy="3579346"/>
-          </a:xfrm>
-          <a:prstGeom prst="rect">
-            <a:avLst/>
-          </a:prstGeom>
-        </p:spPr>
-      </p:pic>
-    </p:spTree>
-    <p:extLst>
-      <p:ext uri="{BB962C8B-B14F-4D97-AF65-F5344CB8AC3E}">
-        <p14:creationId xmlns:p14="http://schemas.microsoft.com/office/powerpoint/2010/main" val="393509544"/>
       </p:ext>
     </p:extLst>
   </p:cSld>

</xml_diff>